<commit_message>
Change on oral presentation
</commit_message>
<xml_diff>
--- a/oral_presentation/Oral_presentation_12_02_2019.pptx
+++ b/oral_presentation/Oral_presentation_12_02_2019.pptx
@@ -8,6 +8,23 @@
     <p:sldId id="256" r:id="rId2"/>
     <p:sldId id="257" r:id="rId3"/>
     <p:sldId id="258" r:id="rId4"/>
+    <p:sldId id="259" r:id="rId5"/>
+    <p:sldId id="260" r:id="rId6"/>
+    <p:sldId id="261" r:id="rId7"/>
+    <p:sldId id="264" r:id="rId8"/>
+    <p:sldId id="263" r:id="rId9"/>
+    <p:sldId id="265" r:id="rId10"/>
+    <p:sldId id="266" r:id="rId11"/>
+    <p:sldId id="267" r:id="rId12"/>
+    <p:sldId id="270" r:id="rId13"/>
+    <p:sldId id="272" r:id="rId14"/>
+    <p:sldId id="274" r:id="rId15"/>
+    <p:sldId id="273" r:id="rId16"/>
+    <p:sldId id="275" r:id="rId17"/>
+    <p:sldId id="276" r:id="rId18"/>
+    <p:sldId id="277" r:id="rId19"/>
+    <p:sldId id="279" r:id="rId20"/>
+    <p:sldId id="280" r:id="rId21"/>
   </p:sldIdLst>
   <p:sldSz cx="12192000" cy="6858000"/>
   <p:notesSz cx="6858000" cy="9144000"/>
@@ -859,7 +876,7 @@
           <a:p>
             <a:fld id="{4771A69F-C10C-45E2-9AFD-1BC34CAE6126}" type="datetimeFigureOut">
               <a:rPr lang="fr-FR" smtClean="0"/>
-              <a:t>09/02/2019</a:t>
+              <a:t>10/02/2019</a:t>
             </a:fld>
             <a:endParaRPr lang="fr-FR"/>
           </a:p>
@@ -1110,7 +1127,7 @@
           <a:p>
             <a:fld id="{4771A69F-C10C-45E2-9AFD-1BC34CAE6126}" type="datetimeFigureOut">
               <a:rPr lang="fr-FR" smtClean="0"/>
-              <a:t>09/02/2019</a:t>
+              <a:t>10/02/2019</a:t>
             </a:fld>
             <a:endParaRPr lang="fr-FR"/>
           </a:p>
@@ -1424,7 +1441,7 @@
           <a:p>
             <a:fld id="{4771A69F-C10C-45E2-9AFD-1BC34CAE6126}" type="datetimeFigureOut">
               <a:rPr lang="fr-FR" smtClean="0"/>
-              <a:t>09/02/2019</a:t>
+              <a:t>10/02/2019</a:t>
             </a:fld>
             <a:endParaRPr lang="fr-FR"/>
           </a:p>
@@ -1757,7 +1774,7 @@
           <a:p>
             <a:fld id="{4771A69F-C10C-45E2-9AFD-1BC34CAE6126}" type="datetimeFigureOut">
               <a:rPr lang="fr-FR" smtClean="0"/>
-              <a:t>09/02/2019</a:t>
+              <a:t>10/02/2019</a:t>
             </a:fld>
             <a:endParaRPr lang="fr-FR"/>
           </a:p>
@@ -2071,7 +2088,7 @@
           <a:p>
             <a:fld id="{4771A69F-C10C-45E2-9AFD-1BC34CAE6126}" type="datetimeFigureOut">
               <a:rPr lang="fr-FR" smtClean="0"/>
-              <a:t>09/02/2019</a:t>
+              <a:t>10/02/2019</a:t>
             </a:fld>
             <a:endParaRPr lang="fr-FR"/>
           </a:p>
@@ -2464,7 +2481,7 @@
           <a:p>
             <a:fld id="{4771A69F-C10C-45E2-9AFD-1BC34CAE6126}" type="datetimeFigureOut">
               <a:rPr lang="fr-FR" smtClean="0"/>
-              <a:t>09/02/2019</a:t>
+              <a:t>10/02/2019</a:t>
             </a:fld>
             <a:endParaRPr lang="fr-FR"/>
           </a:p>
@@ -2634,7 +2651,7 @@
           <a:p>
             <a:fld id="{4771A69F-C10C-45E2-9AFD-1BC34CAE6126}" type="datetimeFigureOut">
               <a:rPr lang="fr-FR" smtClean="0"/>
-              <a:t>09/02/2019</a:t>
+              <a:t>10/02/2019</a:t>
             </a:fld>
             <a:endParaRPr lang="fr-FR"/>
           </a:p>
@@ -2814,7 +2831,7 @@
           <a:p>
             <a:fld id="{4771A69F-C10C-45E2-9AFD-1BC34CAE6126}" type="datetimeFigureOut">
               <a:rPr lang="fr-FR" smtClean="0"/>
-              <a:t>09/02/2019</a:t>
+              <a:t>10/02/2019</a:t>
             </a:fld>
             <a:endParaRPr lang="fr-FR"/>
           </a:p>
@@ -2984,7 +3001,7 @@
           <a:p>
             <a:fld id="{4771A69F-C10C-45E2-9AFD-1BC34CAE6126}" type="datetimeFigureOut">
               <a:rPr lang="fr-FR" smtClean="0"/>
-              <a:t>09/02/2019</a:t>
+              <a:t>10/02/2019</a:t>
             </a:fld>
             <a:endParaRPr lang="fr-FR"/>
           </a:p>
@@ -3231,7 +3248,7 @@
           <a:p>
             <a:fld id="{4771A69F-C10C-45E2-9AFD-1BC34CAE6126}" type="datetimeFigureOut">
               <a:rPr lang="fr-FR" smtClean="0"/>
-              <a:t>09/02/2019</a:t>
+              <a:t>10/02/2019</a:t>
             </a:fld>
             <a:endParaRPr lang="fr-FR"/>
           </a:p>
@@ -3463,7 +3480,7 @@
           <a:p>
             <a:fld id="{4771A69F-C10C-45E2-9AFD-1BC34CAE6126}" type="datetimeFigureOut">
               <a:rPr lang="fr-FR" smtClean="0"/>
-              <a:t>09/02/2019</a:t>
+              <a:t>10/02/2019</a:t>
             </a:fld>
             <a:endParaRPr lang="fr-FR"/>
           </a:p>
@@ -3837,7 +3854,7 @@
           <a:p>
             <a:fld id="{4771A69F-C10C-45E2-9AFD-1BC34CAE6126}" type="datetimeFigureOut">
               <a:rPr lang="fr-FR" smtClean="0"/>
-              <a:t>09/02/2019</a:t>
+              <a:t>10/02/2019</a:t>
             </a:fld>
             <a:endParaRPr lang="fr-FR"/>
           </a:p>
@@ -3960,7 +3977,7 @@
           <a:p>
             <a:fld id="{4771A69F-C10C-45E2-9AFD-1BC34CAE6126}" type="datetimeFigureOut">
               <a:rPr lang="fr-FR" smtClean="0"/>
-              <a:t>09/02/2019</a:t>
+              <a:t>10/02/2019</a:t>
             </a:fld>
             <a:endParaRPr lang="fr-FR"/>
           </a:p>
@@ -4055,7 +4072,7 @@
           <a:p>
             <a:fld id="{4771A69F-C10C-45E2-9AFD-1BC34CAE6126}" type="datetimeFigureOut">
               <a:rPr lang="fr-FR" smtClean="0"/>
-              <a:t>09/02/2019</a:t>
+              <a:t>10/02/2019</a:t>
             </a:fld>
             <a:endParaRPr lang="fr-FR"/>
           </a:p>
@@ -4310,7 +4327,7 @@
           <a:p>
             <a:fld id="{4771A69F-C10C-45E2-9AFD-1BC34CAE6126}" type="datetimeFigureOut">
               <a:rPr lang="fr-FR" smtClean="0"/>
-              <a:t>09/02/2019</a:t>
+              <a:t>10/02/2019</a:t>
             </a:fld>
             <a:endParaRPr lang="fr-FR"/>
           </a:p>
@@ -4615,7 +4632,7 @@
           <a:p>
             <a:fld id="{4771A69F-C10C-45E2-9AFD-1BC34CAE6126}" type="datetimeFigureOut">
               <a:rPr lang="fr-FR" smtClean="0"/>
-              <a:t>09/02/2019</a:t>
+              <a:t>10/02/2019</a:t>
             </a:fld>
             <a:endParaRPr lang="fr-FR"/>
           </a:p>
@@ -5317,7 +5334,7 @@
           <a:p>
             <a:fld id="{4771A69F-C10C-45E2-9AFD-1BC34CAE6126}" type="datetimeFigureOut">
               <a:rPr lang="fr-FR" smtClean="0"/>
-              <a:t>09/02/2019</a:t>
+              <a:t>10/02/2019</a:t>
             </a:fld>
             <a:endParaRPr lang="fr-FR"/>
           </a:p>
@@ -5910,6 +5927,1852 @@
 </p:sld>
 </file>
 
+<file path=ppt/slides/slide10.xml><?xml version="1.0" encoding="utf-8"?>
+<p:sld xmlns:a="http://schemas.openxmlformats.org/drawingml/2006/main" xmlns:r="http://schemas.openxmlformats.org/officeDocument/2006/relationships" xmlns:p="http://schemas.openxmlformats.org/presentationml/2006/main">
+  <p:cSld>
+    <p:spTree>
+      <p:nvGrpSpPr>
+        <p:cNvPr id="1" name=""/>
+        <p:cNvGrpSpPr/>
+        <p:nvPr/>
+      </p:nvGrpSpPr>
+      <p:grpSpPr>
+        <a:xfrm>
+          <a:off x="0" y="0"/>
+          <a:ext cx="0" cy="0"/>
+          <a:chOff x="0" y="0"/>
+          <a:chExt cx="0" cy="0"/>
+        </a:xfrm>
+      </p:grpSpPr>
+      <p:sp>
+        <p:nvSpPr>
+          <p:cNvPr id="2" name="Titre 1">
+            <a:extLst>
+              <a:ext uri="{FF2B5EF4-FFF2-40B4-BE49-F238E27FC236}">
+                <a16:creationId xmlns:a16="http://schemas.microsoft.com/office/drawing/2014/main" id="{BA08D9E1-CEC9-4B88-AE35-3ECF4E31C848}"/>
+              </a:ext>
+            </a:extLst>
+          </p:cNvPr>
+          <p:cNvSpPr>
+            <a:spLocks noGrp="1"/>
+          </p:cNvSpPr>
+          <p:nvPr>
+            <p:ph type="title"/>
+          </p:nvPr>
+        </p:nvSpPr>
+        <p:spPr/>
+        <p:txBody>
+          <a:bodyPr/>
+          <a:lstStyle/>
+          <a:p>
+            <a:pPr algn="ctr"/>
+            <a:r>
+              <a:rPr lang="fr-FR" dirty="0"/>
+              <a:t>II – Gestion de projet</a:t>
+            </a:r>
+            <a:br>
+              <a:rPr lang="fr-FR" dirty="0"/>
+            </a:br>
+            <a:r>
+              <a:rPr lang="fr-FR" sz="2800" dirty="0"/>
+              <a:t>Conclusion</a:t>
+            </a:r>
+            <a:endParaRPr lang="fr-FR" dirty="0"/>
+          </a:p>
+        </p:txBody>
+      </p:sp>
+      <p:sp>
+        <p:nvSpPr>
+          <p:cNvPr id="3" name="Espace réservé du contenu 2">
+            <a:extLst>
+              <a:ext uri="{FF2B5EF4-FFF2-40B4-BE49-F238E27FC236}">
+                <a16:creationId xmlns:a16="http://schemas.microsoft.com/office/drawing/2014/main" id="{A9A29769-64FE-41E1-8464-629C5513BB6F}"/>
+              </a:ext>
+            </a:extLst>
+          </p:cNvPr>
+          <p:cNvSpPr>
+            <a:spLocks noGrp="1"/>
+          </p:cNvSpPr>
+          <p:nvPr>
+            <p:ph idx="1"/>
+          </p:nvPr>
+        </p:nvSpPr>
+        <p:spPr/>
+        <p:txBody>
+          <a:bodyPr/>
+          <a:lstStyle/>
+          <a:p>
+            <a:r>
+              <a:rPr lang="fr-FR" dirty="0"/>
+              <a:t>Satisfaction client </a:t>
+            </a:r>
+          </a:p>
+          <a:p>
+            <a:endParaRPr lang="fr-FR" dirty="0"/>
+          </a:p>
+          <a:p>
+            <a:r>
+              <a:rPr lang="fr-FR" dirty="0"/>
+              <a:t>Investigation sur des problèmes plus complexes </a:t>
+            </a:r>
+          </a:p>
+          <a:p>
+            <a:endParaRPr lang="fr-FR" dirty="0"/>
+          </a:p>
+          <a:p>
+            <a:r>
+              <a:rPr lang="fr-FR" dirty="0"/>
+              <a:t>Préconisation sur l’emploi des méthodes selon le problème à traiter</a:t>
+            </a:r>
+          </a:p>
+          <a:p>
+            <a:endParaRPr lang="fr-FR" dirty="0"/>
+          </a:p>
+          <a:p>
+            <a:r>
+              <a:rPr lang="fr-FR" dirty="0"/>
+              <a:t>Ouverture sur de nouvelles problématiques </a:t>
+            </a:r>
+          </a:p>
+        </p:txBody>
+      </p:sp>
+    </p:spTree>
+    <p:extLst>
+      <p:ext uri="{BB962C8B-B14F-4D97-AF65-F5344CB8AC3E}">
+        <p14:creationId xmlns:p14="http://schemas.microsoft.com/office/powerpoint/2010/main" val="3356429125"/>
+      </p:ext>
+    </p:extLst>
+  </p:cSld>
+  <p:clrMapOvr>
+    <a:masterClrMapping/>
+  </p:clrMapOvr>
+</p:sld>
+</file>
+
+<file path=ppt/slides/slide11.xml><?xml version="1.0" encoding="utf-8"?>
+<p:sld xmlns:a="http://schemas.openxmlformats.org/drawingml/2006/main" xmlns:r="http://schemas.openxmlformats.org/officeDocument/2006/relationships" xmlns:p="http://schemas.openxmlformats.org/presentationml/2006/main">
+  <p:cSld>
+    <p:spTree>
+      <p:nvGrpSpPr>
+        <p:cNvPr id="1" name=""/>
+        <p:cNvGrpSpPr/>
+        <p:nvPr/>
+      </p:nvGrpSpPr>
+      <p:grpSpPr>
+        <a:xfrm>
+          <a:off x="0" y="0"/>
+          <a:ext cx="0" cy="0"/>
+          <a:chOff x="0" y="0"/>
+          <a:chExt cx="0" cy="0"/>
+        </a:xfrm>
+      </p:grpSpPr>
+      <p:sp>
+        <p:nvSpPr>
+          <p:cNvPr id="2" name="Titre 1">
+            <a:extLst>
+              <a:ext uri="{FF2B5EF4-FFF2-40B4-BE49-F238E27FC236}">
+                <a16:creationId xmlns:a16="http://schemas.microsoft.com/office/drawing/2014/main" id="{EBA0D8F0-6DB9-4391-BE2E-594E0C99CB60}"/>
+              </a:ext>
+            </a:extLst>
+          </p:cNvPr>
+          <p:cNvSpPr>
+            <a:spLocks noGrp="1"/>
+          </p:cNvSpPr>
+          <p:nvPr>
+            <p:ph type="title"/>
+          </p:nvPr>
+        </p:nvSpPr>
+        <p:spPr/>
+        <p:txBody>
+          <a:bodyPr/>
+          <a:lstStyle/>
+          <a:p>
+            <a:r>
+              <a:rPr lang="fr-FR" dirty="0"/>
+              <a:t>III - Méthodes numériques temporelles usuelles </a:t>
+            </a:r>
+          </a:p>
+        </p:txBody>
+      </p:sp>
+      <p:sp>
+        <p:nvSpPr>
+          <p:cNvPr id="3" name="Espace réservé du contenu 2">
+            <a:extLst>
+              <a:ext uri="{FF2B5EF4-FFF2-40B4-BE49-F238E27FC236}">
+                <a16:creationId xmlns:a16="http://schemas.microsoft.com/office/drawing/2014/main" id="{0580CE79-11C7-4557-A919-4162E26770A3}"/>
+              </a:ext>
+            </a:extLst>
+          </p:cNvPr>
+          <p:cNvSpPr>
+            <a:spLocks noGrp="1"/>
+          </p:cNvSpPr>
+          <p:nvPr>
+            <p:ph idx="1"/>
+          </p:nvPr>
+        </p:nvSpPr>
+        <p:spPr>
+          <a:xfrm>
+            <a:off x="677334" y="2160589"/>
+            <a:ext cx="8596668" cy="4373376"/>
+          </a:xfrm>
+        </p:spPr>
+        <p:txBody>
+          <a:bodyPr/>
+          <a:lstStyle/>
+          <a:p>
+            <a:r>
+              <a:rPr lang="fr-FR" dirty="0"/>
+              <a:t>Méthodes Explicites </a:t>
+            </a:r>
+          </a:p>
+          <a:p>
+            <a:pPr lvl="1"/>
+            <a:r>
+              <a:rPr lang="fr-FR" dirty="0"/>
+              <a:t>Cher en temps de calcul, nombres d’opérations, mémoire nécessaire</a:t>
+            </a:r>
+          </a:p>
+          <a:p>
+            <a:pPr lvl="1"/>
+            <a:r>
+              <a:rPr lang="fr-FR" dirty="0"/>
+              <a:t>Plutôt utilisée dans le cadre de phénomène à courte durée du type chocs</a:t>
+            </a:r>
+          </a:p>
+          <a:p>
+            <a:pPr lvl="1"/>
+            <a:r>
+              <a:rPr lang="fr-FR" dirty="0"/>
+              <a:t>Pas toujours stable (vérifier lipschitzienne) </a:t>
+            </a:r>
+          </a:p>
+          <a:p>
+            <a:pPr marL="457200" lvl="1" indent="0">
+              <a:buNone/>
+            </a:pPr>
+            <a:endParaRPr lang="fr-FR" dirty="0"/>
+          </a:p>
+          <a:p>
+            <a:r>
+              <a:rPr lang="fr-FR" dirty="0"/>
+              <a:t>Méthodes Implicites </a:t>
+            </a:r>
+          </a:p>
+          <a:p>
+            <a:pPr lvl="1"/>
+            <a:r>
+              <a:rPr lang="fr-FR" dirty="0"/>
+              <a:t>Méthodes toujours stables </a:t>
+            </a:r>
+          </a:p>
+          <a:p>
+            <a:pPr lvl="1"/>
+            <a:r>
+              <a:rPr lang="fr-FR" dirty="0"/>
+              <a:t>Moins de coût de mémoire </a:t>
+            </a:r>
+          </a:p>
+          <a:p>
+            <a:pPr lvl="1"/>
+            <a:endParaRPr lang="fr-FR" dirty="0"/>
+          </a:p>
+          <a:p>
+            <a:r>
+              <a:rPr lang="fr-FR" dirty="0"/>
+              <a:t>Les méthodes les plus utilisées en CFD actuellement sont Runge-</a:t>
+            </a:r>
+            <a:r>
+              <a:rPr lang="fr-FR" dirty="0" err="1"/>
+              <a:t>Kutta</a:t>
+            </a:r>
+            <a:r>
+              <a:rPr lang="fr-FR" dirty="0"/>
+              <a:t> et </a:t>
+            </a:r>
+            <a:r>
+              <a:rPr lang="fr-FR" dirty="0" err="1"/>
+              <a:t>Gear</a:t>
+            </a:r>
+            <a:endParaRPr lang="fr-FR" dirty="0"/>
+          </a:p>
+          <a:p>
+            <a:pPr marL="457200" lvl="1" indent="0">
+              <a:buNone/>
+            </a:pPr>
+            <a:endParaRPr lang="fr-FR" dirty="0"/>
+          </a:p>
+          <a:p>
+            <a:pPr lvl="1"/>
+            <a:endParaRPr lang="fr-FR" dirty="0"/>
+          </a:p>
+          <a:p>
+            <a:endParaRPr lang="fr-FR" dirty="0"/>
+          </a:p>
+          <a:p>
+            <a:endParaRPr lang="fr-FR" dirty="0"/>
+          </a:p>
+        </p:txBody>
+      </p:sp>
+    </p:spTree>
+    <p:extLst>
+      <p:ext uri="{BB962C8B-B14F-4D97-AF65-F5344CB8AC3E}">
+        <p14:creationId xmlns:p14="http://schemas.microsoft.com/office/powerpoint/2010/main" val="659610021"/>
+      </p:ext>
+    </p:extLst>
+  </p:cSld>
+  <p:clrMapOvr>
+    <a:masterClrMapping/>
+  </p:clrMapOvr>
+</p:sld>
+</file>
+
+<file path=ppt/slides/slide12.xml><?xml version="1.0" encoding="utf-8"?>
+<p:sld xmlns:a="http://schemas.openxmlformats.org/drawingml/2006/main" xmlns:r="http://schemas.openxmlformats.org/officeDocument/2006/relationships" xmlns:p="http://schemas.openxmlformats.org/presentationml/2006/main">
+  <p:cSld>
+    <p:spTree>
+      <p:nvGrpSpPr>
+        <p:cNvPr id="1" name=""/>
+        <p:cNvGrpSpPr/>
+        <p:nvPr/>
+      </p:nvGrpSpPr>
+      <p:grpSpPr>
+        <a:xfrm>
+          <a:off x="0" y="0"/>
+          <a:ext cx="0" cy="0"/>
+          <a:chOff x="0" y="0"/>
+          <a:chExt cx="0" cy="0"/>
+        </a:xfrm>
+      </p:grpSpPr>
+      <p:sp>
+        <p:nvSpPr>
+          <p:cNvPr id="2" name="Titre 1">
+            <a:extLst>
+              <a:ext uri="{FF2B5EF4-FFF2-40B4-BE49-F238E27FC236}">
+                <a16:creationId xmlns:a16="http://schemas.microsoft.com/office/drawing/2014/main" id="{D37F7EC2-0586-4160-9928-A4EF8825E06A}"/>
+              </a:ext>
+            </a:extLst>
+          </p:cNvPr>
+          <p:cNvSpPr>
+            <a:spLocks noGrp="1"/>
+          </p:cNvSpPr>
+          <p:nvPr>
+            <p:ph type="title"/>
+          </p:nvPr>
+        </p:nvSpPr>
+        <p:spPr/>
+        <p:txBody>
+          <a:bodyPr/>
+          <a:lstStyle/>
+          <a:p>
+            <a:r>
+              <a:rPr lang="fr-FR" dirty="0"/>
+              <a:t>III - Méthodes numériques temporelles usuelles </a:t>
+            </a:r>
+          </a:p>
+        </p:txBody>
+      </p:sp>
+      <p:sp>
+        <p:nvSpPr>
+          <p:cNvPr id="3" name="Espace réservé du texte 2">
+            <a:extLst>
+              <a:ext uri="{FF2B5EF4-FFF2-40B4-BE49-F238E27FC236}">
+                <a16:creationId xmlns:a16="http://schemas.microsoft.com/office/drawing/2014/main" id="{292B8FA9-1870-407A-90FB-C7E257C081B9}"/>
+              </a:ext>
+            </a:extLst>
+          </p:cNvPr>
+          <p:cNvSpPr>
+            <a:spLocks noGrp="1"/>
+          </p:cNvSpPr>
+          <p:nvPr>
+            <p:ph type="body" idx="1"/>
+          </p:nvPr>
+        </p:nvSpPr>
+        <p:spPr/>
+        <p:txBody>
+          <a:bodyPr/>
+          <a:lstStyle/>
+          <a:p>
+            <a:r>
+              <a:rPr lang="fr-FR" dirty="0"/>
+              <a:t>Méthode RK 4 </a:t>
+            </a:r>
+          </a:p>
+        </p:txBody>
+      </p:sp>
+      <p:sp>
+        <p:nvSpPr>
+          <p:cNvPr id="4" name="Espace réservé du contenu 3">
+            <a:extLst>
+              <a:ext uri="{FF2B5EF4-FFF2-40B4-BE49-F238E27FC236}">
+                <a16:creationId xmlns:a16="http://schemas.microsoft.com/office/drawing/2014/main" id="{B7EE3265-4692-4A3D-80F0-270100CDF995}"/>
+              </a:ext>
+            </a:extLst>
+          </p:cNvPr>
+          <p:cNvSpPr>
+            <a:spLocks noGrp="1"/>
+          </p:cNvSpPr>
+          <p:nvPr>
+            <p:ph sz="half" idx="2"/>
+          </p:nvPr>
+        </p:nvSpPr>
+        <p:spPr/>
+        <p:txBody>
+          <a:bodyPr/>
+          <a:lstStyle/>
+          <a:p>
+            <a:r>
+              <a:rPr lang="fr-FR" dirty="0"/>
+              <a:t>Méthode à un pas</a:t>
+            </a:r>
+          </a:p>
+          <a:p>
+            <a:pPr marL="0" indent="0">
+              <a:buNone/>
+            </a:pPr>
+            <a:endParaRPr lang="fr-FR" dirty="0"/>
+          </a:p>
+          <a:p>
+            <a:r>
+              <a:rPr lang="fr-FR" dirty="0"/>
+              <a:t>Implicite ou explicite</a:t>
+            </a:r>
+          </a:p>
+          <a:p>
+            <a:pPr marL="0" indent="0">
+              <a:buNone/>
+            </a:pPr>
+            <a:r>
+              <a:rPr lang="fr-FR" dirty="0"/>
+              <a:t> </a:t>
+            </a:r>
+          </a:p>
+          <a:p>
+            <a:r>
+              <a:rPr lang="fr-FR" dirty="0"/>
+              <a:t>Ordre élevé </a:t>
+            </a:r>
+          </a:p>
+          <a:p>
+            <a:endParaRPr lang="fr-FR" dirty="0"/>
+          </a:p>
+          <a:p>
+            <a:r>
+              <a:rPr lang="fr-FR" dirty="0"/>
+              <a:t>Conditionnellement Stable </a:t>
+            </a:r>
+          </a:p>
+        </p:txBody>
+      </p:sp>
+      <p:sp>
+        <p:nvSpPr>
+          <p:cNvPr id="5" name="Espace réservé du texte 4">
+            <a:extLst>
+              <a:ext uri="{FF2B5EF4-FFF2-40B4-BE49-F238E27FC236}">
+                <a16:creationId xmlns:a16="http://schemas.microsoft.com/office/drawing/2014/main" id="{135FB07D-4021-4680-A6A5-0A6F94CB2C46}"/>
+              </a:ext>
+            </a:extLst>
+          </p:cNvPr>
+          <p:cNvSpPr>
+            <a:spLocks noGrp="1"/>
+          </p:cNvSpPr>
+          <p:nvPr>
+            <p:ph type="body" sz="quarter" idx="3"/>
+          </p:nvPr>
+        </p:nvSpPr>
+        <p:spPr/>
+        <p:txBody>
+          <a:bodyPr/>
+          <a:lstStyle/>
+          <a:p>
+            <a:r>
+              <a:rPr lang="fr-FR" dirty="0"/>
+              <a:t>Méthodes de </a:t>
+            </a:r>
+            <a:r>
+              <a:rPr lang="fr-FR" dirty="0" err="1"/>
+              <a:t>Gear</a:t>
+            </a:r>
+            <a:endParaRPr lang="fr-FR" dirty="0"/>
+          </a:p>
+        </p:txBody>
+      </p:sp>
+      <p:sp>
+        <p:nvSpPr>
+          <p:cNvPr id="6" name="Espace réservé du contenu 5">
+            <a:extLst>
+              <a:ext uri="{FF2B5EF4-FFF2-40B4-BE49-F238E27FC236}">
+                <a16:creationId xmlns:a16="http://schemas.microsoft.com/office/drawing/2014/main" id="{451E412D-6B17-4628-91FC-F8E869BA2B46}"/>
+              </a:ext>
+            </a:extLst>
+          </p:cNvPr>
+          <p:cNvSpPr>
+            <a:spLocks noGrp="1"/>
+          </p:cNvSpPr>
+          <p:nvPr>
+            <p:ph sz="quarter" idx="4"/>
+          </p:nvPr>
+        </p:nvSpPr>
+        <p:spPr/>
+        <p:txBody>
+          <a:bodyPr/>
+          <a:lstStyle/>
+          <a:p>
+            <a:r>
+              <a:rPr lang="fr-FR" dirty="0"/>
+              <a:t>Méthodes à pas multiples</a:t>
+            </a:r>
+          </a:p>
+          <a:p>
+            <a:pPr marL="0" indent="0">
+              <a:buNone/>
+            </a:pPr>
+            <a:endParaRPr lang="fr-FR" dirty="0"/>
+          </a:p>
+          <a:p>
+            <a:r>
+              <a:rPr lang="fr-FR" dirty="0"/>
+              <a:t>Construit à partir de polynôme d’interpolation</a:t>
+            </a:r>
+          </a:p>
+          <a:p>
+            <a:pPr marL="0" indent="0">
+              <a:buNone/>
+            </a:pPr>
+            <a:endParaRPr lang="fr-FR" dirty="0"/>
+          </a:p>
+          <a:p>
+            <a:r>
+              <a:rPr lang="fr-FR" dirty="0"/>
+              <a:t>Très utilisées pour résoudre des équations différentielles raides </a:t>
+            </a:r>
+          </a:p>
+          <a:p>
+            <a:pPr marL="0" indent="0">
+              <a:buNone/>
+            </a:pPr>
+            <a:r>
+              <a:rPr lang="fr-FR" dirty="0"/>
+              <a:t> </a:t>
+            </a:r>
+          </a:p>
+          <a:p>
+            <a:endParaRPr lang="fr-FR" dirty="0"/>
+          </a:p>
+        </p:txBody>
+      </p:sp>
+    </p:spTree>
+    <p:extLst>
+      <p:ext uri="{BB962C8B-B14F-4D97-AF65-F5344CB8AC3E}">
+        <p14:creationId xmlns:p14="http://schemas.microsoft.com/office/powerpoint/2010/main" val="2763711249"/>
+      </p:ext>
+    </p:extLst>
+  </p:cSld>
+  <p:clrMapOvr>
+    <a:masterClrMapping/>
+  </p:clrMapOvr>
+</p:sld>
+</file>
+
+<file path=ppt/slides/slide13.xml><?xml version="1.0" encoding="utf-8"?>
+<p:sld xmlns:a="http://schemas.openxmlformats.org/drawingml/2006/main" xmlns:r="http://schemas.openxmlformats.org/officeDocument/2006/relationships" xmlns:p="http://schemas.openxmlformats.org/presentationml/2006/main">
+  <p:cSld>
+    <p:spTree>
+      <p:nvGrpSpPr>
+        <p:cNvPr id="1" name=""/>
+        <p:cNvGrpSpPr/>
+        <p:nvPr/>
+      </p:nvGrpSpPr>
+      <p:grpSpPr>
+        <a:xfrm>
+          <a:off x="0" y="0"/>
+          <a:ext cx="0" cy="0"/>
+          <a:chOff x="0" y="0"/>
+          <a:chExt cx="0" cy="0"/>
+        </a:xfrm>
+      </p:grpSpPr>
+      <p:sp>
+        <p:nvSpPr>
+          <p:cNvPr id="2" name="Titre 1">
+            <a:extLst>
+              <a:ext uri="{FF2B5EF4-FFF2-40B4-BE49-F238E27FC236}">
+                <a16:creationId xmlns:a16="http://schemas.microsoft.com/office/drawing/2014/main" id="{C58ED35E-B5E2-42FE-91D3-D2A5FA10D1C6}"/>
+              </a:ext>
+            </a:extLst>
+          </p:cNvPr>
+          <p:cNvSpPr>
+            <a:spLocks noGrp="1"/>
+          </p:cNvSpPr>
+          <p:nvPr>
+            <p:ph type="title"/>
+          </p:nvPr>
+        </p:nvSpPr>
+        <p:spPr/>
+        <p:txBody>
+          <a:bodyPr/>
+          <a:lstStyle/>
+          <a:p>
+            <a:r>
+              <a:rPr lang="fr-FR" dirty="0"/>
+              <a:t>III - Méthodes numériques temporelles usuelles </a:t>
+            </a:r>
+          </a:p>
+        </p:txBody>
+      </p:sp>
+      <p:pic>
+        <p:nvPicPr>
+          <p:cNvPr id="5" name="Espace réservé du contenu 4">
+            <a:extLst>
+              <a:ext uri="{FF2B5EF4-FFF2-40B4-BE49-F238E27FC236}">
+                <a16:creationId xmlns:a16="http://schemas.microsoft.com/office/drawing/2014/main" id="{AB27D9D4-1775-4B49-BA1F-2CAB303CA4F8}"/>
+              </a:ext>
+            </a:extLst>
+          </p:cNvPr>
+          <p:cNvPicPr>
+            <a:picLocks noGrp="1" noChangeAspect="1"/>
+          </p:cNvPicPr>
+          <p:nvPr>
+            <p:ph idx="1"/>
+          </p:nvPr>
+        </p:nvPicPr>
+        <p:blipFill>
+          <a:blip r:embed="rId2">
+            <a:extLst>
+              <a:ext uri="{28A0092B-C50C-407E-A947-70E740481C1C}">
+                <a14:useLocalDpi xmlns:a14="http://schemas.microsoft.com/office/drawing/2010/main" val="0"/>
+              </a:ext>
+            </a:extLst>
+          </a:blip>
+          <a:stretch>
+            <a:fillRect/>
+          </a:stretch>
+        </p:blipFill>
+        <p:spPr>
+          <a:xfrm>
+            <a:off x="585927" y="609600"/>
+            <a:ext cx="10244830" cy="6105143"/>
+          </a:xfrm>
+        </p:spPr>
+      </p:pic>
+      <p:pic>
+        <p:nvPicPr>
+          <p:cNvPr id="7" name="Image 6">
+            <a:extLst>
+              <a:ext uri="{FF2B5EF4-FFF2-40B4-BE49-F238E27FC236}">
+                <a16:creationId xmlns:a16="http://schemas.microsoft.com/office/drawing/2014/main" id="{2660A3EF-5FB2-4CB1-9E42-3217F955C33C}"/>
+              </a:ext>
+            </a:extLst>
+          </p:cNvPr>
+          <p:cNvPicPr>
+            <a:picLocks noChangeAspect="1"/>
+          </p:cNvPicPr>
+          <p:nvPr/>
+        </p:nvPicPr>
+        <p:blipFill>
+          <a:blip r:embed="rId3">
+            <a:extLst>
+              <a:ext uri="{28A0092B-C50C-407E-A947-70E740481C1C}">
+                <a14:useLocalDpi xmlns:a14="http://schemas.microsoft.com/office/drawing/2010/main" val="0"/>
+              </a:ext>
+            </a:extLst>
+          </a:blip>
+          <a:stretch>
+            <a:fillRect/>
+          </a:stretch>
+        </p:blipFill>
+        <p:spPr>
+          <a:xfrm>
+            <a:off x="2760476" y="2845777"/>
+            <a:ext cx="4430384" cy="1476794"/>
+          </a:xfrm>
+          <a:prstGeom prst="rect">
+            <a:avLst/>
+          </a:prstGeom>
+        </p:spPr>
+      </p:pic>
+    </p:spTree>
+    <p:extLst>
+      <p:ext uri="{BB962C8B-B14F-4D97-AF65-F5344CB8AC3E}">
+        <p14:creationId xmlns:p14="http://schemas.microsoft.com/office/powerpoint/2010/main" val="666622740"/>
+      </p:ext>
+    </p:extLst>
+  </p:cSld>
+  <p:clrMapOvr>
+    <a:masterClrMapping/>
+  </p:clrMapOvr>
+  <p:timing>
+    <p:tnLst>
+      <p:par>
+        <p:cTn id="1" dur="indefinite" restart="never" nodeType="tmRoot">
+          <p:childTnLst>
+            <p:seq concurrent="1" nextAc="seek">
+              <p:cTn id="2" dur="indefinite" nodeType="mainSeq">
+                <p:childTnLst>
+                  <p:par>
+                    <p:cTn id="3" fill="hold">
+                      <p:stCondLst>
+                        <p:cond delay="indefinite"/>
+                      </p:stCondLst>
+                      <p:childTnLst>
+                        <p:par>
+                          <p:cTn id="4" fill="hold">
+                            <p:stCondLst>
+                              <p:cond delay="0"/>
+                            </p:stCondLst>
+                            <p:childTnLst>
+                              <p:par>
+                                <p:cTn id="5" presetID="1" presetClass="exit" presetSubtype="0" fill="hold" nodeType="clickEffect">
+                                  <p:stCondLst>
+                                    <p:cond delay="0"/>
+                                  </p:stCondLst>
+                                  <p:childTnLst>
+                                    <p:set>
+                                      <p:cBhvr>
+                                        <p:cTn id="6" dur="1" fill="hold">
+                                          <p:stCondLst>
+                                            <p:cond delay="0"/>
+                                          </p:stCondLst>
+                                        </p:cTn>
+                                        <p:tgtEl>
+                                          <p:spTgt spid="7"/>
+                                        </p:tgtEl>
+                                        <p:attrNameLst>
+                                          <p:attrName>style.visibility</p:attrName>
+                                        </p:attrNameLst>
+                                      </p:cBhvr>
+                                      <p:to>
+                                        <p:strVal val="hidden"/>
+                                      </p:to>
+                                    </p:set>
+                                  </p:childTnLst>
+                                </p:cTn>
+                              </p:par>
+                              <p:par>
+                                <p:cTn id="7" presetID="1" presetClass="entr" presetSubtype="0" fill="hold" nodeType="withEffect">
+                                  <p:stCondLst>
+                                    <p:cond delay="0"/>
+                                  </p:stCondLst>
+                                  <p:childTnLst>
+                                    <p:set>
+                                      <p:cBhvr>
+                                        <p:cTn id="8" dur="1" fill="hold">
+                                          <p:stCondLst>
+                                            <p:cond delay="0"/>
+                                          </p:stCondLst>
+                                        </p:cTn>
+                                        <p:tgtEl>
+                                          <p:spTgt spid="5"/>
+                                        </p:tgtEl>
+                                        <p:attrNameLst>
+                                          <p:attrName>style.visibility</p:attrName>
+                                        </p:attrNameLst>
+                                      </p:cBhvr>
+                                      <p:to>
+                                        <p:strVal val="visible"/>
+                                      </p:to>
+                                    </p:set>
+                                  </p:childTnLst>
+                                </p:cTn>
+                              </p:par>
+                            </p:childTnLst>
+                          </p:cTn>
+                        </p:par>
+                      </p:childTnLst>
+                    </p:cTn>
+                  </p:par>
+                </p:childTnLst>
+              </p:cTn>
+              <p:prevCondLst>
+                <p:cond evt="onPrev" delay="0">
+                  <p:tgtEl>
+                    <p:sldTgt/>
+                  </p:tgtEl>
+                </p:cond>
+              </p:prevCondLst>
+              <p:nextCondLst>
+                <p:cond evt="onNext" delay="0">
+                  <p:tgtEl>
+                    <p:sldTgt/>
+                  </p:tgtEl>
+                </p:cond>
+              </p:nextCondLst>
+            </p:seq>
+          </p:childTnLst>
+        </p:cTn>
+      </p:par>
+    </p:tnLst>
+  </p:timing>
+</p:sld>
+</file>
+
+<file path=ppt/slides/slide14.xml><?xml version="1.0" encoding="utf-8"?>
+<p:sld xmlns:a="http://schemas.openxmlformats.org/drawingml/2006/main" xmlns:r="http://schemas.openxmlformats.org/officeDocument/2006/relationships" xmlns:p="http://schemas.openxmlformats.org/presentationml/2006/main">
+  <p:cSld>
+    <p:spTree>
+      <p:nvGrpSpPr>
+        <p:cNvPr id="1" name=""/>
+        <p:cNvGrpSpPr/>
+        <p:nvPr/>
+      </p:nvGrpSpPr>
+      <p:grpSpPr>
+        <a:xfrm>
+          <a:off x="0" y="0"/>
+          <a:ext cx="0" cy="0"/>
+          <a:chOff x="0" y="0"/>
+          <a:chExt cx="0" cy="0"/>
+        </a:xfrm>
+      </p:grpSpPr>
+      <p:sp>
+        <p:nvSpPr>
+          <p:cNvPr id="2" name="Titre 1">
+            <a:extLst>
+              <a:ext uri="{FF2B5EF4-FFF2-40B4-BE49-F238E27FC236}">
+                <a16:creationId xmlns:a16="http://schemas.microsoft.com/office/drawing/2014/main" id="{C29DDC9A-9353-42C8-BE38-B481E27D43E5}"/>
+              </a:ext>
+            </a:extLst>
+          </p:cNvPr>
+          <p:cNvSpPr>
+            <a:spLocks noGrp="1"/>
+          </p:cNvSpPr>
+          <p:nvPr>
+            <p:ph type="title"/>
+          </p:nvPr>
+        </p:nvSpPr>
+        <p:spPr/>
+        <p:txBody>
+          <a:bodyPr/>
+          <a:lstStyle/>
+          <a:p>
+            <a:r>
+              <a:rPr lang="fr-FR" dirty="0"/>
+              <a:t>III - Méthodes numériques temporelles usuelles </a:t>
+            </a:r>
+          </a:p>
+        </p:txBody>
+      </p:sp>
+      <p:sp>
+        <p:nvSpPr>
+          <p:cNvPr id="3" name="Espace réservé du contenu 2">
+            <a:extLst>
+              <a:ext uri="{FF2B5EF4-FFF2-40B4-BE49-F238E27FC236}">
+                <a16:creationId xmlns:a16="http://schemas.microsoft.com/office/drawing/2014/main" id="{A0FDF85D-AA4E-422E-B886-386CF8D1C946}"/>
+              </a:ext>
+            </a:extLst>
+          </p:cNvPr>
+          <p:cNvSpPr>
+            <a:spLocks noGrp="1"/>
+          </p:cNvSpPr>
+          <p:nvPr>
+            <p:ph idx="1"/>
+          </p:nvPr>
+        </p:nvSpPr>
+        <p:spPr/>
+        <p:txBody>
+          <a:bodyPr/>
+          <a:lstStyle/>
+          <a:p>
+            <a:r>
+              <a:rPr lang="fr-FR" dirty="0"/>
+              <a:t>Problème non linéaire </a:t>
+            </a:r>
+          </a:p>
+          <a:p>
+            <a:pPr marL="0" indent="0">
+              <a:buNone/>
+            </a:pPr>
+            <a:endParaRPr lang="fr-FR" dirty="0"/>
+          </a:p>
+        </p:txBody>
+      </p:sp>
+      <p:pic>
+        <p:nvPicPr>
+          <p:cNvPr id="5" name="Image 4">
+            <a:extLst>
+              <a:ext uri="{FF2B5EF4-FFF2-40B4-BE49-F238E27FC236}">
+                <a16:creationId xmlns:a16="http://schemas.microsoft.com/office/drawing/2014/main" id="{5C174396-3F5C-4728-AD53-601599108461}"/>
+              </a:ext>
+            </a:extLst>
+          </p:cNvPr>
+          <p:cNvPicPr>
+            <a:picLocks noChangeAspect="1"/>
+          </p:cNvPicPr>
+          <p:nvPr/>
+        </p:nvPicPr>
+        <p:blipFill>
+          <a:blip r:embed="rId2">
+            <a:extLst>
+              <a:ext uri="{28A0092B-C50C-407E-A947-70E740481C1C}">
+                <a14:useLocalDpi xmlns:a14="http://schemas.microsoft.com/office/drawing/2010/main" val="0"/>
+              </a:ext>
+            </a:extLst>
+          </a:blip>
+          <a:stretch>
+            <a:fillRect/>
+          </a:stretch>
+        </p:blipFill>
+        <p:spPr>
+          <a:xfrm>
+            <a:off x="3505200" y="3233383"/>
+            <a:ext cx="3117936" cy="1314073"/>
+          </a:xfrm>
+          <a:prstGeom prst="rect">
+            <a:avLst/>
+          </a:prstGeom>
+        </p:spPr>
+      </p:pic>
+      <p:pic>
+        <p:nvPicPr>
+          <p:cNvPr id="7" name="Image 6">
+            <a:extLst>
+              <a:ext uri="{FF2B5EF4-FFF2-40B4-BE49-F238E27FC236}">
+                <a16:creationId xmlns:a16="http://schemas.microsoft.com/office/drawing/2014/main" id="{98018B64-B8C3-43F2-9801-7F04CF2BBEBE}"/>
+              </a:ext>
+            </a:extLst>
+          </p:cNvPr>
+          <p:cNvPicPr>
+            <a:picLocks noChangeAspect="1"/>
+          </p:cNvPicPr>
+          <p:nvPr/>
+        </p:nvPicPr>
+        <p:blipFill>
+          <a:blip r:embed="rId3">
+            <a:extLst>
+              <a:ext uri="{28A0092B-C50C-407E-A947-70E740481C1C}">
+                <a14:useLocalDpi xmlns:a14="http://schemas.microsoft.com/office/drawing/2010/main" val="0"/>
+              </a:ext>
+            </a:extLst>
+          </a:blip>
+          <a:stretch>
+            <a:fillRect/>
+          </a:stretch>
+        </p:blipFill>
+        <p:spPr>
+          <a:xfrm>
+            <a:off x="440266" y="428636"/>
+            <a:ext cx="10969414" cy="6216004"/>
+          </a:xfrm>
+          <a:prstGeom prst="rect">
+            <a:avLst/>
+          </a:prstGeom>
+        </p:spPr>
+      </p:pic>
+    </p:spTree>
+    <p:extLst>
+      <p:ext uri="{BB962C8B-B14F-4D97-AF65-F5344CB8AC3E}">
+        <p14:creationId xmlns:p14="http://schemas.microsoft.com/office/powerpoint/2010/main" val="728501483"/>
+      </p:ext>
+    </p:extLst>
+  </p:cSld>
+  <p:clrMapOvr>
+    <a:masterClrMapping/>
+  </p:clrMapOvr>
+  <p:timing>
+    <p:tnLst>
+      <p:par>
+        <p:cTn id="1" dur="indefinite" restart="never" nodeType="tmRoot">
+          <p:childTnLst>
+            <p:seq concurrent="1" nextAc="seek">
+              <p:cTn id="2" dur="indefinite" nodeType="mainSeq">
+                <p:childTnLst>
+                  <p:par>
+                    <p:cTn id="3" fill="hold">
+                      <p:stCondLst>
+                        <p:cond delay="indefinite"/>
+                      </p:stCondLst>
+                      <p:childTnLst>
+                        <p:par>
+                          <p:cTn id="4" fill="hold">
+                            <p:stCondLst>
+                              <p:cond delay="0"/>
+                            </p:stCondLst>
+                            <p:childTnLst>
+                              <p:par>
+                                <p:cTn id="5" presetID="1" presetClass="exit" presetSubtype="0" fill="hold" nodeType="clickEffect">
+                                  <p:stCondLst>
+                                    <p:cond delay="0"/>
+                                  </p:stCondLst>
+                                  <p:childTnLst>
+                                    <p:set>
+                                      <p:cBhvr>
+                                        <p:cTn id="6" dur="1" fill="hold">
+                                          <p:stCondLst>
+                                            <p:cond delay="0"/>
+                                          </p:stCondLst>
+                                        </p:cTn>
+                                        <p:tgtEl>
+                                          <p:spTgt spid="5"/>
+                                        </p:tgtEl>
+                                        <p:attrNameLst>
+                                          <p:attrName>style.visibility</p:attrName>
+                                        </p:attrNameLst>
+                                      </p:cBhvr>
+                                      <p:to>
+                                        <p:strVal val="hidden"/>
+                                      </p:to>
+                                    </p:set>
+                                  </p:childTnLst>
+                                </p:cTn>
+                              </p:par>
+                              <p:par>
+                                <p:cTn id="7" presetID="1" presetClass="entr" presetSubtype="0" fill="hold" nodeType="withEffect">
+                                  <p:stCondLst>
+                                    <p:cond delay="0"/>
+                                  </p:stCondLst>
+                                  <p:childTnLst>
+                                    <p:set>
+                                      <p:cBhvr>
+                                        <p:cTn id="8" dur="1" fill="hold">
+                                          <p:stCondLst>
+                                            <p:cond delay="0"/>
+                                          </p:stCondLst>
+                                        </p:cTn>
+                                        <p:tgtEl>
+                                          <p:spTgt spid="7"/>
+                                        </p:tgtEl>
+                                        <p:attrNameLst>
+                                          <p:attrName>style.visibility</p:attrName>
+                                        </p:attrNameLst>
+                                      </p:cBhvr>
+                                      <p:to>
+                                        <p:strVal val="visible"/>
+                                      </p:to>
+                                    </p:set>
+                                  </p:childTnLst>
+                                </p:cTn>
+                              </p:par>
+                            </p:childTnLst>
+                          </p:cTn>
+                        </p:par>
+                      </p:childTnLst>
+                    </p:cTn>
+                  </p:par>
+                </p:childTnLst>
+              </p:cTn>
+              <p:prevCondLst>
+                <p:cond evt="onPrev" delay="0">
+                  <p:tgtEl>
+                    <p:sldTgt/>
+                  </p:tgtEl>
+                </p:cond>
+              </p:prevCondLst>
+              <p:nextCondLst>
+                <p:cond evt="onNext" delay="0">
+                  <p:tgtEl>
+                    <p:sldTgt/>
+                  </p:tgtEl>
+                </p:cond>
+              </p:nextCondLst>
+            </p:seq>
+          </p:childTnLst>
+        </p:cTn>
+      </p:par>
+    </p:tnLst>
+  </p:timing>
+</p:sld>
+</file>
+
+<file path=ppt/slides/slide15.xml><?xml version="1.0" encoding="utf-8"?>
+<p:sld xmlns:a="http://schemas.openxmlformats.org/drawingml/2006/main" xmlns:r="http://schemas.openxmlformats.org/officeDocument/2006/relationships" xmlns:p="http://schemas.openxmlformats.org/presentationml/2006/main">
+  <p:cSld>
+    <p:spTree>
+      <p:nvGrpSpPr>
+        <p:cNvPr id="1" name=""/>
+        <p:cNvGrpSpPr/>
+        <p:nvPr/>
+      </p:nvGrpSpPr>
+      <p:grpSpPr>
+        <a:xfrm>
+          <a:off x="0" y="0"/>
+          <a:ext cx="0" cy="0"/>
+          <a:chOff x="0" y="0"/>
+          <a:chExt cx="0" cy="0"/>
+        </a:xfrm>
+      </p:grpSpPr>
+      <p:sp>
+        <p:nvSpPr>
+          <p:cNvPr id="2" name="Titre 1">
+            <a:extLst>
+              <a:ext uri="{FF2B5EF4-FFF2-40B4-BE49-F238E27FC236}">
+                <a16:creationId xmlns:a16="http://schemas.microsoft.com/office/drawing/2014/main" id="{22E14FB8-2A04-4BF7-830E-E1F70CC4D1EE}"/>
+              </a:ext>
+            </a:extLst>
+          </p:cNvPr>
+          <p:cNvSpPr>
+            <a:spLocks noGrp="1"/>
+          </p:cNvSpPr>
+          <p:nvPr>
+            <p:ph type="title"/>
+          </p:nvPr>
+        </p:nvSpPr>
+        <p:spPr/>
+        <p:txBody>
+          <a:bodyPr/>
+          <a:lstStyle/>
+          <a:p>
+            <a:r>
+              <a:rPr lang="fr-FR" dirty="0"/>
+              <a:t>III - Méthodes numériques temporelles usuelles </a:t>
+            </a:r>
+          </a:p>
+        </p:txBody>
+      </p:sp>
+      <p:sp>
+        <p:nvSpPr>
+          <p:cNvPr id="3" name="Espace réservé du contenu 2">
+            <a:extLst>
+              <a:ext uri="{FF2B5EF4-FFF2-40B4-BE49-F238E27FC236}">
+                <a16:creationId xmlns:a16="http://schemas.microsoft.com/office/drawing/2014/main" id="{63DCC6C1-B4A5-4CF6-A55E-7F89B39E94EE}"/>
+              </a:ext>
+            </a:extLst>
+          </p:cNvPr>
+          <p:cNvSpPr>
+            <a:spLocks noGrp="1"/>
+          </p:cNvSpPr>
+          <p:nvPr>
+            <p:ph idx="1"/>
+          </p:nvPr>
+        </p:nvSpPr>
+        <p:spPr/>
+        <p:txBody>
+          <a:bodyPr/>
+          <a:lstStyle/>
+          <a:p>
+            <a:r>
+              <a:rPr lang="fr-FR" dirty="0"/>
+              <a:t>Domaine de stabilité méthodes RK et BDF</a:t>
+            </a:r>
+          </a:p>
+          <a:p>
+            <a:pPr marL="0" indent="0">
+              <a:buNone/>
+            </a:pPr>
+            <a:endParaRPr lang="fr-FR" dirty="0"/>
+          </a:p>
+        </p:txBody>
+      </p:sp>
+      <p:pic>
+        <p:nvPicPr>
+          <p:cNvPr id="5" name="Image 4">
+            <a:extLst>
+              <a:ext uri="{FF2B5EF4-FFF2-40B4-BE49-F238E27FC236}">
+                <a16:creationId xmlns:a16="http://schemas.microsoft.com/office/drawing/2014/main" id="{D4F82992-7DDF-4A24-8514-DB781371A122}"/>
+              </a:ext>
+            </a:extLst>
+          </p:cNvPr>
+          <p:cNvPicPr>
+            <a:picLocks noChangeAspect="1"/>
+          </p:cNvPicPr>
+          <p:nvPr/>
+        </p:nvPicPr>
+        <p:blipFill>
+          <a:blip r:embed="rId2">
+            <a:extLst>
+              <a:ext uri="{28A0092B-C50C-407E-A947-70E740481C1C}">
+                <a14:useLocalDpi xmlns:a14="http://schemas.microsoft.com/office/drawing/2010/main" val="0"/>
+              </a:ext>
+            </a:extLst>
+          </a:blip>
+          <a:stretch>
+            <a:fillRect/>
+          </a:stretch>
+        </p:blipFill>
+        <p:spPr>
+          <a:xfrm>
+            <a:off x="5817608" y="2511895"/>
+            <a:ext cx="6043184" cy="4078107"/>
+          </a:xfrm>
+          <a:prstGeom prst="rect">
+            <a:avLst/>
+          </a:prstGeom>
+        </p:spPr>
+      </p:pic>
+      <p:pic>
+        <p:nvPicPr>
+          <p:cNvPr id="7" name="Image 6">
+            <a:extLst>
+              <a:ext uri="{FF2B5EF4-FFF2-40B4-BE49-F238E27FC236}">
+                <a16:creationId xmlns:a16="http://schemas.microsoft.com/office/drawing/2014/main" id="{4AB8479D-1181-4F7E-8648-B639C85E4D0F}"/>
+              </a:ext>
+            </a:extLst>
+          </p:cNvPr>
+          <p:cNvPicPr>
+            <a:picLocks noChangeAspect="1"/>
+          </p:cNvPicPr>
+          <p:nvPr/>
+        </p:nvPicPr>
+        <p:blipFill>
+          <a:blip r:embed="rId3">
+            <a:extLst>
+              <a:ext uri="{28A0092B-C50C-407E-A947-70E740481C1C}">
+                <a14:useLocalDpi xmlns:a14="http://schemas.microsoft.com/office/drawing/2010/main" val="0"/>
+              </a:ext>
+            </a:extLst>
+          </a:blip>
+          <a:stretch>
+            <a:fillRect/>
+          </a:stretch>
+        </p:blipFill>
+        <p:spPr>
+          <a:xfrm>
+            <a:off x="1372638" y="3013805"/>
+            <a:ext cx="6798474" cy="2909475"/>
+          </a:xfrm>
+          <a:prstGeom prst="rect">
+            <a:avLst/>
+          </a:prstGeom>
+        </p:spPr>
+      </p:pic>
+    </p:spTree>
+    <p:extLst>
+      <p:ext uri="{BB962C8B-B14F-4D97-AF65-F5344CB8AC3E}">
+        <p14:creationId xmlns:p14="http://schemas.microsoft.com/office/powerpoint/2010/main" val="1711717958"/>
+      </p:ext>
+    </p:extLst>
+  </p:cSld>
+  <p:clrMapOvr>
+    <a:masterClrMapping/>
+  </p:clrMapOvr>
+  <p:timing>
+    <p:tnLst>
+      <p:par>
+        <p:cTn id="1" dur="indefinite" restart="never" nodeType="tmRoot">
+          <p:childTnLst>
+            <p:seq concurrent="1" nextAc="seek">
+              <p:cTn id="2" dur="indefinite" nodeType="mainSeq">
+                <p:childTnLst>
+                  <p:par>
+                    <p:cTn id="3" fill="hold">
+                      <p:stCondLst>
+                        <p:cond delay="indefinite"/>
+                      </p:stCondLst>
+                      <p:childTnLst>
+                        <p:par>
+                          <p:cTn id="4" fill="hold">
+                            <p:stCondLst>
+                              <p:cond delay="0"/>
+                            </p:stCondLst>
+                            <p:childTnLst>
+                              <p:par>
+                                <p:cTn id="5" presetID="1" presetClass="entr" presetSubtype="0" fill="hold" nodeType="clickEffect">
+                                  <p:stCondLst>
+                                    <p:cond delay="0"/>
+                                  </p:stCondLst>
+                                  <p:childTnLst>
+                                    <p:set>
+                                      <p:cBhvr>
+                                        <p:cTn id="6" dur="1" fill="hold">
+                                          <p:stCondLst>
+                                            <p:cond delay="0"/>
+                                          </p:stCondLst>
+                                        </p:cTn>
+                                        <p:tgtEl>
+                                          <p:spTgt spid="7"/>
+                                        </p:tgtEl>
+                                        <p:attrNameLst>
+                                          <p:attrName>style.visibility</p:attrName>
+                                        </p:attrNameLst>
+                                      </p:cBhvr>
+                                      <p:to>
+                                        <p:strVal val="visible"/>
+                                      </p:to>
+                                    </p:set>
+                                  </p:childTnLst>
+                                </p:cTn>
+                              </p:par>
+                            </p:childTnLst>
+                          </p:cTn>
+                        </p:par>
+                      </p:childTnLst>
+                    </p:cTn>
+                  </p:par>
+                  <p:par>
+                    <p:cTn id="7" fill="hold">
+                      <p:stCondLst>
+                        <p:cond delay="indefinite"/>
+                      </p:stCondLst>
+                      <p:childTnLst>
+                        <p:par>
+                          <p:cTn id="8" fill="hold">
+                            <p:stCondLst>
+                              <p:cond delay="0"/>
+                            </p:stCondLst>
+                            <p:childTnLst>
+                              <p:par>
+                                <p:cTn id="9" presetID="1" presetClass="exit" presetSubtype="0" fill="hold" nodeType="clickEffect">
+                                  <p:stCondLst>
+                                    <p:cond delay="0"/>
+                                  </p:stCondLst>
+                                  <p:childTnLst>
+                                    <p:set>
+                                      <p:cBhvr>
+                                        <p:cTn id="10" dur="1" fill="hold">
+                                          <p:stCondLst>
+                                            <p:cond delay="0"/>
+                                          </p:stCondLst>
+                                        </p:cTn>
+                                        <p:tgtEl>
+                                          <p:spTgt spid="7"/>
+                                        </p:tgtEl>
+                                        <p:attrNameLst>
+                                          <p:attrName>style.visibility</p:attrName>
+                                        </p:attrNameLst>
+                                      </p:cBhvr>
+                                      <p:to>
+                                        <p:strVal val="hidden"/>
+                                      </p:to>
+                                    </p:set>
+                                  </p:childTnLst>
+                                </p:cTn>
+                              </p:par>
+                              <p:par>
+                                <p:cTn id="11" presetID="1" presetClass="entr" presetSubtype="0" fill="hold" nodeType="withEffect">
+                                  <p:stCondLst>
+                                    <p:cond delay="0"/>
+                                  </p:stCondLst>
+                                  <p:childTnLst>
+                                    <p:set>
+                                      <p:cBhvr>
+                                        <p:cTn id="12" dur="1" fill="hold">
+                                          <p:stCondLst>
+                                            <p:cond delay="0"/>
+                                          </p:stCondLst>
+                                        </p:cTn>
+                                        <p:tgtEl>
+                                          <p:spTgt spid="5"/>
+                                        </p:tgtEl>
+                                        <p:attrNameLst>
+                                          <p:attrName>style.visibility</p:attrName>
+                                        </p:attrNameLst>
+                                      </p:cBhvr>
+                                      <p:to>
+                                        <p:strVal val="visible"/>
+                                      </p:to>
+                                    </p:set>
+                                  </p:childTnLst>
+                                </p:cTn>
+                              </p:par>
+                            </p:childTnLst>
+                          </p:cTn>
+                        </p:par>
+                      </p:childTnLst>
+                    </p:cTn>
+                  </p:par>
+                </p:childTnLst>
+              </p:cTn>
+              <p:prevCondLst>
+                <p:cond evt="onPrev" delay="0">
+                  <p:tgtEl>
+                    <p:sldTgt/>
+                  </p:tgtEl>
+                </p:cond>
+              </p:prevCondLst>
+              <p:nextCondLst>
+                <p:cond evt="onNext" delay="0">
+                  <p:tgtEl>
+                    <p:sldTgt/>
+                  </p:tgtEl>
+                </p:cond>
+              </p:nextCondLst>
+            </p:seq>
+          </p:childTnLst>
+        </p:cTn>
+      </p:par>
+    </p:tnLst>
+  </p:timing>
+</p:sld>
+</file>
+
+<file path=ppt/slides/slide16.xml><?xml version="1.0" encoding="utf-8"?>
+<p:sld xmlns:a="http://schemas.openxmlformats.org/drawingml/2006/main" xmlns:r="http://schemas.openxmlformats.org/officeDocument/2006/relationships" xmlns:p="http://schemas.openxmlformats.org/presentationml/2006/main">
+  <p:cSld>
+    <p:spTree>
+      <p:nvGrpSpPr>
+        <p:cNvPr id="1" name=""/>
+        <p:cNvGrpSpPr/>
+        <p:nvPr/>
+      </p:nvGrpSpPr>
+      <p:grpSpPr>
+        <a:xfrm>
+          <a:off x="0" y="0"/>
+          <a:ext cx="0" cy="0"/>
+          <a:chOff x="0" y="0"/>
+          <a:chExt cx="0" cy="0"/>
+        </a:xfrm>
+      </p:grpSpPr>
+      <p:sp>
+        <p:nvSpPr>
+          <p:cNvPr id="2" name="Titre 1">
+            <a:extLst>
+              <a:ext uri="{FF2B5EF4-FFF2-40B4-BE49-F238E27FC236}">
+                <a16:creationId xmlns:a16="http://schemas.microsoft.com/office/drawing/2014/main" id="{33D48989-5D71-406C-AC15-390DA2F5F356}"/>
+              </a:ext>
+            </a:extLst>
+          </p:cNvPr>
+          <p:cNvSpPr>
+            <a:spLocks noGrp="1"/>
+          </p:cNvSpPr>
+          <p:nvPr>
+            <p:ph type="title"/>
+          </p:nvPr>
+        </p:nvSpPr>
+        <p:spPr/>
+        <p:txBody>
+          <a:bodyPr/>
+          <a:lstStyle/>
+          <a:p>
+            <a:r>
+              <a:rPr lang="fr-FR" dirty="0"/>
+              <a:t>IV – Méthodes numériques exponentielles</a:t>
+            </a:r>
+          </a:p>
+        </p:txBody>
+      </p:sp>
+      <p:sp>
+        <p:nvSpPr>
+          <p:cNvPr id="3" name="Espace réservé du contenu 2">
+            <a:extLst>
+              <a:ext uri="{FF2B5EF4-FFF2-40B4-BE49-F238E27FC236}">
+                <a16:creationId xmlns:a16="http://schemas.microsoft.com/office/drawing/2014/main" id="{11DCB18D-0E24-4E2D-A04E-C2DDFCD78A60}"/>
+              </a:ext>
+            </a:extLst>
+          </p:cNvPr>
+          <p:cNvSpPr>
+            <a:spLocks noGrp="1"/>
+          </p:cNvSpPr>
+          <p:nvPr>
+            <p:ph idx="1"/>
+          </p:nvPr>
+        </p:nvSpPr>
+        <p:spPr/>
+        <p:txBody>
+          <a:bodyPr/>
+          <a:lstStyle/>
+          <a:p>
+            <a:r>
+              <a:rPr lang="fr-FR" dirty="0"/>
+              <a:t>Méthode Taylor exponentielle </a:t>
+            </a:r>
+          </a:p>
+          <a:p>
+            <a:pPr lvl="1"/>
+            <a:r>
+              <a:rPr lang="fr-FR" dirty="0"/>
+              <a:t>Basé sur une matrice augmentée</a:t>
+            </a:r>
+          </a:p>
+          <a:p>
+            <a:pPr lvl="1"/>
+            <a:r>
+              <a:rPr lang="fr-FR" dirty="0"/>
+              <a:t>Calculée à chaque itérations</a:t>
+            </a:r>
+          </a:p>
+          <a:p>
+            <a:endParaRPr lang="fr-FR" dirty="0"/>
+          </a:p>
+          <a:p>
+            <a:r>
+              <a:rPr lang="fr-FR" dirty="0"/>
+              <a:t>Méthode </a:t>
+            </a:r>
+            <a:r>
+              <a:rPr lang="fr-FR" dirty="0" err="1"/>
+              <a:t>Rosenbroch</a:t>
+            </a:r>
+            <a:endParaRPr lang="fr-FR" dirty="0"/>
+          </a:p>
+          <a:p>
+            <a:pPr lvl="1"/>
+            <a:r>
+              <a:rPr lang="fr-FR" dirty="0"/>
+              <a:t>Basé sur une matrice augmentée</a:t>
+            </a:r>
+          </a:p>
+          <a:p>
+            <a:pPr lvl="1"/>
+            <a:r>
+              <a:rPr lang="fr-FR" dirty="0"/>
+              <a:t>Calculée une seule fois </a:t>
+            </a:r>
+          </a:p>
+          <a:p>
+            <a:endParaRPr lang="fr-FR" dirty="0"/>
+          </a:p>
+          <a:p>
+            <a:r>
+              <a:rPr lang="fr-FR" dirty="0"/>
+              <a:t>Méthode exponentielle RK </a:t>
+            </a:r>
+          </a:p>
+          <a:p>
+            <a:pPr lvl="1"/>
+            <a:r>
+              <a:rPr lang="fr-FR" dirty="0"/>
+              <a:t>Début d’étude </a:t>
+            </a:r>
+          </a:p>
+        </p:txBody>
+      </p:sp>
+    </p:spTree>
+    <p:extLst>
+      <p:ext uri="{BB962C8B-B14F-4D97-AF65-F5344CB8AC3E}">
+        <p14:creationId xmlns:p14="http://schemas.microsoft.com/office/powerpoint/2010/main" val="861286761"/>
+      </p:ext>
+    </p:extLst>
+  </p:cSld>
+  <p:clrMapOvr>
+    <a:masterClrMapping/>
+  </p:clrMapOvr>
+</p:sld>
+</file>
+
+<file path=ppt/slides/slide17.xml><?xml version="1.0" encoding="utf-8"?>
+<p:sld xmlns:a="http://schemas.openxmlformats.org/drawingml/2006/main" xmlns:r="http://schemas.openxmlformats.org/officeDocument/2006/relationships" xmlns:p="http://schemas.openxmlformats.org/presentationml/2006/main">
+  <p:cSld>
+    <p:spTree>
+      <p:nvGrpSpPr>
+        <p:cNvPr id="1" name=""/>
+        <p:cNvGrpSpPr/>
+        <p:nvPr/>
+      </p:nvGrpSpPr>
+      <p:grpSpPr>
+        <a:xfrm>
+          <a:off x="0" y="0"/>
+          <a:ext cx="0" cy="0"/>
+          <a:chOff x="0" y="0"/>
+          <a:chExt cx="0" cy="0"/>
+        </a:xfrm>
+      </p:grpSpPr>
+      <p:sp>
+        <p:nvSpPr>
+          <p:cNvPr id="2" name="Titre 1">
+            <a:extLst>
+              <a:ext uri="{FF2B5EF4-FFF2-40B4-BE49-F238E27FC236}">
+                <a16:creationId xmlns:a16="http://schemas.microsoft.com/office/drawing/2014/main" id="{B3ACA20D-C8BA-48AC-8A1B-D5BF49DC040C}"/>
+              </a:ext>
+            </a:extLst>
+          </p:cNvPr>
+          <p:cNvSpPr>
+            <a:spLocks noGrp="1"/>
+          </p:cNvSpPr>
+          <p:nvPr>
+            <p:ph type="title"/>
+          </p:nvPr>
+        </p:nvSpPr>
+        <p:spPr/>
+        <p:txBody>
+          <a:bodyPr/>
+          <a:lstStyle/>
+          <a:p>
+            <a:r>
+              <a:rPr lang="fr-FR" dirty="0"/>
+              <a:t>IV – Méthodes numériques exponentielles</a:t>
+            </a:r>
+          </a:p>
+        </p:txBody>
+      </p:sp>
+      <p:sp>
+        <p:nvSpPr>
+          <p:cNvPr id="3" name="Espace réservé du contenu 2">
+            <a:extLst>
+              <a:ext uri="{FF2B5EF4-FFF2-40B4-BE49-F238E27FC236}">
+                <a16:creationId xmlns:a16="http://schemas.microsoft.com/office/drawing/2014/main" id="{572CBCEE-73BF-41CE-94D4-7F72DCE621AB}"/>
+              </a:ext>
+            </a:extLst>
+          </p:cNvPr>
+          <p:cNvSpPr>
+            <a:spLocks noGrp="1"/>
+          </p:cNvSpPr>
+          <p:nvPr>
+            <p:ph idx="1"/>
+          </p:nvPr>
+        </p:nvSpPr>
+        <p:spPr/>
+        <p:txBody>
+          <a:bodyPr/>
+          <a:lstStyle/>
+          <a:p>
+            <a:r>
+              <a:rPr lang="fr-FR" dirty="0"/>
+              <a:t>Calcul d’exponentielle de matrice en python</a:t>
+            </a:r>
+          </a:p>
+          <a:p>
+            <a:endParaRPr lang="fr-FR" dirty="0"/>
+          </a:p>
+          <a:p>
+            <a:r>
+              <a:rPr lang="fr-FR" dirty="0"/>
+              <a:t>Utilisation du module </a:t>
+            </a:r>
+            <a:r>
+              <a:rPr lang="fr-FR" dirty="0" err="1"/>
+              <a:t>Scipy</a:t>
+            </a:r>
+            <a:r>
+              <a:rPr lang="fr-FR" dirty="0"/>
+              <a:t> </a:t>
+            </a:r>
+          </a:p>
+          <a:p>
+            <a:endParaRPr lang="fr-FR" dirty="0"/>
+          </a:p>
+          <a:p>
+            <a:r>
+              <a:rPr lang="fr-FR" dirty="0"/>
+              <a:t>Implémentation de la méthode de Krylov </a:t>
+            </a:r>
+          </a:p>
+          <a:p>
+            <a:endParaRPr lang="fr-FR" dirty="0"/>
+          </a:p>
+          <a:p>
+            <a:r>
+              <a:rPr lang="fr-FR" dirty="0"/>
+              <a:t>   Amélioration du temps de calcul de la méthode </a:t>
+            </a:r>
+          </a:p>
+          <a:p>
+            <a:endParaRPr lang="fr-FR" dirty="0"/>
+          </a:p>
+          <a:p>
+            <a:r>
+              <a:rPr lang="fr-FR" dirty="0"/>
+              <a:t>(Il faudrait un screen permettant de mettre en avant cela) </a:t>
+            </a:r>
+          </a:p>
+        </p:txBody>
+      </p:sp>
+      <p:sp>
+        <p:nvSpPr>
+          <p:cNvPr id="4" name="Flèche : droite 3">
+            <a:extLst>
+              <a:ext uri="{FF2B5EF4-FFF2-40B4-BE49-F238E27FC236}">
+                <a16:creationId xmlns:a16="http://schemas.microsoft.com/office/drawing/2014/main" id="{2953CAF0-33E8-4AF1-8E58-14EA48335686}"/>
+              </a:ext>
+            </a:extLst>
+          </p:cNvPr>
+          <p:cNvSpPr/>
+          <p:nvPr/>
+        </p:nvSpPr>
+        <p:spPr>
+          <a:xfrm>
+            <a:off x="677334" y="4592320"/>
+            <a:ext cx="457200" cy="355601"/>
+          </a:xfrm>
+          <a:prstGeom prst="rightArrow">
+            <a:avLst/>
+          </a:prstGeom>
+        </p:spPr>
+        <p:style>
+          <a:lnRef idx="2">
+            <a:schemeClr val="accent1">
+              <a:shade val="50000"/>
+            </a:schemeClr>
+          </a:lnRef>
+          <a:fillRef idx="1">
+            <a:schemeClr val="accent1"/>
+          </a:fillRef>
+          <a:effectRef idx="0">
+            <a:schemeClr val="accent1"/>
+          </a:effectRef>
+          <a:fontRef idx="minor">
+            <a:schemeClr val="lt1"/>
+          </a:fontRef>
+        </p:style>
+        <p:txBody>
+          <a:bodyPr rtlCol="0" anchor="ctr"/>
+          <a:lstStyle/>
+          <a:p>
+            <a:pPr algn="ctr"/>
+            <a:endParaRPr lang="fr-FR"/>
+          </a:p>
+        </p:txBody>
+      </p:sp>
+    </p:spTree>
+    <p:extLst>
+      <p:ext uri="{BB962C8B-B14F-4D97-AF65-F5344CB8AC3E}">
+        <p14:creationId xmlns:p14="http://schemas.microsoft.com/office/powerpoint/2010/main" val="474638245"/>
+      </p:ext>
+    </p:extLst>
+  </p:cSld>
+  <p:clrMapOvr>
+    <a:masterClrMapping/>
+  </p:clrMapOvr>
+</p:sld>
+</file>
+
+<file path=ppt/slides/slide18.xml><?xml version="1.0" encoding="utf-8"?>
+<p:sld xmlns:a="http://schemas.openxmlformats.org/drawingml/2006/main" xmlns:r="http://schemas.openxmlformats.org/officeDocument/2006/relationships" xmlns:p="http://schemas.openxmlformats.org/presentationml/2006/main">
+  <p:cSld>
+    <p:spTree>
+      <p:nvGrpSpPr>
+        <p:cNvPr id="1" name=""/>
+        <p:cNvGrpSpPr/>
+        <p:nvPr/>
+      </p:nvGrpSpPr>
+      <p:grpSpPr>
+        <a:xfrm>
+          <a:off x="0" y="0"/>
+          <a:ext cx="0" cy="0"/>
+          <a:chOff x="0" y="0"/>
+          <a:chExt cx="0" cy="0"/>
+        </a:xfrm>
+      </p:grpSpPr>
+      <p:sp>
+        <p:nvSpPr>
+          <p:cNvPr id="2" name="Titre 1">
+            <a:extLst>
+              <a:ext uri="{FF2B5EF4-FFF2-40B4-BE49-F238E27FC236}">
+                <a16:creationId xmlns:a16="http://schemas.microsoft.com/office/drawing/2014/main" id="{BEAD297D-408C-4DCC-A83F-3991F010784A}"/>
+              </a:ext>
+            </a:extLst>
+          </p:cNvPr>
+          <p:cNvSpPr>
+            <a:spLocks noGrp="1"/>
+          </p:cNvSpPr>
+          <p:nvPr>
+            <p:ph type="title"/>
+          </p:nvPr>
+        </p:nvSpPr>
+        <p:spPr/>
+        <p:txBody>
+          <a:bodyPr/>
+          <a:lstStyle/>
+          <a:p>
+            <a:r>
+              <a:rPr lang="fr-FR" dirty="0"/>
+              <a:t>IV – Méthodes numériques exponentielles</a:t>
+            </a:r>
+          </a:p>
+        </p:txBody>
+      </p:sp>
+      <p:sp>
+        <p:nvSpPr>
+          <p:cNvPr id="3" name="Espace réservé du contenu 2">
+            <a:extLst>
+              <a:ext uri="{FF2B5EF4-FFF2-40B4-BE49-F238E27FC236}">
+                <a16:creationId xmlns:a16="http://schemas.microsoft.com/office/drawing/2014/main" id="{8C01C720-3BA3-4CC0-9BD8-6DAFA23FEEAA}"/>
+              </a:ext>
+            </a:extLst>
+          </p:cNvPr>
+          <p:cNvSpPr>
+            <a:spLocks noGrp="1"/>
+          </p:cNvSpPr>
+          <p:nvPr>
+            <p:ph idx="1"/>
+          </p:nvPr>
+        </p:nvSpPr>
+        <p:spPr/>
+        <p:txBody>
+          <a:bodyPr/>
+          <a:lstStyle/>
+          <a:p>
+            <a:r>
+              <a:rPr lang="fr-FR" dirty="0"/>
+              <a:t>Screens de comparaison des méthodes entre elles sur des problèmes donnés </a:t>
+            </a:r>
+          </a:p>
+        </p:txBody>
+      </p:sp>
+    </p:spTree>
+    <p:extLst>
+      <p:ext uri="{BB962C8B-B14F-4D97-AF65-F5344CB8AC3E}">
+        <p14:creationId xmlns:p14="http://schemas.microsoft.com/office/powerpoint/2010/main" val="883981461"/>
+      </p:ext>
+    </p:extLst>
+  </p:cSld>
+  <p:clrMapOvr>
+    <a:masterClrMapping/>
+  </p:clrMapOvr>
+</p:sld>
+</file>
+
+<file path=ppt/slides/slide19.xml><?xml version="1.0" encoding="utf-8"?>
+<p:sld xmlns:a="http://schemas.openxmlformats.org/drawingml/2006/main" xmlns:r="http://schemas.openxmlformats.org/officeDocument/2006/relationships" xmlns:p="http://schemas.openxmlformats.org/presentationml/2006/main">
+  <p:cSld>
+    <p:spTree>
+      <p:nvGrpSpPr>
+        <p:cNvPr id="1" name=""/>
+        <p:cNvGrpSpPr/>
+        <p:nvPr/>
+      </p:nvGrpSpPr>
+      <p:grpSpPr>
+        <a:xfrm>
+          <a:off x="0" y="0"/>
+          <a:ext cx="0" cy="0"/>
+          <a:chOff x="0" y="0"/>
+          <a:chExt cx="0" cy="0"/>
+        </a:xfrm>
+      </p:grpSpPr>
+      <p:sp>
+        <p:nvSpPr>
+          <p:cNvPr id="2" name="Titre 1">
+            <a:extLst>
+              <a:ext uri="{FF2B5EF4-FFF2-40B4-BE49-F238E27FC236}">
+                <a16:creationId xmlns:a16="http://schemas.microsoft.com/office/drawing/2014/main" id="{BEAD297D-408C-4DCC-A83F-3991F010784A}"/>
+              </a:ext>
+            </a:extLst>
+          </p:cNvPr>
+          <p:cNvSpPr>
+            <a:spLocks noGrp="1"/>
+          </p:cNvSpPr>
+          <p:nvPr>
+            <p:ph type="title"/>
+          </p:nvPr>
+        </p:nvSpPr>
+        <p:spPr/>
+        <p:txBody>
+          <a:bodyPr/>
+          <a:lstStyle/>
+          <a:p>
+            <a:r>
+              <a:rPr lang="fr-FR" dirty="0"/>
+              <a:t>IV – Méthodes numériques exponentielles</a:t>
+            </a:r>
+          </a:p>
+        </p:txBody>
+      </p:sp>
+      <p:sp>
+        <p:nvSpPr>
+          <p:cNvPr id="3" name="Espace réservé du contenu 2">
+            <a:extLst>
+              <a:ext uri="{FF2B5EF4-FFF2-40B4-BE49-F238E27FC236}">
+                <a16:creationId xmlns:a16="http://schemas.microsoft.com/office/drawing/2014/main" id="{8C01C720-3BA3-4CC0-9BD8-6DAFA23FEEAA}"/>
+              </a:ext>
+            </a:extLst>
+          </p:cNvPr>
+          <p:cNvSpPr>
+            <a:spLocks noGrp="1"/>
+          </p:cNvSpPr>
+          <p:nvPr>
+            <p:ph idx="1"/>
+          </p:nvPr>
+        </p:nvSpPr>
+        <p:spPr/>
+        <p:txBody>
+          <a:bodyPr/>
+          <a:lstStyle/>
+          <a:p>
+            <a:r>
+              <a:rPr lang="fr-FR" dirty="0"/>
+              <a:t>Screens de comparaison avec les méthodes usuelles entre elles sur des problèmes donnés </a:t>
+            </a:r>
+          </a:p>
+        </p:txBody>
+      </p:sp>
+    </p:spTree>
+    <p:extLst>
+      <p:ext uri="{BB962C8B-B14F-4D97-AF65-F5344CB8AC3E}">
+        <p14:creationId xmlns:p14="http://schemas.microsoft.com/office/powerpoint/2010/main" val="34546804"/>
+      </p:ext>
+    </p:extLst>
+  </p:cSld>
+  <p:clrMapOvr>
+    <a:masterClrMapping/>
+  </p:clrMapOvr>
+</p:sld>
+</file>
+
 <file path=ppt/slides/slide2.xml><?xml version="1.0" encoding="utf-8"?>
 <p:sld xmlns:a="http://schemas.openxmlformats.org/drawingml/2006/main" xmlns:r="http://schemas.openxmlformats.org/officeDocument/2006/relationships" xmlns:p="http://schemas.openxmlformats.org/presentationml/2006/main">
   <p:cSld>
@@ -6014,15 +7877,7 @@
           <a:p>
             <a:r>
               <a:rPr lang="fr-FR" dirty="0"/>
-              <a:t>V – Bilan des </a:t>
-            </a:r>
-            <a:r>
-              <a:rPr lang="fr-FR" dirty="0" err="1"/>
-              <a:t>précaunisations</a:t>
-            </a:r>
-            <a:r>
-              <a:rPr lang="fr-FR" dirty="0"/>
-              <a:t> </a:t>
+              <a:t>V – Bilan des préconisations </a:t>
             </a:r>
           </a:p>
           <a:p>
@@ -6037,6 +7892,224 @@
     <p:extLst>
       <p:ext uri="{BB962C8B-B14F-4D97-AF65-F5344CB8AC3E}">
         <p14:creationId xmlns:p14="http://schemas.microsoft.com/office/powerpoint/2010/main" val="503595150"/>
+      </p:ext>
+    </p:extLst>
+  </p:cSld>
+  <p:clrMapOvr>
+    <a:masterClrMapping/>
+  </p:clrMapOvr>
+</p:sld>
+</file>
+
+<file path=ppt/slides/slide20.xml><?xml version="1.0" encoding="utf-8"?>
+<p:sld xmlns:a="http://schemas.openxmlformats.org/drawingml/2006/main" xmlns:r="http://schemas.openxmlformats.org/officeDocument/2006/relationships" xmlns:p="http://schemas.openxmlformats.org/presentationml/2006/main">
+  <p:cSld>
+    <p:spTree>
+      <p:nvGrpSpPr>
+        <p:cNvPr id="1" name=""/>
+        <p:cNvGrpSpPr/>
+        <p:nvPr/>
+      </p:nvGrpSpPr>
+      <p:grpSpPr>
+        <a:xfrm>
+          <a:off x="0" y="0"/>
+          <a:ext cx="0" cy="0"/>
+          <a:chOff x="0" y="0"/>
+          <a:chExt cx="0" cy="0"/>
+        </a:xfrm>
+      </p:grpSpPr>
+      <p:sp>
+        <p:nvSpPr>
+          <p:cNvPr id="2" name="Titre 1">
+            <a:extLst>
+              <a:ext uri="{FF2B5EF4-FFF2-40B4-BE49-F238E27FC236}">
+                <a16:creationId xmlns:a16="http://schemas.microsoft.com/office/drawing/2014/main" id="{8B8AA958-7EF5-4EB0-806C-74836A2B60F3}"/>
+              </a:ext>
+            </a:extLst>
+          </p:cNvPr>
+          <p:cNvSpPr>
+            <a:spLocks noGrp="1"/>
+          </p:cNvSpPr>
+          <p:nvPr>
+            <p:ph type="title"/>
+          </p:nvPr>
+        </p:nvSpPr>
+        <p:spPr/>
+        <p:txBody>
+          <a:bodyPr/>
+          <a:lstStyle/>
+          <a:p>
+            <a:r>
+              <a:rPr lang="fr-FR" dirty="0"/>
+              <a:t>IV – Méthodes numériques exponentielles</a:t>
+            </a:r>
+          </a:p>
+        </p:txBody>
+      </p:sp>
+      <p:sp>
+        <p:nvSpPr>
+          <p:cNvPr id="3" name="Espace réservé du texte 2">
+            <a:extLst>
+              <a:ext uri="{FF2B5EF4-FFF2-40B4-BE49-F238E27FC236}">
+                <a16:creationId xmlns:a16="http://schemas.microsoft.com/office/drawing/2014/main" id="{7478EE0A-709D-4E6A-9A69-97A1C1F54D87}"/>
+              </a:ext>
+            </a:extLst>
+          </p:cNvPr>
+          <p:cNvSpPr>
+            <a:spLocks noGrp="1"/>
+          </p:cNvSpPr>
+          <p:nvPr>
+            <p:ph type="body" idx="1"/>
+          </p:nvPr>
+        </p:nvSpPr>
+        <p:spPr/>
+        <p:txBody>
+          <a:bodyPr/>
+          <a:lstStyle/>
+          <a:p>
+            <a:r>
+              <a:rPr lang="fr-FR" dirty="0"/>
+              <a:t>Méthodes usuelles</a:t>
+            </a:r>
+          </a:p>
+        </p:txBody>
+      </p:sp>
+      <p:sp>
+        <p:nvSpPr>
+          <p:cNvPr id="4" name="Espace réservé du contenu 3">
+            <a:extLst>
+              <a:ext uri="{FF2B5EF4-FFF2-40B4-BE49-F238E27FC236}">
+                <a16:creationId xmlns:a16="http://schemas.microsoft.com/office/drawing/2014/main" id="{E2AB1664-5A63-444A-BC52-5D2B293703CE}"/>
+              </a:ext>
+            </a:extLst>
+          </p:cNvPr>
+          <p:cNvSpPr>
+            <a:spLocks noGrp="1"/>
+          </p:cNvSpPr>
+          <p:nvPr>
+            <p:ph sz="half" idx="2"/>
+          </p:nvPr>
+        </p:nvSpPr>
+        <p:spPr/>
+        <p:txBody>
+          <a:bodyPr/>
+          <a:lstStyle/>
+          <a:p>
+            <a:r>
+              <a:rPr lang="fr-FR" dirty="0"/>
+              <a:t>Conditionnellement stable </a:t>
+            </a:r>
+          </a:p>
+          <a:p>
+            <a:endParaRPr lang="fr-FR" dirty="0"/>
+          </a:p>
+          <a:p>
+            <a:r>
+              <a:rPr lang="fr-FR" dirty="0"/>
+              <a:t>Erreurs dues aux schémas numériques</a:t>
+            </a:r>
+          </a:p>
+          <a:p>
+            <a:endParaRPr lang="fr-FR" dirty="0"/>
+          </a:p>
+          <a:p>
+            <a:r>
+              <a:rPr lang="fr-FR" dirty="0"/>
+              <a:t>Condition CFL à respecter (pas de temps</a:t>
+            </a:r>
+          </a:p>
+          <a:p>
+            <a:endParaRPr lang="fr-FR" dirty="0"/>
+          </a:p>
+          <a:p>
+            <a:endParaRPr lang="fr-FR" dirty="0"/>
+          </a:p>
+        </p:txBody>
+      </p:sp>
+      <p:sp>
+        <p:nvSpPr>
+          <p:cNvPr id="5" name="Espace réservé du texte 4">
+            <a:extLst>
+              <a:ext uri="{FF2B5EF4-FFF2-40B4-BE49-F238E27FC236}">
+                <a16:creationId xmlns:a16="http://schemas.microsoft.com/office/drawing/2014/main" id="{88B3B4E8-F4B8-474F-ADF7-691CCDBA65DC}"/>
+              </a:ext>
+            </a:extLst>
+          </p:cNvPr>
+          <p:cNvSpPr>
+            <a:spLocks noGrp="1"/>
+          </p:cNvSpPr>
+          <p:nvPr>
+            <p:ph type="body" sz="quarter" idx="3"/>
+          </p:nvPr>
+        </p:nvSpPr>
+        <p:spPr/>
+        <p:txBody>
+          <a:bodyPr/>
+          <a:lstStyle/>
+          <a:p>
+            <a:r>
+              <a:rPr lang="fr-FR" dirty="0"/>
+              <a:t>Méthodes exponentielle</a:t>
+            </a:r>
+          </a:p>
+        </p:txBody>
+      </p:sp>
+      <p:sp>
+        <p:nvSpPr>
+          <p:cNvPr id="6" name="Espace réservé du contenu 5">
+            <a:extLst>
+              <a:ext uri="{FF2B5EF4-FFF2-40B4-BE49-F238E27FC236}">
+                <a16:creationId xmlns:a16="http://schemas.microsoft.com/office/drawing/2014/main" id="{7C7F8C92-21F6-4243-BC10-2A53A7E53035}"/>
+              </a:ext>
+            </a:extLst>
+          </p:cNvPr>
+          <p:cNvSpPr>
+            <a:spLocks noGrp="1"/>
+          </p:cNvSpPr>
+          <p:nvPr>
+            <p:ph sz="quarter" idx="4"/>
+          </p:nvPr>
+        </p:nvSpPr>
+        <p:spPr/>
+        <p:txBody>
+          <a:bodyPr/>
+          <a:lstStyle/>
+          <a:p>
+            <a:r>
+              <a:rPr lang="fr-FR" dirty="0"/>
+              <a:t>Grand pas de temps </a:t>
+            </a:r>
+          </a:p>
+          <a:p>
+            <a:endParaRPr lang="fr-FR" dirty="0"/>
+          </a:p>
+          <a:p>
+            <a:r>
+              <a:rPr lang="fr-FR" dirty="0"/>
+              <a:t>Aucune erreur sur des problèmes autonome (précision machine)</a:t>
+            </a:r>
+          </a:p>
+          <a:p>
+            <a:endParaRPr lang="fr-FR" dirty="0"/>
+          </a:p>
+          <a:p>
+            <a:r>
+              <a:rPr lang="fr-FR" dirty="0"/>
+              <a:t>Inconditionnellement stable sur pb de CFD classique </a:t>
+            </a:r>
+          </a:p>
+          <a:p>
+            <a:endParaRPr lang="fr-FR" dirty="0"/>
+          </a:p>
+          <a:p>
+            <a:endParaRPr lang="fr-FR" dirty="0"/>
+          </a:p>
+        </p:txBody>
+      </p:sp>
+    </p:spTree>
+    <p:extLst>
+      <p:ext uri="{BB962C8B-B14F-4D97-AF65-F5344CB8AC3E}">
+        <p14:creationId xmlns:p14="http://schemas.microsoft.com/office/powerpoint/2010/main" val="860307842"/>
       </p:ext>
     </p:extLst>
   </p:cSld>
@@ -6084,6 +8157,7 @@
           <a:bodyPr/>
           <a:lstStyle/>
           <a:p>
+            <a:pPr algn="ctr"/>
             <a:r>
               <a:rPr lang="fr-FR" dirty="0"/>
               <a:t>I - Introduction</a:t>
@@ -6128,18 +8202,42 @@
             <a:pPr lvl="1"/>
             <a:r>
               <a:rPr lang="fr-FR" dirty="0"/>
-              <a:t>Besoin exprimer par </a:t>
-            </a:r>
-            <a:r>
-              <a:rPr lang="fr-FR"/>
-              <a:t>un client : L’ONERA </a:t>
-            </a:r>
-          </a:p>
-          <a:p>
-            <a:pPr marL="457200" lvl="1" indent="0">
+              <a:t>Groupe de 5</a:t>
+            </a:r>
+          </a:p>
+          <a:p>
+            <a:pPr lvl="1"/>
+            <a:r>
+              <a:rPr lang="fr-FR" dirty="0"/>
+              <a:t>Projet  Recherche</a:t>
+            </a:r>
+          </a:p>
+          <a:p>
+            <a:pPr marL="0" indent="0">
               <a:buNone/>
             </a:pPr>
-            <a:endParaRPr lang="fr-FR"/>
+            <a:endParaRPr lang="fr-FR" dirty="0"/>
+          </a:p>
+          <a:p>
+            <a:r>
+              <a:rPr lang="fr-FR" dirty="0"/>
+              <a:t>Besoin exprimer par le client l’ONERA </a:t>
+            </a:r>
+          </a:p>
+          <a:p>
+            <a:endParaRPr lang="fr-FR" dirty="0"/>
+          </a:p>
+          <a:p>
+            <a:r>
+              <a:rPr lang="fr-FR" dirty="0"/>
+              <a:t>Amélioration des performances du solveur CFD JAGUAR</a:t>
+            </a:r>
+          </a:p>
+          <a:p>
+            <a:endParaRPr lang="fr-FR" dirty="0"/>
+          </a:p>
+          <a:p>
+            <a:endParaRPr lang="fr-FR" dirty="0"/>
           </a:p>
         </p:txBody>
       </p:sp>
@@ -6147,6 +8245,946 @@
     <p:extLst>
       <p:ext uri="{BB962C8B-B14F-4D97-AF65-F5344CB8AC3E}">
         <p14:creationId xmlns:p14="http://schemas.microsoft.com/office/powerpoint/2010/main" val="1102305186"/>
+      </p:ext>
+    </p:extLst>
+  </p:cSld>
+  <p:clrMapOvr>
+    <a:masterClrMapping/>
+  </p:clrMapOvr>
+</p:sld>
+</file>
+
+<file path=ppt/slides/slide4.xml><?xml version="1.0" encoding="utf-8"?>
+<p:sld xmlns:a="http://schemas.openxmlformats.org/drawingml/2006/main" xmlns:r="http://schemas.openxmlformats.org/officeDocument/2006/relationships" xmlns:p="http://schemas.openxmlformats.org/presentationml/2006/main">
+  <p:cSld>
+    <p:spTree>
+      <p:nvGrpSpPr>
+        <p:cNvPr id="1" name=""/>
+        <p:cNvGrpSpPr/>
+        <p:nvPr/>
+      </p:nvGrpSpPr>
+      <p:grpSpPr>
+        <a:xfrm>
+          <a:off x="0" y="0"/>
+          <a:ext cx="0" cy="0"/>
+          <a:chOff x="0" y="0"/>
+          <a:chExt cx="0" cy="0"/>
+        </a:xfrm>
+      </p:grpSpPr>
+      <p:sp>
+        <p:nvSpPr>
+          <p:cNvPr id="2" name="Titre 1">
+            <a:extLst>
+              <a:ext uri="{FF2B5EF4-FFF2-40B4-BE49-F238E27FC236}">
+                <a16:creationId xmlns:a16="http://schemas.microsoft.com/office/drawing/2014/main" id="{925AD2DE-CFF0-475B-98D6-8249214AA0DD}"/>
+              </a:ext>
+            </a:extLst>
+          </p:cNvPr>
+          <p:cNvSpPr>
+            <a:spLocks noGrp="1"/>
+          </p:cNvSpPr>
+          <p:nvPr>
+            <p:ph type="title"/>
+          </p:nvPr>
+        </p:nvSpPr>
+        <p:spPr>
+          <a:xfrm>
+            <a:off x="677334" y="609600"/>
+            <a:ext cx="8596668" cy="1236955"/>
+          </a:xfrm>
+        </p:spPr>
+        <p:txBody>
+          <a:bodyPr/>
+          <a:lstStyle/>
+          <a:p>
+            <a:pPr algn="ctr"/>
+            <a:r>
+              <a:rPr lang="fr-FR" dirty="0"/>
+              <a:t>I - Introduction</a:t>
+            </a:r>
+          </a:p>
+        </p:txBody>
+      </p:sp>
+      <mc:AlternateContent xmlns:mc="http://schemas.openxmlformats.org/markup-compatibility/2006">
+        <mc:Choice xmlns:a14="http://schemas.microsoft.com/office/drawing/2010/main" Requires="a14">
+          <p:sp>
+            <p:nvSpPr>
+              <p:cNvPr id="3" name="Espace réservé du contenu 2">
+                <a:extLst>
+                  <a:ext uri="{FF2B5EF4-FFF2-40B4-BE49-F238E27FC236}">
+                    <a16:creationId xmlns:a16="http://schemas.microsoft.com/office/drawing/2014/main" id="{8CBA7287-84B3-424D-9ABF-037BCE2D2D13}"/>
+                  </a:ext>
+                </a:extLst>
+              </p:cNvPr>
+              <p:cNvSpPr>
+                <a:spLocks noGrp="1"/>
+              </p:cNvSpPr>
+              <p:nvPr>
+                <p:ph idx="1"/>
+              </p:nvPr>
+            </p:nvSpPr>
+            <p:spPr/>
+            <p:txBody>
+              <a:bodyPr/>
+              <a:lstStyle/>
+              <a:p>
+                <a14:m>
+                  <m:oMath xmlns:m="http://schemas.openxmlformats.org/officeDocument/2006/math">
+                    <m:f>
+                      <m:fPr>
+                        <m:ctrlPr>
+                          <a:rPr lang="fr-FR" i="1" smtClean="0">
+                            <a:latin typeface="Cambria Math" panose="02040503050406030204" pitchFamily="18" charset="0"/>
+                          </a:rPr>
+                        </m:ctrlPr>
+                      </m:fPr>
+                      <m:num>
+                        <m:r>
+                          <a:rPr lang="fr-FR" i="1" smtClean="0">
+                            <a:latin typeface="Cambria Math" panose="02040503050406030204" pitchFamily="18" charset="0"/>
+                          </a:rPr>
+                          <m:t>𝜕</m:t>
+                        </m:r>
+                        <m:r>
+                          <a:rPr lang="fr-FR" i="1" smtClean="0">
+                            <a:latin typeface="Cambria Math" panose="02040503050406030204" pitchFamily="18" charset="0"/>
+                          </a:rPr>
+                          <m:t>𝑦</m:t>
+                        </m:r>
+                      </m:num>
+                      <m:den>
+                        <m:r>
+                          <a:rPr lang="fr-FR" i="1" smtClean="0">
+                            <a:latin typeface="Cambria Math" panose="02040503050406030204" pitchFamily="18" charset="0"/>
+                          </a:rPr>
+                          <m:t>𝜕</m:t>
+                        </m:r>
+                        <m:r>
+                          <a:rPr lang="fr-FR" b="0" i="1" smtClean="0">
+                            <a:latin typeface="Cambria Math" panose="02040503050406030204" pitchFamily="18" charset="0"/>
+                          </a:rPr>
+                          <m:t>𝑡</m:t>
+                        </m:r>
+                      </m:den>
+                    </m:f>
+                    <m:r>
+                      <a:rPr lang="fr-FR" b="0" i="1" smtClean="0">
+                        <a:latin typeface="Cambria Math" panose="02040503050406030204" pitchFamily="18" charset="0"/>
+                      </a:rPr>
+                      <m:t>=</m:t>
+                    </m:r>
+                    <m:r>
+                      <a:rPr lang="fr-FR" b="0" i="1" smtClean="0">
+                        <a:latin typeface="Cambria Math" panose="02040503050406030204" pitchFamily="18" charset="0"/>
+                      </a:rPr>
+                      <m:t>𝑅𝐻𝑆</m:t>
+                    </m:r>
+                    <m:d>
+                      <m:dPr>
+                        <m:ctrlPr>
+                          <a:rPr lang="fr-FR" b="0" i="1" smtClean="0">
+                            <a:latin typeface="Cambria Math" panose="02040503050406030204" pitchFamily="18" charset="0"/>
+                          </a:rPr>
+                        </m:ctrlPr>
+                      </m:dPr>
+                      <m:e>
+                        <m:r>
+                          <a:rPr lang="fr-FR" b="0" i="1" smtClean="0">
+                            <a:latin typeface="Cambria Math" panose="02040503050406030204" pitchFamily="18" charset="0"/>
+                          </a:rPr>
+                          <m:t>𝑦</m:t>
+                        </m:r>
+                        <m:r>
+                          <a:rPr lang="fr-FR" b="0" i="1" smtClean="0">
+                            <a:latin typeface="Cambria Math" panose="02040503050406030204" pitchFamily="18" charset="0"/>
+                          </a:rPr>
+                          <m:t>,</m:t>
+                        </m:r>
+                        <m:r>
+                          <a:rPr lang="fr-FR" b="0" i="1" smtClean="0">
+                            <a:latin typeface="Cambria Math" panose="02040503050406030204" pitchFamily="18" charset="0"/>
+                          </a:rPr>
+                          <m:t>𝑡</m:t>
+                        </m:r>
+                      </m:e>
+                    </m:d>
+                  </m:oMath>
+                </a14:m>
+                <a:endParaRPr lang="fr-FR" b="0" dirty="0"/>
+              </a:p>
+              <a:p>
+                <a:endParaRPr lang="fr-FR" dirty="0"/>
+              </a:p>
+              <a:p>
+                <a:r>
+                  <a:rPr lang="fr-FR" dirty="0"/>
+                  <a:t>Implémentation de schémas numériques pour la résolution temporelle</a:t>
+                </a:r>
+              </a:p>
+              <a:p>
+                <a:endParaRPr lang="fr-FR" dirty="0"/>
+              </a:p>
+              <a:p>
+                <a:r>
+                  <a:rPr lang="fr-FR" dirty="0"/>
+                  <a:t>Investigation sur les méthodes exponentielles </a:t>
+                </a:r>
+              </a:p>
+              <a:p>
+                <a:endParaRPr lang="fr-FR" dirty="0"/>
+              </a:p>
+              <a:p>
+                <a:r>
+                  <a:rPr lang="fr-FR" dirty="0"/>
+                  <a:t>Programmation en python </a:t>
+                </a:r>
+              </a:p>
+              <a:p>
+                <a:endParaRPr lang="fr-FR" dirty="0"/>
+              </a:p>
+              <a:p>
+                <a:endParaRPr lang="fr-FR" dirty="0"/>
+              </a:p>
+            </p:txBody>
+          </p:sp>
+        </mc:Choice>
+        <mc:Fallback>
+          <p:sp>
+            <p:nvSpPr>
+              <p:cNvPr id="3" name="Espace réservé du contenu 2">
+                <a:extLst>
+                  <a:ext uri="{FF2B5EF4-FFF2-40B4-BE49-F238E27FC236}">
+                    <a16:creationId xmlns:a16="http://schemas.microsoft.com/office/drawing/2014/main" id="{8CBA7287-84B3-424D-9ABF-037BCE2D2D13}"/>
+                  </a:ext>
+                </a:extLst>
+              </p:cNvPr>
+              <p:cNvSpPr>
+                <a:spLocks noGrp="1" noRot="1" noChangeAspect="1" noMove="1" noResize="1" noEditPoints="1" noAdjustHandles="1" noChangeArrowheads="1" noChangeShapeType="1" noTextEdit="1"/>
+              </p:cNvSpPr>
+              <p:nvPr>
+                <p:ph idx="1"/>
+              </p:nvPr>
+            </p:nvSpPr>
+            <p:spPr>
+              <a:blipFill>
+                <a:blip r:embed="rId2"/>
+                <a:stretch>
+                  <a:fillRect l="-142"/>
+                </a:stretch>
+              </a:blipFill>
+            </p:spPr>
+            <p:txBody>
+              <a:bodyPr/>
+              <a:lstStyle/>
+              <a:p>
+                <a:r>
+                  <a:rPr lang="fr-FR">
+                    <a:noFill/>
+                  </a:rPr>
+                  <a:t> </a:t>
+                </a:r>
+              </a:p>
+            </p:txBody>
+          </p:sp>
+        </mc:Fallback>
+      </mc:AlternateContent>
+    </p:spTree>
+    <p:extLst>
+      <p:ext uri="{BB962C8B-B14F-4D97-AF65-F5344CB8AC3E}">
+        <p14:creationId xmlns:p14="http://schemas.microsoft.com/office/powerpoint/2010/main" val="3686136127"/>
+      </p:ext>
+    </p:extLst>
+  </p:cSld>
+  <p:clrMapOvr>
+    <a:masterClrMapping/>
+  </p:clrMapOvr>
+</p:sld>
+</file>
+
+<file path=ppt/slides/slide5.xml><?xml version="1.0" encoding="utf-8"?>
+<p:sld xmlns:a="http://schemas.openxmlformats.org/drawingml/2006/main" xmlns:r="http://schemas.openxmlformats.org/officeDocument/2006/relationships" xmlns:p="http://schemas.openxmlformats.org/presentationml/2006/main">
+  <p:cSld>
+    <p:spTree>
+      <p:nvGrpSpPr>
+        <p:cNvPr id="1" name=""/>
+        <p:cNvGrpSpPr/>
+        <p:nvPr/>
+      </p:nvGrpSpPr>
+      <p:grpSpPr>
+        <a:xfrm>
+          <a:off x="0" y="0"/>
+          <a:ext cx="0" cy="0"/>
+          <a:chOff x="0" y="0"/>
+          <a:chExt cx="0" cy="0"/>
+        </a:xfrm>
+      </p:grpSpPr>
+      <p:sp>
+        <p:nvSpPr>
+          <p:cNvPr id="2" name="Titre 1">
+            <a:extLst>
+              <a:ext uri="{FF2B5EF4-FFF2-40B4-BE49-F238E27FC236}">
+                <a16:creationId xmlns:a16="http://schemas.microsoft.com/office/drawing/2014/main" id="{87AA8248-2FC7-4DB4-B76F-CE3FEE666906}"/>
+              </a:ext>
+            </a:extLst>
+          </p:cNvPr>
+          <p:cNvSpPr>
+            <a:spLocks noGrp="1"/>
+          </p:cNvSpPr>
+          <p:nvPr>
+            <p:ph type="title"/>
+          </p:nvPr>
+        </p:nvSpPr>
+        <p:spPr/>
+        <p:txBody>
+          <a:bodyPr/>
+          <a:lstStyle/>
+          <a:p>
+            <a:pPr algn="ctr"/>
+            <a:r>
+              <a:rPr lang="fr-FR" dirty="0"/>
+              <a:t>II – Gestion de projet </a:t>
+            </a:r>
+            <a:br>
+              <a:rPr lang="fr-FR" dirty="0"/>
+            </a:br>
+            <a:r>
+              <a:rPr lang="fr-FR" sz="2800" dirty="0"/>
+              <a:t>Objectifs client</a:t>
+            </a:r>
+            <a:endParaRPr lang="fr-FR" dirty="0"/>
+          </a:p>
+        </p:txBody>
+      </p:sp>
+      <p:sp>
+        <p:nvSpPr>
+          <p:cNvPr id="3" name="Espace réservé du contenu 2">
+            <a:extLst>
+              <a:ext uri="{FF2B5EF4-FFF2-40B4-BE49-F238E27FC236}">
+                <a16:creationId xmlns:a16="http://schemas.microsoft.com/office/drawing/2014/main" id="{180EDACD-AC7E-4944-A8DC-529FEE578D6F}"/>
+              </a:ext>
+            </a:extLst>
+          </p:cNvPr>
+          <p:cNvSpPr>
+            <a:spLocks noGrp="1"/>
+          </p:cNvSpPr>
+          <p:nvPr>
+            <p:ph idx="1"/>
+          </p:nvPr>
+        </p:nvSpPr>
+        <p:spPr/>
+        <p:txBody>
+          <a:bodyPr/>
+          <a:lstStyle/>
+          <a:p>
+            <a:pPr lvl="0"/>
+            <a:r>
+              <a:rPr lang="fr-FR" dirty="0"/>
+              <a:t>Implémenter au moins une méthode d’intégration temporelle du type exponentielle</a:t>
+            </a:r>
+          </a:p>
+          <a:p>
+            <a:pPr marL="0" lvl="0" indent="0">
+              <a:buNone/>
+            </a:pPr>
+            <a:endParaRPr lang="fr-FR" dirty="0"/>
+          </a:p>
+          <a:p>
+            <a:pPr lvl="0"/>
+            <a:r>
+              <a:rPr lang="fr-FR" dirty="0"/>
+              <a:t>Coupler cette méthode avec la méthode spatiale des SD</a:t>
+            </a:r>
+          </a:p>
+          <a:p>
+            <a:pPr marL="0" lvl="0" indent="0">
+              <a:buNone/>
+            </a:pPr>
+            <a:endParaRPr lang="fr-FR" dirty="0"/>
+          </a:p>
+          <a:p>
+            <a:pPr lvl="0"/>
+            <a:r>
+              <a:rPr lang="fr-FR" dirty="0"/>
+              <a:t>Fournir et commenter le code</a:t>
+            </a:r>
+          </a:p>
+          <a:p>
+            <a:pPr marL="0" lvl="0" indent="0">
+              <a:buNone/>
+            </a:pPr>
+            <a:endParaRPr lang="fr-FR" dirty="0"/>
+          </a:p>
+          <a:p>
+            <a:pPr lvl="0"/>
+            <a:r>
+              <a:rPr lang="fr-FR" dirty="0"/>
+              <a:t>Donner les avantages et les inconvénients de la méthode par rapport aux méthodes classiques. </a:t>
+            </a:r>
+          </a:p>
+          <a:p>
+            <a:endParaRPr lang="fr-FR" dirty="0"/>
+          </a:p>
+        </p:txBody>
+      </p:sp>
+    </p:spTree>
+    <p:extLst>
+      <p:ext uri="{BB962C8B-B14F-4D97-AF65-F5344CB8AC3E}">
+        <p14:creationId xmlns:p14="http://schemas.microsoft.com/office/powerpoint/2010/main" val="129017208"/>
+      </p:ext>
+    </p:extLst>
+  </p:cSld>
+  <p:clrMapOvr>
+    <a:masterClrMapping/>
+  </p:clrMapOvr>
+</p:sld>
+</file>
+
+<file path=ppt/slides/slide6.xml><?xml version="1.0" encoding="utf-8"?>
+<p:sld xmlns:a="http://schemas.openxmlformats.org/drawingml/2006/main" xmlns:r="http://schemas.openxmlformats.org/officeDocument/2006/relationships" xmlns:p="http://schemas.openxmlformats.org/presentationml/2006/main">
+  <p:cSld>
+    <p:spTree>
+      <p:nvGrpSpPr>
+        <p:cNvPr id="1" name=""/>
+        <p:cNvGrpSpPr/>
+        <p:nvPr/>
+      </p:nvGrpSpPr>
+      <p:grpSpPr>
+        <a:xfrm>
+          <a:off x="0" y="0"/>
+          <a:ext cx="0" cy="0"/>
+          <a:chOff x="0" y="0"/>
+          <a:chExt cx="0" cy="0"/>
+        </a:xfrm>
+      </p:grpSpPr>
+      <p:sp>
+        <p:nvSpPr>
+          <p:cNvPr id="2" name="Titre 1">
+            <a:extLst>
+              <a:ext uri="{FF2B5EF4-FFF2-40B4-BE49-F238E27FC236}">
+                <a16:creationId xmlns:a16="http://schemas.microsoft.com/office/drawing/2014/main" id="{8DB6E984-1000-41D0-9BAD-8224D1D5B727}"/>
+              </a:ext>
+            </a:extLst>
+          </p:cNvPr>
+          <p:cNvSpPr>
+            <a:spLocks noGrp="1"/>
+          </p:cNvSpPr>
+          <p:nvPr>
+            <p:ph type="title"/>
+          </p:nvPr>
+        </p:nvSpPr>
+        <p:spPr/>
+        <p:txBody>
+          <a:bodyPr/>
+          <a:lstStyle/>
+          <a:p>
+            <a:pPr algn="ctr"/>
+            <a:r>
+              <a:rPr lang="fr-FR" dirty="0"/>
+              <a:t>II – Gestion de projet </a:t>
+            </a:r>
+            <a:br>
+              <a:rPr lang="fr-FR" dirty="0"/>
+            </a:br>
+            <a:r>
+              <a:rPr lang="fr-FR" sz="2800" dirty="0"/>
+              <a:t>Livrables attendus</a:t>
+            </a:r>
+            <a:endParaRPr lang="fr-FR" dirty="0"/>
+          </a:p>
+        </p:txBody>
+      </p:sp>
+      <p:sp>
+        <p:nvSpPr>
+          <p:cNvPr id="3" name="Espace réservé du contenu 2">
+            <a:extLst>
+              <a:ext uri="{FF2B5EF4-FFF2-40B4-BE49-F238E27FC236}">
+                <a16:creationId xmlns:a16="http://schemas.microsoft.com/office/drawing/2014/main" id="{D2C42D89-DA06-4B88-A1AF-550229405A0C}"/>
+              </a:ext>
+            </a:extLst>
+          </p:cNvPr>
+          <p:cNvSpPr>
+            <a:spLocks noGrp="1"/>
+          </p:cNvSpPr>
+          <p:nvPr>
+            <p:ph idx="1"/>
+          </p:nvPr>
+        </p:nvSpPr>
+        <p:spPr/>
+        <p:txBody>
+          <a:bodyPr/>
+          <a:lstStyle/>
+          <a:p>
+            <a:pPr lvl="0"/>
+            <a:r>
+              <a:rPr lang="fr-FR" dirty="0"/>
+              <a:t>Une maquette (python) dans laquelle les schémas sont implantés (à gérer sous GitHub) </a:t>
+            </a:r>
+          </a:p>
+          <a:p>
+            <a:pPr lvl="0"/>
+            <a:endParaRPr lang="fr-FR" dirty="0"/>
+          </a:p>
+          <a:p>
+            <a:pPr lvl="0"/>
+            <a:r>
+              <a:rPr lang="fr-FR" dirty="0"/>
+              <a:t>Plusieurs cas test  </a:t>
+            </a:r>
+          </a:p>
+          <a:p>
+            <a:pPr marL="0" lvl="0" indent="0">
+              <a:buNone/>
+            </a:pPr>
+            <a:endParaRPr lang="fr-FR" dirty="0"/>
+          </a:p>
+          <a:p>
+            <a:pPr lvl="0"/>
+            <a:r>
+              <a:rPr lang="fr-FR" dirty="0"/>
+              <a:t>Un rapport sur la comparaison croisée des schémas numériques (liste de recommandations ) </a:t>
+            </a:r>
+          </a:p>
+          <a:p>
+            <a:pPr lvl="0"/>
+            <a:endParaRPr lang="fr-FR" dirty="0"/>
+          </a:p>
+          <a:p>
+            <a:pPr lvl="0"/>
+            <a:r>
+              <a:rPr lang="fr-FR" dirty="0"/>
+              <a:t>Une présentation orale du travail effectué au cours du projet </a:t>
+            </a:r>
+          </a:p>
+          <a:p>
+            <a:endParaRPr lang="fr-FR" dirty="0"/>
+          </a:p>
+        </p:txBody>
+      </p:sp>
+    </p:spTree>
+    <p:extLst>
+      <p:ext uri="{BB962C8B-B14F-4D97-AF65-F5344CB8AC3E}">
+        <p14:creationId xmlns:p14="http://schemas.microsoft.com/office/powerpoint/2010/main" val="2572246735"/>
+      </p:ext>
+    </p:extLst>
+  </p:cSld>
+  <p:clrMapOvr>
+    <a:masterClrMapping/>
+  </p:clrMapOvr>
+</p:sld>
+</file>
+
+<file path=ppt/slides/slide7.xml><?xml version="1.0" encoding="utf-8"?>
+<p:sld xmlns:a="http://schemas.openxmlformats.org/drawingml/2006/main" xmlns:r="http://schemas.openxmlformats.org/officeDocument/2006/relationships" xmlns:p="http://schemas.openxmlformats.org/presentationml/2006/main">
+  <p:cSld>
+    <p:spTree>
+      <p:nvGrpSpPr>
+        <p:cNvPr id="1" name=""/>
+        <p:cNvGrpSpPr/>
+        <p:nvPr/>
+      </p:nvGrpSpPr>
+      <p:grpSpPr>
+        <a:xfrm>
+          <a:off x="0" y="0"/>
+          <a:ext cx="0" cy="0"/>
+          <a:chOff x="0" y="0"/>
+          <a:chExt cx="0" cy="0"/>
+        </a:xfrm>
+      </p:grpSpPr>
+      <p:sp>
+        <p:nvSpPr>
+          <p:cNvPr id="2" name="Titre 1">
+            <a:extLst>
+              <a:ext uri="{FF2B5EF4-FFF2-40B4-BE49-F238E27FC236}">
+                <a16:creationId xmlns:a16="http://schemas.microsoft.com/office/drawing/2014/main" id="{2F4E9914-A102-49E3-9B09-BB7A13F49DD0}"/>
+              </a:ext>
+            </a:extLst>
+          </p:cNvPr>
+          <p:cNvSpPr>
+            <a:spLocks noGrp="1"/>
+          </p:cNvSpPr>
+          <p:nvPr>
+            <p:ph type="title"/>
+          </p:nvPr>
+        </p:nvSpPr>
+        <p:spPr/>
+        <p:txBody>
+          <a:bodyPr/>
+          <a:lstStyle/>
+          <a:p>
+            <a:pPr algn="ctr"/>
+            <a:r>
+              <a:rPr lang="fr-FR" dirty="0"/>
+              <a:t>II – Gestion de projet</a:t>
+            </a:r>
+            <a:br>
+              <a:rPr lang="fr-FR" dirty="0"/>
+            </a:br>
+            <a:r>
+              <a:rPr lang="fr-FR" sz="2800" dirty="0"/>
+              <a:t>Organisation</a:t>
+            </a:r>
+            <a:endParaRPr lang="fr-FR" dirty="0"/>
+          </a:p>
+        </p:txBody>
+      </p:sp>
+      <p:sp>
+        <p:nvSpPr>
+          <p:cNvPr id="4" name="Espace réservé du contenu 3">
+            <a:extLst>
+              <a:ext uri="{FF2B5EF4-FFF2-40B4-BE49-F238E27FC236}">
+                <a16:creationId xmlns:a16="http://schemas.microsoft.com/office/drawing/2014/main" id="{8C412395-3E7D-4827-B89D-D10AF7A53A97}"/>
+              </a:ext>
+            </a:extLst>
+          </p:cNvPr>
+          <p:cNvSpPr>
+            <a:spLocks noGrp="1"/>
+          </p:cNvSpPr>
+          <p:nvPr>
+            <p:ph sz="half" idx="2"/>
+          </p:nvPr>
+        </p:nvSpPr>
+        <p:spPr>
+          <a:xfrm>
+            <a:off x="675745" y="2160983"/>
+            <a:ext cx="4185623" cy="3880379"/>
+          </a:xfrm>
+        </p:spPr>
+        <p:txBody>
+          <a:bodyPr/>
+          <a:lstStyle/>
+          <a:p>
+            <a:r>
+              <a:rPr lang="fr-FR" dirty="0"/>
+              <a:t>Répartition en 2 équipes </a:t>
+            </a:r>
+          </a:p>
+          <a:p>
+            <a:r>
+              <a:rPr lang="fr-FR" dirty="0"/>
+              <a:t>Répondre aux 2 principaux objectifs du client </a:t>
+            </a:r>
+          </a:p>
+          <a:p>
+            <a:r>
+              <a:rPr lang="fr-FR" dirty="0"/>
+              <a:t>Gain de temps sur la partie couplage</a:t>
+            </a:r>
+          </a:p>
+          <a:p>
+            <a:r>
+              <a:rPr lang="fr-FR" dirty="0"/>
+              <a:t>Difficulté sur la partie implémentation d’une méthode</a:t>
+            </a:r>
+          </a:p>
+          <a:p>
+            <a:r>
+              <a:rPr lang="fr-FR" dirty="0"/>
+              <a:t>   Changement temporaire d’équipe. </a:t>
+            </a:r>
+          </a:p>
+          <a:p>
+            <a:endParaRPr lang="fr-FR" dirty="0"/>
+          </a:p>
+          <a:p>
+            <a:endParaRPr lang="fr-FR" dirty="0"/>
+          </a:p>
+        </p:txBody>
+      </p:sp>
+      <p:pic>
+        <p:nvPicPr>
+          <p:cNvPr id="7" name="image6.png">
+            <a:extLst>
+              <a:ext uri="{FF2B5EF4-FFF2-40B4-BE49-F238E27FC236}">
+                <a16:creationId xmlns:a16="http://schemas.microsoft.com/office/drawing/2014/main" id="{C0C77CD7-A252-41BA-924C-91383B1D9AA9}"/>
+              </a:ext>
+            </a:extLst>
+          </p:cNvPr>
+          <p:cNvPicPr>
+            <a:picLocks noGrp="1"/>
+          </p:cNvPicPr>
+          <p:nvPr>
+            <p:ph sz="quarter" idx="4"/>
+          </p:nvPr>
+        </p:nvPicPr>
+        <p:blipFill>
+          <a:blip r:embed="rId2"/>
+          <a:srcRect/>
+          <a:stretch>
+            <a:fillRect/>
+          </a:stretch>
+        </p:blipFill>
+        <p:spPr>
+          <a:xfrm>
+            <a:off x="5141204" y="2160983"/>
+            <a:ext cx="4934951" cy="3304116"/>
+          </a:xfrm>
+          <a:prstGeom prst="rect">
+            <a:avLst/>
+          </a:prstGeom>
+          <a:ln/>
+        </p:spPr>
+      </p:pic>
+      <p:sp>
+        <p:nvSpPr>
+          <p:cNvPr id="8" name="Flèche : droite 7">
+            <a:extLst>
+              <a:ext uri="{FF2B5EF4-FFF2-40B4-BE49-F238E27FC236}">
+                <a16:creationId xmlns:a16="http://schemas.microsoft.com/office/drawing/2014/main" id="{4F1978B8-9DC2-4CC4-87B0-445F4B061D10}"/>
+              </a:ext>
+            </a:extLst>
+          </p:cNvPr>
+          <p:cNvSpPr/>
+          <p:nvPr/>
+        </p:nvSpPr>
+        <p:spPr>
+          <a:xfrm>
+            <a:off x="765794" y="4640663"/>
+            <a:ext cx="470516" cy="348588"/>
+          </a:xfrm>
+          <a:prstGeom prst="rightArrow">
+            <a:avLst/>
+          </a:prstGeom>
+        </p:spPr>
+        <p:style>
+          <a:lnRef idx="2">
+            <a:schemeClr val="accent1">
+              <a:shade val="50000"/>
+            </a:schemeClr>
+          </a:lnRef>
+          <a:fillRef idx="1">
+            <a:schemeClr val="accent1"/>
+          </a:fillRef>
+          <a:effectRef idx="0">
+            <a:schemeClr val="accent1"/>
+          </a:effectRef>
+          <a:fontRef idx="minor">
+            <a:schemeClr val="lt1"/>
+          </a:fontRef>
+        </p:style>
+        <p:txBody>
+          <a:bodyPr rtlCol="0" anchor="ctr"/>
+          <a:lstStyle/>
+          <a:p>
+            <a:pPr algn="ctr"/>
+            <a:endParaRPr lang="fr-FR"/>
+          </a:p>
+        </p:txBody>
+      </p:sp>
+    </p:spTree>
+    <p:extLst>
+      <p:ext uri="{BB962C8B-B14F-4D97-AF65-F5344CB8AC3E}">
+        <p14:creationId xmlns:p14="http://schemas.microsoft.com/office/powerpoint/2010/main" val="308474648"/>
+      </p:ext>
+    </p:extLst>
+  </p:cSld>
+  <p:clrMapOvr>
+    <a:masterClrMapping/>
+  </p:clrMapOvr>
+</p:sld>
+</file>
+
+<file path=ppt/slides/slide8.xml><?xml version="1.0" encoding="utf-8"?>
+<p:sld xmlns:a="http://schemas.openxmlformats.org/drawingml/2006/main" xmlns:r="http://schemas.openxmlformats.org/officeDocument/2006/relationships" xmlns:p="http://schemas.openxmlformats.org/presentationml/2006/main">
+  <p:cSld>
+    <p:spTree>
+      <p:nvGrpSpPr>
+        <p:cNvPr id="1" name=""/>
+        <p:cNvGrpSpPr/>
+        <p:nvPr/>
+      </p:nvGrpSpPr>
+      <p:grpSpPr>
+        <a:xfrm>
+          <a:off x="0" y="0"/>
+          <a:ext cx="0" cy="0"/>
+          <a:chOff x="0" y="0"/>
+          <a:chExt cx="0" cy="0"/>
+        </a:xfrm>
+      </p:grpSpPr>
+      <p:sp>
+        <p:nvSpPr>
+          <p:cNvPr id="2" name="Titre 1">
+            <a:extLst>
+              <a:ext uri="{FF2B5EF4-FFF2-40B4-BE49-F238E27FC236}">
+                <a16:creationId xmlns:a16="http://schemas.microsoft.com/office/drawing/2014/main" id="{8DB6E984-1000-41D0-9BAD-8224D1D5B727}"/>
+              </a:ext>
+            </a:extLst>
+          </p:cNvPr>
+          <p:cNvSpPr>
+            <a:spLocks noGrp="1"/>
+          </p:cNvSpPr>
+          <p:nvPr>
+            <p:ph type="title"/>
+          </p:nvPr>
+        </p:nvSpPr>
+        <p:spPr>
+          <a:xfrm>
+            <a:off x="695089" y="110971"/>
+            <a:ext cx="8596668" cy="1320800"/>
+          </a:xfrm>
+        </p:spPr>
+        <p:txBody>
+          <a:bodyPr/>
+          <a:lstStyle/>
+          <a:p>
+            <a:pPr algn="ctr"/>
+            <a:r>
+              <a:rPr lang="fr-FR" dirty="0"/>
+              <a:t>II – Gestion de projet </a:t>
+            </a:r>
+            <a:br>
+              <a:rPr lang="fr-FR" dirty="0"/>
+            </a:br>
+            <a:r>
+              <a:rPr lang="fr-FR" dirty="0"/>
+              <a:t>Diagramme de Gantt initial</a:t>
+            </a:r>
+          </a:p>
+        </p:txBody>
+      </p:sp>
+      <p:pic>
+        <p:nvPicPr>
+          <p:cNvPr id="4" name="image3.png">
+            <a:extLst>
+              <a:ext uri="{FF2B5EF4-FFF2-40B4-BE49-F238E27FC236}">
+                <a16:creationId xmlns:a16="http://schemas.microsoft.com/office/drawing/2014/main" id="{AF5DA36B-4B61-44E0-B6CA-383B78BFE83A}"/>
+              </a:ext>
+            </a:extLst>
+          </p:cNvPr>
+          <p:cNvPicPr>
+            <a:picLocks noGrp="1"/>
+          </p:cNvPicPr>
+          <p:nvPr>
+            <p:ph idx="1"/>
+          </p:nvPr>
+        </p:nvPicPr>
+        <p:blipFill>
+          <a:blip r:embed="rId2"/>
+          <a:srcRect/>
+          <a:stretch>
+            <a:fillRect/>
+          </a:stretch>
+        </p:blipFill>
+        <p:spPr>
+          <a:xfrm>
+            <a:off x="168676" y="1431771"/>
+            <a:ext cx="11523215" cy="5253114"/>
+          </a:xfrm>
+          <a:prstGeom prst="rect">
+            <a:avLst/>
+          </a:prstGeom>
+          <a:ln/>
+        </p:spPr>
+      </p:pic>
+    </p:spTree>
+    <p:extLst>
+      <p:ext uri="{BB962C8B-B14F-4D97-AF65-F5344CB8AC3E}">
+        <p14:creationId xmlns:p14="http://schemas.microsoft.com/office/powerpoint/2010/main" val="1880120633"/>
+      </p:ext>
+    </p:extLst>
+  </p:cSld>
+  <p:clrMapOvr>
+    <a:masterClrMapping/>
+  </p:clrMapOvr>
+</p:sld>
+</file>
+
+<file path=ppt/slides/slide9.xml><?xml version="1.0" encoding="utf-8"?>
+<p:sld xmlns:a="http://schemas.openxmlformats.org/drawingml/2006/main" xmlns:r="http://schemas.openxmlformats.org/officeDocument/2006/relationships" xmlns:p="http://schemas.openxmlformats.org/presentationml/2006/main">
+  <p:cSld>
+    <p:spTree>
+      <p:nvGrpSpPr>
+        <p:cNvPr id="1" name=""/>
+        <p:cNvGrpSpPr/>
+        <p:nvPr/>
+      </p:nvGrpSpPr>
+      <p:grpSpPr>
+        <a:xfrm>
+          <a:off x="0" y="0"/>
+          <a:ext cx="0" cy="0"/>
+          <a:chOff x="0" y="0"/>
+          <a:chExt cx="0" cy="0"/>
+        </a:xfrm>
+      </p:grpSpPr>
+      <p:sp>
+        <p:nvSpPr>
+          <p:cNvPr id="2" name="Titre 1">
+            <a:extLst>
+              <a:ext uri="{FF2B5EF4-FFF2-40B4-BE49-F238E27FC236}">
+                <a16:creationId xmlns:a16="http://schemas.microsoft.com/office/drawing/2014/main" id="{8DB6E984-1000-41D0-9BAD-8224D1D5B727}"/>
+              </a:ext>
+            </a:extLst>
+          </p:cNvPr>
+          <p:cNvSpPr>
+            <a:spLocks noGrp="1"/>
+          </p:cNvSpPr>
+          <p:nvPr>
+            <p:ph type="title"/>
+          </p:nvPr>
+        </p:nvSpPr>
+        <p:spPr>
+          <a:xfrm>
+            <a:off x="695089" y="110971"/>
+            <a:ext cx="8596668" cy="1320800"/>
+          </a:xfrm>
+        </p:spPr>
+        <p:txBody>
+          <a:bodyPr/>
+          <a:lstStyle/>
+          <a:p>
+            <a:pPr algn="ctr"/>
+            <a:r>
+              <a:rPr lang="fr-FR" dirty="0"/>
+              <a:t>II – Gestion de projet </a:t>
+            </a:r>
+            <a:br>
+              <a:rPr lang="fr-FR" dirty="0"/>
+            </a:br>
+            <a:r>
+              <a:rPr lang="fr-FR" dirty="0"/>
+              <a:t>Diagramme de Gantt « final »</a:t>
+            </a:r>
+          </a:p>
+        </p:txBody>
+      </p:sp>
+      <p:pic>
+        <p:nvPicPr>
+          <p:cNvPr id="6" name="Espace réservé du contenu 7">
+            <a:extLst>
+              <a:ext uri="{FF2B5EF4-FFF2-40B4-BE49-F238E27FC236}">
+                <a16:creationId xmlns:a16="http://schemas.microsoft.com/office/drawing/2014/main" id="{30805947-EB13-4CE1-AA67-545007F33662}"/>
+              </a:ext>
+            </a:extLst>
+          </p:cNvPr>
+          <p:cNvPicPr>
+            <a:picLocks noGrp="1" noChangeAspect="1"/>
+          </p:cNvPicPr>
+          <p:nvPr>
+            <p:ph idx="1"/>
+          </p:nvPr>
+        </p:nvPicPr>
+        <p:blipFill>
+          <a:blip r:embed="rId2">
+            <a:extLst>
+              <a:ext uri="{28A0092B-C50C-407E-A947-70E740481C1C}">
+                <a14:useLocalDpi xmlns:a14="http://schemas.microsoft.com/office/drawing/2010/main" val="0"/>
+              </a:ext>
+            </a:extLst>
+          </a:blip>
+          <a:stretch>
+            <a:fillRect/>
+          </a:stretch>
+        </p:blipFill>
+        <p:spPr>
+          <a:xfrm>
+            <a:off x="695089" y="1322773"/>
+            <a:ext cx="11079331" cy="5356094"/>
+          </a:xfrm>
+        </p:spPr>
+      </p:pic>
+    </p:spTree>
+    <p:extLst>
+      <p:ext uri="{BB962C8B-B14F-4D97-AF65-F5344CB8AC3E}">
+        <p14:creationId xmlns:p14="http://schemas.microsoft.com/office/powerpoint/2010/main" val="849679488"/>
       </p:ext>
     </p:extLst>
   </p:cSld>

</xml_diff>

<commit_message>
Change in oral presentation and temporal/test.py for screen shots
</commit_message>
<xml_diff>
--- a/oral_presentation/Oral_presentation_12_02_2019.pptx
+++ b/oral_presentation/Oral_presentation_12_02_2019.pptx
@@ -9,22 +9,24 @@
     <p:sldId id="257" r:id="rId3"/>
     <p:sldId id="258" r:id="rId4"/>
     <p:sldId id="259" r:id="rId5"/>
-    <p:sldId id="260" r:id="rId6"/>
-    <p:sldId id="261" r:id="rId7"/>
-    <p:sldId id="264" r:id="rId8"/>
-    <p:sldId id="263" r:id="rId9"/>
-    <p:sldId id="265" r:id="rId10"/>
-    <p:sldId id="266" r:id="rId11"/>
-    <p:sldId id="267" r:id="rId12"/>
-    <p:sldId id="270" r:id="rId13"/>
-    <p:sldId id="272" r:id="rId14"/>
-    <p:sldId id="274" r:id="rId15"/>
-    <p:sldId id="273" r:id="rId16"/>
-    <p:sldId id="275" r:id="rId17"/>
-    <p:sldId id="276" r:id="rId18"/>
-    <p:sldId id="277" r:id="rId19"/>
-    <p:sldId id="279" r:id="rId20"/>
-    <p:sldId id="280" r:id="rId21"/>
+    <p:sldId id="282" r:id="rId6"/>
+    <p:sldId id="260" r:id="rId7"/>
+    <p:sldId id="261" r:id="rId8"/>
+    <p:sldId id="264" r:id="rId9"/>
+    <p:sldId id="263" r:id="rId10"/>
+    <p:sldId id="265" r:id="rId11"/>
+    <p:sldId id="266" r:id="rId12"/>
+    <p:sldId id="267" r:id="rId13"/>
+    <p:sldId id="270" r:id="rId14"/>
+    <p:sldId id="272" r:id="rId15"/>
+    <p:sldId id="274" r:id="rId16"/>
+    <p:sldId id="273" r:id="rId17"/>
+    <p:sldId id="275" r:id="rId18"/>
+    <p:sldId id="276" r:id="rId19"/>
+    <p:sldId id="277" r:id="rId20"/>
+    <p:sldId id="281" r:id="rId21"/>
+    <p:sldId id="279" r:id="rId22"/>
+    <p:sldId id="280" r:id="rId23"/>
   </p:sldIdLst>
   <p:sldSz cx="12192000" cy="6858000"/>
   <p:notesSz cx="6858000" cy="9144000"/>
@@ -876,7 +878,7 @@
           <a:p>
             <a:fld id="{4771A69F-C10C-45E2-9AFD-1BC34CAE6126}" type="datetimeFigureOut">
               <a:rPr lang="fr-FR" smtClean="0"/>
-              <a:t>10/02/2019</a:t>
+              <a:t>11/02/2019</a:t>
             </a:fld>
             <a:endParaRPr lang="fr-FR"/>
           </a:p>
@@ -1127,7 +1129,7 @@
           <a:p>
             <a:fld id="{4771A69F-C10C-45E2-9AFD-1BC34CAE6126}" type="datetimeFigureOut">
               <a:rPr lang="fr-FR" smtClean="0"/>
-              <a:t>10/02/2019</a:t>
+              <a:t>11/02/2019</a:t>
             </a:fld>
             <a:endParaRPr lang="fr-FR"/>
           </a:p>
@@ -1441,7 +1443,7 @@
           <a:p>
             <a:fld id="{4771A69F-C10C-45E2-9AFD-1BC34CAE6126}" type="datetimeFigureOut">
               <a:rPr lang="fr-FR" smtClean="0"/>
-              <a:t>10/02/2019</a:t>
+              <a:t>11/02/2019</a:t>
             </a:fld>
             <a:endParaRPr lang="fr-FR"/>
           </a:p>
@@ -1774,7 +1776,7 @@
           <a:p>
             <a:fld id="{4771A69F-C10C-45E2-9AFD-1BC34CAE6126}" type="datetimeFigureOut">
               <a:rPr lang="fr-FR" smtClean="0"/>
-              <a:t>10/02/2019</a:t>
+              <a:t>11/02/2019</a:t>
             </a:fld>
             <a:endParaRPr lang="fr-FR"/>
           </a:p>
@@ -2088,7 +2090,7 @@
           <a:p>
             <a:fld id="{4771A69F-C10C-45E2-9AFD-1BC34CAE6126}" type="datetimeFigureOut">
               <a:rPr lang="fr-FR" smtClean="0"/>
-              <a:t>10/02/2019</a:t>
+              <a:t>11/02/2019</a:t>
             </a:fld>
             <a:endParaRPr lang="fr-FR"/>
           </a:p>
@@ -2481,7 +2483,7 @@
           <a:p>
             <a:fld id="{4771A69F-C10C-45E2-9AFD-1BC34CAE6126}" type="datetimeFigureOut">
               <a:rPr lang="fr-FR" smtClean="0"/>
-              <a:t>10/02/2019</a:t>
+              <a:t>11/02/2019</a:t>
             </a:fld>
             <a:endParaRPr lang="fr-FR"/>
           </a:p>
@@ -2651,7 +2653,7 @@
           <a:p>
             <a:fld id="{4771A69F-C10C-45E2-9AFD-1BC34CAE6126}" type="datetimeFigureOut">
               <a:rPr lang="fr-FR" smtClean="0"/>
-              <a:t>10/02/2019</a:t>
+              <a:t>11/02/2019</a:t>
             </a:fld>
             <a:endParaRPr lang="fr-FR"/>
           </a:p>
@@ -2831,7 +2833,7 @@
           <a:p>
             <a:fld id="{4771A69F-C10C-45E2-9AFD-1BC34CAE6126}" type="datetimeFigureOut">
               <a:rPr lang="fr-FR" smtClean="0"/>
-              <a:t>10/02/2019</a:t>
+              <a:t>11/02/2019</a:t>
             </a:fld>
             <a:endParaRPr lang="fr-FR"/>
           </a:p>
@@ -3001,7 +3003,7 @@
           <a:p>
             <a:fld id="{4771A69F-C10C-45E2-9AFD-1BC34CAE6126}" type="datetimeFigureOut">
               <a:rPr lang="fr-FR" smtClean="0"/>
-              <a:t>10/02/2019</a:t>
+              <a:t>11/02/2019</a:t>
             </a:fld>
             <a:endParaRPr lang="fr-FR"/>
           </a:p>
@@ -3248,7 +3250,7 @@
           <a:p>
             <a:fld id="{4771A69F-C10C-45E2-9AFD-1BC34CAE6126}" type="datetimeFigureOut">
               <a:rPr lang="fr-FR" smtClean="0"/>
-              <a:t>10/02/2019</a:t>
+              <a:t>11/02/2019</a:t>
             </a:fld>
             <a:endParaRPr lang="fr-FR"/>
           </a:p>
@@ -3480,7 +3482,7 @@
           <a:p>
             <a:fld id="{4771A69F-C10C-45E2-9AFD-1BC34CAE6126}" type="datetimeFigureOut">
               <a:rPr lang="fr-FR" smtClean="0"/>
-              <a:t>10/02/2019</a:t>
+              <a:t>11/02/2019</a:t>
             </a:fld>
             <a:endParaRPr lang="fr-FR"/>
           </a:p>
@@ -3854,7 +3856,7 @@
           <a:p>
             <a:fld id="{4771A69F-C10C-45E2-9AFD-1BC34CAE6126}" type="datetimeFigureOut">
               <a:rPr lang="fr-FR" smtClean="0"/>
-              <a:t>10/02/2019</a:t>
+              <a:t>11/02/2019</a:t>
             </a:fld>
             <a:endParaRPr lang="fr-FR"/>
           </a:p>
@@ -3977,7 +3979,7 @@
           <a:p>
             <a:fld id="{4771A69F-C10C-45E2-9AFD-1BC34CAE6126}" type="datetimeFigureOut">
               <a:rPr lang="fr-FR" smtClean="0"/>
-              <a:t>10/02/2019</a:t>
+              <a:t>11/02/2019</a:t>
             </a:fld>
             <a:endParaRPr lang="fr-FR"/>
           </a:p>
@@ -4072,7 +4074,7 @@
           <a:p>
             <a:fld id="{4771A69F-C10C-45E2-9AFD-1BC34CAE6126}" type="datetimeFigureOut">
               <a:rPr lang="fr-FR" smtClean="0"/>
-              <a:t>10/02/2019</a:t>
+              <a:t>11/02/2019</a:t>
             </a:fld>
             <a:endParaRPr lang="fr-FR"/>
           </a:p>
@@ -4327,7 +4329,7 @@
           <a:p>
             <a:fld id="{4771A69F-C10C-45E2-9AFD-1BC34CAE6126}" type="datetimeFigureOut">
               <a:rPr lang="fr-FR" smtClean="0"/>
-              <a:t>10/02/2019</a:t>
+              <a:t>11/02/2019</a:t>
             </a:fld>
             <a:endParaRPr lang="fr-FR"/>
           </a:p>
@@ -4632,7 +4634,7 @@
           <a:p>
             <a:fld id="{4771A69F-C10C-45E2-9AFD-1BC34CAE6126}" type="datetimeFigureOut">
               <a:rPr lang="fr-FR" smtClean="0"/>
-              <a:t>10/02/2019</a:t>
+              <a:t>11/02/2019</a:t>
             </a:fld>
             <a:endParaRPr lang="fr-FR"/>
           </a:p>
@@ -5334,7 +5336,7 @@
           <a:p>
             <a:fld id="{4771A69F-C10C-45E2-9AFD-1BC34CAE6126}" type="datetimeFigureOut">
               <a:rPr lang="fr-FR" smtClean="0"/>
-              <a:t>10/02/2019</a:t>
+              <a:t>11/02/2019</a:t>
             </a:fld>
             <a:endParaRPr lang="fr-FR"/>
           </a:p>
@@ -5949,7 +5951,7 @@
           <p:cNvPr id="2" name="Titre 1">
             <a:extLst>
               <a:ext uri="{FF2B5EF4-FFF2-40B4-BE49-F238E27FC236}">
-                <a16:creationId xmlns:a16="http://schemas.microsoft.com/office/drawing/2014/main" id="{BA08D9E1-CEC9-4B88-AE35-3ECF4E31C848}"/>
+                <a16:creationId xmlns:a16="http://schemas.microsoft.com/office/drawing/2014/main" id="{8DB6E984-1000-41D0-9BAD-8224D1D5B727}"/>
               </a:ext>
             </a:extLst>
           </p:cNvPr>
@@ -5960,7 +5962,12 @@
             <p:ph type="title"/>
           </p:nvPr>
         </p:nvSpPr>
-        <p:spPr/>
+        <p:spPr>
+          <a:xfrm>
+            <a:off x="695089" y="110971"/>
+            <a:ext cx="8596668" cy="1320800"/>
+          </a:xfrm>
+        </p:spPr>
         <p:txBody>
           <a:bodyPr/>
           <a:lstStyle/>
@@ -5968,78 +5975,57 @@
             <a:pPr algn="ctr"/>
             <a:r>
               <a:rPr lang="fr-FR" dirty="0"/>
-              <a:t>II – Gestion de projet</a:t>
+              <a:t>II – Gestion de projet </a:t>
             </a:r>
             <a:br>
               <a:rPr lang="fr-FR" dirty="0"/>
             </a:br>
             <a:r>
-              <a:rPr lang="fr-FR" sz="2800" dirty="0"/>
-              <a:t>Conclusion</a:t>
-            </a:r>
-            <a:endParaRPr lang="fr-FR" dirty="0"/>
-          </a:p>
-        </p:txBody>
-      </p:sp>
-      <p:sp>
-        <p:nvSpPr>
-          <p:cNvPr id="3" name="Espace réservé du contenu 2">
+              <a:rPr lang="fr-FR" dirty="0"/>
+              <a:t>Diagramme de Gantt « final »</a:t>
+            </a:r>
+          </a:p>
+        </p:txBody>
+      </p:sp>
+      <p:pic>
+        <p:nvPicPr>
+          <p:cNvPr id="6" name="Espace réservé du contenu 7">
             <a:extLst>
               <a:ext uri="{FF2B5EF4-FFF2-40B4-BE49-F238E27FC236}">
-                <a16:creationId xmlns:a16="http://schemas.microsoft.com/office/drawing/2014/main" id="{A9A29769-64FE-41E1-8464-629C5513BB6F}"/>
+                <a16:creationId xmlns:a16="http://schemas.microsoft.com/office/drawing/2014/main" id="{30805947-EB13-4CE1-AA67-545007F33662}"/>
               </a:ext>
             </a:extLst>
           </p:cNvPr>
-          <p:cNvSpPr>
-            <a:spLocks noGrp="1"/>
-          </p:cNvSpPr>
+          <p:cNvPicPr>
+            <a:picLocks noGrp="1" noChangeAspect="1"/>
+          </p:cNvPicPr>
           <p:nvPr>
             <p:ph idx="1"/>
           </p:nvPr>
-        </p:nvSpPr>
-        <p:spPr/>
-        <p:txBody>
-          <a:bodyPr/>
-          <a:lstStyle/>
-          <a:p>
-            <a:r>
-              <a:rPr lang="fr-FR" dirty="0"/>
-              <a:t>Satisfaction client </a:t>
-            </a:r>
-          </a:p>
-          <a:p>
-            <a:endParaRPr lang="fr-FR" dirty="0"/>
-          </a:p>
-          <a:p>
-            <a:r>
-              <a:rPr lang="fr-FR" dirty="0"/>
-              <a:t>Investigation sur des problèmes plus complexes </a:t>
-            </a:r>
-          </a:p>
-          <a:p>
-            <a:endParaRPr lang="fr-FR" dirty="0"/>
-          </a:p>
-          <a:p>
-            <a:r>
-              <a:rPr lang="fr-FR" dirty="0"/>
-              <a:t>Préconisation sur l’emploi des méthodes selon le problème à traiter</a:t>
-            </a:r>
-          </a:p>
-          <a:p>
-            <a:endParaRPr lang="fr-FR" dirty="0"/>
-          </a:p>
-          <a:p>
-            <a:r>
-              <a:rPr lang="fr-FR" dirty="0"/>
-              <a:t>Ouverture sur de nouvelles problématiques </a:t>
-            </a:r>
-          </a:p>
-        </p:txBody>
-      </p:sp>
+        </p:nvPicPr>
+        <p:blipFill>
+          <a:blip r:embed="rId2">
+            <a:extLst>
+              <a:ext uri="{28A0092B-C50C-407E-A947-70E740481C1C}">
+                <a14:useLocalDpi xmlns:a14="http://schemas.microsoft.com/office/drawing/2010/main" val="0"/>
+              </a:ext>
+            </a:extLst>
+          </a:blip>
+          <a:stretch>
+            <a:fillRect/>
+          </a:stretch>
+        </p:blipFill>
+        <p:spPr>
+          <a:xfrm>
+            <a:off x="695089" y="1322773"/>
+            <a:ext cx="11079331" cy="5356094"/>
+          </a:xfrm>
+        </p:spPr>
+      </p:pic>
     </p:spTree>
     <p:extLst>
       <p:ext uri="{BB962C8B-B14F-4D97-AF65-F5344CB8AC3E}">
-        <p14:creationId xmlns:p14="http://schemas.microsoft.com/office/powerpoint/2010/main" val="3356429125"/>
+        <p14:creationId xmlns:p14="http://schemas.microsoft.com/office/powerpoint/2010/main" val="849679488"/>
       </p:ext>
     </p:extLst>
   </p:cSld>
@@ -6071,7 +6057,7 @@
           <p:cNvPr id="2" name="Titre 1">
             <a:extLst>
               <a:ext uri="{FF2B5EF4-FFF2-40B4-BE49-F238E27FC236}">
-                <a16:creationId xmlns:a16="http://schemas.microsoft.com/office/drawing/2014/main" id="{EBA0D8F0-6DB9-4391-BE2E-594E0C99CB60}"/>
+                <a16:creationId xmlns:a16="http://schemas.microsoft.com/office/drawing/2014/main" id="{BA08D9E1-CEC9-4B88-AE35-3ECF4E31C848}"/>
               </a:ext>
             </a:extLst>
           </p:cNvPr>
@@ -6087,10 +6073,19 @@
           <a:bodyPr/>
           <a:lstStyle/>
           <a:p>
+            <a:pPr algn="ctr"/>
             <a:r>
               <a:rPr lang="fr-FR" dirty="0"/>
-              <a:t>III - Méthodes numériques temporelles usuelles </a:t>
-            </a:r>
+              <a:t>II – Gestion de projet</a:t>
+            </a:r>
+            <a:br>
+              <a:rPr lang="fr-FR" dirty="0"/>
+            </a:br>
+            <a:r>
+              <a:rPr lang="fr-FR" sz="2800" dirty="0"/>
+              <a:t>Conclusion</a:t>
+            </a:r>
+            <a:endParaRPr lang="fr-FR" dirty="0"/>
           </a:p>
         </p:txBody>
       </p:sp>
@@ -6099,7 +6094,7 @@
           <p:cNvPr id="3" name="Espace réservé du contenu 2">
             <a:extLst>
               <a:ext uri="{FF2B5EF4-FFF2-40B4-BE49-F238E27FC236}">
-                <a16:creationId xmlns:a16="http://schemas.microsoft.com/office/drawing/2014/main" id="{0580CE79-11C7-4557-A919-4162E26770A3}"/>
+                <a16:creationId xmlns:a16="http://schemas.microsoft.com/office/drawing/2014/main" id="{A9A29769-64FE-41E1-8464-629C5513BB6F}"/>
               </a:ext>
             </a:extLst>
           </p:cNvPr>
@@ -6110,113 +6105,49 @@
             <p:ph idx="1"/>
           </p:nvPr>
         </p:nvSpPr>
-        <p:spPr>
-          <a:xfrm>
-            <a:off x="677334" y="2160589"/>
-            <a:ext cx="8596668" cy="4373376"/>
-          </a:xfrm>
-        </p:spPr>
+        <p:spPr/>
         <p:txBody>
           <a:bodyPr/>
           <a:lstStyle/>
           <a:p>
             <a:r>
               <a:rPr lang="fr-FR" dirty="0"/>
-              <a:t>Méthodes Explicites </a:t>
-            </a:r>
-          </a:p>
-          <a:p>
-            <a:pPr lvl="1"/>
+              <a:t>Satisfaction client </a:t>
+            </a:r>
+          </a:p>
+          <a:p>
+            <a:endParaRPr lang="fr-FR" dirty="0"/>
+          </a:p>
+          <a:p>
             <a:r>
               <a:rPr lang="fr-FR" dirty="0"/>
-              <a:t>Cher en temps de calcul, nombres d’opérations, mémoire nécessaire</a:t>
-            </a:r>
-          </a:p>
-          <a:p>
-            <a:pPr lvl="1"/>
+              <a:t>Investigation sur des problèmes plus complexes </a:t>
+            </a:r>
+          </a:p>
+          <a:p>
+            <a:endParaRPr lang="fr-FR" dirty="0"/>
+          </a:p>
+          <a:p>
             <a:r>
               <a:rPr lang="fr-FR" dirty="0"/>
-              <a:t>Plutôt utilisée dans le cadre de phénomène à courte durée du type chocs</a:t>
-            </a:r>
-          </a:p>
-          <a:p>
-            <a:pPr lvl="1"/>
+              <a:t>Préconisation sur l’emploi des méthodes selon le problème à traiter</a:t>
+            </a:r>
+          </a:p>
+          <a:p>
+            <a:endParaRPr lang="fr-FR" dirty="0"/>
+          </a:p>
+          <a:p>
             <a:r>
               <a:rPr lang="fr-FR" dirty="0"/>
-              <a:t>Pas toujours stable (vérifier lipschitzienne) </a:t>
-            </a:r>
-          </a:p>
-          <a:p>
-            <a:pPr marL="457200" lvl="1" indent="0">
-              <a:buNone/>
-            </a:pPr>
-            <a:endParaRPr lang="fr-FR" dirty="0"/>
-          </a:p>
-          <a:p>
-            <a:r>
-              <a:rPr lang="fr-FR" dirty="0"/>
-              <a:t>Méthodes Implicites </a:t>
-            </a:r>
-          </a:p>
-          <a:p>
-            <a:pPr lvl="1"/>
-            <a:r>
-              <a:rPr lang="fr-FR" dirty="0"/>
-              <a:t>Méthodes toujours stables </a:t>
-            </a:r>
-          </a:p>
-          <a:p>
-            <a:pPr lvl="1"/>
-            <a:r>
-              <a:rPr lang="fr-FR" dirty="0"/>
-              <a:t>Moins de coût de mémoire </a:t>
-            </a:r>
-          </a:p>
-          <a:p>
-            <a:pPr lvl="1"/>
-            <a:endParaRPr lang="fr-FR" dirty="0"/>
-          </a:p>
-          <a:p>
-            <a:r>
-              <a:rPr lang="fr-FR" dirty="0"/>
-              <a:t>Les méthodes les plus utilisées en CFD actuellement sont Runge-</a:t>
-            </a:r>
-            <a:r>
-              <a:rPr lang="fr-FR" dirty="0" err="1"/>
-              <a:t>Kutta</a:t>
-            </a:r>
-            <a:r>
-              <a:rPr lang="fr-FR" dirty="0"/>
-              <a:t> et </a:t>
-            </a:r>
-            <a:r>
-              <a:rPr lang="fr-FR" dirty="0" err="1"/>
-              <a:t>Gear</a:t>
-            </a:r>
-            <a:endParaRPr lang="fr-FR" dirty="0"/>
-          </a:p>
-          <a:p>
-            <a:pPr marL="457200" lvl="1" indent="0">
-              <a:buNone/>
-            </a:pPr>
-            <a:endParaRPr lang="fr-FR" dirty="0"/>
-          </a:p>
-          <a:p>
-            <a:pPr lvl="1"/>
-            <a:endParaRPr lang="fr-FR" dirty="0"/>
-          </a:p>
-          <a:p>
-            <a:endParaRPr lang="fr-FR" dirty="0"/>
-          </a:p>
-          <a:p>
-            <a:endParaRPr lang="fr-FR" dirty="0"/>
+              <a:t>Ouverture sur de nouvelles problématiques </a:t>
+            </a:r>
           </a:p>
         </p:txBody>
       </p:sp>
     </p:spTree>
     <p:extLst>
       <p:ext uri="{BB962C8B-B14F-4D97-AF65-F5344CB8AC3E}">
-        <p14:creationId xmlns:p14="http://schemas.microsoft.com/office/powerpoint/2010/main" val="659610021"/>
+        <p14:creationId xmlns:p14="http://schemas.microsoft.com/office/powerpoint/2010/main" val="3356429125"/>
       </p:ext>
     </p:extLst>
   </p:cSld>
@@ -6248,7 +6179,7 @@
           <p:cNvPr id="2" name="Titre 1">
             <a:extLst>
               <a:ext uri="{FF2B5EF4-FFF2-40B4-BE49-F238E27FC236}">
-                <a16:creationId xmlns:a16="http://schemas.microsoft.com/office/drawing/2014/main" id="{D37F7EC2-0586-4160-9928-A4EF8825E06A}"/>
+                <a16:creationId xmlns:a16="http://schemas.microsoft.com/office/drawing/2014/main" id="{EBA0D8F0-6DB9-4391-BE2E-594E0C99CB60}"/>
               </a:ext>
             </a:extLst>
           </p:cNvPr>
@@ -6273,10 +6204,10 @@
       </p:sp>
       <p:sp>
         <p:nvSpPr>
-          <p:cNvPr id="3" name="Espace réservé du texte 2">
+          <p:cNvPr id="3" name="Espace réservé du contenu 2">
             <a:extLst>
               <a:ext uri="{FF2B5EF4-FFF2-40B4-BE49-F238E27FC236}">
-                <a16:creationId xmlns:a16="http://schemas.microsoft.com/office/drawing/2014/main" id="{292B8FA9-1870-407A-90FB-C7E257C081B9}"/>
+                <a16:creationId xmlns:a16="http://schemas.microsoft.com/office/drawing/2014/main" id="{0580CE79-11C7-4557-A919-4162E26770A3}"/>
               </a:ext>
             </a:extLst>
           </p:cNvPr>
@@ -6284,186 +6215,163 @@
             <a:spLocks noGrp="1"/>
           </p:cNvSpPr>
           <p:nvPr>
-            <p:ph type="body" idx="1"/>
-          </p:nvPr>
-        </p:nvSpPr>
-        <p:spPr/>
+            <p:ph idx="1"/>
+          </p:nvPr>
+        </p:nvSpPr>
+        <p:spPr>
+          <a:xfrm>
+            <a:off x="677334" y="2160589"/>
+            <a:ext cx="8596668" cy="4373376"/>
+          </a:xfrm>
+        </p:spPr>
         <p:txBody>
           <a:bodyPr/>
           <a:lstStyle/>
           <a:p>
             <a:r>
               <a:rPr lang="fr-FR" dirty="0"/>
-              <a:t>Méthode RK 4 </a:t>
-            </a:r>
-          </a:p>
-        </p:txBody>
-      </p:sp>
-      <p:sp>
-        <p:nvSpPr>
-          <p:cNvPr id="4" name="Espace réservé du contenu 3">
+              <a:t>Méthodes Explicites </a:t>
+            </a:r>
+          </a:p>
+          <a:p>
+            <a:pPr lvl="1"/>
+            <a:r>
+              <a:rPr lang="fr-FR" dirty="0"/>
+              <a:t>Problème de stabilité               CFL restrictive (coût de calcul) </a:t>
+            </a:r>
+          </a:p>
+          <a:p>
+            <a:pPr lvl="1"/>
+            <a:r>
+              <a:rPr lang="fr-FR" dirty="0"/>
+              <a:t>Plutôt utilisée dans le cadre de phénomène à courte durée du type chocs</a:t>
+            </a:r>
+          </a:p>
+          <a:p>
+            <a:pPr marL="457200" lvl="1" indent="0">
+              <a:buNone/>
+            </a:pPr>
+            <a:endParaRPr lang="fr-FR" dirty="0"/>
+          </a:p>
+          <a:p>
+            <a:pPr marL="457200" lvl="1" indent="0">
+              <a:buNone/>
+            </a:pPr>
+            <a:endParaRPr lang="fr-FR" dirty="0"/>
+          </a:p>
+          <a:p>
+            <a:r>
+              <a:rPr lang="fr-FR" dirty="0"/>
+              <a:t>Méthodes Implicites </a:t>
+            </a:r>
+          </a:p>
+          <a:p>
+            <a:pPr lvl="1"/>
+            <a:r>
+              <a:rPr lang="fr-FR" dirty="0"/>
+              <a:t>Meilleures conditions de stabilité (ordre inférieur à 2 )</a:t>
+            </a:r>
+          </a:p>
+          <a:p>
+            <a:pPr lvl="1"/>
+            <a:r>
+              <a:rPr lang="fr-FR" dirty="0"/>
+              <a:t>CFL plus grand  </a:t>
+            </a:r>
+          </a:p>
+          <a:p>
+            <a:pPr marL="457200" lvl="1" indent="0">
+              <a:buNone/>
+            </a:pPr>
+            <a:endParaRPr lang="fr-FR" dirty="0"/>
+          </a:p>
+          <a:p>
+            <a:r>
+              <a:rPr lang="fr-FR" dirty="0"/>
+              <a:t>Les méthodes les plus utilisées en CFD actuellement sont Runge-</a:t>
+            </a:r>
+            <a:r>
+              <a:rPr lang="fr-FR" dirty="0" err="1"/>
+              <a:t>Kutta</a:t>
+            </a:r>
+            <a:r>
+              <a:rPr lang="fr-FR" dirty="0"/>
+              <a:t> et </a:t>
+            </a:r>
+            <a:r>
+              <a:rPr lang="fr-FR" dirty="0" err="1"/>
+              <a:t>Gear</a:t>
+            </a:r>
+            <a:endParaRPr lang="fr-FR" dirty="0"/>
+          </a:p>
+          <a:p>
+            <a:pPr marL="457200" lvl="1" indent="0">
+              <a:buNone/>
+            </a:pPr>
+            <a:endParaRPr lang="fr-FR" dirty="0"/>
+          </a:p>
+          <a:p>
+            <a:pPr lvl="1"/>
+            <a:endParaRPr lang="fr-FR" dirty="0"/>
+          </a:p>
+          <a:p>
+            <a:endParaRPr lang="fr-FR" dirty="0"/>
+          </a:p>
+          <a:p>
+            <a:endParaRPr lang="fr-FR" dirty="0"/>
+          </a:p>
+        </p:txBody>
+      </p:sp>
+      <p:sp>
+        <p:nvSpPr>
+          <p:cNvPr id="4" name="Flèche : droite 3">
             <a:extLst>
               <a:ext uri="{FF2B5EF4-FFF2-40B4-BE49-F238E27FC236}">
-                <a16:creationId xmlns:a16="http://schemas.microsoft.com/office/drawing/2014/main" id="{B7EE3265-4692-4A3D-80F0-270100CDF995}"/>
+                <a16:creationId xmlns:a16="http://schemas.microsoft.com/office/drawing/2014/main" id="{6B0B5884-6582-4CAD-AEFC-7E4E82508A8A}"/>
               </a:ext>
             </a:extLst>
           </p:cNvPr>
-          <p:cNvSpPr>
-            <a:spLocks noGrp="1"/>
-          </p:cNvSpPr>
-          <p:nvPr>
-            <p:ph sz="half" idx="2"/>
-          </p:nvPr>
-        </p:nvSpPr>
-        <p:spPr/>
-        <p:txBody>
-          <a:bodyPr/>
-          <a:lstStyle/>
-          <a:p>
-            <a:r>
-              <a:rPr lang="fr-FR" dirty="0"/>
-              <a:t>Méthode à un pas</a:t>
-            </a:r>
-          </a:p>
-          <a:p>
-            <a:pPr marL="0" indent="0">
-              <a:buNone/>
-            </a:pPr>
-            <a:endParaRPr lang="fr-FR" dirty="0"/>
-          </a:p>
-          <a:p>
-            <a:r>
-              <a:rPr lang="fr-FR" dirty="0"/>
-              <a:t>Implicite ou explicite</a:t>
-            </a:r>
-          </a:p>
-          <a:p>
-            <a:pPr marL="0" indent="0">
-              <a:buNone/>
-            </a:pPr>
-            <a:r>
-              <a:rPr lang="fr-FR" dirty="0"/>
-              <a:t> </a:t>
-            </a:r>
-          </a:p>
-          <a:p>
-            <a:r>
-              <a:rPr lang="fr-FR" dirty="0"/>
-              <a:t>Ordre élevé </a:t>
-            </a:r>
-          </a:p>
-          <a:p>
-            <a:endParaRPr lang="fr-FR" dirty="0"/>
-          </a:p>
-          <a:p>
-            <a:r>
-              <a:rPr lang="fr-FR" dirty="0"/>
-              <a:t>Conditionnellement Stable </a:t>
-            </a:r>
-          </a:p>
-        </p:txBody>
-      </p:sp>
-      <p:sp>
-        <p:nvSpPr>
-          <p:cNvPr id="5" name="Espace réservé du texte 4">
-            <a:extLst>
-              <a:ext uri="{FF2B5EF4-FFF2-40B4-BE49-F238E27FC236}">
-                <a16:creationId xmlns:a16="http://schemas.microsoft.com/office/drawing/2014/main" id="{135FB07D-4021-4680-A6A5-0A6F94CB2C46}"/>
-              </a:ext>
-            </a:extLst>
-          </p:cNvPr>
-          <p:cNvSpPr>
-            <a:spLocks noGrp="1"/>
-          </p:cNvSpPr>
-          <p:nvPr>
-            <p:ph type="body" sz="quarter" idx="3"/>
-          </p:nvPr>
-        </p:nvSpPr>
-        <p:spPr/>
-        <p:txBody>
-          <a:bodyPr/>
-          <a:lstStyle/>
-          <a:p>
-            <a:r>
-              <a:rPr lang="fr-FR" dirty="0"/>
-              <a:t>Méthodes de </a:t>
-            </a:r>
-            <a:r>
-              <a:rPr lang="fr-FR" dirty="0" err="1"/>
-              <a:t>Gear</a:t>
-            </a:r>
-            <a:endParaRPr lang="fr-FR" dirty="0"/>
-          </a:p>
-        </p:txBody>
-      </p:sp>
-      <p:sp>
-        <p:nvSpPr>
-          <p:cNvPr id="6" name="Espace réservé du contenu 5">
-            <a:extLst>
-              <a:ext uri="{FF2B5EF4-FFF2-40B4-BE49-F238E27FC236}">
-                <a16:creationId xmlns:a16="http://schemas.microsoft.com/office/drawing/2014/main" id="{451E412D-6B17-4628-91FC-F8E869BA2B46}"/>
-              </a:ext>
-            </a:extLst>
-          </p:cNvPr>
-          <p:cNvSpPr>
-            <a:spLocks noGrp="1"/>
-          </p:cNvSpPr>
-          <p:nvPr>
-            <p:ph sz="quarter" idx="4"/>
-          </p:nvPr>
-        </p:nvSpPr>
-        <p:spPr/>
-        <p:txBody>
-          <a:bodyPr/>
-          <a:lstStyle/>
-          <a:p>
-            <a:r>
-              <a:rPr lang="fr-FR" dirty="0"/>
-              <a:t>Méthodes à pas multiples</a:t>
-            </a:r>
-          </a:p>
-          <a:p>
-            <a:pPr marL="0" indent="0">
-              <a:buNone/>
-            </a:pPr>
-            <a:endParaRPr lang="fr-FR" dirty="0"/>
-          </a:p>
-          <a:p>
-            <a:r>
-              <a:rPr lang="fr-FR" dirty="0"/>
-              <a:t>Construit à partir de polynôme d’interpolation</a:t>
-            </a:r>
-          </a:p>
-          <a:p>
-            <a:pPr marL="0" indent="0">
-              <a:buNone/>
-            </a:pPr>
-            <a:endParaRPr lang="fr-FR" dirty="0"/>
-          </a:p>
-          <a:p>
-            <a:r>
-              <a:rPr lang="fr-FR" dirty="0"/>
-              <a:t>Très utilisées pour résoudre des équations différentielles raides </a:t>
-            </a:r>
-          </a:p>
-          <a:p>
-            <a:pPr marL="0" indent="0">
-              <a:buNone/>
-            </a:pPr>
-            <a:r>
-              <a:rPr lang="fr-FR" dirty="0"/>
-              <a:t> </a:t>
-            </a:r>
-          </a:p>
-          <a:p>
-            <a:endParaRPr lang="fr-FR" dirty="0"/>
+          <p:cNvSpPr/>
+          <p:nvPr/>
+        </p:nvSpPr>
+        <p:spPr>
+          <a:xfrm>
+            <a:off x="3693111" y="2636668"/>
+            <a:ext cx="452761" cy="230819"/>
+          </a:xfrm>
+          <a:prstGeom prst="rightArrow">
+            <a:avLst/>
+          </a:prstGeom>
+        </p:spPr>
+        <p:style>
+          <a:lnRef idx="2">
+            <a:schemeClr val="accent1">
+              <a:shade val="50000"/>
+            </a:schemeClr>
+          </a:lnRef>
+          <a:fillRef idx="1">
+            <a:schemeClr val="accent1"/>
+          </a:fillRef>
+          <a:effectRef idx="0">
+            <a:schemeClr val="accent1"/>
+          </a:effectRef>
+          <a:fontRef idx="minor">
+            <a:schemeClr val="lt1"/>
+          </a:fontRef>
+        </p:style>
+        <p:txBody>
+          <a:bodyPr rtlCol="0" anchor="ctr"/>
+          <a:lstStyle/>
+          <a:p>
+            <a:pPr algn="ctr"/>
+            <a:endParaRPr lang="fr-FR"/>
           </a:p>
         </p:txBody>
       </p:sp>
     </p:spTree>
     <p:extLst>
       <p:ext uri="{BB962C8B-B14F-4D97-AF65-F5344CB8AC3E}">
-        <p14:creationId xmlns:p14="http://schemas.microsoft.com/office/powerpoint/2010/main" val="2763711249"/>
+        <p14:creationId xmlns:p14="http://schemas.microsoft.com/office/powerpoint/2010/main" val="659610021"/>
       </p:ext>
     </p:extLst>
   </p:cSld>
@@ -6495,6 +6403,260 @@
           <p:cNvPr id="2" name="Titre 1">
             <a:extLst>
               <a:ext uri="{FF2B5EF4-FFF2-40B4-BE49-F238E27FC236}">
+                <a16:creationId xmlns:a16="http://schemas.microsoft.com/office/drawing/2014/main" id="{D37F7EC2-0586-4160-9928-A4EF8825E06A}"/>
+              </a:ext>
+            </a:extLst>
+          </p:cNvPr>
+          <p:cNvSpPr>
+            <a:spLocks noGrp="1"/>
+          </p:cNvSpPr>
+          <p:nvPr>
+            <p:ph type="title"/>
+          </p:nvPr>
+        </p:nvSpPr>
+        <p:spPr/>
+        <p:txBody>
+          <a:bodyPr/>
+          <a:lstStyle/>
+          <a:p>
+            <a:r>
+              <a:rPr lang="fr-FR" dirty="0"/>
+              <a:t>III - Méthodes numériques temporelles usuelles </a:t>
+            </a:r>
+          </a:p>
+        </p:txBody>
+      </p:sp>
+      <p:sp>
+        <p:nvSpPr>
+          <p:cNvPr id="3" name="Espace réservé du texte 2">
+            <a:extLst>
+              <a:ext uri="{FF2B5EF4-FFF2-40B4-BE49-F238E27FC236}">
+                <a16:creationId xmlns:a16="http://schemas.microsoft.com/office/drawing/2014/main" id="{292B8FA9-1870-407A-90FB-C7E257C081B9}"/>
+              </a:ext>
+            </a:extLst>
+          </p:cNvPr>
+          <p:cNvSpPr>
+            <a:spLocks noGrp="1"/>
+          </p:cNvSpPr>
+          <p:nvPr>
+            <p:ph type="body" idx="1"/>
+          </p:nvPr>
+        </p:nvSpPr>
+        <p:spPr/>
+        <p:txBody>
+          <a:bodyPr/>
+          <a:lstStyle/>
+          <a:p>
+            <a:r>
+              <a:rPr lang="fr-FR" dirty="0"/>
+              <a:t>Méthode RK 4 </a:t>
+            </a:r>
+          </a:p>
+        </p:txBody>
+      </p:sp>
+      <p:sp>
+        <p:nvSpPr>
+          <p:cNvPr id="4" name="Espace réservé du contenu 3">
+            <a:extLst>
+              <a:ext uri="{FF2B5EF4-FFF2-40B4-BE49-F238E27FC236}">
+                <a16:creationId xmlns:a16="http://schemas.microsoft.com/office/drawing/2014/main" id="{B7EE3265-4692-4A3D-80F0-270100CDF995}"/>
+              </a:ext>
+            </a:extLst>
+          </p:cNvPr>
+          <p:cNvSpPr>
+            <a:spLocks noGrp="1"/>
+          </p:cNvSpPr>
+          <p:nvPr>
+            <p:ph sz="half" idx="2"/>
+          </p:nvPr>
+        </p:nvSpPr>
+        <p:spPr/>
+        <p:txBody>
+          <a:bodyPr>
+            <a:normAutofit lnSpcReduction="10000"/>
+          </a:bodyPr>
+          <a:lstStyle/>
+          <a:p>
+            <a:r>
+              <a:rPr lang="fr-FR" dirty="0"/>
+              <a:t>Méthode à pas multiples</a:t>
+            </a:r>
+          </a:p>
+          <a:p>
+            <a:pPr marL="0" indent="0">
+              <a:buNone/>
+            </a:pPr>
+            <a:endParaRPr lang="fr-FR" dirty="0"/>
+          </a:p>
+          <a:p>
+            <a:r>
+              <a:rPr lang="fr-FR" dirty="0"/>
+              <a:t>Explicite</a:t>
+            </a:r>
+          </a:p>
+          <a:p>
+            <a:pPr marL="0" indent="0">
+              <a:buNone/>
+            </a:pPr>
+            <a:r>
+              <a:rPr lang="fr-FR" dirty="0"/>
+              <a:t> </a:t>
+            </a:r>
+          </a:p>
+          <a:p>
+            <a:r>
+              <a:rPr lang="fr-FR" dirty="0"/>
+              <a:t>Ordre élevé </a:t>
+            </a:r>
+          </a:p>
+          <a:p>
+            <a:endParaRPr lang="fr-FR" dirty="0"/>
+          </a:p>
+          <a:p>
+            <a:r>
+              <a:rPr lang="fr-FR" dirty="0"/>
+              <a:t>Conditionnellement Stable </a:t>
+            </a:r>
+          </a:p>
+        </p:txBody>
+      </p:sp>
+      <p:sp>
+        <p:nvSpPr>
+          <p:cNvPr id="5" name="Espace réservé du texte 4">
+            <a:extLst>
+              <a:ext uri="{FF2B5EF4-FFF2-40B4-BE49-F238E27FC236}">
+                <a16:creationId xmlns:a16="http://schemas.microsoft.com/office/drawing/2014/main" id="{135FB07D-4021-4680-A6A5-0A6F94CB2C46}"/>
+              </a:ext>
+            </a:extLst>
+          </p:cNvPr>
+          <p:cNvSpPr>
+            <a:spLocks noGrp="1"/>
+          </p:cNvSpPr>
+          <p:nvPr>
+            <p:ph type="body" sz="quarter" idx="3"/>
+          </p:nvPr>
+        </p:nvSpPr>
+        <p:spPr/>
+        <p:txBody>
+          <a:bodyPr/>
+          <a:lstStyle/>
+          <a:p>
+            <a:r>
+              <a:rPr lang="fr-FR" dirty="0"/>
+              <a:t>Méthodes de </a:t>
+            </a:r>
+            <a:r>
+              <a:rPr lang="fr-FR" dirty="0" err="1"/>
+              <a:t>Gear</a:t>
+            </a:r>
+            <a:endParaRPr lang="fr-FR" dirty="0"/>
+          </a:p>
+        </p:txBody>
+      </p:sp>
+      <p:sp>
+        <p:nvSpPr>
+          <p:cNvPr id="6" name="Espace réservé du contenu 5">
+            <a:extLst>
+              <a:ext uri="{FF2B5EF4-FFF2-40B4-BE49-F238E27FC236}">
+                <a16:creationId xmlns:a16="http://schemas.microsoft.com/office/drawing/2014/main" id="{451E412D-6B17-4628-91FC-F8E869BA2B46}"/>
+              </a:ext>
+            </a:extLst>
+          </p:cNvPr>
+          <p:cNvSpPr>
+            <a:spLocks noGrp="1"/>
+          </p:cNvSpPr>
+          <p:nvPr>
+            <p:ph sz="quarter" idx="4"/>
+          </p:nvPr>
+        </p:nvSpPr>
+        <p:spPr/>
+        <p:txBody>
+          <a:bodyPr>
+            <a:normAutofit lnSpcReduction="10000"/>
+          </a:bodyPr>
+          <a:lstStyle/>
+          <a:p>
+            <a:r>
+              <a:rPr lang="fr-FR" dirty="0"/>
+              <a:t>Méthodes à pas multiples</a:t>
+            </a:r>
+          </a:p>
+          <a:p>
+            <a:pPr marL="0" indent="0">
+              <a:buNone/>
+            </a:pPr>
+            <a:endParaRPr lang="fr-FR" dirty="0"/>
+          </a:p>
+          <a:p>
+            <a:r>
+              <a:rPr lang="fr-FR" dirty="0"/>
+              <a:t>Construit à partir de polynôme d’interpolation</a:t>
+            </a:r>
+          </a:p>
+          <a:p>
+            <a:pPr marL="0" indent="0">
+              <a:buNone/>
+            </a:pPr>
+            <a:endParaRPr lang="fr-FR" dirty="0"/>
+          </a:p>
+          <a:p>
+            <a:r>
+              <a:rPr lang="fr-FR" dirty="0"/>
+              <a:t>Très utilisées pour résoudre des équations différentielles raides </a:t>
+            </a:r>
+          </a:p>
+          <a:p>
+            <a:pPr marL="0" indent="0">
+              <a:buNone/>
+            </a:pPr>
+            <a:r>
+              <a:rPr lang="fr-FR" dirty="0"/>
+              <a:t> </a:t>
+            </a:r>
+          </a:p>
+          <a:p>
+            <a:r>
+              <a:rPr lang="fr-FR" dirty="0"/>
+              <a:t>Peu stable </a:t>
+            </a:r>
+          </a:p>
+        </p:txBody>
+      </p:sp>
+    </p:spTree>
+    <p:extLst>
+      <p:ext uri="{BB962C8B-B14F-4D97-AF65-F5344CB8AC3E}">
+        <p14:creationId xmlns:p14="http://schemas.microsoft.com/office/powerpoint/2010/main" val="2763711249"/>
+      </p:ext>
+    </p:extLst>
+  </p:cSld>
+  <p:clrMapOvr>
+    <a:masterClrMapping/>
+  </p:clrMapOvr>
+</p:sld>
+</file>
+
+<file path=ppt/slides/slide14.xml><?xml version="1.0" encoding="utf-8"?>
+<p:sld xmlns:a="http://schemas.openxmlformats.org/drawingml/2006/main" xmlns:r="http://schemas.openxmlformats.org/officeDocument/2006/relationships" xmlns:p="http://schemas.openxmlformats.org/presentationml/2006/main">
+  <p:cSld>
+    <p:spTree>
+      <p:nvGrpSpPr>
+        <p:cNvPr id="1" name=""/>
+        <p:cNvGrpSpPr/>
+        <p:nvPr/>
+      </p:nvGrpSpPr>
+      <p:grpSpPr>
+        <a:xfrm>
+          <a:off x="0" y="0"/>
+          <a:ext cx="0" cy="0"/>
+          <a:chOff x="0" y="0"/>
+          <a:chExt cx="0" cy="0"/>
+        </a:xfrm>
+      </p:grpSpPr>
+      <p:sp>
+        <p:nvSpPr>
+          <p:cNvPr id="2" name="Titre 1">
+            <a:extLst>
+              <a:ext uri="{FF2B5EF4-FFF2-40B4-BE49-F238E27FC236}">
                 <a16:creationId xmlns:a16="http://schemas.microsoft.com/office/drawing/2014/main" id="{C58ED35E-B5E2-42FE-91D3-D2A5FA10D1C6}"/>
               </a:ext>
             </a:extLst>
@@ -6518,41 +6680,6 @@
           </a:p>
         </p:txBody>
       </p:sp>
-      <p:pic>
-        <p:nvPicPr>
-          <p:cNvPr id="5" name="Espace réservé du contenu 4">
-            <a:extLst>
-              <a:ext uri="{FF2B5EF4-FFF2-40B4-BE49-F238E27FC236}">
-                <a16:creationId xmlns:a16="http://schemas.microsoft.com/office/drawing/2014/main" id="{AB27D9D4-1775-4B49-BA1F-2CAB303CA4F8}"/>
-              </a:ext>
-            </a:extLst>
-          </p:cNvPr>
-          <p:cNvPicPr>
-            <a:picLocks noGrp="1" noChangeAspect="1"/>
-          </p:cNvPicPr>
-          <p:nvPr>
-            <p:ph idx="1"/>
-          </p:nvPr>
-        </p:nvPicPr>
-        <p:blipFill>
-          <a:blip r:embed="rId2">
-            <a:extLst>
-              <a:ext uri="{28A0092B-C50C-407E-A947-70E740481C1C}">
-                <a14:useLocalDpi xmlns:a14="http://schemas.microsoft.com/office/drawing/2010/main" val="0"/>
-              </a:ext>
-            </a:extLst>
-          </a:blip>
-          <a:stretch>
-            <a:fillRect/>
-          </a:stretch>
-        </p:blipFill>
-        <p:spPr>
-          <a:xfrm>
-            <a:off x="585927" y="609600"/>
-            <a:ext cx="10244830" cy="6105143"/>
-          </a:xfrm>
-        </p:spPr>
-      </p:pic>
       <p:pic>
         <p:nvPicPr>
           <p:cNvPr id="7" name="Image 6">
@@ -6568,7 +6695,7 @@
           <p:nvPr/>
         </p:nvPicPr>
         <p:blipFill>
-          <a:blip r:embed="rId3">
+          <a:blip r:embed="rId2">
             <a:extLst>
               <a:ext uri="{28A0092B-C50C-407E-A947-70E740481C1C}">
                 <a14:useLocalDpi xmlns:a14="http://schemas.microsoft.com/office/drawing/2010/main" val="0"/>
@@ -6587,6 +6714,41 @@
           <a:prstGeom prst="rect">
             <a:avLst/>
           </a:prstGeom>
+        </p:spPr>
+      </p:pic>
+      <p:pic>
+        <p:nvPicPr>
+          <p:cNvPr id="8" name="Espace réservé du contenu 7">
+            <a:extLst>
+              <a:ext uri="{FF2B5EF4-FFF2-40B4-BE49-F238E27FC236}">
+                <a16:creationId xmlns:a16="http://schemas.microsoft.com/office/drawing/2014/main" id="{C81D1FA0-349C-4443-BC5E-69EDD607808C}"/>
+              </a:ext>
+            </a:extLst>
+          </p:cNvPr>
+          <p:cNvPicPr>
+            <a:picLocks noGrp="1" noChangeAspect="1"/>
+          </p:cNvPicPr>
+          <p:nvPr>
+            <p:ph idx="1"/>
+          </p:nvPr>
+        </p:nvPicPr>
+        <p:blipFill>
+          <a:blip r:embed="rId3">
+            <a:extLst>
+              <a:ext uri="{28A0092B-C50C-407E-A947-70E740481C1C}">
+                <a14:useLocalDpi xmlns:a14="http://schemas.microsoft.com/office/drawing/2010/main" val="0"/>
+              </a:ext>
+            </a:extLst>
+          </a:blip>
+          <a:stretch>
+            <a:fillRect/>
+          </a:stretch>
+        </p:blipFill>
+        <p:spPr>
+          <a:xfrm>
+            <a:off x="383477" y="609600"/>
+            <a:ext cx="11425046" cy="6045693"/>
+          </a:xfrm>
         </p:spPr>
       </p:pic>
     </p:spTree>
@@ -6660,7 +6822,7 @@
                                           </p:stCondLst>
                                         </p:cTn>
                                         <p:tgtEl>
-                                          <p:spTgt spid="5"/>
+                                          <p:spTgt spid="8"/>
                                         </p:tgtEl>
                                         <p:attrNameLst>
                                           <p:attrName>style.visibility</p:attrName>
@@ -6704,7 +6866,7 @@
 </p:sld>
 </file>
 
-<file path=ppt/slides/slide14.xml><?xml version="1.0" encoding="utf-8"?>
+<file path=ppt/slides/slide15.xml><?xml version="1.0" encoding="utf-8"?>
 <p:sld xmlns:a="http://schemas.openxmlformats.org/drawingml/2006/main" xmlns:r="http://schemas.openxmlformats.org/officeDocument/2006/relationships" xmlns:p="http://schemas.openxmlformats.org/presentationml/2006/main">
   <p:cSld>
     <p:spTree>
@@ -6821,10 +6983,10 @@
       </p:pic>
       <p:pic>
         <p:nvPicPr>
-          <p:cNvPr id="7" name="Image 6">
+          <p:cNvPr id="6" name="Image 5">
             <a:extLst>
               <a:ext uri="{FF2B5EF4-FFF2-40B4-BE49-F238E27FC236}">
-                <a16:creationId xmlns:a16="http://schemas.microsoft.com/office/drawing/2014/main" id="{98018B64-B8C3-43F2-9801-7F04CF2BBEBE}"/>
+                <a16:creationId xmlns:a16="http://schemas.microsoft.com/office/drawing/2014/main" id="{EEE9FCD8-B323-492D-910B-EA0F46695B71}"/>
               </a:ext>
             </a:extLst>
           </p:cNvPr>
@@ -6847,8 +7009,8 @@
         </p:blipFill>
         <p:spPr>
           <a:xfrm>
-            <a:off x="440266" y="428636"/>
-            <a:ext cx="10969414" cy="6216004"/>
+            <a:off x="218440" y="339804"/>
+            <a:ext cx="11755120" cy="6178392"/>
           </a:xfrm>
           <a:prstGeom prst="rect">
             <a:avLst/>
@@ -6926,7 +7088,7 @@
                                           </p:stCondLst>
                                         </p:cTn>
                                         <p:tgtEl>
-                                          <p:spTgt spid="7"/>
+                                          <p:spTgt spid="6"/>
                                         </p:tgtEl>
                                         <p:attrNameLst>
                                           <p:attrName>style.visibility</p:attrName>
@@ -6970,7 +7132,7 @@
 </p:sld>
 </file>
 
-<file path=ppt/slides/slide15.xml><?xml version="1.0" encoding="utf-8"?>
+<file path=ppt/slides/slide16.xml><?xml version="1.0" encoding="utf-8"?>
 <p:sld xmlns:a="http://schemas.openxmlformats.org/drawingml/2006/main" xmlns:r="http://schemas.openxmlformats.org/officeDocument/2006/relationships" xmlns:p="http://schemas.openxmlformats.org/presentationml/2006/main">
   <p:cSld>
     <p:spTree>
@@ -7281,150 +7443,6 @@
 </p:sld>
 </file>
 
-<file path=ppt/slides/slide16.xml><?xml version="1.0" encoding="utf-8"?>
-<p:sld xmlns:a="http://schemas.openxmlformats.org/drawingml/2006/main" xmlns:r="http://schemas.openxmlformats.org/officeDocument/2006/relationships" xmlns:p="http://schemas.openxmlformats.org/presentationml/2006/main">
-  <p:cSld>
-    <p:spTree>
-      <p:nvGrpSpPr>
-        <p:cNvPr id="1" name=""/>
-        <p:cNvGrpSpPr/>
-        <p:nvPr/>
-      </p:nvGrpSpPr>
-      <p:grpSpPr>
-        <a:xfrm>
-          <a:off x="0" y="0"/>
-          <a:ext cx="0" cy="0"/>
-          <a:chOff x="0" y="0"/>
-          <a:chExt cx="0" cy="0"/>
-        </a:xfrm>
-      </p:grpSpPr>
-      <p:sp>
-        <p:nvSpPr>
-          <p:cNvPr id="2" name="Titre 1">
-            <a:extLst>
-              <a:ext uri="{FF2B5EF4-FFF2-40B4-BE49-F238E27FC236}">
-                <a16:creationId xmlns:a16="http://schemas.microsoft.com/office/drawing/2014/main" id="{33D48989-5D71-406C-AC15-390DA2F5F356}"/>
-              </a:ext>
-            </a:extLst>
-          </p:cNvPr>
-          <p:cNvSpPr>
-            <a:spLocks noGrp="1"/>
-          </p:cNvSpPr>
-          <p:nvPr>
-            <p:ph type="title"/>
-          </p:nvPr>
-        </p:nvSpPr>
-        <p:spPr/>
-        <p:txBody>
-          <a:bodyPr/>
-          <a:lstStyle/>
-          <a:p>
-            <a:r>
-              <a:rPr lang="fr-FR" dirty="0"/>
-              <a:t>IV – Méthodes numériques exponentielles</a:t>
-            </a:r>
-          </a:p>
-        </p:txBody>
-      </p:sp>
-      <p:sp>
-        <p:nvSpPr>
-          <p:cNvPr id="3" name="Espace réservé du contenu 2">
-            <a:extLst>
-              <a:ext uri="{FF2B5EF4-FFF2-40B4-BE49-F238E27FC236}">
-                <a16:creationId xmlns:a16="http://schemas.microsoft.com/office/drawing/2014/main" id="{11DCB18D-0E24-4E2D-A04E-C2DDFCD78A60}"/>
-              </a:ext>
-            </a:extLst>
-          </p:cNvPr>
-          <p:cNvSpPr>
-            <a:spLocks noGrp="1"/>
-          </p:cNvSpPr>
-          <p:nvPr>
-            <p:ph idx="1"/>
-          </p:nvPr>
-        </p:nvSpPr>
-        <p:spPr/>
-        <p:txBody>
-          <a:bodyPr/>
-          <a:lstStyle/>
-          <a:p>
-            <a:r>
-              <a:rPr lang="fr-FR" dirty="0"/>
-              <a:t>Méthode Taylor exponentielle </a:t>
-            </a:r>
-          </a:p>
-          <a:p>
-            <a:pPr lvl="1"/>
-            <a:r>
-              <a:rPr lang="fr-FR" dirty="0"/>
-              <a:t>Basé sur une matrice augmentée</a:t>
-            </a:r>
-          </a:p>
-          <a:p>
-            <a:pPr lvl="1"/>
-            <a:r>
-              <a:rPr lang="fr-FR" dirty="0"/>
-              <a:t>Calculée à chaque itérations</a:t>
-            </a:r>
-          </a:p>
-          <a:p>
-            <a:endParaRPr lang="fr-FR" dirty="0"/>
-          </a:p>
-          <a:p>
-            <a:r>
-              <a:rPr lang="fr-FR" dirty="0"/>
-              <a:t>Méthode </a:t>
-            </a:r>
-            <a:r>
-              <a:rPr lang="fr-FR" dirty="0" err="1"/>
-              <a:t>Rosenbroch</a:t>
-            </a:r>
-            <a:endParaRPr lang="fr-FR" dirty="0"/>
-          </a:p>
-          <a:p>
-            <a:pPr lvl="1"/>
-            <a:r>
-              <a:rPr lang="fr-FR" dirty="0"/>
-              <a:t>Basé sur une matrice augmentée</a:t>
-            </a:r>
-          </a:p>
-          <a:p>
-            <a:pPr lvl="1"/>
-            <a:r>
-              <a:rPr lang="fr-FR" dirty="0"/>
-              <a:t>Calculée une seule fois </a:t>
-            </a:r>
-          </a:p>
-          <a:p>
-            <a:endParaRPr lang="fr-FR" dirty="0"/>
-          </a:p>
-          <a:p>
-            <a:r>
-              <a:rPr lang="fr-FR" dirty="0"/>
-              <a:t>Méthode exponentielle RK </a:t>
-            </a:r>
-          </a:p>
-          <a:p>
-            <a:pPr lvl="1"/>
-            <a:r>
-              <a:rPr lang="fr-FR" dirty="0"/>
-              <a:t>Début d’étude </a:t>
-            </a:r>
-          </a:p>
-        </p:txBody>
-      </p:sp>
-    </p:spTree>
-    <p:extLst>
-      <p:ext uri="{BB962C8B-B14F-4D97-AF65-F5344CB8AC3E}">
-        <p14:creationId xmlns:p14="http://schemas.microsoft.com/office/powerpoint/2010/main" val="861286761"/>
-      </p:ext>
-    </p:extLst>
-  </p:cSld>
-  <p:clrMapOvr>
-    <a:masterClrMapping/>
-  </p:clrMapOvr>
-</p:sld>
-</file>
-
 <file path=ppt/slides/slide17.xml><?xml version="1.0" encoding="utf-8"?>
 <p:sld xmlns:a="http://schemas.openxmlformats.org/drawingml/2006/main" xmlns:r="http://schemas.openxmlformats.org/officeDocument/2006/relationships" xmlns:p="http://schemas.openxmlformats.org/presentationml/2006/main">
   <p:cSld>
@@ -7447,7 +7465,7 @@
           <p:cNvPr id="2" name="Titre 1">
             <a:extLst>
               <a:ext uri="{FF2B5EF4-FFF2-40B4-BE49-F238E27FC236}">
-                <a16:creationId xmlns:a16="http://schemas.microsoft.com/office/drawing/2014/main" id="{B3ACA20D-C8BA-48AC-8A1B-D5BF49DC040C}"/>
+                <a16:creationId xmlns:a16="http://schemas.microsoft.com/office/drawing/2014/main" id="{33D48989-5D71-406C-AC15-390DA2F5F356}"/>
               </a:ext>
             </a:extLst>
           </p:cNvPr>
@@ -7475,7 +7493,7 @@
           <p:cNvPr id="3" name="Espace réservé du contenu 2">
             <a:extLst>
               <a:ext uri="{FF2B5EF4-FFF2-40B4-BE49-F238E27FC236}">
-                <a16:creationId xmlns:a16="http://schemas.microsoft.com/office/drawing/2014/main" id="{572CBCEE-73BF-41CE-94D4-7F72DCE621AB}"/>
+                <a16:creationId xmlns:a16="http://schemas.microsoft.com/office/drawing/2014/main" id="{11DCB18D-0E24-4E2D-A04E-C2DDFCD78A60}"/>
               </a:ext>
             </a:extLst>
           </p:cNvPr>
@@ -7493,7 +7511,21 @@
           <a:p>
             <a:r>
               <a:rPr lang="fr-FR" dirty="0"/>
-              <a:t>Calcul d’exponentielle de matrice en python</a:t>
+              <a:t>Méthode Taylor exponentielle </a:t>
+            </a:r>
+          </a:p>
+          <a:p>
+            <a:pPr lvl="1"/>
+            <a:r>
+              <a:rPr lang="fr-FR" dirty="0"/>
+              <a:t>Basé sur une matrice augmentée</a:t>
+            </a:r>
+          </a:p>
+          <a:p>
+            <a:pPr lvl="1"/>
+            <a:r>
+              <a:rPr lang="fr-FR" dirty="0"/>
+              <a:t>Calculée une seule fois </a:t>
             </a:r>
           </a:p>
           <a:p>
@@ -7502,15 +7534,26 @@
           <a:p>
             <a:r>
               <a:rPr lang="fr-FR" dirty="0"/>
-              <a:t>Utilisation du module </a:t>
+              <a:t>Méthode </a:t>
             </a:r>
             <a:r>
               <a:rPr lang="fr-FR" dirty="0" err="1"/>
-              <a:t>Scipy</a:t>
-            </a:r>
+              <a:t>Rosenbroch</a:t>
+            </a:r>
+            <a:endParaRPr lang="fr-FR" dirty="0"/>
+          </a:p>
+          <a:p>
+            <a:pPr lvl="1"/>
             <a:r>
               <a:rPr lang="fr-FR" dirty="0"/>
-              <a:t> </a:t>
+              <a:t>Basé sur une matrice augmentée</a:t>
+            </a:r>
+          </a:p>
+          <a:p>
+            <a:pPr lvl="1"/>
+            <a:r>
+              <a:rPr lang="fr-FR" dirty="0"/>
+              <a:t>Calculée à chaque itération</a:t>
             </a:r>
           </a:p>
           <a:p>
@@ -7519,79 +7562,22 @@
           <a:p>
             <a:r>
               <a:rPr lang="fr-FR" dirty="0"/>
-              <a:t>Implémentation de la méthode de Krylov </a:t>
-            </a:r>
-          </a:p>
-          <a:p>
-            <a:endParaRPr lang="fr-FR" dirty="0"/>
-          </a:p>
-          <a:p>
+              <a:t>Méthode exponentielle RK </a:t>
+            </a:r>
+          </a:p>
+          <a:p>
+            <a:pPr lvl="1"/>
             <a:r>
               <a:rPr lang="fr-FR" dirty="0"/>
-              <a:t>   Amélioration du temps de calcul de la méthode </a:t>
-            </a:r>
-          </a:p>
-          <a:p>
-            <a:endParaRPr lang="fr-FR" dirty="0"/>
-          </a:p>
-          <a:p>
-            <a:r>
-              <a:rPr lang="fr-FR" dirty="0"/>
-              <a:t>(Il faudrait un screen permettant de mettre en avant cela) </a:t>
-            </a:r>
-          </a:p>
-        </p:txBody>
-      </p:sp>
-      <p:sp>
-        <p:nvSpPr>
-          <p:cNvPr id="4" name="Flèche : droite 3">
-            <a:extLst>
-              <a:ext uri="{FF2B5EF4-FFF2-40B4-BE49-F238E27FC236}">
-                <a16:creationId xmlns:a16="http://schemas.microsoft.com/office/drawing/2014/main" id="{2953CAF0-33E8-4AF1-8E58-14EA48335686}"/>
-              </a:ext>
-            </a:extLst>
-          </p:cNvPr>
-          <p:cNvSpPr/>
-          <p:nvPr/>
-        </p:nvSpPr>
-        <p:spPr>
-          <a:xfrm>
-            <a:off x="677334" y="4592320"/>
-            <a:ext cx="457200" cy="355601"/>
-          </a:xfrm>
-          <a:prstGeom prst="rightArrow">
-            <a:avLst/>
-          </a:prstGeom>
-        </p:spPr>
-        <p:style>
-          <a:lnRef idx="2">
-            <a:schemeClr val="accent1">
-              <a:shade val="50000"/>
-            </a:schemeClr>
-          </a:lnRef>
-          <a:fillRef idx="1">
-            <a:schemeClr val="accent1"/>
-          </a:fillRef>
-          <a:effectRef idx="0">
-            <a:schemeClr val="accent1"/>
-          </a:effectRef>
-          <a:fontRef idx="minor">
-            <a:schemeClr val="lt1"/>
-          </a:fontRef>
-        </p:style>
-        <p:txBody>
-          <a:bodyPr rtlCol="0" anchor="ctr"/>
-          <a:lstStyle/>
-          <a:p>
-            <a:pPr algn="ctr"/>
-            <a:endParaRPr lang="fr-FR"/>
+              <a:t>Début d’étude </a:t>
+            </a:r>
           </a:p>
         </p:txBody>
       </p:sp>
     </p:spTree>
     <p:extLst>
       <p:ext uri="{BB962C8B-B14F-4D97-AF65-F5344CB8AC3E}">
-        <p14:creationId xmlns:p14="http://schemas.microsoft.com/office/powerpoint/2010/main" val="474638245"/>
+        <p14:creationId xmlns:p14="http://schemas.microsoft.com/office/powerpoint/2010/main" val="861286761"/>
       </p:ext>
     </p:extLst>
   </p:cSld>
@@ -7623,7 +7609,7 @@
           <p:cNvPr id="2" name="Titre 1">
             <a:extLst>
               <a:ext uri="{FF2B5EF4-FFF2-40B4-BE49-F238E27FC236}">
-                <a16:creationId xmlns:a16="http://schemas.microsoft.com/office/drawing/2014/main" id="{BEAD297D-408C-4DCC-A83F-3991F010784A}"/>
+                <a16:creationId xmlns:a16="http://schemas.microsoft.com/office/drawing/2014/main" id="{B3ACA20D-C8BA-48AC-8A1B-D5BF49DC040C}"/>
               </a:ext>
             </a:extLst>
           </p:cNvPr>
@@ -7651,7 +7637,7 @@
           <p:cNvPr id="3" name="Espace réservé du contenu 2">
             <a:extLst>
               <a:ext uri="{FF2B5EF4-FFF2-40B4-BE49-F238E27FC236}">
-                <a16:creationId xmlns:a16="http://schemas.microsoft.com/office/drawing/2014/main" id="{8C01C720-3BA3-4CC0-9BD8-6DAFA23FEEAA}"/>
+                <a16:creationId xmlns:a16="http://schemas.microsoft.com/office/drawing/2014/main" id="{572CBCEE-73BF-41CE-94D4-7F72DCE621AB}"/>
               </a:ext>
             </a:extLst>
           </p:cNvPr>
@@ -7669,21 +7655,233 @@
           <a:p>
             <a:r>
               <a:rPr lang="fr-FR" dirty="0"/>
-              <a:t>Screens de comparaison des méthodes entre elles sur des problèmes donnés </a:t>
-            </a:r>
-          </a:p>
-        </p:txBody>
-      </p:sp>
+              <a:t>Calcul d’exponentielle de matrice en python</a:t>
+            </a:r>
+          </a:p>
+          <a:p>
+            <a:endParaRPr lang="fr-FR" dirty="0"/>
+          </a:p>
+          <a:p>
+            <a:r>
+              <a:rPr lang="fr-FR" dirty="0"/>
+              <a:t>Utilisation du module </a:t>
+            </a:r>
+            <a:r>
+              <a:rPr lang="fr-FR" dirty="0" err="1"/>
+              <a:t>Scipy</a:t>
+            </a:r>
+            <a:r>
+              <a:rPr lang="fr-FR" dirty="0"/>
+              <a:t> </a:t>
+            </a:r>
+          </a:p>
+          <a:p>
+            <a:endParaRPr lang="fr-FR" dirty="0"/>
+          </a:p>
+          <a:p>
+            <a:r>
+              <a:rPr lang="fr-FR" dirty="0"/>
+              <a:t>Implémentation de la méthode de Krylov </a:t>
+            </a:r>
+          </a:p>
+          <a:p>
+            <a:endParaRPr lang="fr-FR" dirty="0"/>
+          </a:p>
+          <a:p>
+            <a:r>
+              <a:rPr lang="fr-FR" dirty="0"/>
+              <a:t>   Amélioration du temps de calcul de la méthode </a:t>
+            </a:r>
+          </a:p>
+          <a:p>
+            <a:endParaRPr lang="fr-FR" dirty="0"/>
+          </a:p>
+          <a:p>
+            <a:pPr marL="0" indent="0">
+              <a:buNone/>
+            </a:pPr>
+            <a:endParaRPr lang="fr-FR" dirty="0"/>
+          </a:p>
+        </p:txBody>
+      </p:sp>
+      <p:sp>
+        <p:nvSpPr>
+          <p:cNvPr id="4" name="Flèche : droite 3">
+            <a:extLst>
+              <a:ext uri="{FF2B5EF4-FFF2-40B4-BE49-F238E27FC236}">
+                <a16:creationId xmlns:a16="http://schemas.microsoft.com/office/drawing/2014/main" id="{2953CAF0-33E8-4AF1-8E58-14EA48335686}"/>
+              </a:ext>
+            </a:extLst>
+          </p:cNvPr>
+          <p:cNvSpPr/>
+          <p:nvPr/>
+        </p:nvSpPr>
+        <p:spPr>
+          <a:xfrm>
+            <a:off x="677334" y="4592320"/>
+            <a:ext cx="457200" cy="355601"/>
+          </a:xfrm>
+          <a:prstGeom prst="rightArrow">
+            <a:avLst/>
+          </a:prstGeom>
+        </p:spPr>
+        <p:style>
+          <a:lnRef idx="2">
+            <a:schemeClr val="accent1">
+              <a:shade val="50000"/>
+            </a:schemeClr>
+          </a:lnRef>
+          <a:fillRef idx="1">
+            <a:schemeClr val="accent1"/>
+          </a:fillRef>
+          <a:effectRef idx="0">
+            <a:schemeClr val="accent1"/>
+          </a:effectRef>
+          <a:fontRef idx="minor">
+            <a:schemeClr val="lt1"/>
+          </a:fontRef>
+        </p:style>
+        <p:txBody>
+          <a:bodyPr rtlCol="0" anchor="ctr"/>
+          <a:lstStyle/>
+          <a:p>
+            <a:pPr algn="ctr"/>
+            <a:endParaRPr lang="fr-FR"/>
+          </a:p>
+        </p:txBody>
+      </p:sp>
+      <p:pic>
+        <p:nvPicPr>
+          <p:cNvPr id="1026" name="Picture 2" descr="https://lh3.googleusercontent.com/9uI-o7le6bMVd2swCsPRnGWjIVobJZS6AHCRcRk31hs1euU42v5lElfT4mgJpqSyqVOz1TRILKo8WXElp97gSdab7Lh3Vd1ToTZD6sceA2aRRvOEetXKh6rOFe_z5BHrMzbqHTG-3jZeIQ">
+            <a:extLst>
+              <a:ext uri="{FF2B5EF4-FFF2-40B4-BE49-F238E27FC236}">
+                <a16:creationId xmlns:a16="http://schemas.microsoft.com/office/drawing/2014/main" id="{E6606883-82CD-4DA3-94CE-3AEC53ED689B}"/>
+              </a:ext>
+            </a:extLst>
+          </p:cNvPr>
+          <p:cNvPicPr>
+            <a:picLocks noChangeAspect="1" noChangeArrowheads="1"/>
+          </p:cNvPicPr>
+          <p:nvPr/>
+        </p:nvPicPr>
+        <p:blipFill>
+          <a:blip r:embed="rId2">
+            <a:extLst>
+              <a:ext uri="{28A0092B-C50C-407E-A947-70E740481C1C}">
+                <a14:useLocalDpi xmlns:a14="http://schemas.microsoft.com/office/drawing/2010/main" val="0"/>
+              </a:ext>
+            </a:extLst>
+          </a:blip>
+          <a:srcRect/>
+          <a:stretch>
+            <a:fillRect/>
+          </a:stretch>
+        </p:blipFill>
+        <p:spPr bwMode="auto">
+          <a:xfrm>
+            <a:off x="1290320" y="5059681"/>
+            <a:ext cx="9566459" cy="1656080"/>
+          </a:xfrm>
+          <a:prstGeom prst="rect">
+            <a:avLst/>
+          </a:prstGeom>
+          <a:noFill/>
+          <a:extLst>
+            <a:ext uri="{909E8E84-426E-40DD-AFC4-6F175D3DCCD1}">
+              <a14:hiddenFill xmlns:a14="http://schemas.microsoft.com/office/drawing/2010/main">
+                <a:solidFill>
+                  <a:srgbClr val="FFFFFF"/>
+                </a:solidFill>
+              </a14:hiddenFill>
+            </a:ext>
+          </a:extLst>
+        </p:spPr>
+      </p:pic>
     </p:spTree>
     <p:extLst>
       <p:ext uri="{BB962C8B-B14F-4D97-AF65-F5344CB8AC3E}">
-        <p14:creationId xmlns:p14="http://schemas.microsoft.com/office/powerpoint/2010/main" val="883981461"/>
+        <p14:creationId xmlns:p14="http://schemas.microsoft.com/office/powerpoint/2010/main" val="474638245"/>
       </p:ext>
     </p:extLst>
   </p:cSld>
   <p:clrMapOvr>
     <a:masterClrMapping/>
   </p:clrMapOvr>
+  <p:timing>
+    <p:tnLst>
+      <p:par>
+        <p:cTn id="1" dur="indefinite" restart="never" nodeType="tmRoot">
+          <p:childTnLst>
+            <p:seq concurrent="1" nextAc="seek">
+              <p:cTn id="2" dur="indefinite" nodeType="mainSeq">
+                <p:childTnLst>
+                  <p:par>
+                    <p:cTn id="3" fill="hold">
+                      <p:stCondLst>
+                        <p:cond delay="indefinite"/>
+                      </p:stCondLst>
+                      <p:childTnLst>
+                        <p:par>
+                          <p:cTn id="4" fill="hold">
+                            <p:stCondLst>
+                              <p:cond delay="0"/>
+                            </p:stCondLst>
+                            <p:childTnLst>
+                              <p:par>
+                                <p:cTn id="5" presetID="1" presetClass="entr" presetSubtype="0" fill="hold" nodeType="clickEffect">
+                                  <p:stCondLst>
+                                    <p:cond delay="0"/>
+                                  </p:stCondLst>
+                                  <p:childTnLst>
+                                    <p:set>
+                                      <p:cBhvr>
+                                        <p:cTn id="6" dur="1" fill="hold">
+                                          <p:stCondLst>
+                                            <p:cond delay="0"/>
+                                          </p:stCondLst>
+                                        </p:cTn>
+                                        <p:tgtEl>
+                                          <p:spTgt spid="1026"/>
+                                        </p:tgtEl>
+                                        <p:attrNameLst>
+                                          <p:attrName>style.visibility</p:attrName>
+                                        </p:attrNameLst>
+                                      </p:cBhvr>
+                                      <p:to>
+                                        <p:strVal val="visible"/>
+                                      </p:to>
+                                    </p:set>
+                                  </p:childTnLst>
+                                </p:cTn>
+                              </p:par>
+                            </p:childTnLst>
+                          </p:cTn>
+                        </p:par>
+                      </p:childTnLst>
+                    </p:cTn>
+                  </p:par>
+                </p:childTnLst>
+              </p:cTn>
+              <p:prevCondLst>
+                <p:cond evt="onPrev" delay="0">
+                  <p:tgtEl>
+                    <p:sldTgt/>
+                  </p:tgtEl>
+                </p:cond>
+              </p:prevCondLst>
+              <p:nextCondLst>
+                <p:cond evt="onNext" delay="0">
+                  <p:tgtEl>
+                    <p:sldTgt/>
+                  </p:tgtEl>
+                </p:cond>
+              </p:nextCondLst>
+            </p:seq>
+          </p:childTnLst>
+        </p:cTn>
+      </p:par>
+    </p:tnLst>
+  </p:timing>
 </p:sld>
 </file>
 
@@ -7732,44 +7930,192 @@
           </a:p>
         </p:txBody>
       </p:sp>
-      <p:sp>
-        <p:nvSpPr>
-          <p:cNvPr id="3" name="Espace réservé du contenu 2">
+      <p:pic>
+        <p:nvPicPr>
+          <p:cNvPr id="4" name="Espace réservé du contenu 3">
             <a:extLst>
               <a:ext uri="{FF2B5EF4-FFF2-40B4-BE49-F238E27FC236}">
-                <a16:creationId xmlns:a16="http://schemas.microsoft.com/office/drawing/2014/main" id="{8C01C720-3BA3-4CC0-9BD8-6DAFA23FEEAA}"/>
+                <a16:creationId xmlns:a16="http://schemas.microsoft.com/office/drawing/2014/main" id="{BECEC932-1CBA-496B-A497-0EEBE4276EC1}"/>
               </a:ext>
             </a:extLst>
           </p:cNvPr>
-          <p:cNvSpPr>
-            <a:spLocks noGrp="1"/>
-          </p:cNvSpPr>
+          <p:cNvPicPr>
+            <a:picLocks noGrp="1" noChangeAspect="1"/>
+          </p:cNvPicPr>
           <p:nvPr>
             <p:ph idx="1"/>
           </p:nvPr>
-        </p:nvSpPr>
-        <p:spPr/>
-        <p:txBody>
-          <a:bodyPr/>
-          <a:lstStyle/>
-          <a:p>
-            <a:r>
-              <a:rPr lang="fr-FR" dirty="0"/>
-              <a:t>Screens de comparaison avec les méthodes usuelles entre elles sur des problèmes donnés </a:t>
-            </a:r>
-          </a:p>
-        </p:txBody>
-      </p:sp>
+        </p:nvPicPr>
+        <p:blipFill>
+          <a:blip r:embed="rId2">
+            <a:extLst>
+              <a:ext uri="{28A0092B-C50C-407E-A947-70E740481C1C}">
+                <a14:useLocalDpi xmlns:a14="http://schemas.microsoft.com/office/drawing/2010/main" val="0"/>
+              </a:ext>
+            </a:extLst>
+          </a:blip>
+          <a:stretch>
+            <a:fillRect/>
+          </a:stretch>
+        </p:blipFill>
+        <p:spPr>
+          <a:xfrm>
+            <a:off x="2608577" y="3312161"/>
+            <a:ext cx="4734884" cy="1578292"/>
+          </a:xfrm>
+          <a:prstGeom prst="rect">
+            <a:avLst/>
+          </a:prstGeom>
+        </p:spPr>
+      </p:pic>
+      <p:pic>
+        <p:nvPicPr>
+          <p:cNvPr id="6" name="Image 5">
+            <a:extLst>
+              <a:ext uri="{FF2B5EF4-FFF2-40B4-BE49-F238E27FC236}">
+                <a16:creationId xmlns:a16="http://schemas.microsoft.com/office/drawing/2014/main" id="{BA8C6809-1D91-4B3D-BECB-23D7EFEEC9DB}"/>
+              </a:ext>
+            </a:extLst>
+          </p:cNvPr>
+          <p:cNvPicPr>
+            <a:picLocks noChangeAspect="1"/>
+          </p:cNvPicPr>
+          <p:nvPr/>
+        </p:nvPicPr>
+        <p:blipFill>
+          <a:blip r:embed="rId3">
+            <a:extLst>
+              <a:ext uri="{28A0092B-C50C-407E-A947-70E740481C1C}">
+                <a14:useLocalDpi xmlns:a14="http://schemas.microsoft.com/office/drawing/2010/main" val="0"/>
+              </a:ext>
+            </a:extLst>
+          </a:blip>
+          <a:stretch>
+            <a:fillRect/>
+          </a:stretch>
+        </p:blipFill>
+        <p:spPr>
+          <a:xfrm>
+            <a:off x="203200" y="384968"/>
+            <a:ext cx="11663680" cy="6088063"/>
+          </a:xfrm>
+          <a:prstGeom prst="rect">
+            <a:avLst/>
+          </a:prstGeom>
+        </p:spPr>
+      </p:pic>
     </p:spTree>
     <p:extLst>
       <p:ext uri="{BB962C8B-B14F-4D97-AF65-F5344CB8AC3E}">
-        <p14:creationId xmlns:p14="http://schemas.microsoft.com/office/powerpoint/2010/main" val="34546804"/>
+        <p14:creationId xmlns:p14="http://schemas.microsoft.com/office/powerpoint/2010/main" val="883981461"/>
       </p:ext>
     </p:extLst>
   </p:cSld>
   <p:clrMapOvr>
     <a:masterClrMapping/>
   </p:clrMapOvr>
+  <p:timing>
+    <p:tnLst>
+      <p:par>
+        <p:cTn id="1" dur="indefinite" restart="never" nodeType="tmRoot">
+          <p:childTnLst>
+            <p:seq concurrent="1" nextAc="seek">
+              <p:cTn id="2" dur="indefinite" nodeType="mainSeq">
+                <p:childTnLst>
+                  <p:par>
+                    <p:cTn id="3" fill="hold">
+                      <p:stCondLst>
+                        <p:cond delay="indefinite"/>
+                      </p:stCondLst>
+                      <p:childTnLst>
+                        <p:par>
+                          <p:cTn id="4" fill="hold">
+                            <p:stCondLst>
+                              <p:cond delay="0"/>
+                            </p:stCondLst>
+                            <p:childTnLst>
+                              <p:par>
+                                <p:cTn id="5" presetID="1" presetClass="exit" presetSubtype="0" fill="hold" nodeType="clickEffect">
+                                  <p:stCondLst>
+                                    <p:cond delay="0"/>
+                                  </p:stCondLst>
+                                  <p:childTnLst>
+                                    <p:set>
+                                      <p:cBhvr>
+                                        <p:cTn id="6" dur="1" fill="hold">
+                                          <p:stCondLst>
+                                            <p:cond delay="0"/>
+                                          </p:stCondLst>
+                                        </p:cTn>
+                                        <p:tgtEl>
+                                          <p:spTgt spid="4"/>
+                                        </p:tgtEl>
+                                        <p:attrNameLst>
+                                          <p:attrName>style.visibility</p:attrName>
+                                        </p:attrNameLst>
+                                      </p:cBhvr>
+                                      <p:to>
+                                        <p:strVal val="hidden"/>
+                                      </p:to>
+                                    </p:set>
+                                  </p:childTnLst>
+                                </p:cTn>
+                              </p:par>
+                              <p:par>
+                                <p:cTn id="7" presetID="1" presetClass="entr" presetSubtype="0" fill="hold" nodeType="withEffect">
+                                  <p:stCondLst>
+                                    <p:cond delay="0"/>
+                                  </p:stCondLst>
+                                  <p:childTnLst>
+                                    <p:set>
+                                      <p:cBhvr>
+                                        <p:cTn id="8" dur="1" fill="hold">
+                                          <p:stCondLst>
+                                            <p:cond delay="0"/>
+                                          </p:stCondLst>
+                                        </p:cTn>
+                                        <p:tgtEl>
+                                          <p:spTgt spid="6"/>
+                                        </p:tgtEl>
+                                        <p:attrNameLst>
+                                          <p:attrName>style.visibility</p:attrName>
+                                        </p:attrNameLst>
+                                      </p:cBhvr>
+                                      <p:to>
+                                        <p:strVal val="visible"/>
+                                      </p:to>
+                                    </p:set>
+                                  </p:childTnLst>
+                                </p:cTn>
+                              </p:par>
+                            </p:childTnLst>
+                          </p:cTn>
+                        </p:par>
+                      </p:childTnLst>
+                    </p:cTn>
+                  </p:par>
+                </p:childTnLst>
+              </p:cTn>
+              <p:prevCondLst>
+                <p:cond evt="onPrev" delay="0">
+                  <p:tgtEl>
+                    <p:sldTgt/>
+                  </p:tgtEl>
+                </p:cond>
+              </p:prevCondLst>
+              <p:nextCondLst>
+                <p:cond evt="onNext" delay="0">
+                  <p:tgtEl>
+                    <p:sldTgt/>
+                  </p:tgtEl>
+                </p:cond>
+              </p:nextCondLst>
+            </p:seq>
+          </p:childTnLst>
+        </p:cTn>
+      </p:par>
+    </p:tnLst>
+  </p:timing>
 </p:sld>
 </file>
 
@@ -7923,6 +8269,626 @@
           <p:cNvPr id="2" name="Titre 1">
             <a:extLst>
               <a:ext uri="{FF2B5EF4-FFF2-40B4-BE49-F238E27FC236}">
+                <a16:creationId xmlns:a16="http://schemas.microsoft.com/office/drawing/2014/main" id="{A032E8A6-5CD7-447B-9FF9-CCAB7F9B3C57}"/>
+              </a:ext>
+            </a:extLst>
+          </p:cNvPr>
+          <p:cNvSpPr>
+            <a:spLocks noGrp="1"/>
+          </p:cNvSpPr>
+          <p:nvPr>
+            <p:ph type="title"/>
+          </p:nvPr>
+        </p:nvSpPr>
+        <p:spPr/>
+        <p:txBody>
+          <a:bodyPr/>
+          <a:lstStyle/>
+          <a:p>
+            <a:r>
+              <a:rPr lang="fr-FR" dirty="0"/>
+              <a:t>IV – Méthodes numériques exponentielles</a:t>
+            </a:r>
+          </a:p>
+        </p:txBody>
+      </p:sp>
+      <p:pic>
+        <p:nvPicPr>
+          <p:cNvPr id="4" name="Espace réservé du contenu 3">
+            <a:extLst>
+              <a:ext uri="{FF2B5EF4-FFF2-40B4-BE49-F238E27FC236}">
+                <a16:creationId xmlns:a16="http://schemas.microsoft.com/office/drawing/2014/main" id="{F76D6BBB-CCA8-4B44-A5C8-A0620C1291A6}"/>
+              </a:ext>
+            </a:extLst>
+          </p:cNvPr>
+          <p:cNvPicPr>
+            <a:picLocks noGrp="1" noChangeAspect="1"/>
+          </p:cNvPicPr>
+          <p:nvPr>
+            <p:ph idx="1"/>
+          </p:nvPr>
+        </p:nvPicPr>
+        <p:blipFill>
+          <a:blip r:embed="rId2">
+            <a:extLst>
+              <a:ext uri="{28A0092B-C50C-407E-A947-70E740481C1C}">
+                <a14:useLocalDpi xmlns:a14="http://schemas.microsoft.com/office/drawing/2010/main" val="0"/>
+              </a:ext>
+            </a:extLst>
+          </a:blip>
+          <a:stretch>
+            <a:fillRect/>
+          </a:stretch>
+        </p:blipFill>
+        <p:spPr>
+          <a:xfrm>
+            <a:off x="2958597" y="2936241"/>
+            <a:ext cx="4034142" cy="1700212"/>
+          </a:xfrm>
+          <a:prstGeom prst="rect">
+            <a:avLst/>
+          </a:prstGeom>
+        </p:spPr>
+      </p:pic>
+      <p:pic>
+        <p:nvPicPr>
+          <p:cNvPr id="6" name="Image 5">
+            <a:extLst>
+              <a:ext uri="{FF2B5EF4-FFF2-40B4-BE49-F238E27FC236}">
+                <a16:creationId xmlns:a16="http://schemas.microsoft.com/office/drawing/2014/main" id="{E63D94C4-FA55-4EFF-BE37-693B6A250459}"/>
+              </a:ext>
+            </a:extLst>
+          </p:cNvPr>
+          <p:cNvPicPr>
+            <a:picLocks noChangeAspect="1"/>
+          </p:cNvPicPr>
+          <p:nvPr/>
+        </p:nvPicPr>
+        <p:blipFill>
+          <a:blip r:embed="rId3">
+            <a:extLst>
+              <a:ext uri="{28A0092B-C50C-407E-A947-70E740481C1C}">
+                <a14:useLocalDpi xmlns:a14="http://schemas.microsoft.com/office/drawing/2010/main" val="0"/>
+              </a:ext>
+            </a:extLst>
+          </a:blip>
+          <a:stretch>
+            <a:fillRect/>
+          </a:stretch>
+        </p:blipFill>
+        <p:spPr>
+          <a:xfrm>
+            <a:off x="233680" y="684298"/>
+            <a:ext cx="11358880" cy="5788733"/>
+          </a:xfrm>
+          <a:prstGeom prst="rect">
+            <a:avLst/>
+          </a:prstGeom>
+        </p:spPr>
+      </p:pic>
+    </p:spTree>
+    <p:extLst>
+      <p:ext uri="{BB962C8B-B14F-4D97-AF65-F5344CB8AC3E}">
+        <p14:creationId xmlns:p14="http://schemas.microsoft.com/office/powerpoint/2010/main" val="2574923907"/>
+      </p:ext>
+    </p:extLst>
+  </p:cSld>
+  <p:clrMapOvr>
+    <a:masterClrMapping/>
+  </p:clrMapOvr>
+  <p:timing>
+    <p:tnLst>
+      <p:par>
+        <p:cTn id="1" dur="indefinite" restart="never" nodeType="tmRoot">
+          <p:childTnLst>
+            <p:seq concurrent="1" nextAc="seek">
+              <p:cTn id="2" dur="indefinite" nodeType="mainSeq">
+                <p:childTnLst>
+                  <p:par>
+                    <p:cTn id="3" fill="hold">
+                      <p:stCondLst>
+                        <p:cond delay="indefinite"/>
+                      </p:stCondLst>
+                      <p:childTnLst>
+                        <p:par>
+                          <p:cTn id="4" fill="hold">
+                            <p:stCondLst>
+                              <p:cond delay="0"/>
+                            </p:stCondLst>
+                            <p:childTnLst>
+                              <p:par>
+                                <p:cTn id="5" presetID="1" presetClass="exit" presetSubtype="0" fill="hold" nodeType="clickEffect">
+                                  <p:stCondLst>
+                                    <p:cond delay="0"/>
+                                  </p:stCondLst>
+                                  <p:childTnLst>
+                                    <p:set>
+                                      <p:cBhvr>
+                                        <p:cTn id="6" dur="1" fill="hold">
+                                          <p:stCondLst>
+                                            <p:cond delay="0"/>
+                                          </p:stCondLst>
+                                        </p:cTn>
+                                        <p:tgtEl>
+                                          <p:spTgt spid="4"/>
+                                        </p:tgtEl>
+                                        <p:attrNameLst>
+                                          <p:attrName>style.visibility</p:attrName>
+                                        </p:attrNameLst>
+                                      </p:cBhvr>
+                                      <p:to>
+                                        <p:strVal val="hidden"/>
+                                      </p:to>
+                                    </p:set>
+                                  </p:childTnLst>
+                                </p:cTn>
+                              </p:par>
+                            </p:childTnLst>
+                          </p:cTn>
+                        </p:par>
+                      </p:childTnLst>
+                    </p:cTn>
+                  </p:par>
+                </p:childTnLst>
+              </p:cTn>
+              <p:prevCondLst>
+                <p:cond evt="onPrev" delay="0">
+                  <p:tgtEl>
+                    <p:sldTgt/>
+                  </p:tgtEl>
+                </p:cond>
+              </p:prevCondLst>
+              <p:nextCondLst>
+                <p:cond evt="onNext" delay="0">
+                  <p:tgtEl>
+                    <p:sldTgt/>
+                  </p:tgtEl>
+                </p:cond>
+              </p:nextCondLst>
+            </p:seq>
+          </p:childTnLst>
+        </p:cTn>
+      </p:par>
+    </p:tnLst>
+  </p:timing>
+</p:sld>
+</file>
+
+<file path=ppt/slides/slide21.xml><?xml version="1.0" encoding="utf-8"?>
+<p:sld xmlns:a="http://schemas.openxmlformats.org/drawingml/2006/main" xmlns:r="http://schemas.openxmlformats.org/officeDocument/2006/relationships" xmlns:p="http://schemas.openxmlformats.org/presentationml/2006/main">
+  <p:cSld>
+    <p:spTree>
+      <p:nvGrpSpPr>
+        <p:cNvPr id="1" name=""/>
+        <p:cNvGrpSpPr/>
+        <p:nvPr/>
+      </p:nvGrpSpPr>
+      <p:grpSpPr>
+        <a:xfrm>
+          <a:off x="0" y="0"/>
+          <a:ext cx="0" cy="0"/>
+          <a:chOff x="0" y="0"/>
+          <a:chExt cx="0" cy="0"/>
+        </a:xfrm>
+      </p:grpSpPr>
+      <p:sp>
+        <p:nvSpPr>
+          <p:cNvPr id="2" name="Titre 1">
+            <a:extLst>
+              <a:ext uri="{FF2B5EF4-FFF2-40B4-BE49-F238E27FC236}">
+                <a16:creationId xmlns:a16="http://schemas.microsoft.com/office/drawing/2014/main" id="{BEAD297D-408C-4DCC-A83F-3991F010784A}"/>
+              </a:ext>
+            </a:extLst>
+          </p:cNvPr>
+          <p:cNvSpPr>
+            <a:spLocks noGrp="1"/>
+          </p:cNvSpPr>
+          <p:nvPr>
+            <p:ph type="title"/>
+          </p:nvPr>
+        </p:nvSpPr>
+        <p:spPr/>
+        <p:txBody>
+          <a:bodyPr/>
+          <a:lstStyle/>
+          <a:p>
+            <a:r>
+              <a:rPr lang="fr-FR" dirty="0"/>
+              <a:t>IV – Méthodes numériques exponentielles</a:t>
+            </a:r>
+          </a:p>
+        </p:txBody>
+      </p:sp>
+      <p:sp>
+        <p:nvSpPr>
+          <p:cNvPr id="3" name="Espace réservé du contenu 2">
+            <a:extLst>
+              <a:ext uri="{FF2B5EF4-FFF2-40B4-BE49-F238E27FC236}">
+                <a16:creationId xmlns:a16="http://schemas.microsoft.com/office/drawing/2014/main" id="{8C01C720-3BA3-4CC0-9BD8-6DAFA23FEEAA}"/>
+              </a:ext>
+            </a:extLst>
+          </p:cNvPr>
+          <p:cNvSpPr>
+            <a:spLocks noGrp="1"/>
+          </p:cNvSpPr>
+          <p:nvPr>
+            <p:ph idx="1"/>
+          </p:nvPr>
+        </p:nvSpPr>
+        <p:spPr/>
+        <p:txBody>
+          <a:bodyPr/>
+          <a:lstStyle/>
+          <a:p>
+            <a:r>
+              <a:rPr lang="fr-FR" dirty="0"/>
+              <a:t>Test sur EDP </a:t>
+            </a:r>
+          </a:p>
+          <a:p>
+            <a:endParaRPr lang="fr-FR" dirty="0"/>
+          </a:p>
+          <a:p>
+            <a:r>
+              <a:rPr lang="fr-FR" dirty="0"/>
+              <a:t>Equation de Burgers </a:t>
+            </a:r>
+          </a:p>
+          <a:p>
+            <a:pPr marL="0" indent="0">
+              <a:buNone/>
+            </a:pPr>
+            <a:endParaRPr lang="fr-FR" dirty="0"/>
+          </a:p>
+          <a:p>
+            <a:r>
+              <a:rPr lang="fr-FR" dirty="0"/>
+              <a:t>Différents CFL </a:t>
+            </a:r>
+          </a:p>
+          <a:p>
+            <a:endParaRPr lang="fr-FR" dirty="0"/>
+          </a:p>
+          <a:p>
+            <a:endParaRPr lang="fr-FR" dirty="0"/>
+          </a:p>
+        </p:txBody>
+      </p:sp>
+      <p:pic>
+        <p:nvPicPr>
+          <p:cNvPr id="5" name="Image 4">
+            <a:extLst>
+              <a:ext uri="{FF2B5EF4-FFF2-40B4-BE49-F238E27FC236}">
+                <a16:creationId xmlns:a16="http://schemas.microsoft.com/office/drawing/2014/main" id="{832230D8-B3A3-41BD-925A-1E390CFE5E0F}"/>
+              </a:ext>
+            </a:extLst>
+          </p:cNvPr>
+          <p:cNvPicPr>
+            <a:picLocks noChangeAspect="1"/>
+          </p:cNvPicPr>
+          <p:nvPr/>
+        </p:nvPicPr>
+        <p:blipFill>
+          <a:blip r:embed="rId2">
+            <a:extLst>
+              <a:ext uri="{28A0092B-C50C-407E-A947-70E740481C1C}">
+                <a14:useLocalDpi xmlns:a14="http://schemas.microsoft.com/office/drawing/2010/main" val="0"/>
+              </a:ext>
+            </a:extLst>
+          </a:blip>
+          <a:stretch>
+            <a:fillRect/>
+          </a:stretch>
+        </p:blipFill>
+        <p:spPr>
+          <a:xfrm>
+            <a:off x="147816" y="182873"/>
+            <a:ext cx="11896368" cy="6492253"/>
+          </a:xfrm>
+          <a:prstGeom prst="rect">
+            <a:avLst/>
+          </a:prstGeom>
+        </p:spPr>
+      </p:pic>
+      <p:pic>
+        <p:nvPicPr>
+          <p:cNvPr id="7" name="Image 6">
+            <a:extLst>
+              <a:ext uri="{FF2B5EF4-FFF2-40B4-BE49-F238E27FC236}">
+                <a16:creationId xmlns:a16="http://schemas.microsoft.com/office/drawing/2014/main" id="{3D6D0F9D-E201-4CEA-ADB4-91536E300412}"/>
+              </a:ext>
+            </a:extLst>
+          </p:cNvPr>
+          <p:cNvPicPr>
+            <a:picLocks noChangeAspect="1"/>
+          </p:cNvPicPr>
+          <p:nvPr/>
+        </p:nvPicPr>
+        <p:blipFill>
+          <a:blip r:embed="rId3">
+            <a:extLst>
+              <a:ext uri="{28A0092B-C50C-407E-A947-70E740481C1C}">
+                <a14:useLocalDpi xmlns:a14="http://schemas.microsoft.com/office/drawing/2010/main" val="0"/>
+              </a:ext>
+            </a:extLst>
+          </a:blip>
+          <a:stretch>
+            <a:fillRect/>
+          </a:stretch>
+        </p:blipFill>
+        <p:spPr>
+          <a:xfrm>
+            <a:off x="147816" y="182873"/>
+            <a:ext cx="11896368" cy="6492253"/>
+          </a:xfrm>
+          <a:prstGeom prst="rect">
+            <a:avLst/>
+          </a:prstGeom>
+        </p:spPr>
+      </p:pic>
+      <p:pic>
+        <p:nvPicPr>
+          <p:cNvPr id="9" name="Image 8">
+            <a:extLst>
+              <a:ext uri="{FF2B5EF4-FFF2-40B4-BE49-F238E27FC236}">
+                <a16:creationId xmlns:a16="http://schemas.microsoft.com/office/drawing/2014/main" id="{4C1C44DA-FC67-4D0A-B6CF-2DA9A645F6BA}"/>
+              </a:ext>
+            </a:extLst>
+          </p:cNvPr>
+          <p:cNvPicPr>
+            <a:picLocks noChangeAspect="1"/>
+          </p:cNvPicPr>
+          <p:nvPr/>
+        </p:nvPicPr>
+        <p:blipFill>
+          <a:blip r:embed="rId4">
+            <a:extLst>
+              <a:ext uri="{28A0092B-C50C-407E-A947-70E740481C1C}">
+                <a14:useLocalDpi xmlns:a14="http://schemas.microsoft.com/office/drawing/2010/main" val="0"/>
+              </a:ext>
+            </a:extLst>
+          </a:blip>
+          <a:stretch>
+            <a:fillRect/>
+          </a:stretch>
+        </p:blipFill>
+        <p:spPr>
+          <a:xfrm>
+            <a:off x="147816" y="182873"/>
+            <a:ext cx="11896368" cy="6492253"/>
+          </a:xfrm>
+          <a:prstGeom prst="rect">
+            <a:avLst/>
+          </a:prstGeom>
+        </p:spPr>
+      </p:pic>
+    </p:spTree>
+    <p:extLst>
+      <p:ext uri="{BB962C8B-B14F-4D97-AF65-F5344CB8AC3E}">
+        <p14:creationId xmlns:p14="http://schemas.microsoft.com/office/powerpoint/2010/main" val="34546804"/>
+      </p:ext>
+    </p:extLst>
+  </p:cSld>
+  <p:clrMapOvr>
+    <a:masterClrMapping/>
+  </p:clrMapOvr>
+  <p:timing>
+    <p:tnLst>
+      <p:par>
+        <p:cTn id="1" dur="indefinite" restart="never" nodeType="tmRoot">
+          <p:childTnLst>
+            <p:seq concurrent="1" nextAc="seek">
+              <p:cTn id="2" dur="indefinite" nodeType="mainSeq">
+                <p:childTnLst>
+                  <p:par>
+                    <p:cTn id="3" fill="hold">
+                      <p:stCondLst>
+                        <p:cond delay="indefinite"/>
+                      </p:stCondLst>
+                      <p:childTnLst>
+                        <p:par>
+                          <p:cTn id="4" fill="hold">
+                            <p:stCondLst>
+                              <p:cond delay="0"/>
+                            </p:stCondLst>
+                            <p:childTnLst>
+                              <p:par>
+                                <p:cTn id="5" presetID="1" presetClass="entr" presetSubtype="0" fill="hold" nodeType="clickEffect">
+                                  <p:stCondLst>
+                                    <p:cond delay="0"/>
+                                  </p:stCondLst>
+                                  <p:childTnLst>
+                                    <p:set>
+                                      <p:cBhvr>
+                                        <p:cTn id="6" dur="1" fill="hold">
+                                          <p:stCondLst>
+                                            <p:cond delay="0"/>
+                                          </p:stCondLst>
+                                        </p:cTn>
+                                        <p:tgtEl>
+                                          <p:spTgt spid="5"/>
+                                        </p:tgtEl>
+                                        <p:attrNameLst>
+                                          <p:attrName>style.visibility</p:attrName>
+                                        </p:attrNameLst>
+                                      </p:cBhvr>
+                                      <p:to>
+                                        <p:strVal val="visible"/>
+                                      </p:to>
+                                    </p:set>
+                                  </p:childTnLst>
+                                </p:cTn>
+                              </p:par>
+                            </p:childTnLst>
+                          </p:cTn>
+                        </p:par>
+                      </p:childTnLst>
+                    </p:cTn>
+                  </p:par>
+                  <p:par>
+                    <p:cTn id="7" fill="hold">
+                      <p:stCondLst>
+                        <p:cond delay="indefinite"/>
+                      </p:stCondLst>
+                      <p:childTnLst>
+                        <p:par>
+                          <p:cTn id="8" fill="hold">
+                            <p:stCondLst>
+                              <p:cond delay="0"/>
+                            </p:stCondLst>
+                            <p:childTnLst>
+                              <p:par>
+                                <p:cTn id="9" presetID="1" presetClass="entr" presetSubtype="0" fill="hold" nodeType="clickEffect">
+                                  <p:stCondLst>
+                                    <p:cond delay="0"/>
+                                  </p:stCondLst>
+                                  <p:childTnLst>
+                                    <p:set>
+                                      <p:cBhvr>
+                                        <p:cTn id="10" dur="1" fill="hold">
+                                          <p:stCondLst>
+                                            <p:cond delay="0"/>
+                                          </p:stCondLst>
+                                        </p:cTn>
+                                        <p:tgtEl>
+                                          <p:spTgt spid="7"/>
+                                        </p:tgtEl>
+                                        <p:attrNameLst>
+                                          <p:attrName>style.visibility</p:attrName>
+                                        </p:attrNameLst>
+                                      </p:cBhvr>
+                                      <p:to>
+                                        <p:strVal val="visible"/>
+                                      </p:to>
+                                    </p:set>
+                                  </p:childTnLst>
+                                </p:cTn>
+                              </p:par>
+                              <p:par>
+                                <p:cTn id="11" presetID="1" presetClass="exit" presetSubtype="0" fill="hold" nodeType="withEffect">
+                                  <p:stCondLst>
+                                    <p:cond delay="0"/>
+                                  </p:stCondLst>
+                                  <p:childTnLst>
+                                    <p:set>
+                                      <p:cBhvr>
+                                        <p:cTn id="12" dur="1" fill="hold">
+                                          <p:stCondLst>
+                                            <p:cond delay="0"/>
+                                          </p:stCondLst>
+                                        </p:cTn>
+                                        <p:tgtEl>
+                                          <p:spTgt spid="5"/>
+                                        </p:tgtEl>
+                                        <p:attrNameLst>
+                                          <p:attrName>style.visibility</p:attrName>
+                                        </p:attrNameLst>
+                                      </p:cBhvr>
+                                      <p:to>
+                                        <p:strVal val="hidden"/>
+                                      </p:to>
+                                    </p:set>
+                                  </p:childTnLst>
+                                </p:cTn>
+                              </p:par>
+                            </p:childTnLst>
+                          </p:cTn>
+                        </p:par>
+                      </p:childTnLst>
+                    </p:cTn>
+                  </p:par>
+                  <p:par>
+                    <p:cTn id="13" fill="hold">
+                      <p:stCondLst>
+                        <p:cond delay="indefinite"/>
+                      </p:stCondLst>
+                      <p:childTnLst>
+                        <p:par>
+                          <p:cTn id="14" fill="hold">
+                            <p:stCondLst>
+                              <p:cond delay="0"/>
+                            </p:stCondLst>
+                            <p:childTnLst>
+                              <p:par>
+                                <p:cTn id="15" presetID="1" presetClass="entr" presetSubtype="0" fill="hold" nodeType="clickEffect">
+                                  <p:stCondLst>
+                                    <p:cond delay="0"/>
+                                  </p:stCondLst>
+                                  <p:childTnLst>
+                                    <p:set>
+                                      <p:cBhvr>
+                                        <p:cTn id="16" dur="1" fill="hold">
+                                          <p:stCondLst>
+                                            <p:cond delay="0"/>
+                                          </p:stCondLst>
+                                        </p:cTn>
+                                        <p:tgtEl>
+                                          <p:spTgt spid="9"/>
+                                        </p:tgtEl>
+                                        <p:attrNameLst>
+                                          <p:attrName>style.visibility</p:attrName>
+                                        </p:attrNameLst>
+                                      </p:cBhvr>
+                                      <p:to>
+                                        <p:strVal val="visible"/>
+                                      </p:to>
+                                    </p:set>
+                                  </p:childTnLst>
+                                </p:cTn>
+                              </p:par>
+                            </p:childTnLst>
+                          </p:cTn>
+                        </p:par>
+                      </p:childTnLst>
+                    </p:cTn>
+                  </p:par>
+                </p:childTnLst>
+              </p:cTn>
+              <p:prevCondLst>
+                <p:cond evt="onPrev" delay="0">
+                  <p:tgtEl>
+                    <p:sldTgt/>
+                  </p:tgtEl>
+                </p:cond>
+              </p:prevCondLst>
+              <p:nextCondLst>
+                <p:cond evt="onNext" delay="0">
+                  <p:tgtEl>
+                    <p:sldTgt/>
+                  </p:tgtEl>
+                </p:cond>
+              </p:nextCondLst>
+            </p:seq>
+          </p:childTnLst>
+        </p:cTn>
+      </p:par>
+    </p:tnLst>
+  </p:timing>
+</p:sld>
+</file>
+
+<file path=ppt/slides/slide22.xml><?xml version="1.0" encoding="utf-8"?>
+<p:sld xmlns:a="http://schemas.openxmlformats.org/drawingml/2006/main" xmlns:r="http://schemas.openxmlformats.org/officeDocument/2006/relationships" xmlns:p="http://schemas.openxmlformats.org/presentationml/2006/main">
+  <p:cSld>
+    <p:spTree>
+      <p:nvGrpSpPr>
+        <p:cNvPr id="1" name=""/>
+        <p:cNvGrpSpPr/>
+        <p:nvPr/>
+      </p:nvGrpSpPr>
+      <p:grpSpPr>
+        <a:xfrm>
+          <a:off x="0" y="0"/>
+          <a:ext cx="0" cy="0"/>
+          <a:chOff x="0" y="0"/>
+          <a:chExt cx="0" cy="0"/>
+        </a:xfrm>
+      </p:grpSpPr>
+      <p:sp>
+        <p:nvSpPr>
+          <p:cNvPr id="2" name="Titre 1">
+            <a:extLst>
+              <a:ext uri="{FF2B5EF4-FFF2-40B4-BE49-F238E27FC236}">
                 <a16:creationId xmlns:a16="http://schemas.microsoft.com/office/drawing/2014/main" id="{8B8AA958-7EF5-4EB0-806C-74836A2B60F3}"/>
               </a:ext>
             </a:extLst>
@@ -8086,7 +9052,7 @@
           <a:p>
             <a:r>
               <a:rPr lang="fr-FR" dirty="0"/>
-              <a:t>Aucune erreur sur des problèmes autonome (précision machine)</a:t>
+              <a:t>Aucune erreur sur des problèmes linéaire (précision machine)</a:t>
             </a:r>
           </a:p>
           <a:p>
@@ -8328,91 +9294,15 @@
               <a:bodyPr/>
               <a:lstStyle/>
               <a:p>
-                <a14:m>
-                  <m:oMath xmlns:m="http://schemas.openxmlformats.org/officeDocument/2006/math">
-                    <m:f>
-                      <m:fPr>
-                        <m:ctrlPr>
-                          <a:rPr lang="fr-FR" i="1" smtClean="0">
-                            <a:latin typeface="Cambria Math" panose="02040503050406030204" pitchFamily="18" charset="0"/>
-                          </a:rPr>
-                        </m:ctrlPr>
-                      </m:fPr>
-                      <m:num>
-                        <m:r>
-                          <a:rPr lang="fr-FR" i="1" smtClean="0">
-                            <a:latin typeface="Cambria Math" panose="02040503050406030204" pitchFamily="18" charset="0"/>
-                          </a:rPr>
-                          <m:t>𝜕</m:t>
-                        </m:r>
-                        <m:r>
-                          <a:rPr lang="fr-FR" i="1" smtClean="0">
-                            <a:latin typeface="Cambria Math" panose="02040503050406030204" pitchFamily="18" charset="0"/>
-                          </a:rPr>
-                          <m:t>𝑦</m:t>
-                        </m:r>
-                      </m:num>
-                      <m:den>
-                        <m:r>
-                          <a:rPr lang="fr-FR" i="1" smtClean="0">
-                            <a:latin typeface="Cambria Math" panose="02040503050406030204" pitchFamily="18" charset="0"/>
-                          </a:rPr>
-                          <m:t>𝜕</m:t>
-                        </m:r>
-                        <m:r>
-                          <a:rPr lang="fr-FR" b="0" i="1" smtClean="0">
-                            <a:latin typeface="Cambria Math" panose="02040503050406030204" pitchFamily="18" charset="0"/>
-                          </a:rPr>
-                          <m:t>𝑡</m:t>
-                        </m:r>
-                      </m:den>
-                    </m:f>
-                    <m:r>
-                      <a:rPr lang="fr-FR" b="0" i="1" smtClean="0">
-                        <a:latin typeface="Cambria Math" panose="02040503050406030204" pitchFamily="18" charset="0"/>
-                      </a:rPr>
-                      <m:t>=</m:t>
-                    </m:r>
-                    <m:r>
-                      <a:rPr lang="fr-FR" b="0" i="1" smtClean="0">
-                        <a:latin typeface="Cambria Math" panose="02040503050406030204" pitchFamily="18" charset="0"/>
-                      </a:rPr>
-                      <m:t>𝑅𝐻𝑆</m:t>
-                    </m:r>
-                    <m:d>
-                      <m:dPr>
-                        <m:ctrlPr>
-                          <a:rPr lang="fr-FR" b="0" i="1" smtClean="0">
-                            <a:latin typeface="Cambria Math" panose="02040503050406030204" pitchFamily="18" charset="0"/>
-                          </a:rPr>
-                        </m:ctrlPr>
-                      </m:dPr>
-                      <m:e>
-                        <m:r>
-                          <a:rPr lang="fr-FR" b="0" i="1" smtClean="0">
-                            <a:latin typeface="Cambria Math" panose="02040503050406030204" pitchFamily="18" charset="0"/>
-                          </a:rPr>
-                          <m:t>𝑦</m:t>
-                        </m:r>
-                        <m:r>
-                          <a:rPr lang="fr-FR" b="0" i="1" smtClean="0">
-                            <a:latin typeface="Cambria Math" panose="02040503050406030204" pitchFamily="18" charset="0"/>
-                          </a:rPr>
-                          <m:t>,</m:t>
-                        </m:r>
-                        <m:r>
-                          <a:rPr lang="fr-FR" b="0" i="1" smtClean="0">
-                            <a:latin typeface="Cambria Math" panose="02040503050406030204" pitchFamily="18" charset="0"/>
-                          </a:rPr>
-                          <m:t>𝑡</m:t>
-                        </m:r>
-                      </m:e>
-                    </m:d>
-                  </m:oMath>
-                </a14:m>
+                <a:pPr marL="0" indent="0">
+                  <a:buNone/>
+                </a:pPr>
                 <a:endParaRPr lang="fr-FR" b="0" dirty="0"/>
               </a:p>
               <a:p>
+                <a:pPr marL="0" indent="0">
+                  <a:buNone/>
+                </a:pPr>
                 <a:endParaRPr lang="fr-FR" dirty="0"/>
               </a:p>
               <a:p>
@@ -8438,6 +9328,94 @@
                   <a:rPr lang="fr-FR" dirty="0"/>
                   <a:t>Programmation en python </a:t>
                 </a:r>
+              </a:p>
+              <a:p>
+                <a:endParaRPr lang="fr-FR" dirty="0"/>
+              </a:p>
+              <a:p>
+                <a14:m>
+                  <m:oMath xmlns:m="http://schemas.openxmlformats.org/officeDocument/2006/math">
+                    <m:f>
+                      <m:fPr>
+                        <m:ctrlPr>
+                          <a:rPr lang="fr-FR" i="1">
+                            <a:latin typeface="Cambria Math" panose="02040503050406030204" pitchFamily="18" charset="0"/>
+                          </a:rPr>
+                        </m:ctrlPr>
+                      </m:fPr>
+                      <m:num>
+                        <m:r>
+                          <a:rPr lang="fr-FR" i="1">
+                            <a:latin typeface="Cambria Math" panose="02040503050406030204" pitchFamily="18" charset="0"/>
+                          </a:rPr>
+                          <m:t>𝜕</m:t>
+                        </m:r>
+                        <m:r>
+                          <a:rPr lang="fr-FR" i="1">
+                            <a:latin typeface="Cambria Math" panose="02040503050406030204" pitchFamily="18" charset="0"/>
+                          </a:rPr>
+                          <m:t>𝑦</m:t>
+                        </m:r>
+                      </m:num>
+                      <m:den>
+                        <m:r>
+                          <a:rPr lang="fr-FR" i="1">
+                            <a:latin typeface="Cambria Math" panose="02040503050406030204" pitchFamily="18" charset="0"/>
+                          </a:rPr>
+                          <m:t>𝜕</m:t>
+                        </m:r>
+                        <m:r>
+                          <a:rPr lang="fr-FR" i="1">
+                            <a:latin typeface="Cambria Math" panose="02040503050406030204" pitchFamily="18" charset="0"/>
+                          </a:rPr>
+                          <m:t>𝑡</m:t>
+                        </m:r>
+                      </m:den>
+                    </m:f>
+                    <m:r>
+                      <a:rPr lang="fr-FR" i="1">
+                        <a:latin typeface="Cambria Math" panose="02040503050406030204" pitchFamily="18" charset="0"/>
+                      </a:rPr>
+                      <m:t>=</m:t>
+                    </m:r>
+                    <m:r>
+                      <a:rPr lang="fr-FR" i="1">
+                        <a:latin typeface="Cambria Math" panose="02040503050406030204" pitchFamily="18" charset="0"/>
+                      </a:rPr>
+                      <m:t>𝑅𝐻𝑆</m:t>
+                    </m:r>
+                    <m:d>
+                      <m:dPr>
+                        <m:ctrlPr>
+                          <a:rPr lang="fr-FR" i="1">
+                            <a:latin typeface="Cambria Math" panose="02040503050406030204" pitchFamily="18" charset="0"/>
+                          </a:rPr>
+                        </m:ctrlPr>
+                      </m:dPr>
+                      <m:e>
+                        <m:r>
+                          <a:rPr lang="fr-FR" i="1">
+                            <a:latin typeface="Cambria Math" panose="02040503050406030204" pitchFamily="18" charset="0"/>
+                          </a:rPr>
+                          <m:t>𝑦</m:t>
+                        </m:r>
+                        <m:r>
+                          <a:rPr lang="fr-FR" i="1">
+                            <a:latin typeface="Cambria Math" panose="02040503050406030204" pitchFamily="18" charset="0"/>
+                          </a:rPr>
+                          <m:t>,</m:t>
+                        </m:r>
+                        <m:r>
+                          <a:rPr lang="fr-FR" i="1">
+                            <a:latin typeface="Cambria Math" panose="02040503050406030204" pitchFamily="18" charset="0"/>
+                          </a:rPr>
+                          <m:t>𝑡</m:t>
+                        </m:r>
+                      </m:e>
+                    </m:d>
+                  </m:oMath>
+                </a14:m>
+                <a:endParaRPr lang="fr-FR" dirty="0"/>
               </a:p>
               <a:p>
                 <a:endParaRPr lang="fr-FR" dirty="0"/>
@@ -8523,7 +9501,7 @@
           <p:cNvPr id="2" name="Titre 1">
             <a:extLst>
               <a:ext uri="{FF2B5EF4-FFF2-40B4-BE49-F238E27FC236}">
-                <a16:creationId xmlns:a16="http://schemas.microsoft.com/office/drawing/2014/main" id="{87AA8248-2FC7-4DB4-B76F-CE3FEE666906}"/>
+                <a16:creationId xmlns:a16="http://schemas.microsoft.com/office/drawing/2014/main" id="{BC24BA0F-9D53-463F-94E5-89FCFEB0F3F5}"/>
               </a:ext>
             </a:extLst>
           </p:cNvPr>
@@ -8542,94 +9520,50 @@
             <a:pPr algn="ctr"/>
             <a:r>
               <a:rPr lang="fr-FR" dirty="0"/>
-              <a:t>II – Gestion de projet </a:t>
-            </a:r>
-            <a:br>
-              <a:rPr lang="fr-FR" dirty="0"/>
-            </a:br>
-            <a:r>
-              <a:rPr lang="fr-FR" sz="2800" dirty="0"/>
-              <a:t>Objectifs client</a:t>
-            </a:r>
-            <a:endParaRPr lang="fr-FR" dirty="0"/>
-          </a:p>
-        </p:txBody>
-      </p:sp>
-      <p:sp>
-        <p:nvSpPr>
-          <p:cNvPr id="3" name="Espace réservé du contenu 2">
+              <a:t>I - Introduction</a:t>
+            </a:r>
+          </a:p>
+        </p:txBody>
+      </p:sp>
+      <p:pic>
+        <p:nvPicPr>
+          <p:cNvPr id="5" name="Espace réservé du contenu 4">
             <a:extLst>
               <a:ext uri="{FF2B5EF4-FFF2-40B4-BE49-F238E27FC236}">
-                <a16:creationId xmlns:a16="http://schemas.microsoft.com/office/drawing/2014/main" id="{180EDACD-AC7E-4944-A8DC-529FEE578D6F}"/>
+                <a16:creationId xmlns:a16="http://schemas.microsoft.com/office/drawing/2014/main" id="{3A18DBDE-EF58-418B-B921-ED79F6280F78}"/>
               </a:ext>
             </a:extLst>
           </p:cNvPr>
-          <p:cNvSpPr>
-            <a:spLocks noGrp="1"/>
-          </p:cNvSpPr>
+          <p:cNvPicPr>
+            <a:picLocks noGrp="1" noChangeAspect="1"/>
+          </p:cNvPicPr>
           <p:nvPr>
             <p:ph idx="1"/>
           </p:nvPr>
-        </p:nvSpPr>
-        <p:spPr/>
-        <p:txBody>
-          <a:bodyPr/>
-          <a:lstStyle/>
-          <a:p>
-            <a:pPr lvl="0"/>
-            <a:r>
-              <a:rPr lang="fr-FR" dirty="0"/>
-              <a:t>Implémenter au moins une méthode d’intégration temporelle du type exponentielle</a:t>
-            </a:r>
-          </a:p>
-          <a:p>
-            <a:pPr marL="0" lvl="0" indent="0">
-              <a:buNone/>
-            </a:pPr>
-            <a:endParaRPr lang="fr-FR" dirty="0"/>
-          </a:p>
-          <a:p>
-            <a:pPr lvl="0"/>
-            <a:r>
-              <a:rPr lang="fr-FR" dirty="0"/>
-              <a:t>Coupler cette méthode avec la méthode spatiale des SD</a:t>
-            </a:r>
-          </a:p>
-          <a:p>
-            <a:pPr marL="0" lvl="0" indent="0">
-              <a:buNone/>
-            </a:pPr>
-            <a:endParaRPr lang="fr-FR" dirty="0"/>
-          </a:p>
-          <a:p>
-            <a:pPr lvl="0"/>
-            <a:r>
-              <a:rPr lang="fr-FR" dirty="0"/>
-              <a:t>Fournir et commenter le code</a:t>
-            </a:r>
-          </a:p>
-          <a:p>
-            <a:pPr marL="0" lvl="0" indent="0">
-              <a:buNone/>
-            </a:pPr>
-            <a:endParaRPr lang="fr-FR" dirty="0"/>
-          </a:p>
-          <a:p>
-            <a:pPr lvl="0"/>
-            <a:r>
-              <a:rPr lang="fr-FR" dirty="0"/>
-              <a:t>Donner les avantages et les inconvénients de la méthode par rapport aux méthodes classiques. </a:t>
-            </a:r>
-          </a:p>
-          <a:p>
-            <a:endParaRPr lang="fr-FR" dirty="0"/>
-          </a:p>
-        </p:txBody>
-      </p:sp>
+        </p:nvPicPr>
+        <p:blipFill>
+          <a:blip r:embed="rId2">
+            <a:extLst>
+              <a:ext uri="{28A0092B-C50C-407E-A947-70E740481C1C}">
+                <a14:useLocalDpi xmlns:a14="http://schemas.microsoft.com/office/drawing/2010/main" val="0"/>
+              </a:ext>
+            </a:extLst>
+          </a:blip>
+          <a:stretch>
+            <a:fillRect/>
+          </a:stretch>
+        </p:blipFill>
+        <p:spPr>
+          <a:xfrm>
+            <a:off x="2052321" y="2170282"/>
+            <a:ext cx="5847396" cy="3862048"/>
+          </a:xfrm>
+        </p:spPr>
+      </p:pic>
     </p:spTree>
     <p:extLst>
       <p:ext uri="{BB962C8B-B14F-4D97-AF65-F5344CB8AC3E}">
-        <p14:creationId xmlns:p14="http://schemas.microsoft.com/office/powerpoint/2010/main" val="129017208"/>
+        <p14:creationId xmlns:p14="http://schemas.microsoft.com/office/powerpoint/2010/main" val="2132634010"/>
       </p:ext>
     </p:extLst>
   </p:cSld>
@@ -8661,7 +9595,7 @@
           <p:cNvPr id="2" name="Titre 1">
             <a:extLst>
               <a:ext uri="{FF2B5EF4-FFF2-40B4-BE49-F238E27FC236}">
-                <a16:creationId xmlns:a16="http://schemas.microsoft.com/office/drawing/2014/main" id="{8DB6E984-1000-41D0-9BAD-8224D1D5B727}"/>
+                <a16:creationId xmlns:a16="http://schemas.microsoft.com/office/drawing/2014/main" id="{87AA8248-2FC7-4DB4-B76F-CE3FEE666906}"/>
               </a:ext>
             </a:extLst>
           </p:cNvPr>
@@ -8687,7 +9621,7 @@
             </a:br>
             <a:r>
               <a:rPr lang="fr-FR" sz="2800" dirty="0"/>
-              <a:t>Livrables attendus</a:t>
+              <a:t>Objectifs client</a:t>
             </a:r>
             <a:endParaRPr lang="fr-FR" dirty="0"/>
           </a:p>
@@ -8698,7 +9632,7 @@
           <p:cNvPr id="3" name="Espace réservé du contenu 2">
             <a:extLst>
               <a:ext uri="{FF2B5EF4-FFF2-40B4-BE49-F238E27FC236}">
-                <a16:creationId xmlns:a16="http://schemas.microsoft.com/office/drawing/2014/main" id="{D2C42D89-DA06-4B88-A1AF-550229405A0C}"/>
+                <a16:creationId xmlns:a16="http://schemas.microsoft.com/office/drawing/2014/main" id="{180EDACD-AC7E-4944-A8DC-529FEE578D6F}"/>
               </a:ext>
             </a:extLst>
           </p:cNvPr>
@@ -8717,18 +9651,7 @@
             <a:pPr lvl="0"/>
             <a:r>
               <a:rPr lang="fr-FR" dirty="0"/>
-              <a:t>Une maquette (python) dans laquelle les schémas sont implantés (à gérer sous GitHub) </a:t>
-            </a:r>
-          </a:p>
-          <a:p>
-            <a:pPr lvl="0"/>
-            <a:endParaRPr lang="fr-FR" dirty="0"/>
-          </a:p>
-          <a:p>
-            <a:pPr lvl="0"/>
-            <a:r>
-              <a:rPr lang="fr-FR" dirty="0"/>
-              <a:t>Plusieurs cas test  </a:t>
+              <a:t>Implémenter au moins une méthode d’intégration temporelle du type exponentielle</a:t>
             </a:r>
           </a:p>
           <a:p>
@@ -8741,18 +9664,33 @@
             <a:pPr lvl="0"/>
             <a:r>
               <a:rPr lang="fr-FR" dirty="0"/>
-              <a:t>Un rapport sur la comparaison croisée des schémas numériques (liste de recommandations ) </a:t>
-            </a:r>
+              <a:t>Coupler cette méthode avec la méthode spatiale des SD</a:t>
+            </a:r>
+          </a:p>
+          <a:p>
+            <a:pPr marL="0" lvl="0" indent="0">
+              <a:buNone/>
+            </a:pPr>
+            <a:endParaRPr lang="fr-FR" dirty="0"/>
           </a:p>
           <a:p>
             <a:pPr lvl="0"/>
+            <a:r>
+              <a:rPr lang="fr-FR" dirty="0"/>
+              <a:t>Fournir et commenter le code</a:t>
+            </a:r>
+          </a:p>
+          <a:p>
+            <a:pPr marL="0" lvl="0" indent="0">
+              <a:buNone/>
+            </a:pPr>
             <a:endParaRPr lang="fr-FR" dirty="0"/>
           </a:p>
           <a:p>
             <a:pPr lvl="0"/>
             <a:r>
               <a:rPr lang="fr-FR" dirty="0"/>
-              <a:t>Une présentation orale du travail effectué au cours du projet </a:t>
+              <a:t>Donner les avantages et les inconvénients de la méthode par rapport aux méthodes classiques. </a:t>
             </a:r>
           </a:p>
           <a:p>
@@ -8763,7 +9701,7 @@
     </p:spTree>
     <p:extLst>
       <p:ext uri="{BB962C8B-B14F-4D97-AF65-F5344CB8AC3E}">
-        <p14:creationId xmlns:p14="http://schemas.microsoft.com/office/powerpoint/2010/main" val="2572246735"/>
+        <p14:creationId xmlns:p14="http://schemas.microsoft.com/office/powerpoint/2010/main" val="129017208"/>
       </p:ext>
     </p:extLst>
   </p:cSld>
@@ -8795,7 +9733,7 @@
           <p:cNvPr id="2" name="Titre 1">
             <a:extLst>
               <a:ext uri="{FF2B5EF4-FFF2-40B4-BE49-F238E27FC236}">
-                <a16:creationId xmlns:a16="http://schemas.microsoft.com/office/drawing/2014/main" id="{2F4E9914-A102-49E3-9B09-BB7A13F49DD0}"/>
+                <a16:creationId xmlns:a16="http://schemas.microsoft.com/office/drawing/2014/main" id="{8DB6E984-1000-41D0-9BAD-8224D1D5B727}"/>
               </a:ext>
             </a:extLst>
           </p:cNvPr>
@@ -8814,14 +9752,14 @@
             <a:pPr algn="ctr"/>
             <a:r>
               <a:rPr lang="fr-FR" dirty="0"/>
-              <a:t>II – Gestion de projet</a:t>
+              <a:t>II – Gestion de projet </a:t>
             </a:r>
             <a:br>
               <a:rPr lang="fr-FR" dirty="0"/>
             </a:br>
             <a:r>
               <a:rPr lang="fr-FR" sz="2800" dirty="0"/>
-              <a:t>Organisation</a:t>
+              <a:t>Livrables attendus</a:t>
             </a:r>
             <a:endParaRPr lang="fr-FR" dirty="0"/>
           </a:p>
@@ -8829,10 +9767,10 @@
       </p:sp>
       <p:sp>
         <p:nvSpPr>
-          <p:cNvPr id="4" name="Espace réservé du contenu 3">
+          <p:cNvPr id="3" name="Espace réservé du contenu 2">
             <a:extLst>
               <a:ext uri="{FF2B5EF4-FFF2-40B4-BE49-F238E27FC236}">
-                <a16:creationId xmlns:a16="http://schemas.microsoft.com/office/drawing/2014/main" id="{8C412395-3E7D-4827-B89D-D10AF7A53A97}"/>
+                <a16:creationId xmlns:a16="http://schemas.microsoft.com/office/drawing/2014/main" id="{D2C42D89-DA06-4B88-A1AF-550229405A0C}"/>
               </a:ext>
             </a:extLst>
           </p:cNvPr>
@@ -8840,140 +9778,64 @@
             <a:spLocks noGrp="1"/>
           </p:cNvSpPr>
           <p:nvPr>
-            <p:ph sz="half" idx="2"/>
-          </p:nvPr>
-        </p:nvSpPr>
-        <p:spPr>
-          <a:xfrm>
-            <a:off x="675745" y="2160983"/>
-            <a:ext cx="4185623" cy="3880379"/>
-          </a:xfrm>
-        </p:spPr>
+            <p:ph idx="1"/>
+          </p:nvPr>
+        </p:nvSpPr>
+        <p:spPr/>
         <p:txBody>
           <a:bodyPr/>
           <a:lstStyle/>
           <a:p>
+            <a:pPr lvl="0"/>
             <a:r>
               <a:rPr lang="fr-FR" dirty="0"/>
-              <a:t>Répartition en 2 équipes </a:t>
-            </a:r>
-          </a:p>
-          <a:p>
+              <a:t>Une maquette (python) dans laquelle les schémas sont implantés (à gérer sous GitHub) </a:t>
+            </a:r>
+          </a:p>
+          <a:p>
+            <a:pPr lvl="0"/>
+            <a:endParaRPr lang="fr-FR" dirty="0"/>
+          </a:p>
+          <a:p>
+            <a:pPr lvl="0"/>
             <a:r>
               <a:rPr lang="fr-FR" dirty="0"/>
-              <a:t>Répondre aux 2 principaux objectifs du client </a:t>
-            </a:r>
-          </a:p>
-          <a:p>
+              <a:t>Plusieurs cas test  </a:t>
+            </a:r>
+          </a:p>
+          <a:p>
+            <a:pPr marL="0" lvl="0" indent="0">
+              <a:buNone/>
+            </a:pPr>
+            <a:endParaRPr lang="fr-FR" dirty="0"/>
+          </a:p>
+          <a:p>
+            <a:pPr lvl="0"/>
             <a:r>
               <a:rPr lang="fr-FR" dirty="0"/>
-              <a:t>Gain de temps sur la partie couplage</a:t>
-            </a:r>
-          </a:p>
-          <a:p>
+              <a:t>Un rapport sur la comparaison croisée des schémas numériques (liste de recommandations ) </a:t>
+            </a:r>
+          </a:p>
+          <a:p>
+            <a:pPr lvl="0"/>
+            <a:endParaRPr lang="fr-FR" dirty="0"/>
+          </a:p>
+          <a:p>
+            <a:pPr lvl="0"/>
             <a:r>
               <a:rPr lang="fr-FR" dirty="0"/>
-              <a:t>Difficulté sur la partie implémentation d’une méthode</a:t>
-            </a:r>
-          </a:p>
-          <a:p>
-            <a:r>
-              <a:rPr lang="fr-FR" dirty="0"/>
-              <a:t>   Changement temporaire d’équipe. </a:t>
+              <a:t>Une présentation orale du travail effectué au cours du projet </a:t>
             </a:r>
           </a:p>
           <a:p>
             <a:endParaRPr lang="fr-FR" dirty="0"/>
-          </a:p>
-          <a:p>
-            <a:endParaRPr lang="fr-FR" dirty="0"/>
-          </a:p>
-        </p:txBody>
-      </p:sp>
-      <p:pic>
-        <p:nvPicPr>
-          <p:cNvPr id="7" name="image6.png">
-            <a:extLst>
-              <a:ext uri="{FF2B5EF4-FFF2-40B4-BE49-F238E27FC236}">
-                <a16:creationId xmlns:a16="http://schemas.microsoft.com/office/drawing/2014/main" id="{C0C77CD7-A252-41BA-924C-91383B1D9AA9}"/>
-              </a:ext>
-            </a:extLst>
-          </p:cNvPr>
-          <p:cNvPicPr>
-            <a:picLocks noGrp="1"/>
-          </p:cNvPicPr>
-          <p:nvPr>
-            <p:ph sz="quarter" idx="4"/>
-          </p:nvPr>
-        </p:nvPicPr>
-        <p:blipFill>
-          <a:blip r:embed="rId2"/>
-          <a:srcRect/>
-          <a:stretch>
-            <a:fillRect/>
-          </a:stretch>
-        </p:blipFill>
-        <p:spPr>
-          <a:xfrm>
-            <a:off x="5141204" y="2160983"/>
-            <a:ext cx="4934951" cy="3304116"/>
-          </a:xfrm>
-          <a:prstGeom prst="rect">
-            <a:avLst/>
-          </a:prstGeom>
-          <a:ln/>
-        </p:spPr>
-      </p:pic>
-      <p:sp>
-        <p:nvSpPr>
-          <p:cNvPr id="8" name="Flèche : droite 7">
-            <a:extLst>
-              <a:ext uri="{FF2B5EF4-FFF2-40B4-BE49-F238E27FC236}">
-                <a16:creationId xmlns:a16="http://schemas.microsoft.com/office/drawing/2014/main" id="{4F1978B8-9DC2-4CC4-87B0-445F4B061D10}"/>
-              </a:ext>
-            </a:extLst>
-          </p:cNvPr>
-          <p:cNvSpPr/>
-          <p:nvPr/>
-        </p:nvSpPr>
-        <p:spPr>
-          <a:xfrm>
-            <a:off x="765794" y="4640663"/>
-            <a:ext cx="470516" cy="348588"/>
-          </a:xfrm>
-          <a:prstGeom prst="rightArrow">
-            <a:avLst/>
-          </a:prstGeom>
-        </p:spPr>
-        <p:style>
-          <a:lnRef idx="2">
-            <a:schemeClr val="accent1">
-              <a:shade val="50000"/>
-            </a:schemeClr>
-          </a:lnRef>
-          <a:fillRef idx="1">
-            <a:schemeClr val="accent1"/>
-          </a:fillRef>
-          <a:effectRef idx="0">
-            <a:schemeClr val="accent1"/>
-          </a:effectRef>
-          <a:fontRef idx="minor">
-            <a:schemeClr val="lt1"/>
-          </a:fontRef>
-        </p:style>
-        <p:txBody>
-          <a:bodyPr rtlCol="0" anchor="ctr"/>
-          <a:lstStyle/>
-          <a:p>
-            <a:pPr algn="ctr"/>
-            <a:endParaRPr lang="fr-FR"/>
           </a:p>
         </p:txBody>
       </p:sp>
     </p:spTree>
     <p:extLst>
       <p:ext uri="{BB962C8B-B14F-4D97-AF65-F5344CB8AC3E}">
-        <p14:creationId xmlns:p14="http://schemas.microsoft.com/office/powerpoint/2010/main" val="308474648"/>
+        <p14:creationId xmlns:p14="http://schemas.microsoft.com/office/powerpoint/2010/main" val="2572246735"/>
       </p:ext>
     </p:extLst>
   </p:cSld>
@@ -9005,7 +9867,7 @@
           <p:cNvPr id="2" name="Titre 1">
             <a:extLst>
               <a:ext uri="{FF2B5EF4-FFF2-40B4-BE49-F238E27FC236}">
-                <a16:creationId xmlns:a16="http://schemas.microsoft.com/office/drawing/2014/main" id="{8DB6E984-1000-41D0-9BAD-8224D1D5B727}"/>
+                <a16:creationId xmlns:a16="http://schemas.microsoft.com/office/drawing/2014/main" id="{2F4E9914-A102-49E3-9B09-BB7A13F49DD0}"/>
               </a:ext>
             </a:extLst>
           </p:cNvPr>
@@ -9016,12 +9878,7 @@
             <p:ph type="title"/>
           </p:nvPr>
         </p:nvSpPr>
-        <p:spPr>
-          <a:xfrm>
-            <a:off x="695089" y="110971"/>
-            <a:ext cx="8596668" cy="1320800"/>
-          </a:xfrm>
-        </p:spPr>
+        <p:spPr/>
         <p:txBody>
           <a:bodyPr/>
           <a:lstStyle/>
@@ -9029,24 +9886,88 @@
             <a:pPr algn="ctr"/>
             <a:r>
               <a:rPr lang="fr-FR" dirty="0"/>
-              <a:t>II – Gestion de projet </a:t>
+              <a:t>II – Gestion de projet</a:t>
             </a:r>
             <a:br>
               <a:rPr lang="fr-FR" dirty="0"/>
             </a:br>
             <a:r>
+              <a:rPr lang="fr-FR" sz="2800" dirty="0"/>
+              <a:t>Organisation</a:t>
+            </a:r>
+            <a:endParaRPr lang="fr-FR" dirty="0"/>
+          </a:p>
+        </p:txBody>
+      </p:sp>
+      <p:sp>
+        <p:nvSpPr>
+          <p:cNvPr id="4" name="Espace réservé du contenu 3">
+            <a:extLst>
+              <a:ext uri="{FF2B5EF4-FFF2-40B4-BE49-F238E27FC236}">
+                <a16:creationId xmlns:a16="http://schemas.microsoft.com/office/drawing/2014/main" id="{8C412395-3E7D-4827-B89D-D10AF7A53A97}"/>
+              </a:ext>
+            </a:extLst>
+          </p:cNvPr>
+          <p:cNvSpPr>
+            <a:spLocks noGrp="1"/>
+          </p:cNvSpPr>
+          <p:nvPr>
+            <p:ph sz="half" idx="2"/>
+          </p:nvPr>
+        </p:nvSpPr>
+        <p:spPr>
+          <a:xfrm>
+            <a:off x="675745" y="2160983"/>
+            <a:ext cx="4185623" cy="3880379"/>
+          </a:xfrm>
+        </p:spPr>
+        <p:txBody>
+          <a:bodyPr/>
+          <a:lstStyle/>
+          <a:p>
+            <a:r>
               <a:rPr lang="fr-FR" dirty="0"/>
-              <a:t>Diagramme de Gantt initial</a:t>
-            </a:r>
+              <a:t>Répartition en 2 équipes </a:t>
+            </a:r>
+          </a:p>
+          <a:p>
+            <a:r>
+              <a:rPr lang="fr-FR" dirty="0"/>
+              <a:t>Répondre aux 2 principaux objectifs du client </a:t>
+            </a:r>
+          </a:p>
+          <a:p>
+            <a:r>
+              <a:rPr lang="fr-FR" dirty="0"/>
+              <a:t>Gain de temps sur la partie couplage</a:t>
+            </a:r>
+          </a:p>
+          <a:p>
+            <a:r>
+              <a:rPr lang="fr-FR" dirty="0"/>
+              <a:t>Difficulté sur la partie implémentation d’une méthode</a:t>
+            </a:r>
+          </a:p>
+          <a:p>
+            <a:r>
+              <a:rPr lang="fr-FR" dirty="0"/>
+              <a:t>   Changement temporaire d’équipe. </a:t>
+            </a:r>
+          </a:p>
+          <a:p>
+            <a:endParaRPr lang="fr-FR" dirty="0"/>
+          </a:p>
+          <a:p>
+            <a:endParaRPr lang="fr-FR" dirty="0"/>
           </a:p>
         </p:txBody>
       </p:sp>
       <p:pic>
         <p:nvPicPr>
-          <p:cNvPr id="4" name="image3.png">
+          <p:cNvPr id="7" name="image6.png">
             <a:extLst>
               <a:ext uri="{FF2B5EF4-FFF2-40B4-BE49-F238E27FC236}">
-                <a16:creationId xmlns:a16="http://schemas.microsoft.com/office/drawing/2014/main" id="{AF5DA36B-4B61-44E0-B6CA-383B78BFE83A}"/>
+                <a16:creationId xmlns:a16="http://schemas.microsoft.com/office/drawing/2014/main" id="{C0C77CD7-A252-41BA-924C-91383B1D9AA9}"/>
               </a:ext>
             </a:extLst>
           </p:cNvPr>
@@ -9054,7 +9975,7 @@
             <a:picLocks noGrp="1"/>
           </p:cNvPicPr>
           <p:nvPr>
-            <p:ph idx="1"/>
+            <p:ph sz="quarter" idx="4"/>
           </p:nvPr>
         </p:nvPicPr>
         <p:blipFill>
@@ -9066,8 +9987,8 @@
         </p:blipFill>
         <p:spPr>
           <a:xfrm>
-            <a:off x="168676" y="1431771"/>
-            <a:ext cx="11523215" cy="5253114"/>
+            <a:off x="5141204" y="2160983"/>
+            <a:ext cx="4934951" cy="3304116"/>
           </a:xfrm>
           <a:prstGeom prst="rect">
             <a:avLst/>
@@ -9075,10 +9996,56 @@
           <a:ln/>
         </p:spPr>
       </p:pic>
+      <p:sp>
+        <p:nvSpPr>
+          <p:cNvPr id="8" name="Flèche : droite 7">
+            <a:extLst>
+              <a:ext uri="{FF2B5EF4-FFF2-40B4-BE49-F238E27FC236}">
+                <a16:creationId xmlns:a16="http://schemas.microsoft.com/office/drawing/2014/main" id="{4F1978B8-9DC2-4CC4-87B0-445F4B061D10}"/>
+              </a:ext>
+            </a:extLst>
+          </p:cNvPr>
+          <p:cNvSpPr/>
+          <p:nvPr/>
+        </p:nvSpPr>
+        <p:spPr>
+          <a:xfrm>
+            <a:off x="765794" y="4640663"/>
+            <a:ext cx="470516" cy="348588"/>
+          </a:xfrm>
+          <a:prstGeom prst="rightArrow">
+            <a:avLst/>
+          </a:prstGeom>
+        </p:spPr>
+        <p:style>
+          <a:lnRef idx="2">
+            <a:schemeClr val="accent1">
+              <a:shade val="50000"/>
+            </a:schemeClr>
+          </a:lnRef>
+          <a:fillRef idx="1">
+            <a:schemeClr val="accent1"/>
+          </a:fillRef>
+          <a:effectRef idx="0">
+            <a:schemeClr val="accent1"/>
+          </a:effectRef>
+          <a:fontRef idx="minor">
+            <a:schemeClr val="lt1"/>
+          </a:fontRef>
+        </p:style>
+        <p:txBody>
+          <a:bodyPr rtlCol="0" anchor="ctr"/>
+          <a:lstStyle/>
+          <a:p>
+            <a:pPr algn="ctr"/>
+            <a:endParaRPr lang="fr-FR"/>
+          </a:p>
+        </p:txBody>
+      </p:sp>
     </p:spTree>
     <p:extLst>
       <p:ext uri="{BB962C8B-B14F-4D97-AF65-F5344CB8AC3E}">
-        <p14:creationId xmlns:p14="http://schemas.microsoft.com/office/powerpoint/2010/main" val="1880120633"/>
+        <p14:creationId xmlns:p14="http://schemas.microsoft.com/office/powerpoint/2010/main" val="308474648"/>
       </p:ext>
     </p:extLst>
   </p:cSld>
@@ -9141,50 +10108,49 @@
             </a:br>
             <a:r>
               <a:rPr lang="fr-FR" dirty="0"/>
-              <a:t>Diagramme de Gantt « final »</a:t>
+              <a:t>Diagramme de Gantt initial</a:t>
             </a:r>
           </a:p>
         </p:txBody>
       </p:sp>
       <p:pic>
         <p:nvPicPr>
-          <p:cNvPr id="6" name="Espace réservé du contenu 7">
+          <p:cNvPr id="4" name="image3.png">
             <a:extLst>
               <a:ext uri="{FF2B5EF4-FFF2-40B4-BE49-F238E27FC236}">
-                <a16:creationId xmlns:a16="http://schemas.microsoft.com/office/drawing/2014/main" id="{30805947-EB13-4CE1-AA67-545007F33662}"/>
+                <a16:creationId xmlns:a16="http://schemas.microsoft.com/office/drawing/2014/main" id="{AF5DA36B-4B61-44E0-B6CA-383B78BFE83A}"/>
               </a:ext>
             </a:extLst>
           </p:cNvPr>
           <p:cNvPicPr>
-            <a:picLocks noGrp="1" noChangeAspect="1"/>
+            <a:picLocks noGrp="1"/>
           </p:cNvPicPr>
           <p:nvPr>
             <p:ph idx="1"/>
           </p:nvPr>
         </p:nvPicPr>
         <p:blipFill>
-          <a:blip r:embed="rId2">
-            <a:extLst>
-              <a:ext uri="{28A0092B-C50C-407E-A947-70E740481C1C}">
-                <a14:useLocalDpi xmlns:a14="http://schemas.microsoft.com/office/drawing/2010/main" val="0"/>
-              </a:ext>
-            </a:extLst>
-          </a:blip>
+          <a:blip r:embed="rId2"/>
+          <a:srcRect/>
           <a:stretch>
             <a:fillRect/>
           </a:stretch>
         </p:blipFill>
         <p:spPr>
           <a:xfrm>
-            <a:off x="695089" y="1322773"/>
-            <a:ext cx="11079331" cy="5356094"/>
+            <a:off x="168676" y="1431771"/>
+            <a:ext cx="11523215" cy="5253114"/>
           </a:xfrm>
+          <a:prstGeom prst="rect">
+            <a:avLst/>
+          </a:prstGeom>
+          <a:ln/>
         </p:spPr>
       </p:pic>
     </p:spTree>
     <p:extLst>
       <p:ext uri="{BB962C8B-B14F-4D97-AF65-F5344CB8AC3E}">
-        <p14:creationId xmlns:p14="http://schemas.microsoft.com/office/powerpoint/2010/main" val="849679488"/>
+        <p14:creationId xmlns:p14="http://schemas.microsoft.com/office/powerpoint/2010/main" val="1880120633"/>
       </p:ext>
     </p:extLst>
   </p:cSld>

</xml_diff>

<commit_message>
Adding some eqs to oral presentation
</commit_message>
<xml_diff>
--- a/oral_presentation/Oral_presentation_12_02_2019.pptx
+++ b/oral_presentation/Oral_presentation_12_02_2019.pptx
@@ -5,7 +5,7 @@
     <p:sldMasterId id="2147483677" r:id="rId1"/>
   </p:sldMasterIdLst>
   <p:notesMasterIdLst>
-    <p:notesMasterId r:id="rId28"/>
+    <p:notesMasterId r:id="rId29"/>
   </p:notesMasterIdLst>
   <p:sldIdLst>
     <p:sldId id="256" r:id="rId2"/>
@@ -28,12 +28,13 @@
     <p:sldId id="273" r:id="rId19"/>
     <p:sldId id="275" r:id="rId20"/>
     <p:sldId id="276" r:id="rId21"/>
-    <p:sldId id="277" r:id="rId22"/>
-    <p:sldId id="281" r:id="rId23"/>
-    <p:sldId id="286" r:id="rId24"/>
-    <p:sldId id="279" r:id="rId25"/>
-    <p:sldId id="287" r:id="rId26"/>
-    <p:sldId id="280" r:id="rId27"/>
+    <p:sldId id="288" r:id="rId22"/>
+    <p:sldId id="277" r:id="rId23"/>
+    <p:sldId id="281" r:id="rId24"/>
+    <p:sldId id="286" r:id="rId25"/>
+    <p:sldId id="279" r:id="rId26"/>
+    <p:sldId id="287" r:id="rId27"/>
+    <p:sldId id="280" r:id="rId28"/>
   </p:sldIdLst>
   <p:sldSz cx="12192000" cy="6858000"/>
   <p:notesSz cx="6858000" cy="9144000"/>
@@ -134,7 +135,7 @@
   </p:defaultTextStyle>
   <p:extLst>
     <p:ext uri="{EFAFB233-063F-42B5-8137-9DF3F51BA10A}">
-      <p15:sldGuideLst xmlns:p15="http://schemas.microsoft.com/office/powerpoint/2012/main"/>
+      <p15:sldGuideLst xmlns:p15="http://schemas.microsoft.com/office/powerpoint/2012/main" xmlns=""/>
     </p:ext>
   </p:extLst>
 </p:presentation>
@@ -222,7 +223,8 @@
           <a:p>
             <a:fld id="{56ADCF75-9FA8-4B5E-89AC-8EA488A0C9C6}" type="datetimeFigureOut">
               <a:rPr lang="fr-FR" smtClean="0"/>
-              <a:t>12/02/2019</a:t>
+              <a:pPr/>
+              <a:t>20/02/2019</a:t>
             </a:fld>
             <a:endParaRPr lang="fr-FR"/>
           </a:p>
@@ -380,7 +382,8 @@
           <a:p>
             <a:fld id="{EE68C684-0D5A-433E-9D44-475EB8B197BE}" type="slidenum">
               <a:rPr lang="fr-FR" smtClean="0"/>
-              <a:t>‹N°›</a:t>
+              <a:pPr/>
+              <a:t>‹Nº›</a:t>
             </a:fld>
             <a:endParaRPr lang="fr-FR"/>
           </a:p>
@@ -389,7 +392,7 @@
     </p:spTree>
     <p:extLst>
       <p:ext uri="{BB962C8B-B14F-4D97-AF65-F5344CB8AC3E}">
-        <p14:creationId xmlns:p14="http://schemas.microsoft.com/office/powerpoint/2010/main" val="2768550619"/>
+        <p14:creationId xmlns:p14="http://schemas.microsoft.com/office/powerpoint/2010/main" xmlns="" val="2768550619"/>
       </p:ext>
     </p:extLst>
   </p:cSld>
@@ -1234,7 +1237,8 @@
           <a:p>
             <a:fld id="{89DE9712-09E9-407E-A1FD-F5C2C5E766F2}" type="datetime1">
               <a:rPr lang="fr-FR" smtClean="0"/>
-              <a:t>12/02/2019</a:t>
+              <a:pPr/>
+              <a:t>20/02/2019</a:t>
             </a:fld>
             <a:endParaRPr lang="fr-FR"/>
           </a:p>
@@ -1276,7 +1280,8 @@
           <a:p>
             <a:fld id="{000982F6-AAAD-4258-B115-44D8EC280712}" type="slidenum">
               <a:rPr lang="fr-FR" smtClean="0"/>
-              <a:t>‹N°›</a:t>
+              <a:pPr/>
+              <a:t>‹Nº›</a:t>
             </a:fld>
             <a:endParaRPr lang="fr-FR"/>
           </a:p>
@@ -1285,7 +1290,7 @@
     </p:spTree>
     <p:extLst>
       <p:ext uri="{BB962C8B-B14F-4D97-AF65-F5344CB8AC3E}">
-        <p14:creationId xmlns:p14="http://schemas.microsoft.com/office/powerpoint/2010/main" val="3344104296"/>
+        <p14:creationId xmlns:p14="http://schemas.microsoft.com/office/powerpoint/2010/main" xmlns="" val="3344104296"/>
       </p:ext>
     </p:extLst>
   </p:cSld>
@@ -1485,7 +1490,8 @@
           <a:p>
             <a:fld id="{1EA571E9-F197-408D-A002-C7CB11937ADF}" type="datetime1">
               <a:rPr lang="fr-FR" smtClean="0"/>
-              <a:t>12/02/2019</a:t>
+              <a:pPr/>
+              <a:t>20/02/2019</a:t>
             </a:fld>
             <a:endParaRPr lang="fr-FR"/>
           </a:p>
@@ -1527,7 +1533,8 @@
           <a:p>
             <a:fld id="{000982F6-AAAD-4258-B115-44D8EC280712}" type="slidenum">
               <a:rPr lang="fr-FR" smtClean="0"/>
-              <a:t>‹N°›</a:t>
+              <a:pPr/>
+              <a:t>‹Nº›</a:t>
             </a:fld>
             <a:endParaRPr lang="fr-FR"/>
           </a:p>
@@ -1536,7 +1543,7 @@
     </p:spTree>
     <p:extLst>
       <p:ext uri="{BB962C8B-B14F-4D97-AF65-F5344CB8AC3E}">
-        <p14:creationId xmlns:p14="http://schemas.microsoft.com/office/powerpoint/2010/main" val="3118303151"/>
+        <p14:creationId xmlns:p14="http://schemas.microsoft.com/office/powerpoint/2010/main" xmlns="" val="3118303151"/>
       </p:ext>
     </p:extLst>
   </p:cSld>
@@ -1799,7 +1806,8 @@
           <a:p>
             <a:fld id="{BD56AC79-BDEC-4E9A-8490-EFD625A2113C}" type="datetime1">
               <a:rPr lang="fr-FR" smtClean="0"/>
-              <a:t>12/02/2019</a:t>
+              <a:pPr/>
+              <a:t>20/02/2019</a:t>
             </a:fld>
             <a:endParaRPr lang="fr-FR"/>
           </a:p>
@@ -1841,7 +1849,8 @@
           <a:p>
             <a:fld id="{000982F6-AAAD-4258-B115-44D8EC280712}" type="slidenum">
               <a:rPr lang="fr-FR" smtClean="0"/>
-              <a:t>‹N°›</a:t>
+              <a:pPr/>
+              <a:t>‹Nº›</a:t>
             </a:fld>
             <a:endParaRPr lang="fr-FR"/>
           </a:p>
@@ -1932,7 +1941,7 @@
     </p:spTree>
     <p:extLst>
       <p:ext uri="{BB962C8B-B14F-4D97-AF65-F5344CB8AC3E}">
-        <p14:creationId xmlns:p14="http://schemas.microsoft.com/office/powerpoint/2010/main" val="2191588136"/>
+        <p14:creationId xmlns:p14="http://schemas.microsoft.com/office/powerpoint/2010/main" xmlns="" val="2191588136"/>
       </p:ext>
     </p:extLst>
   </p:cSld>
@@ -2132,7 +2141,8 @@
           <a:p>
             <a:fld id="{BDFDD02D-B74E-4E50-ACE1-7DC01A48810E}" type="datetime1">
               <a:rPr lang="fr-FR" smtClean="0"/>
-              <a:t>12/02/2019</a:t>
+              <a:pPr/>
+              <a:t>20/02/2019</a:t>
             </a:fld>
             <a:endParaRPr lang="fr-FR"/>
           </a:p>
@@ -2174,7 +2184,8 @@
           <a:p>
             <a:fld id="{000982F6-AAAD-4258-B115-44D8EC280712}" type="slidenum">
               <a:rPr lang="fr-FR" smtClean="0"/>
-              <a:t>‹N°›</a:t>
+              <a:pPr/>
+              <a:t>‹Nº›</a:t>
             </a:fld>
             <a:endParaRPr lang="fr-FR"/>
           </a:p>
@@ -2183,7 +2194,7 @@
     </p:spTree>
     <p:extLst>
       <p:ext uri="{BB962C8B-B14F-4D97-AF65-F5344CB8AC3E}">
-        <p14:creationId xmlns:p14="http://schemas.microsoft.com/office/powerpoint/2010/main" val="1959268983"/>
+        <p14:creationId xmlns:p14="http://schemas.microsoft.com/office/powerpoint/2010/main" xmlns="" val="1959268983"/>
       </p:ext>
     </p:extLst>
   </p:cSld>
@@ -2446,7 +2457,8 @@
           <a:p>
             <a:fld id="{816C6CB9-D7B5-4C0B-B0D6-2259E77C28C5}" type="datetime1">
               <a:rPr lang="fr-FR" smtClean="0"/>
-              <a:t>12/02/2019</a:t>
+              <a:pPr/>
+              <a:t>20/02/2019</a:t>
             </a:fld>
             <a:endParaRPr lang="fr-FR"/>
           </a:p>
@@ -2488,7 +2500,8 @@
           <a:p>
             <a:fld id="{000982F6-AAAD-4258-B115-44D8EC280712}" type="slidenum">
               <a:rPr lang="fr-FR" smtClean="0"/>
-              <a:t>‹N°›</a:t>
+              <a:pPr/>
+              <a:t>‹Nº›</a:t>
             </a:fld>
             <a:endParaRPr lang="fr-FR"/>
           </a:p>
@@ -2579,7 +2592,7 @@
     </p:spTree>
     <p:extLst>
       <p:ext uri="{BB962C8B-B14F-4D97-AF65-F5344CB8AC3E}">
-        <p14:creationId xmlns:p14="http://schemas.microsoft.com/office/powerpoint/2010/main" val="3454582472"/>
+        <p14:creationId xmlns:p14="http://schemas.microsoft.com/office/powerpoint/2010/main" xmlns="" val="3454582472"/>
       </p:ext>
     </p:extLst>
   </p:cSld>
@@ -2839,7 +2852,8 @@
           <a:p>
             <a:fld id="{D7649D92-D288-4ABD-A423-47AFF391697D}" type="datetime1">
               <a:rPr lang="fr-FR" smtClean="0"/>
-              <a:t>12/02/2019</a:t>
+              <a:pPr/>
+              <a:t>20/02/2019</a:t>
             </a:fld>
             <a:endParaRPr lang="fr-FR"/>
           </a:p>
@@ -2881,7 +2895,8 @@
           <a:p>
             <a:fld id="{000982F6-AAAD-4258-B115-44D8EC280712}" type="slidenum">
               <a:rPr lang="fr-FR" smtClean="0"/>
-              <a:t>‹N°›</a:t>
+              <a:pPr/>
+              <a:t>‹Nº›</a:t>
             </a:fld>
             <a:endParaRPr lang="fr-FR"/>
           </a:p>
@@ -2890,7 +2905,7 @@
     </p:spTree>
     <p:extLst>
       <p:ext uri="{BB962C8B-B14F-4D97-AF65-F5344CB8AC3E}">
-        <p14:creationId xmlns:p14="http://schemas.microsoft.com/office/powerpoint/2010/main" val="1087781599"/>
+        <p14:creationId xmlns:p14="http://schemas.microsoft.com/office/powerpoint/2010/main" xmlns="" val="1087781599"/>
       </p:ext>
     </p:extLst>
   </p:cSld>
@@ -3009,7 +3024,8 @@
           <a:p>
             <a:fld id="{32C16C4E-CE6B-4126-99D6-47659C184675}" type="datetime1">
               <a:rPr lang="fr-FR" smtClean="0"/>
-              <a:t>12/02/2019</a:t>
+              <a:pPr/>
+              <a:t>20/02/2019</a:t>
             </a:fld>
             <a:endParaRPr lang="fr-FR"/>
           </a:p>
@@ -3051,7 +3067,8 @@
           <a:p>
             <a:fld id="{000982F6-AAAD-4258-B115-44D8EC280712}" type="slidenum">
               <a:rPr lang="fr-FR" smtClean="0"/>
-              <a:t>‹N°›</a:t>
+              <a:pPr/>
+              <a:t>‹Nº›</a:t>
             </a:fld>
             <a:endParaRPr lang="fr-FR"/>
           </a:p>
@@ -3060,7 +3077,7 @@
     </p:spTree>
     <p:extLst>
       <p:ext uri="{BB962C8B-B14F-4D97-AF65-F5344CB8AC3E}">
-        <p14:creationId xmlns:p14="http://schemas.microsoft.com/office/powerpoint/2010/main" val="1938243915"/>
+        <p14:creationId xmlns:p14="http://schemas.microsoft.com/office/powerpoint/2010/main" xmlns="" val="1938243915"/>
       </p:ext>
     </p:extLst>
   </p:cSld>
@@ -3189,7 +3206,8 @@
           <a:p>
             <a:fld id="{1F51B9D7-346C-4256-8C4C-EAA818213197}" type="datetime1">
               <a:rPr lang="fr-FR" smtClean="0"/>
-              <a:t>12/02/2019</a:t>
+              <a:pPr/>
+              <a:t>20/02/2019</a:t>
             </a:fld>
             <a:endParaRPr lang="fr-FR"/>
           </a:p>
@@ -3231,7 +3249,8 @@
           <a:p>
             <a:fld id="{000982F6-AAAD-4258-B115-44D8EC280712}" type="slidenum">
               <a:rPr lang="fr-FR" smtClean="0"/>
-              <a:t>‹N°›</a:t>
+              <a:pPr/>
+              <a:t>‹Nº›</a:t>
             </a:fld>
             <a:endParaRPr lang="fr-FR"/>
           </a:p>
@@ -3240,7 +3259,7 @@
     </p:spTree>
     <p:extLst>
       <p:ext uri="{BB962C8B-B14F-4D97-AF65-F5344CB8AC3E}">
-        <p14:creationId xmlns:p14="http://schemas.microsoft.com/office/powerpoint/2010/main" val="4185667816"/>
+        <p14:creationId xmlns:p14="http://schemas.microsoft.com/office/powerpoint/2010/main" xmlns="" val="4185667816"/>
       </p:ext>
     </p:extLst>
   </p:cSld>
@@ -3359,7 +3378,8 @@
           <a:p>
             <a:fld id="{737F8263-D0D8-4843-B368-33B7ADDF127F}" type="datetime1">
               <a:rPr lang="fr-FR" smtClean="0"/>
-              <a:t>12/02/2019</a:t>
+              <a:pPr/>
+              <a:t>20/02/2019</a:t>
             </a:fld>
             <a:endParaRPr lang="fr-FR"/>
           </a:p>
@@ -3401,7 +3421,8 @@
           <a:p>
             <a:fld id="{000982F6-AAAD-4258-B115-44D8EC280712}" type="slidenum">
               <a:rPr lang="fr-FR" smtClean="0"/>
-              <a:t>‹N°›</a:t>
+              <a:pPr/>
+              <a:t>‹Nº›</a:t>
             </a:fld>
             <a:endParaRPr lang="fr-FR"/>
           </a:p>
@@ -3410,7 +3431,7 @@
     </p:spTree>
     <p:extLst>
       <p:ext uri="{BB962C8B-B14F-4D97-AF65-F5344CB8AC3E}">
-        <p14:creationId xmlns:p14="http://schemas.microsoft.com/office/powerpoint/2010/main" val="473486958"/>
+        <p14:creationId xmlns:p14="http://schemas.microsoft.com/office/powerpoint/2010/main" xmlns="" val="473486958"/>
       </p:ext>
     </p:extLst>
   </p:cSld>
@@ -3606,7 +3627,8 @@
           <a:p>
             <a:fld id="{D392D74D-FFEA-4245-8886-A6F8268ED21E}" type="datetime1">
               <a:rPr lang="fr-FR" smtClean="0"/>
-              <a:t>12/02/2019</a:t>
+              <a:pPr/>
+              <a:t>20/02/2019</a:t>
             </a:fld>
             <a:endParaRPr lang="fr-FR"/>
           </a:p>
@@ -3648,7 +3670,8 @@
           <a:p>
             <a:fld id="{000982F6-AAAD-4258-B115-44D8EC280712}" type="slidenum">
               <a:rPr lang="fr-FR" smtClean="0"/>
-              <a:t>‹N°›</a:t>
+              <a:pPr/>
+              <a:t>‹Nº›</a:t>
             </a:fld>
             <a:endParaRPr lang="fr-FR"/>
           </a:p>
@@ -3657,7 +3680,7 @@
     </p:spTree>
     <p:extLst>
       <p:ext uri="{BB962C8B-B14F-4D97-AF65-F5344CB8AC3E}">
-        <p14:creationId xmlns:p14="http://schemas.microsoft.com/office/powerpoint/2010/main" val="1852630678"/>
+        <p14:creationId xmlns:p14="http://schemas.microsoft.com/office/powerpoint/2010/main" xmlns="" val="1852630678"/>
       </p:ext>
     </p:extLst>
   </p:cSld>
@@ -3838,7 +3861,8 @@
           <a:p>
             <a:fld id="{B7A49A4A-35AF-4856-B170-4C5751F1F7EF}" type="datetime1">
               <a:rPr lang="fr-FR" smtClean="0"/>
-              <a:t>12/02/2019</a:t>
+              <a:pPr/>
+              <a:t>20/02/2019</a:t>
             </a:fld>
             <a:endParaRPr lang="fr-FR"/>
           </a:p>
@@ -3880,7 +3904,8 @@
           <a:p>
             <a:fld id="{000982F6-AAAD-4258-B115-44D8EC280712}" type="slidenum">
               <a:rPr lang="fr-FR" smtClean="0"/>
-              <a:t>‹N°›</a:t>
+              <a:pPr/>
+              <a:t>‹Nº›</a:t>
             </a:fld>
             <a:endParaRPr lang="fr-FR"/>
           </a:p>
@@ -3889,7 +3914,7 @@
     </p:spTree>
     <p:extLst>
       <p:ext uri="{BB962C8B-B14F-4D97-AF65-F5344CB8AC3E}">
-        <p14:creationId xmlns:p14="http://schemas.microsoft.com/office/powerpoint/2010/main" val="1584811670"/>
+        <p14:creationId xmlns:p14="http://schemas.microsoft.com/office/powerpoint/2010/main" xmlns="" val="1584811670"/>
       </p:ext>
     </p:extLst>
   </p:cSld>
@@ -4212,7 +4237,8 @@
           <a:p>
             <a:fld id="{76F48825-794F-4804-8130-41EB5FB3BA95}" type="datetime1">
               <a:rPr lang="fr-FR" smtClean="0"/>
-              <a:t>12/02/2019</a:t>
+              <a:pPr/>
+              <a:t>20/02/2019</a:t>
             </a:fld>
             <a:endParaRPr lang="fr-FR"/>
           </a:p>
@@ -4254,7 +4280,8 @@
           <a:p>
             <a:fld id="{000982F6-AAAD-4258-B115-44D8EC280712}" type="slidenum">
               <a:rPr lang="fr-FR" smtClean="0"/>
-              <a:t>‹N°›</a:t>
+              <a:pPr/>
+              <a:t>‹Nº›</a:t>
             </a:fld>
             <a:endParaRPr lang="fr-FR"/>
           </a:p>
@@ -4263,7 +4290,7 @@
     </p:spTree>
     <p:extLst>
       <p:ext uri="{BB962C8B-B14F-4D97-AF65-F5344CB8AC3E}">
-        <p14:creationId xmlns:p14="http://schemas.microsoft.com/office/powerpoint/2010/main" val="2334506417"/>
+        <p14:creationId xmlns:p14="http://schemas.microsoft.com/office/powerpoint/2010/main" xmlns="" val="2334506417"/>
       </p:ext>
     </p:extLst>
   </p:cSld>
@@ -4335,7 +4362,8 @@
           <a:p>
             <a:fld id="{345AFD62-CB2E-47E0-B9F3-AF4CD676DF0D}" type="datetime1">
               <a:rPr lang="fr-FR" smtClean="0"/>
-              <a:t>12/02/2019</a:t>
+              <a:pPr/>
+              <a:t>20/02/2019</a:t>
             </a:fld>
             <a:endParaRPr lang="fr-FR"/>
           </a:p>
@@ -4377,7 +4405,8 @@
           <a:p>
             <a:fld id="{000982F6-AAAD-4258-B115-44D8EC280712}" type="slidenum">
               <a:rPr lang="fr-FR" smtClean="0"/>
-              <a:t>‹N°›</a:t>
+              <a:pPr/>
+              <a:t>‹Nº›</a:t>
             </a:fld>
             <a:endParaRPr lang="fr-FR"/>
           </a:p>
@@ -4386,7 +4415,7 @@
     </p:spTree>
     <p:extLst>
       <p:ext uri="{BB962C8B-B14F-4D97-AF65-F5344CB8AC3E}">
-        <p14:creationId xmlns:p14="http://schemas.microsoft.com/office/powerpoint/2010/main" val="2069309907"/>
+        <p14:creationId xmlns:p14="http://schemas.microsoft.com/office/powerpoint/2010/main" xmlns="" val="2069309907"/>
       </p:ext>
     </p:extLst>
   </p:cSld>
@@ -4430,7 +4459,8 @@
           <a:p>
             <a:fld id="{C6C76E0C-EAC5-4FFC-9610-27148E22261B}" type="datetime1">
               <a:rPr lang="fr-FR" smtClean="0"/>
-              <a:t>12/02/2019</a:t>
+              <a:pPr/>
+              <a:t>20/02/2019</a:t>
             </a:fld>
             <a:endParaRPr lang="fr-FR"/>
           </a:p>
@@ -4472,7 +4502,8 @@
           <a:p>
             <a:fld id="{000982F6-AAAD-4258-B115-44D8EC280712}" type="slidenum">
               <a:rPr lang="fr-FR" smtClean="0"/>
-              <a:t>‹N°›</a:t>
+              <a:pPr/>
+              <a:t>‹Nº›</a:t>
             </a:fld>
             <a:endParaRPr lang="fr-FR"/>
           </a:p>
@@ -4481,7 +4512,7 @@
     </p:spTree>
     <p:extLst>
       <p:ext uri="{BB962C8B-B14F-4D97-AF65-F5344CB8AC3E}">
-        <p14:creationId xmlns:p14="http://schemas.microsoft.com/office/powerpoint/2010/main" val="639196056"/>
+        <p14:creationId xmlns:p14="http://schemas.microsoft.com/office/powerpoint/2010/main" xmlns="" val="639196056"/>
       </p:ext>
     </p:extLst>
   </p:cSld>
@@ -4685,7 +4716,8 @@
           <a:p>
             <a:fld id="{23591DC3-B044-4F76-A85E-C7113341B796}" type="datetime1">
               <a:rPr lang="fr-FR" smtClean="0"/>
-              <a:t>12/02/2019</a:t>
+              <a:pPr/>
+              <a:t>20/02/2019</a:t>
             </a:fld>
             <a:endParaRPr lang="fr-FR"/>
           </a:p>
@@ -4727,7 +4759,8 @@
           <a:p>
             <a:fld id="{000982F6-AAAD-4258-B115-44D8EC280712}" type="slidenum">
               <a:rPr lang="fr-FR" smtClean="0"/>
-              <a:t>‹N°›</a:t>
+              <a:pPr/>
+              <a:t>‹Nº›</a:t>
             </a:fld>
             <a:endParaRPr lang="fr-FR"/>
           </a:p>
@@ -4736,7 +4769,7 @@
     </p:spTree>
     <p:extLst>
       <p:ext uri="{BB962C8B-B14F-4D97-AF65-F5344CB8AC3E}">
-        <p14:creationId xmlns:p14="http://schemas.microsoft.com/office/powerpoint/2010/main" val="4248595626"/>
+        <p14:creationId xmlns:p14="http://schemas.microsoft.com/office/powerpoint/2010/main" xmlns="" val="4248595626"/>
       </p:ext>
     </p:extLst>
   </p:cSld>
@@ -4967,7 +5000,8 @@
           <a:p>
             <a:fld id="{000982F6-AAAD-4258-B115-44D8EC280712}" type="slidenum">
               <a:rPr lang="fr-FR" smtClean="0"/>
-              <a:t>‹N°›</a:t>
+              <a:pPr/>
+              <a:t>‹Nº›</a:t>
             </a:fld>
             <a:endParaRPr lang="fr-FR"/>
           </a:p>
@@ -4990,7 +5024,8 @@
           <a:p>
             <a:fld id="{7BE10B72-BCB4-4E5C-A06A-C621F15D31CF}" type="datetime1">
               <a:rPr lang="fr-FR" smtClean="0"/>
-              <a:t>12/02/2019</a:t>
+              <a:pPr/>
+              <a:t>20/02/2019</a:t>
             </a:fld>
             <a:endParaRPr lang="fr-FR"/>
           </a:p>
@@ -4999,7 +5034,7 @@
     </p:spTree>
     <p:extLst>
       <p:ext uri="{BB962C8B-B14F-4D97-AF65-F5344CB8AC3E}">
-        <p14:creationId xmlns:p14="http://schemas.microsoft.com/office/powerpoint/2010/main" val="1569854607"/>
+        <p14:creationId xmlns:p14="http://schemas.microsoft.com/office/powerpoint/2010/main" xmlns="" val="1569854607"/>
       </p:ext>
     </p:extLst>
   </p:cSld>
@@ -5692,7 +5727,8 @@
           <a:p>
             <a:fld id="{74B392F4-30E2-47AE-AE4F-34A92428D3A6}" type="datetime1">
               <a:rPr lang="fr-FR" smtClean="0"/>
-              <a:t>12/02/2019</a:t>
+              <a:pPr/>
+              <a:t>20/02/2019</a:t>
             </a:fld>
             <a:endParaRPr lang="fr-FR"/>
           </a:p>
@@ -5768,7 +5804,8 @@
           <a:p>
             <a:fld id="{000982F6-AAAD-4258-B115-44D8EC280712}" type="slidenum">
               <a:rPr lang="fr-FR" smtClean="0"/>
-              <a:t>‹N°›</a:t>
+              <a:pPr/>
+              <a:t>‹Nº›</a:t>
             </a:fld>
             <a:endParaRPr lang="fr-FR"/>
           </a:p>
@@ -5777,7 +5814,7 @@
     </p:spTree>
     <p:extLst>
       <p:ext uri="{BB962C8B-B14F-4D97-AF65-F5344CB8AC3E}">
-        <p14:creationId xmlns:p14="http://schemas.microsoft.com/office/powerpoint/2010/main" val="2122014391"/>
+        <p14:creationId xmlns:p14="http://schemas.microsoft.com/office/powerpoint/2010/main" xmlns="" val="2122014391"/>
       </p:ext>
     </p:extLst>
   </p:cSld>
@@ -6222,7 +6259,7 @@
           <p:cNvPr id="2" name="Titre 1">
             <a:extLst>
               <a:ext uri="{FF2B5EF4-FFF2-40B4-BE49-F238E27FC236}">
-                <a16:creationId xmlns:a16="http://schemas.microsoft.com/office/drawing/2014/main" id="{3D894223-47F8-483F-851A-7E3A556F81DB}"/>
+                <a16:creationId xmlns:a16="http://schemas.microsoft.com/office/drawing/2014/main" xmlns="" id="{3D894223-47F8-483F-851A-7E3A556F81DB}"/>
               </a:ext>
             </a:extLst>
           </p:cNvPr>
@@ -6250,7 +6287,7 @@
           <p:cNvPr id="3" name="Sous-titre 2">
             <a:extLst>
               <a:ext uri="{FF2B5EF4-FFF2-40B4-BE49-F238E27FC236}">
-                <a16:creationId xmlns:a16="http://schemas.microsoft.com/office/drawing/2014/main" id="{EBA00830-AA12-447D-AEB8-C4E3C5AE3647}"/>
+                <a16:creationId xmlns:a16="http://schemas.microsoft.com/office/drawing/2014/main" xmlns="" id="{EBA00830-AA12-447D-AEB8-C4E3C5AE3647}"/>
               </a:ext>
             </a:extLst>
           </p:cNvPr>
@@ -6278,7 +6315,7 @@
           <p:cNvPr id="5" name="Espace réservé du numéro de diapositive 4">
             <a:extLst>
               <a:ext uri="{FF2B5EF4-FFF2-40B4-BE49-F238E27FC236}">
-                <a16:creationId xmlns:a16="http://schemas.microsoft.com/office/drawing/2014/main" id="{59EDFDBB-9CE5-4EB2-93E2-08AFF19C6FE0}"/>
+                <a16:creationId xmlns:a16="http://schemas.microsoft.com/office/drawing/2014/main" xmlns="" id="{59EDFDBB-9CE5-4EB2-93E2-08AFF19C6FE0}"/>
               </a:ext>
             </a:extLst>
           </p:cNvPr>
@@ -6296,6 +6333,7 @@
           <a:p>
             <a:fld id="{000982F6-AAAD-4258-B115-44D8EC280712}" type="slidenum">
               <a:rPr lang="fr-FR" smtClean="0"/>
+              <a:pPr/>
               <a:t>1</a:t>
             </a:fld>
             <a:endParaRPr lang="fr-FR"/>
@@ -6305,7 +6343,7 @@
     </p:spTree>
     <p:extLst>
       <p:ext uri="{BB962C8B-B14F-4D97-AF65-F5344CB8AC3E}">
-        <p14:creationId xmlns:p14="http://schemas.microsoft.com/office/powerpoint/2010/main" val="453207635"/>
+        <p14:creationId xmlns:p14="http://schemas.microsoft.com/office/powerpoint/2010/main" xmlns="" val="453207635"/>
       </p:ext>
     </p:extLst>
   </p:cSld>
@@ -6337,7 +6375,7 @@
           <p:cNvPr id="2" name="Titre 1">
             <a:extLst>
               <a:ext uri="{FF2B5EF4-FFF2-40B4-BE49-F238E27FC236}">
-                <a16:creationId xmlns:a16="http://schemas.microsoft.com/office/drawing/2014/main" id="{8DB6E984-1000-41D0-9BAD-8224D1D5B727}"/>
+                <a16:creationId xmlns:a16="http://schemas.microsoft.com/office/drawing/2014/main" xmlns="" id="{8DB6E984-1000-41D0-9BAD-8224D1D5B727}"/>
               </a:ext>
             </a:extLst>
           </p:cNvPr>
@@ -6378,7 +6416,7 @@
           <p:cNvPr id="4" name="image3.png">
             <a:extLst>
               <a:ext uri="{FF2B5EF4-FFF2-40B4-BE49-F238E27FC236}">
-                <a16:creationId xmlns:a16="http://schemas.microsoft.com/office/drawing/2014/main" id="{AF5DA36B-4B61-44E0-B6CA-383B78BFE83A}"/>
+                <a16:creationId xmlns:a16="http://schemas.microsoft.com/office/drawing/2014/main" xmlns="" id="{AF5DA36B-4B61-44E0-B6CA-383B78BFE83A}"/>
               </a:ext>
             </a:extLst>
           </p:cNvPr>
@@ -6412,7 +6450,7 @@
           <p:cNvPr id="5" name="Espace réservé du numéro de diapositive 4">
             <a:extLst>
               <a:ext uri="{FF2B5EF4-FFF2-40B4-BE49-F238E27FC236}">
-                <a16:creationId xmlns:a16="http://schemas.microsoft.com/office/drawing/2014/main" id="{CC0AF4EB-5793-4C57-B071-C30C5F47A36F}"/>
+                <a16:creationId xmlns:a16="http://schemas.microsoft.com/office/drawing/2014/main" xmlns="" id="{CC0AF4EB-5793-4C57-B071-C30C5F47A36F}"/>
               </a:ext>
             </a:extLst>
           </p:cNvPr>
@@ -6430,6 +6468,7 @@
           <a:p>
             <a:fld id="{000982F6-AAAD-4258-B115-44D8EC280712}" type="slidenum">
               <a:rPr lang="fr-FR" smtClean="0"/>
+              <a:pPr/>
               <a:t>10</a:t>
             </a:fld>
             <a:endParaRPr lang="fr-FR"/>
@@ -6439,7 +6478,7 @@
     </p:spTree>
     <p:extLst>
       <p:ext uri="{BB962C8B-B14F-4D97-AF65-F5344CB8AC3E}">
-        <p14:creationId xmlns:p14="http://schemas.microsoft.com/office/powerpoint/2010/main" val="1880120633"/>
+        <p14:creationId xmlns:p14="http://schemas.microsoft.com/office/powerpoint/2010/main" xmlns="" val="1880120633"/>
       </p:ext>
     </p:extLst>
   </p:cSld>
@@ -6471,7 +6510,7 @@
           <p:cNvPr id="2" name="Titre 1">
             <a:extLst>
               <a:ext uri="{FF2B5EF4-FFF2-40B4-BE49-F238E27FC236}">
-                <a16:creationId xmlns:a16="http://schemas.microsoft.com/office/drawing/2014/main" id="{DA2842C6-85BF-428F-BA64-3F1746AE7B06}"/>
+                <a16:creationId xmlns:a16="http://schemas.microsoft.com/office/drawing/2014/main" xmlns="" id="{DA2842C6-85BF-428F-BA64-3F1746AE7B06}"/>
               </a:ext>
             </a:extLst>
           </p:cNvPr>
@@ -6496,7 +6535,7 @@
           <p:cNvPr id="3" name="Espace réservé du contenu 2">
             <a:extLst>
               <a:ext uri="{FF2B5EF4-FFF2-40B4-BE49-F238E27FC236}">
-                <a16:creationId xmlns:a16="http://schemas.microsoft.com/office/drawing/2014/main" id="{D8F8BA25-1C85-430F-81BD-3862B01F3253}"/>
+                <a16:creationId xmlns:a16="http://schemas.microsoft.com/office/drawing/2014/main" xmlns="" id="{D8F8BA25-1C85-430F-81BD-3862B01F3253}"/>
               </a:ext>
             </a:extLst>
           </p:cNvPr>
@@ -6538,7 +6577,7 @@
           <p:cNvPr id="5" name="image3.png">
             <a:extLst>
               <a:ext uri="{FF2B5EF4-FFF2-40B4-BE49-F238E27FC236}">
-                <a16:creationId xmlns:a16="http://schemas.microsoft.com/office/drawing/2014/main" id="{E390200B-D712-4A8C-A169-7FE01C42F22E}"/>
+                <a16:creationId xmlns:a16="http://schemas.microsoft.com/office/drawing/2014/main" xmlns="" id="{E390200B-D712-4A8C-A169-7FE01C42F22E}"/>
               </a:ext>
             </a:extLst>
           </p:cNvPr>
@@ -6570,7 +6609,7 @@
           <p:cNvPr id="7" name="Espace réservé du numéro de diapositive 6">
             <a:extLst>
               <a:ext uri="{FF2B5EF4-FFF2-40B4-BE49-F238E27FC236}">
-                <a16:creationId xmlns:a16="http://schemas.microsoft.com/office/drawing/2014/main" id="{73B5E105-71E2-4565-8ADB-9C935C94BB7E}"/>
+                <a16:creationId xmlns:a16="http://schemas.microsoft.com/office/drawing/2014/main" xmlns="" id="{73B5E105-71E2-4565-8ADB-9C935C94BB7E}"/>
               </a:ext>
             </a:extLst>
           </p:cNvPr>
@@ -6588,6 +6627,7 @@
           <a:p>
             <a:fld id="{000982F6-AAAD-4258-B115-44D8EC280712}" type="slidenum">
               <a:rPr lang="fr-FR" smtClean="0"/>
+              <a:pPr/>
               <a:t>11</a:t>
             </a:fld>
             <a:endParaRPr lang="fr-FR"/>
@@ -6597,7 +6637,7 @@
     </p:spTree>
     <p:extLst>
       <p:ext uri="{BB962C8B-B14F-4D97-AF65-F5344CB8AC3E}">
-        <p14:creationId xmlns:p14="http://schemas.microsoft.com/office/powerpoint/2010/main" val="1114326998"/>
+        <p14:creationId xmlns:p14="http://schemas.microsoft.com/office/powerpoint/2010/main" xmlns="" val="1114326998"/>
       </p:ext>
     </p:extLst>
   </p:cSld>
@@ -6629,7 +6669,7 @@
           <p:cNvPr id="2" name="Titre 1">
             <a:extLst>
               <a:ext uri="{FF2B5EF4-FFF2-40B4-BE49-F238E27FC236}">
-                <a16:creationId xmlns:a16="http://schemas.microsoft.com/office/drawing/2014/main" id="{8DB6E984-1000-41D0-9BAD-8224D1D5B727}"/>
+                <a16:creationId xmlns:a16="http://schemas.microsoft.com/office/drawing/2014/main" xmlns="" id="{8DB6E984-1000-41D0-9BAD-8224D1D5B727}"/>
               </a:ext>
             </a:extLst>
           </p:cNvPr>
@@ -6670,7 +6710,7 @@
           <p:cNvPr id="6" name="Espace réservé du contenu 7">
             <a:extLst>
               <a:ext uri="{FF2B5EF4-FFF2-40B4-BE49-F238E27FC236}">
-                <a16:creationId xmlns:a16="http://schemas.microsoft.com/office/drawing/2014/main" id="{30805947-EB13-4CE1-AA67-545007F33662}"/>
+                <a16:creationId xmlns:a16="http://schemas.microsoft.com/office/drawing/2014/main" xmlns="" id="{30805947-EB13-4CE1-AA67-545007F33662}"/>
               </a:ext>
             </a:extLst>
           </p:cNvPr>
@@ -6685,7 +6725,7 @@
           <a:blip r:embed="rId2">
             <a:extLst>
               <a:ext uri="{28A0092B-C50C-407E-A947-70E740481C1C}">
-                <a14:useLocalDpi xmlns:a14="http://schemas.microsoft.com/office/drawing/2010/main" val="0"/>
+                <a14:useLocalDpi xmlns:a14="http://schemas.microsoft.com/office/drawing/2010/main" xmlns="" val="0"/>
               </a:ext>
             </a:extLst>
           </a:blip>
@@ -6705,7 +6745,7 @@
           <p:cNvPr id="4" name="Espace réservé du numéro de diapositive 3">
             <a:extLst>
               <a:ext uri="{FF2B5EF4-FFF2-40B4-BE49-F238E27FC236}">
-                <a16:creationId xmlns:a16="http://schemas.microsoft.com/office/drawing/2014/main" id="{6FA83639-8372-4E05-9712-D39DF24D8EBF}"/>
+                <a16:creationId xmlns:a16="http://schemas.microsoft.com/office/drawing/2014/main" xmlns="" id="{6FA83639-8372-4E05-9712-D39DF24D8EBF}"/>
               </a:ext>
             </a:extLst>
           </p:cNvPr>
@@ -6723,6 +6763,7 @@
           <a:p>
             <a:fld id="{000982F6-AAAD-4258-B115-44D8EC280712}" type="slidenum">
               <a:rPr lang="fr-FR" smtClean="0"/>
+              <a:pPr/>
               <a:t>12</a:t>
             </a:fld>
             <a:endParaRPr lang="fr-FR"/>
@@ -6732,7 +6773,7 @@
     </p:spTree>
     <p:extLst>
       <p:ext uri="{BB962C8B-B14F-4D97-AF65-F5344CB8AC3E}">
-        <p14:creationId xmlns:p14="http://schemas.microsoft.com/office/powerpoint/2010/main" val="849679488"/>
+        <p14:creationId xmlns:p14="http://schemas.microsoft.com/office/powerpoint/2010/main" xmlns="" val="849679488"/>
       </p:ext>
     </p:extLst>
   </p:cSld>
@@ -6764,7 +6805,7 @@
           <p:cNvPr id="2" name="Titre 1">
             <a:extLst>
               <a:ext uri="{FF2B5EF4-FFF2-40B4-BE49-F238E27FC236}">
-                <a16:creationId xmlns:a16="http://schemas.microsoft.com/office/drawing/2014/main" id="{BA08D9E1-CEC9-4B88-AE35-3ECF4E31C848}"/>
+                <a16:creationId xmlns:a16="http://schemas.microsoft.com/office/drawing/2014/main" xmlns="" id="{BA08D9E1-CEC9-4B88-AE35-3ECF4E31C848}"/>
               </a:ext>
             </a:extLst>
           </p:cNvPr>
@@ -6801,7 +6842,7 @@
           <p:cNvPr id="3" name="Espace réservé du contenu 2">
             <a:extLst>
               <a:ext uri="{FF2B5EF4-FFF2-40B4-BE49-F238E27FC236}">
-                <a16:creationId xmlns:a16="http://schemas.microsoft.com/office/drawing/2014/main" id="{A9A29769-64FE-41E1-8464-629C5513BB6F}"/>
+                <a16:creationId xmlns:a16="http://schemas.microsoft.com/office/drawing/2014/main" xmlns="" id="{A9A29769-64FE-41E1-8464-629C5513BB6F}"/>
               </a:ext>
             </a:extLst>
           </p:cNvPr>
@@ -6869,7 +6910,7 @@
           <p:cNvPr id="5" name="Espace réservé du numéro de diapositive 4">
             <a:extLst>
               <a:ext uri="{FF2B5EF4-FFF2-40B4-BE49-F238E27FC236}">
-                <a16:creationId xmlns:a16="http://schemas.microsoft.com/office/drawing/2014/main" id="{606E6FB1-EE2B-4829-8DA7-FB30143A7A12}"/>
+                <a16:creationId xmlns:a16="http://schemas.microsoft.com/office/drawing/2014/main" xmlns="" id="{606E6FB1-EE2B-4829-8DA7-FB30143A7A12}"/>
               </a:ext>
             </a:extLst>
           </p:cNvPr>
@@ -6887,6 +6928,7 @@
           <a:p>
             <a:fld id="{000982F6-AAAD-4258-B115-44D8EC280712}" type="slidenum">
               <a:rPr lang="fr-FR" smtClean="0"/>
+              <a:pPr/>
               <a:t>13</a:t>
             </a:fld>
             <a:endParaRPr lang="fr-FR"/>
@@ -6896,7 +6938,7 @@
     </p:spTree>
     <p:extLst>
       <p:ext uri="{BB962C8B-B14F-4D97-AF65-F5344CB8AC3E}">
-        <p14:creationId xmlns:p14="http://schemas.microsoft.com/office/powerpoint/2010/main" val="3356429125"/>
+        <p14:creationId xmlns:p14="http://schemas.microsoft.com/office/powerpoint/2010/main" xmlns="" val="3356429125"/>
       </p:ext>
     </p:extLst>
   </p:cSld>
@@ -6928,7 +6970,7 @@
           <p:cNvPr id="2" name="Titre 1">
             <a:extLst>
               <a:ext uri="{FF2B5EF4-FFF2-40B4-BE49-F238E27FC236}">
-                <a16:creationId xmlns:a16="http://schemas.microsoft.com/office/drawing/2014/main" id="{EBA0D8F0-6DB9-4391-BE2E-594E0C99CB60}"/>
+                <a16:creationId xmlns:a16="http://schemas.microsoft.com/office/drawing/2014/main" xmlns="" id="{EBA0D8F0-6DB9-4391-BE2E-594E0C99CB60}"/>
               </a:ext>
             </a:extLst>
           </p:cNvPr>
@@ -6956,7 +6998,7 @@
           <p:cNvPr id="3" name="Espace réservé du contenu 2">
             <a:extLst>
               <a:ext uri="{FF2B5EF4-FFF2-40B4-BE49-F238E27FC236}">
-                <a16:creationId xmlns:a16="http://schemas.microsoft.com/office/drawing/2014/main" id="{0580CE79-11C7-4557-A919-4162E26770A3}"/>
+                <a16:creationId xmlns:a16="http://schemas.microsoft.com/office/drawing/2014/main" xmlns="" id="{0580CE79-11C7-4557-A919-4162E26770A3}"/>
               </a:ext>
             </a:extLst>
           </p:cNvPr>
@@ -7108,7 +7150,7 @@
           <p:cNvPr id="4" name="Flèche : droite 3">
             <a:extLst>
               <a:ext uri="{FF2B5EF4-FFF2-40B4-BE49-F238E27FC236}">
-                <a16:creationId xmlns:a16="http://schemas.microsoft.com/office/drawing/2014/main" id="{6B0B5884-6582-4CAD-AEFC-7E4E82508A8A}"/>
+                <a16:creationId xmlns:a16="http://schemas.microsoft.com/office/drawing/2014/main" xmlns="" id="{6B0B5884-6582-4CAD-AEFC-7E4E82508A8A}"/>
               </a:ext>
             </a:extLst>
           </p:cNvPr>
@@ -7154,7 +7196,7 @@
           <p:cNvPr id="6" name="Espace réservé du numéro de diapositive 5">
             <a:extLst>
               <a:ext uri="{FF2B5EF4-FFF2-40B4-BE49-F238E27FC236}">
-                <a16:creationId xmlns:a16="http://schemas.microsoft.com/office/drawing/2014/main" id="{ECC2BB3B-6CC6-4471-BB84-A24DAA84C3A4}"/>
+                <a16:creationId xmlns:a16="http://schemas.microsoft.com/office/drawing/2014/main" xmlns="" id="{ECC2BB3B-6CC6-4471-BB84-A24DAA84C3A4}"/>
               </a:ext>
             </a:extLst>
           </p:cNvPr>
@@ -7172,6 +7214,7 @@
           <a:p>
             <a:fld id="{000982F6-AAAD-4258-B115-44D8EC280712}" type="slidenum">
               <a:rPr lang="fr-FR" smtClean="0"/>
+              <a:pPr/>
               <a:t>14</a:t>
             </a:fld>
             <a:endParaRPr lang="fr-FR"/>
@@ -7181,7 +7224,7 @@
     </p:spTree>
     <p:extLst>
       <p:ext uri="{BB962C8B-B14F-4D97-AF65-F5344CB8AC3E}">
-        <p14:creationId xmlns:p14="http://schemas.microsoft.com/office/powerpoint/2010/main" val="659610021"/>
+        <p14:creationId xmlns:p14="http://schemas.microsoft.com/office/powerpoint/2010/main" xmlns="" val="659610021"/>
       </p:ext>
     </p:extLst>
   </p:cSld>
@@ -7213,7 +7256,7 @@
           <p:cNvPr id="2" name="Titre 1">
             <a:extLst>
               <a:ext uri="{FF2B5EF4-FFF2-40B4-BE49-F238E27FC236}">
-                <a16:creationId xmlns:a16="http://schemas.microsoft.com/office/drawing/2014/main" id="{D37F7EC2-0586-4160-9928-A4EF8825E06A}"/>
+                <a16:creationId xmlns:a16="http://schemas.microsoft.com/office/drawing/2014/main" xmlns="" id="{D37F7EC2-0586-4160-9928-A4EF8825E06A}"/>
               </a:ext>
             </a:extLst>
           </p:cNvPr>
@@ -7241,7 +7284,7 @@
           <p:cNvPr id="3" name="Espace réservé du texte 2">
             <a:extLst>
               <a:ext uri="{FF2B5EF4-FFF2-40B4-BE49-F238E27FC236}">
-                <a16:creationId xmlns:a16="http://schemas.microsoft.com/office/drawing/2014/main" id="{292B8FA9-1870-407A-90FB-C7E257C081B9}"/>
+                <a16:creationId xmlns:a16="http://schemas.microsoft.com/office/drawing/2014/main" xmlns="" id="{292B8FA9-1870-407A-90FB-C7E257C081B9}"/>
               </a:ext>
             </a:extLst>
           </p:cNvPr>
@@ -7269,7 +7312,7 @@
           <p:cNvPr id="4" name="Espace réservé du contenu 3">
             <a:extLst>
               <a:ext uri="{FF2B5EF4-FFF2-40B4-BE49-F238E27FC236}">
-                <a16:creationId xmlns:a16="http://schemas.microsoft.com/office/drawing/2014/main" id="{B7EE3265-4692-4A3D-80F0-270100CDF995}"/>
+                <a16:creationId xmlns:a16="http://schemas.microsoft.com/office/drawing/2014/main" xmlns="" id="{B7EE3265-4692-4A3D-80F0-270100CDF995}"/>
               </a:ext>
             </a:extLst>
           </p:cNvPr>
@@ -7335,7 +7378,7 @@
           <p:cNvPr id="5" name="Espace réservé du texte 4">
             <a:extLst>
               <a:ext uri="{FF2B5EF4-FFF2-40B4-BE49-F238E27FC236}">
-                <a16:creationId xmlns:a16="http://schemas.microsoft.com/office/drawing/2014/main" id="{135FB07D-4021-4680-A6A5-0A6F94CB2C46}"/>
+                <a16:creationId xmlns:a16="http://schemas.microsoft.com/office/drawing/2014/main" xmlns="" id="{135FB07D-4021-4680-A6A5-0A6F94CB2C46}"/>
               </a:ext>
             </a:extLst>
           </p:cNvPr>
@@ -7368,7 +7411,7 @@
           <p:cNvPr id="6" name="Espace réservé du contenu 5">
             <a:extLst>
               <a:ext uri="{FF2B5EF4-FFF2-40B4-BE49-F238E27FC236}">
-                <a16:creationId xmlns:a16="http://schemas.microsoft.com/office/drawing/2014/main" id="{451E412D-6B17-4628-91FC-F8E869BA2B46}"/>
+                <a16:creationId xmlns:a16="http://schemas.microsoft.com/office/drawing/2014/main" xmlns="" id="{451E412D-6B17-4628-91FC-F8E869BA2B46}"/>
               </a:ext>
             </a:extLst>
           </p:cNvPr>
@@ -7431,7 +7474,7 @@
           <p:cNvPr id="8" name="Espace réservé du numéro de diapositive 7">
             <a:extLst>
               <a:ext uri="{FF2B5EF4-FFF2-40B4-BE49-F238E27FC236}">
-                <a16:creationId xmlns:a16="http://schemas.microsoft.com/office/drawing/2014/main" id="{F8ED3CB3-2C93-4EAE-8F9A-7629B5201528}"/>
+                <a16:creationId xmlns:a16="http://schemas.microsoft.com/office/drawing/2014/main" xmlns="" id="{F8ED3CB3-2C93-4EAE-8F9A-7629B5201528}"/>
               </a:ext>
             </a:extLst>
           </p:cNvPr>
@@ -7449,6 +7492,7 @@
           <a:p>
             <a:fld id="{000982F6-AAAD-4258-B115-44D8EC280712}" type="slidenum">
               <a:rPr lang="fr-FR" smtClean="0"/>
+              <a:pPr/>
               <a:t>15</a:t>
             </a:fld>
             <a:endParaRPr lang="fr-FR"/>
@@ -7458,7 +7502,7 @@
     </p:spTree>
     <p:extLst>
       <p:ext uri="{BB962C8B-B14F-4D97-AF65-F5344CB8AC3E}">
-        <p14:creationId xmlns:p14="http://schemas.microsoft.com/office/powerpoint/2010/main" val="2763711249"/>
+        <p14:creationId xmlns:p14="http://schemas.microsoft.com/office/powerpoint/2010/main" xmlns="" val="2763711249"/>
       </p:ext>
     </p:extLst>
   </p:cSld>
@@ -7490,7 +7534,7 @@
           <p:cNvPr id="2" name="Titre 1">
             <a:extLst>
               <a:ext uri="{FF2B5EF4-FFF2-40B4-BE49-F238E27FC236}">
-                <a16:creationId xmlns:a16="http://schemas.microsoft.com/office/drawing/2014/main" id="{C58ED35E-B5E2-42FE-91D3-D2A5FA10D1C6}"/>
+                <a16:creationId xmlns:a16="http://schemas.microsoft.com/office/drawing/2014/main" xmlns="" id="{C58ED35E-B5E2-42FE-91D3-D2A5FA10D1C6}"/>
               </a:ext>
             </a:extLst>
           </p:cNvPr>
@@ -7518,7 +7562,7 @@
           <p:cNvPr id="7" name="Image 6">
             <a:extLst>
               <a:ext uri="{FF2B5EF4-FFF2-40B4-BE49-F238E27FC236}">
-                <a16:creationId xmlns:a16="http://schemas.microsoft.com/office/drawing/2014/main" id="{2660A3EF-5FB2-4CB1-9E42-3217F955C33C}"/>
+                <a16:creationId xmlns:a16="http://schemas.microsoft.com/office/drawing/2014/main" xmlns="" id="{2660A3EF-5FB2-4CB1-9E42-3217F955C33C}"/>
               </a:ext>
             </a:extLst>
           </p:cNvPr>
@@ -7531,7 +7575,7 @@
           <a:blip r:embed="rId2">
             <a:extLst>
               <a:ext uri="{28A0092B-C50C-407E-A947-70E740481C1C}">
-                <a14:useLocalDpi xmlns:a14="http://schemas.microsoft.com/office/drawing/2010/main" val="0"/>
+                <a14:useLocalDpi xmlns:a14="http://schemas.microsoft.com/office/drawing/2010/main" xmlns="" val="0"/>
               </a:ext>
             </a:extLst>
           </a:blip>
@@ -7554,7 +7598,7 @@
           <p:cNvPr id="8" name="Espace réservé du contenu 7">
             <a:extLst>
               <a:ext uri="{FF2B5EF4-FFF2-40B4-BE49-F238E27FC236}">
-                <a16:creationId xmlns:a16="http://schemas.microsoft.com/office/drawing/2014/main" id="{C81D1FA0-349C-4443-BC5E-69EDD607808C}"/>
+                <a16:creationId xmlns:a16="http://schemas.microsoft.com/office/drawing/2014/main" xmlns="" id="{C81D1FA0-349C-4443-BC5E-69EDD607808C}"/>
               </a:ext>
             </a:extLst>
           </p:cNvPr>
@@ -7569,7 +7613,7 @@
           <a:blip r:embed="rId3">
             <a:extLst>
               <a:ext uri="{28A0092B-C50C-407E-A947-70E740481C1C}">
-                <a14:useLocalDpi xmlns:a14="http://schemas.microsoft.com/office/drawing/2010/main" val="0"/>
+                <a14:useLocalDpi xmlns:a14="http://schemas.microsoft.com/office/drawing/2010/main" xmlns="" val="0"/>
               </a:ext>
             </a:extLst>
           </a:blip>
@@ -7589,7 +7633,7 @@
           <p:cNvPr id="4" name="Espace réservé du numéro de diapositive 3">
             <a:extLst>
               <a:ext uri="{FF2B5EF4-FFF2-40B4-BE49-F238E27FC236}">
-                <a16:creationId xmlns:a16="http://schemas.microsoft.com/office/drawing/2014/main" id="{CEF00673-4004-4E0E-87DB-D70CF191A438}"/>
+                <a16:creationId xmlns:a16="http://schemas.microsoft.com/office/drawing/2014/main" xmlns="" id="{CEF00673-4004-4E0E-87DB-D70CF191A438}"/>
               </a:ext>
             </a:extLst>
           </p:cNvPr>
@@ -7607,6 +7651,7 @@
           <a:p>
             <a:fld id="{000982F6-AAAD-4258-B115-44D8EC280712}" type="slidenum">
               <a:rPr lang="fr-FR" smtClean="0"/>
+              <a:pPr/>
               <a:t>16</a:t>
             </a:fld>
             <a:endParaRPr lang="fr-FR"/>
@@ -7616,7 +7661,7 @@
     </p:spTree>
     <p:extLst>
       <p:ext uri="{BB962C8B-B14F-4D97-AF65-F5344CB8AC3E}">
-        <p14:creationId xmlns:p14="http://schemas.microsoft.com/office/powerpoint/2010/main" val="666622740"/>
+        <p14:creationId xmlns:p14="http://schemas.microsoft.com/office/powerpoint/2010/main" xmlns="" val="666622740"/>
       </p:ext>
     </p:extLst>
   </p:cSld>
@@ -7750,7 +7795,7 @@
           <p:cNvPr id="2" name="Titre 1">
             <a:extLst>
               <a:ext uri="{FF2B5EF4-FFF2-40B4-BE49-F238E27FC236}">
-                <a16:creationId xmlns:a16="http://schemas.microsoft.com/office/drawing/2014/main" id="{C29DDC9A-9353-42C8-BE38-B481E27D43E5}"/>
+                <a16:creationId xmlns:a16="http://schemas.microsoft.com/office/drawing/2014/main" xmlns="" id="{C29DDC9A-9353-42C8-BE38-B481E27D43E5}"/>
               </a:ext>
             </a:extLst>
           </p:cNvPr>
@@ -7778,7 +7823,7 @@
           <p:cNvPr id="3" name="Espace réservé du contenu 2">
             <a:extLst>
               <a:ext uri="{FF2B5EF4-FFF2-40B4-BE49-F238E27FC236}">
-                <a16:creationId xmlns:a16="http://schemas.microsoft.com/office/drawing/2014/main" id="{A0FDF85D-AA4E-422E-B886-386CF8D1C946}"/>
+                <a16:creationId xmlns:a16="http://schemas.microsoft.com/office/drawing/2014/main" xmlns="" id="{A0FDF85D-AA4E-422E-B886-386CF8D1C946}"/>
               </a:ext>
             </a:extLst>
           </p:cNvPr>
@@ -7846,7 +7891,7 @@
           <p:cNvPr id="5" name="Image 4">
             <a:extLst>
               <a:ext uri="{FF2B5EF4-FFF2-40B4-BE49-F238E27FC236}">
-                <a16:creationId xmlns:a16="http://schemas.microsoft.com/office/drawing/2014/main" id="{5C174396-3F5C-4728-AD53-601599108461}"/>
+                <a16:creationId xmlns:a16="http://schemas.microsoft.com/office/drawing/2014/main" xmlns="" id="{5C174396-3F5C-4728-AD53-601599108461}"/>
               </a:ext>
             </a:extLst>
           </p:cNvPr>
@@ -7859,7 +7904,7 @@
           <a:blip r:embed="rId2">
             <a:extLst>
               <a:ext uri="{28A0092B-C50C-407E-A947-70E740481C1C}">
-                <a14:useLocalDpi xmlns:a14="http://schemas.microsoft.com/office/drawing/2010/main" val="0"/>
+                <a14:useLocalDpi xmlns:a14="http://schemas.microsoft.com/office/drawing/2010/main" xmlns="" val="0"/>
               </a:ext>
             </a:extLst>
           </a:blip>
@@ -7882,7 +7927,7 @@
           <p:cNvPr id="6" name="Image 5">
             <a:extLst>
               <a:ext uri="{FF2B5EF4-FFF2-40B4-BE49-F238E27FC236}">
-                <a16:creationId xmlns:a16="http://schemas.microsoft.com/office/drawing/2014/main" id="{EEE9FCD8-B323-492D-910B-EA0F46695B71}"/>
+                <a16:creationId xmlns:a16="http://schemas.microsoft.com/office/drawing/2014/main" xmlns="" id="{EEE9FCD8-B323-492D-910B-EA0F46695B71}"/>
               </a:ext>
             </a:extLst>
           </p:cNvPr>
@@ -7895,7 +7940,7 @@
           <a:blip r:embed="rId3">
             <a:extLst>
               <a:ext uri="{28A0092B-C50C-407E-A947-70E740481C1C}">
-                <a14:useLocalDpi xmlns:a14="http://schemas.microsoft.com/office/drawing/2010/main" val="0"/>
+                <a14:useLocalDpi xmlns:a14="http://schemas.microsoft.com/office/drawing/2010/main" xmlns="" val="0"/>
               </a:ext>
             </a:extLst>
           </a:blip>
@@ -7918,7 +7963,7 @@
           <p:cNvPr id="7" name="Espace réservé du numéro de diapositive 6">
             <a:extLst>
               <a:ext uri="{FF2B5EF4-FFF2-40B4-BE49-F238E27FC236}">
-                <a16:creationId xmlns:a16="http://schemas.microsoft.com/office/drawing/2014/main" id="{65F4A2E6-E711-495C-9A18-2BA5B95E1666}"/>
+                <a16:creationId xmlns:a16="http://schemas.microsoft.com/office/drawing/2014/main" xmlns="" id="{65F4A2E6-E711-495C-9A18-2BA5B95E1666}"/>
               </a:ext>
             </a:extLst>
           </p:cNvPr>
@@ -7936,6 +7981,7 @@
           <a:p>
             <a:fld id="{000982F6-AAAD-4258-B115-44D8EC280712}" type="slidenum">
               <a:rPr lang="fr-FR" smtClean="0"/>
+              <a:pPr/>
               <a:t>17</a:t>
             </a:fld>
             <a:endParaRPr lang="fr-FR"/>
@@ -7945,7 +7991,7 @@
     </p:spTree>
     <p:extLst>
       <p:ext uri="{BB962C8B-B14F-4D97-AF65-F5344CB8AC3E}">
-        <p14:creationId xmlns:p14="http://schemas.microsoft.com/office/powerpoint/2010/main" val="728501483"/>
+        <p14:creationId xmlns:p14="http://schemas.microsoft.com/office/powerpoint/2010/main" xmlns="" val="728501483"/>
       </p:ext>
     </p:extLst>
   </p:cSld>
@@ -8076,10 +8122,10 @@
       </p:grpSpPr>
       <p:sp>
         <p:nvSpPr>
-          <p:cNvPr id="2" name="Titre 1">
+          <p:cNvPr id="10" name="Titre 1">
             <a:extLst>
               <a:ext uri="{FF2B5EF4-FFF2-40B4-BE49-F238E27FC236}">
-                <a16:creationId xmlns:a16="http://schemas.microsoft.com/office/drawing/2014/main" id="{22E14FB8-2A04-4BF7-830E-E1F70CC4D1EE}"/>
+                <a16:creationId xmlns="" xmlns:a16="http://schemas.microsoft.com/office/drawing/2014/main" id="{22E14FB8-2A04-4BF7-830E-E1F70CC4D1EE}"/>
               </a:ext>
             </a:extLst>
           </p:cNvPr>
@@ -8090,7 +8136,12 @@
             <p:ph type="title"/>
           </p:nvPr>
         </p:nvSpPr>
-        <p:spPr/>
+        <p:spPr>
+          <a:xfrm>
+            <a:off x="677334" y="609600"/>
+            <a:ext cx="8596668" cy="1320800"/>
+          </a:xfrm>
+        </p:spPr>
         <p:txBody>
           <a:bodyPr/>
           <a:lstStyle/>
@@ -8104,10 +8155,10 @@
       </p:sp>
       <p:sp>
         <p:nvSpPr>
-          <p:cNvPr id="3" name="Espace réservé du contenu 2">
+          <p:cNvPr id="11" name="Espace réservé du contenu 2">
             <a:extLst>
               <a:ext uri="{FF2B5EF4-FFF2-40B4-BE49-F238E27FC236}">
-                <a16:creationId xmlns:a16="http://schemas.microsoft.com/office/drawing/2014/main" id="{63DCC6C1-B4A5-4CF6-A55E-7F89B39E94EE}"/>
+                <a16:creationId xmlns="" xmlns:a16="http://schemas.microsoft.com/office/drawing/2014/main" id="{63DCC6C1-B4A5-4CF6-A55E-7F89B39E94EE}"/>
               </a:ext>
             </a:extLst>
           </p:cNvPr>
@@ -8118,129 +8169,619 @@
             <p:ph idx="1"/>
           </p:nvPr>
         </p:nvSpPr>
-        <p:spPr/>
+        <p:spPr>
+          <a:xfrm>
+            <a:off x="677334" y="2160590"/>
+            <a:ext cx="8596668" cy="2782472"/>
+          </a:xfrm>
+        </p:spPr>
         <p:txBody>
           <a:bodyPr/>
           <a:lstStyle/>
           <a:p>
             <a:r>
               <a:rPr lang="fr-FR" dirty="0"/>
-              <a:t>Domaine de stabilité méthodes RK et BDF</a:t>
-            </a:r>
-          </a:p>
-          <a:p>
-            <a:pPr marL="0" indent="0">
+              <a:t>Domaine de stabilité méthodes RK et </a:t>
+            </a:r>
+            <a:r>
+              <a:rPr lang="fr-FR" dirty="0" smtClean="0"/>
+              <a:t>BDF</a:t>
+            </a:r>
+          </a:p>
+          <a:p>
+            <a:pPr lvl="1"/>
+            <a:r>
+              <a:rPr lang="fr-FR" dirty="0" smtClean="0"/>
+              <a:t>A-stabilité pour des EDO </a:t>
+            </a:r>
+          </a:p>
+          <a:p>
+            <a:pPr lvl="1">
               <a:buNone/>
             </a:pPr>
-            <a:endParaRPr lang="fr-FR" dirty="0"/>
-          </a:p>
-        </p:txBody>
-      </p:sp>
-      <p:pic>
-        <p:nvPicPr>
-          <p:cNvPr id="5" name="Image 4">
+            <a:r>
+              <a:rPr lang="fr-FR" dirty="0" smtClean="0"/>
+              <a:t>	linéaires, par exemple :</a:t>
+            </a:r>
+          </a:p>
+          <a:p>
+            <a:pPr lvl="1">
+              <a:buNone/>
+            </a:pPr>
+            <a:endParaRPr lang="fr-FR" dirty="0" smtClean="0"/>
+          </a:p>
+          <a:p>
+            <a:pPr lvl="1">
+              <a:buNone/>
+            </a:pPr>
+            <a:endParaRPr lang="fr-FR" dirty="0" smtClean="0"/>
+          </a:p>
+          <a:p>
+            <a:pPr lvl="1"/>
+            <a:endParaRPr lang="fr-FR" dirty="0" smtClean="0"/>
+          </a:p>
+          <a:p>
+            <a:pPr lvl="1"/>
+            <a:endParaRPr lang="fr-FR" dirty="0" smtClean="0"/>
+          </a:p>
+          <a:p>
+            <a:pPr lvl="1"/>
+            <a:endParaRPr lang="fr-FR" dirty="0" smtClean="0"/>
+          </a:p>
+        </p:txBody>
+      </p:sp>
+      <p:grpSp>
+        <p:nvGrpSpPr>
+          <p:cNvPr id="12" name="11 Grupo"/>
+          <p:cNvGrpSpPr/>
+          <p:nvPr/>
+        </p:nvGrpSpPr>
+        <p:grpSpPr>
+          <a:xfrm>
+            <a:off x="1411149" y="3554481"/>
+            <a:ext cx="2193441" cy="1419083"/>
+            <a:chOff x="1278629" y="3501473"/>
+            <a:chExt cx="2505075" cy="1620700"/>
+          </a:xfrm>
+        </p:grpSpPr>
+        <p:pic>
+          <p:nvPicPr>
+            <p:cNvPr id="13" name="Picture 2"/>
+            <p:cNvPicPr>
+              <a:picLocks noChangeAspect="1" noChangeArrowheads="1"/>
+            </p:cNvPicPr>
+            <p:nvPr/>
+          </p:nvPicPr>
+          <p:blipFill>
+            <a:blip r:embed="rId2"/>
+            <a:srcRect/>
+            <a:stretch>
+              <a:fillRect/>
+            </a:stretch>
+          </p:blipFill>
+          <p:spPr bwMode="auto">
+            <a:xfrm>
+              <a:off x="1464987" y="3501473"/>
+              <a:ext cx="2238375" cy="438150"/>
+            </a:xfrm>
+            <a:prstGeom prst="rect">
+              <a:avLst/>
+            </a:prstGeom>
+            <a:noFill/>
+            <a:ln w="9525">
+              <a:noFill/>
+              <a:miter lim="800000"/>
+              <a:headEnd/>
+              <a:tailEnd/>
+            </a:ln>
+            <a:effectLst/>
+          </p:spPr>
+        </p:pic>
+        <p:pic>
+          <p:nvPicPr>
+            <p:cNvPr id="14" name="Picture 4"/>
+            <p:cNvPicPr>
+              <a:picLocks noChangeAspect="1" noChangeArrowheads="1"/>
+            </p:cNvPicPr>
+            <p:nvPr/>
+          </p:nvPicPr>
+          <p:blipFill>
+            <a:blip r:embed="rId3"/>
+            <a:srcRect/>
+            <a:stretch>
+              <a:fillRect/>
+            </a:stretch>
+          </p:blipFill>
+          <p:spPr bwMode="auto">
+            <a:xfrm>
+              <a:off x="1278629" y="4023691"/>
+              <a:ext cx="2505075" cy="533400"/>
+            </a:xfrm>
+            <a:prstGeom prst="rect">
+              <a:avLst/>
+            </a:prstGeom>
+            <a:noFill/>
+            <a:ln w="9525">
+              <a:noFill/>
+              <a:miter lim="800000"/>
+              <a:headEnd/>
+              <a:tailEnd/>
+            </a:ln>
+            <a:effectLst/>
+          </p:spPr>
+        </p:pic>
+        <p:pic>
+          <p:nvPicPr>
+            <p:cNvPr id="15" name="Picture 5"/>
+            <p:cNvPicPr>
+              <a:picLocks noChangeAspect="1" noChangeArrowheads="1"/>
+            </p:cNvPicPr>
+            <p:nvPr/>
+          </p:nvPicPr>
+          <p:blipFill>
+            <a:blip r:embed="rId4"/>
+            <a:srcRect/>
+            <a:stretch>
+              <a:fillRect/>
+            </a:stretch>
+          </p:blipFill>
+          <p:spPr bwMode="auto">
+            <a:xfrm>
+              <a:off x="1456497" y="4598298"/>
+              <a:ext cx="2228850" cy="523875"/>
+            </a:xfrm>
+            <a:prstGeom prst="rect">
+              <a:avLst/>
+            </a:prstGeom>
+            <a:noFill/>
+            <a:ln w="9525">
+              <a:noFill/>
+              <a:miter lim="800000"/>
+              <a:headEnd/>
+              <a:tailEnd/>
+            </a:ln>
+            <a:effectLst/>
+          </p:spPr>
+        </p:pic>
+      </p:grpSp>
+      <p:sp>
+        <p:nvSpPr>
+          <p:cNvPr id="16" name="Espace réservé du contenu 2">
             <a:extLst>
               <a:ext uri="{FF2B5EF4-FFF2-40B4-BE49-F238E27FC236}">
-                <a16:creationId xmlns:a16="http://schemas.microsoft.com/office/drawing/2014/main" id="{D4F82992-7DDF-4A24-8514-DB781371A122}"/>
+                <a16:creationId xmlns="" xmlns:a16="http://schemas.microsoft.com/office/drawing/2014/main" id="{63DCC6C1-B4A5-4CF6-A55E-7F89B39E94EE}"/>
               </a:ext>
             </a:extLst>
           </p:cNvPr>
-          <p:cNvPicPr>
-            <a:picLocks noChangeAspect="1"/>
-          </p:cNvPicPr>
+          <p:cNvSpPr txBox="1">
+            <a:spLocks/>
+          </p:cNvSpPr>
           <p:nvPr/>
-        </p:nvPicPr>
-        <p:blipFill>
-          <a:blip r:embed="rId2">
-            <a:extLst>
-              <a:ext uri="{28A0092B-C50C-407E-A947-70E740481C1C}">
-                <a14:useLocalDpi xmlns:a14="http://schemas.microsoft.com/office/drawing/2010/main" val="0"/>
-              </a:ext>
-            </a:extLst>
-          </a:blip>
-          <a:stretch>
-            <a:fillRect/>
-          </a:stretch>
-        </p:blipFill>
+        </p:nvSpPr>
         <p:spPr>
           <a:xfrm>
-            <a:off x="5817608" y="2511895"/>
-            <a:ext cx="6043184" cy="4078107"/>
+            <a:off x="670710" y="4923674"/>
+            <a:ext cx="8596668" cy="933794"/>
           </a:xfrm>
           <a:prstGeom prst="rect">
             <a:avLst/>
           </a:prstGeom>
         </p:spPr>
-      </p:pic>
-      <p:pic>
-        <p:nvPicPr>
-          <p:cNvPr id="7" name="Image 6">
-            <a:extLst>
-              <a:ext uri="{FF2B5EF4-FFF2-40B4-BE49-F238E27FC236}">
-                <a16:creationId xmlns:a16="http://schemas.microsoft.com/office/drawing/2014/main" id="{4AB8479D-1181-4F7E-8648-B639C85E4D0F}"/>
-              </a:ext>
-            </a:extLst>
-          </p:cNvPr>
-          <p:cNvPicPr>
-            <a:picLocks noChangeAspect="1"/>
-          </p:cNvPicPr>
+        <p:txBody>
+          <a:bodyPr vert="horz" lIns="91440" tIns="45720" rIns="91440" bIns="45720" rtlCol="0">
+            <a:normAutofit fontScale="92500" lnSpcReduction="20000"/>
+          </a:bodyPr>
+          <a:lstStyle/>
+          <a:p>
+            <a:pPr marL="742950" marR="0" lvl="1" indent="-285750" algn="l" defTabSz="457200" rtl="0" eaLnBrk="1" fontAlgn="auto" latinLnBrk="0" hangingPunct="1">
+              <a:lnSpc>
+                <a:spcPct val="100000"/>
+              </a:lnSpc>
+              <a:spcBef>
+                <a:spcPts val="1000"/>
+              </a:spcBef>
+              <a:spcAft>
+                <a:spcPts val="0"/>
+              </a:spcAft>
+              <a:buClr>
+                <a:schemeClr val="accent1"/>
+              </a:buClr>
+              <a:buSzPct val="80000"/>
+              <a:tabLst/>
+              <a:defRPr/>
+            </a:pPr>
+            <a:endParaRPr kumimoji="0" lang="fr-FR" sz="1600" b="0" i="0" u="none" strike="noStrike" kern="1200" cap="none" spc="0" normalizeH="0" baseline="0" noProof="0" dirty="0" smtClean="0">
+              <a:ln>
+                <a:noFill/>
+              </a:ln>
+              <a:solidFill>
+                <a:schemeClr val="tx1">
+                  <a:lumMod val="75000"/>
+                  <a:lumOff val="25000"/>
+                </a:schemeClr>
+              </a:solidFill>
+              <a:effectLst/>
+              <a:uLnTx/>
+              <a:uFillTx/>
+              <a:latin typeface="+mn-lt"/>
+              <a:ea typeface="+mn-ea"/>
+              <a:cs typeface="+mn-cs"/>
+            </a:endParaRPr>
+          </a:p>
+          <a:p>
+            <a:pPr marL="742950" marR="0" lvl="1" indent="-285750" algn="l" defTabSz="457200" rtl="0" eaLnBrk="1" fontAlgn="auto" latinLnBrk="0" hangingPunct="1">
+              <a:lnSpc>
+                <a:spcPct val="100000"/>
+              </a:lnSpc>
+              <a:spcBef>
+                <a:spcPts val="1000"/>
+              </a:spcBef>
+              <a:spcAft>
+                <a:spcPts val="0"/>
+              </a:spcAft>
+              <a:buClr>
+                <a:schemeClr val="accent1"/>
+              </a:buClr>
+              <a:buSzPct val="80000"/>
+              <a:buFont typeface="Wingdings 3" charset="2"/>
+              <a:buChar char=""/>
+              <a:tabLst/>
+              <a:defRPr/>
+            </a:pPr>
+            <a:r>
+              <a:rPr kumimoji="0" lang="fr-FR" sz="1600" b="0" i="0" u="none" strike="noStrike" kern="1200" cap="none" spc="0" normalizeH="0" baseline="0" noProof="0" dirty="0" smtClean="0">
+                <a:ln>
+                  <a:noFill/>
+                </a:ln>
+                <a:solidFill>
+                  <a:schemeClr val="tx1">
+                    <a:lumMod val="75000"/>
+                    <a:lumOff val="25000"/>
+                  </a:schemeClr>
+                </a:solidFill>
+                <a:effectLst/>
+                <a:uLnTx/>
+                <a:uFillTx/>
+                <a:latin typeface="+mn-lt"/>
+                <a:ea typeface="+mn-ea"/>
+                <a:cs typeface="+mn-cs"/>
+              </a:rPr>
+              <a:t>Définition de stabilité pour </a:t>
+            </a:r>
+          </a:p>
+          <a:p>
+            <a:pPr marL="742950" marR="0" lvl="1" indent="-285750" algn="l" defTabSz="457200" rtl="0" eaLnBrk="1" fontAlgn="auto" latinLnBrk="0" hangingPunct="1">
+              <a:lnSpc>
+                <a:spcPct val="100000"/>
+              </a:lnSpc>
+              <a:spcBef>
+                <a:spcPts val="1000"/>
+              </a:spcBef>
+              <a:spcAft>
+                <a:spcPts val="0"/>
+              </a:spcAft>
+              <a:buClr>
+                <a:schemeClr val="accent1"/>
+              </a:buClr>
+              <a:buSzPct val="80000"/>
+              <a:buFont typeface="Wingdings 3" charset="2"/>
+              <a:buNone/>
+              <a:tabLst/>
+              <a:defRPr/>
+            </a:pPr>
+            <a:r>
+              <a:rPr kumimoji="0" lang="fr-FR" sz="1600" b="0" i="0" u="none" strike="noStrike" kern="1200" cap="none" spc="0" normalizeH="0" baseline="0" noProof="0" dirty="0" smtClean="0">
+                <a:ln>
+                  <a:noFill/>
+                </a:ln>
+                <a:solidFill>
+                  <a:schemeClr val="tx1">
+                    <a:lumMod val="75000"/>
+                    <a:lumOff val="25000"/>
+                  </a:schemeClr>
+                </a:solidFill>
+                <a:effectLst/>
+                <a:uLnTx/>
+                <a:uFillTx/>
+                <a:latin typeface="+mn-lt"/>
+                <a:ea typeface="+mn-ea"/>
+                <a:cs typeface="+mn-cs"/>
+              </a:rPr>
+              <a:t>	des EDP non-linéaires </a:t>
+            </a:r>
+          </a:p>
+          <a:p>
+            <a:pPr marL="0" marR="0" lvl="0" indent="0" algn="l" defTabSz="457200" rtl="0" eaLnBrk="1" fontAlgn="auto" latinLnBrk="0" hangingPunct="1">
+              <a:lnSpc>
+                <a:spcPct val="100000"/>
+              </a:lnSpc>
+              <a:spcBef>
+                <a:spcPts val="1000"/>
+              </a:spcBef>
+              <a:spcAft>
+                <a:spcPts val="0"/>
+              </a:spcAft>
+              <a:buClr>
+                <a:schemeClr val="accent1"/>
+              </a:buClr>
+              <a:buSzPct val="80000"/>
+              <a:buFont typeface="Wingdings 3" charset="2"/>
+              <a:buNone/>
+              <a:tabLst/>
+              <a:defRPr/>
+            </a:pPr>
+            <a:endParaRPr kumimoji="0" lang="fr-FR" sz="1800" b="0" i="0" u="none" strike="noStrike" kern="1200" cap="none" spc="0" normalizeH="0" baseline="0" noProof="0" dirty="0">
+              <a:ln>
+                <a:noFill/>
+              </a:ln>
+              <a:solidFill>
+                <a:schemeClr val="tx1">
+                  <a:lumMod val="75000"/>
+                  <a:lumOff val="25000"/>
+                </a:schemeClr>
+              </a:solidFill>
+              <a:effectLst/>
+              <a:uLnTx/>
+              <a:uFillTx/>
+              <a:latin typeface="+mn-lt"/>
+              <a:ea typeface="+mn-ea"/>
+              <a:cs typeface="+mn-cs"/>
+            </a:endParaRPr>
+          </a:p>
+        </p:txBody>
+      </p:sp>
+      <p:grpSp>
+        <p:nvGrpSpPr>
+          <p:cNvPr id="17" name="16 Grupo"/>
+          <p:cNvGrpSpPr/>
           <p:nvPr/>
-        </p:nvPicPr>
-        <p:blipFill>
-          <a:blip r:embed="rId3">
-            <a:extLst>
-              <a:ext uri="{28A0092B-C50C-407E-A947-70E740481C1C}">
-                <a14:useLocalDpi xmlns:a14="http://schemas.microsoft.com/office/drawing/2010/main" val="0"/>
-              </a:ext>
-            </a:extLst>
-          </a:blip>
-          <a:stretch>
-            <a:fillRect/>
-          </a:stretch>
-        </p:blipFill>
-        <p:spPr>
+        </p:nvGrpSpPr>
+        <p:grpSpPr>
           <a:xfrm>
-            <a:off x="1372638" y="3013805"/>
-            <a:ext cx="6798474" cy="2909475"/>
+            <a:off x="4531672" y="2451657"/>
+            <a:ext cx="6831963" cy="3908762"/>
+            <a:chOff x="4432775" y="2557673"/>
+            <a:chExt cx="6831963" cy="3908762"/>
           </a:xfrm>
-          <a:prstGeom prst="rect">
-            <a:avLst/>
-          </a:prstGeom>
-        </p:spPr>
-      </p:pic>
-      <p:sp>
-        <p:nvSpPr>
-          <p:cNvPr id="6" name="Espace réservé du numéro de diapositive 5">
-            <a:extLst>
-              <a:ext uri="{FF2B5EF4-FFF2-40B4-BE49-F238E27FC236}">
-                <a16:creationId xmlns:a16="http://schemas.microsoft.com/office/drawing/2014/main" id="{464D931B-CFDB-41C1-B492-4F3E72F526AD}"/>
-              </a:ext>
-            </a:extLst>
-          </p:cNvPr>
-          <p:cNvSpPr>
-            <a:spLocks noGrp="1"/>
-          </p:cNvSpPr>
-          <p:nvPr>
-            <p:ph type="sldNum" sz="quarter" idx="12"/>
-          </p:nvPr>
-        </p:nvSpPr>
-        <p:spPr/>
-        <p:txBody>
-          <a:bodyPr/>
-          <a:lstStyle/>
-          <a:p>
-            <a:fld id="{000982F6-AAAD-4258-B115-44D8EC280712}" type="slidenum">
-              <a:rPr lang="fr-FR" smtClean="0"/>
-              <a:t>18</a:t>
-            </a:fld>
-            <a:endParaRPr lang="fr-FR"/>
-          </a:p>
-        </p:txBody>
-      </p:sp>
+        </p:grpSpPr>
+        <p:pic>
+          <p:nvPicPr>
+            <p:cNvPr id="18" name="Image 6">
+              <a:extLst>
+                <a:ext uri="{FF2B5EF4-FFF2-40B4-BE49-F238E27FC236}">
+                  <a16:creationId xmlns="" xmlns:a16="http://schemas.microsoft.com/office/drawing/2014/main" id="{4AB8479D-1181-4F7E-8648-B639C85E4D0F}"/>
+                </a:ext>
+              </a:extLst>
+            </p:cNvPr>
+            <p:cNvPicPr>
+              <a:picLocks noChangeAspect="1"/>
+            </p:cNvPicPr>
+            <p:nvPr/>
+          </p:nvPicPr>
+          <p:blipFill>
+            <a:blip r:embed="rId5">
+              <a:extLst>
+                <a:ext uri="{28A0092B-C50C-407E-A947-70E740481C1C}">
+                  <a14:useLocalDpi xmlns="" xmlns:a14="http://schemas.microsoft.com/office/drawing/2010/main" val="0"/>
+                </a:ext>
+              </a:extLst>
+            </a:blip>
+            <a:stretch>
+              <a:fillRect/>
+            </a:stretch>
+          </p:blipFill>
+          <p:spPr>
+            <a:xfrm>
+              <a:off x="4432775" y="3123072"/>
+              <a:ext cx="6798474" cy="2909475"/>
+            </a:xfrm>
+            <a:prstGeom prst="rect">
+              <a:avLst/>
+            </a:prstGeom>
+          </p:spPr>
+        </p:pic>
+        <p:sp>
+          <p:nvSpPr>
+            <p:cNvPr id="19" name="18 CuadroTexto"/>
+            <p:cNvSpPr txBox="1"/>
+            <p:nvPr/>
+          </p:nvSpPr>
+          <p:spPr>
+            <a:xfrm>
+              <a:off x="4439868" y="2557673"/>
+              <a:ext cx="6824870" cy="3908762"/>
+            </a:xfrm>
+            <a:prstGeom prst="rect">
+              <a:avLst/>
+            </a:prstGeom>
+            <a:noFill/>
+          </p:spPr>
+          <p:txBody>
+            <a:bodyPr wrap="square" rtlCol="0">
+              <a:spAutoFit/>
+            </a:bodyPr>
+            <a:lstStyle/>
+            <a:p>
+              <a:pPr algn="ctr"/>
+              <a:r>
+                <a:rPr lang="fr-FR" sz="3200" dirty="0" smtClean="0"/>
+                <a:t>RK</a:t>
+              </a:r>
+            </a:p>
+            <a:p>
+              <a:endParaRPr lang="fr-FR" dirty="0" smtClean="0"/>
+            </a:p>
+            <a:p>
+              <a:endParaRPr lang="fr-FR" dirty="0" smtClean="0"/>
+            </a:p>
+            <a:p>
+              <a:endParaRPr lang="fr-FR" dirty="0" smtClean="0"/>
+            </a:p>
+            <a:p>
+              <a:endParaRPr lang="fr-FR" dirty="0" smtClean="0"/>
+            </a:p>
+            <a:p>
+              <a:endParaRPr lang="fr-FR" dirty="0" smtClean="0"/>
+            </a:p>
+            <a:p>
+              <a:endParaRPr lang="fr-FR" dirty="0" smtClean="0"/>
+            </a:p>
+            <a:p>
+              <a:endParaRPr lang="fr-FR" dirty="0" smtClean="0"/>
+            </a:p>
+            <a:p>
+              <a:endParaRPr lang="fr-FR" i="1" dirty="0" smtClean="0"/>
+            </a:p>
+            <a:p>
+              <a:endParaRPr lang="fr-FR" i="1" dirty="0" smtClean="0"/>
+            </a:p>
+            <a:p>
+              <a:endParaRPr lang="fr-FR" i="1" dirty="0" smtClean="0"/>
+            </a:p>
+            <a:p>
+              <a:endParaRPr lang="fr-FR" i="1" dirty="0" smtClean="0"/>
+            </a:p>
+            <a:p>
+              <a:pPr algn="ctr"/>
+              <a:r>
+                <a:rPr lang="fr-FR" i="1" dirty="0" smtClean="0"/>
+                <a:t>Source : ???</a:t>
+              </a:r>
+              <a:endParaRPr lang="fr-FR" i="1" dirty="0"/>
+            </a:p>
+          </p:txBody>
+        </p:sp>
+      </p:grpSp>
+      <p:grpSp>
+        <p:nvGrpSpPr>
+          <p:cNvPr id="20" name="19 Grupo"/>
+          <p:cNvGrpSpPr/>
+          <p:nvPr/>
+        </p:nvGrpSpPr>
+        <p:grpSpPr>
+          <a:xfrm>
+            <a:off x="4602453" y="2206497"/>
+            <a:ext cx="6824870" cy="4401205"/>
+            <a:chOff x="4457985" y="2312513"/>
+            <a:chExt cx="6824870" cy="4401205"/>
+          </a:xfrm>
+        </p:grpSpPr>
+        <p:pic>
+          <p:nvPicPr>
+            <p:cNvPr id="21" name="Image 4">
+              <a:extLst>
+                <a:ext uri="{FF2B5EF4-FFF2-40B4-BE49-F238E27FC236}">
+                  <a16:creationId xmlns="" xmlns:a16="http://schemas.microsoft.com/office/drawing/2014/main" id="{D4F82992-7DDF-4A24-8514-DB781371A122}"/>
+                </a:ext>
+              </a:extLst>
+            </p:cNvPr>
+            <p:cNvPicPr>
+              <a:picLocks noChangeAspect="1"/>
+            </p:cNvPicPr>
+            <p:nvPr/>
+          </p:nvPicPr>
+          <p:blipFill>
+            <a:blip r:embed="rId6">
+              <a:extLst>
+                <a:ext uri="{28A0092B-C50C-407E-A947-70E740481C1C}">
+                  <a14:useLocalDpi xmlns="" xmlns:a14="http://schemas.microsoft.com/office/drawing/2010/main" val="0"/>
+                </a:ext>
+              </a:extLst>
+            </a:blip>
+            <a:stretch>
+              <a:fillRect/>
+            </a:stretch>
+          </p:blipFill>
+          <p:spPr>
+            <a:xfrm>
+              <a:off x="5128521" y="2753419"/>
+              <a:ext cx="5406983" cy="3648781"/>
+            </a:xfrm>
+            <a:prstGeom prst="rect">
+              <a:avLst/>
+            </a:prstGeom>
+          </p:spPr>
+        </p:pic>
+        <p:sp>
+          <p:nvSpPr>
+            <p:cNvPr id="22" name="21 CuadroTexto"/>
+            <p:cNvSpPr txBox="1"/>
+            <p:nvPr/>
+          </p:nvSpPr>
+          <p:spPr>
+            <a:xfrm>
+              <a:off x="4457985" y="2312513"/>
+              <a:ext cx="6824870" cy="4401205"/>
+            </a:xfrm>
+            <a:prstGeom prst="rect">
+              <a:avLst/>
+            </a:prstGeom>
+            <a:noFill/>
+          </p:spPr>
+          <p:txBody>
+            <a:bodyPr wrap="square" rtlCol="0">
+              <a:spAutoFit/>
+            </a:bodyPr>
+            <a:lstStyle/>
+            <a:p>
+              <a:pPr algn="ctr"/>
+              <a:r>
+                <a:rPr lang="fr-FR" sz="3200" dirty="0" smtClean="0"/>
+                <a:t>BDF</a:t>
+              </a:r>
+            </a:p>
+            <a:p>
+              <a:pPr algn="ctr"/>
+              <a:endParaRPr lang="fr-FR" sz="3200" dirty="0" smtClean="0"/>
+            </a:p>
+            <a:p>
+              <a:endParaRPr lang="fr-FR" dirty="0" smtClean="0"/>
+            </a:p>
+            <a:p>
+              <a:endParaRPr lang="fr-FR" dirty="0" smtClean="0"/>
+            </a:p>
+            <a:p>
+              <a:endParaRPr lang="fr-FR" dirty="0" smtClean="0"/>
+            </a:p>
+            <a:p>
+              <a:endParaRPr lang="fr-FR" dirty="0" smtClean="0"/>
+            </a:p>
+            <a:p>
+              <a:endParaRPr lang="fr-FR" dirty="0" smtClean="0"/>
+            </a:p>
+            <a:p>
+              <a:endParaRPr lang="fr-FR" dirty="0" smtClean="0"/>
+            </a:p>
+            <a:p>
+              <a:endParaRPr lang="fr-FR" dirty="0" smtClean="0"/>
+            </a:p>
+            <a:p>
+              <a:endParaRPr lang="fr-FR" i="1" dirty="0" smtClean="0"/>
+            </a:p>
+            <a:p>
+              <a:endParaRPr lang="fr-FR" i="1" dirty="0" smtClean="0"/>
+            </a:p>
+            <a:p>
+              <a:endParaRPr lang="fr-FR" i="1" dirty="0" smtClean="0"/>
+            </a:p>
+            <a:p>
+              <a:endParaRPr lang="fr-FR" i="1" dirty="0" smtClean="0"/>
+            </a:p>
+            <a:p>
+              <a:pPr algn="ctr"/>
+              <a:r>
+                <a:rPr lang="fr-FR" i="1" dirty="0" smtClean="0"/>
+                <a:t>Source : ???</a:t>
+              </a:r>
+              <a:endParaRPr lang="fr-FR" i="1" dirty="0"/>
+            </a:p>
+          </p:txBody>
+        </p:sp>
+      </p:grpSp>
     </p:spTree>
     <p:extLst>
       <p:ext uri="{BB962C8B-B14F-4D97-AF65-F5344CB8AC3E}">
-        <p14:creationId xmlns:p14="http://schemas.microsoft.com/office/powerpoint/2010/main" val="1711717958"/>
+        <p14:creationId xmlns:p14="http://schemas.microsoft.com/office/powerpoint/2010/main" xmlns="" val="1711717958"/>
       </p:ext>
     </p:extLst>
   </p:cSld>
@@ -8281,7 +8822,7 @@
                                           </p:stCondLst>
                                         </p:cTn>
                                         <p:tgtEl>
-                                          <p:spTgt spid="7"/>
+                                          <p:spTgt spid="17"/>
                                         </p:tgtEl>
                                         <p:attrNameLst>
                                           <p:attrName>style.visibility</p:attrName>
@@ -8313,20 +8854,28 @@
                             </p:stCondLst>
                             <p:childTnLst>
                               <p:par>
-                                <p:cTn id="9" presetID="1" presetClass="exit" presetSubtype="0" fill="hold" nodeType="clickEffect">
+                                <p:cTn id="9" presetID="10" presetClass="exit" presetSubtype="0" fill="hold" nodeType="clickEffect">
                                   <p:stCondLst>
                                     <p:cond delay="0"/>
                                   </p:stCondLst>
                                   <p:childTnLst>
+                                    <p:animEffect transition="out" filter="fade">
+                                      <p:cBhvr>
+                                        <p:cTn id="10" dur="500"/>
+                                        <p:tgtEl>
+                                          <p:spTgt spid="17"/>
+                                        </p:tgtEl>
+                                      </p:cBhvr>
+                                    </p:animEffect>
                                     <p:set>
                                       <p:cBhvr>
-                                        <p:cTn id="10" dur="1" fill="hold">
+                                        <p:cTn id="11" dur="1" fill="hold">
                                           <p:stCondLst>
-                                            <p:cond delay="0"/>
+                                            <p:cond delay="499"/>
                                           </p:stCondLst>
                                         </p:cTn>
                                         <p:tgtEl>
-                                          <p:spTgt spid="7"/>
+                                          <p:spTgt spid="17"/>
                                         </p:tgtEl>
                                         <p:attrNameLst>
                                           <p:attrName>style.visibility</p:attrName>
@@ -8340,20 +8889,65 @@
                                 </p:cTn>
                               </p:par>
                               <p:par>
-                                <p:cTn id="11" presetID="1" presetClass="entr" presetSubtype="0" fill="hold" nodeType="withEffect">
+                                <p:cTn id="12" presetID="1" presetClass="entr" presetSubtype="0" fill="hold" nodeType="withEffect">
                                   <p:stCondLst>
                                     <p:cond delay="0"/>
                                   </p:stCondLst>
                                   <p:childTnLst>
                                     <p:set>
                                       <p:cBhvr>
-                                        <p:cTn id="12" dur="1" fill="hold">
+                                        <p:cTn id="13" dur="1" fill="hold">
                                           <p:stCondLst>
                                             <p:cond delay="0"/>
                                           </p:stCondLst>
                                         </p:cTn>
                                         <p:tgtEl>
-                                          <p:spTgt spid="5"/>
+                                          <p:spTgt spid="20"/>
+                                        </p:tgtEl>
+                                        <p:attrNameLst>
+                                          <p:attrName>style.visibility</p:attrName>
+                                        </p:attrNameLst>
+                                      </p:cBhvr>
+                                      <p:to>
+                                        <p:strVal val="visible"/>
+                                      </p:to>
+                                    </p:set>
+                                  </p:childTnLst>
+                                </p:cTn>
+                              </p:par>
+                            </p:childTnLst>
+                          </p:cTn>
+                        </p:par>
+                      </p:childTnLst>
+                    </p:cTn>
+                  </p:par>
+                  <p:par>
+                    <p:cTn id="14" fill="hold">
+                      <p:stCondLst>
+                        <p:cond delay="indefinite"/>
+                      </p:stCondLst>
+                      <p:childTnLst>
+                        <p:par>
+                          <p:cTn id="15" fill="hold">
+                            <p:stCondLst>
+                              <p:cond delay="0"/>
+                            </p:stCondLst>
+                            <p:childTnLst>
+                              <p:par>
+                                <p:cTn id="16" presetID="1" presetClass="entr" presetSubtype="0" fill="hold" grpId="0" nodeType="clickEffect">
+                                  <p:stCondLst>
+                                    <p:cond delay="0"/>
+                                  </p:stCondLst>
+                                  <p:childTnLst>
+                                    <p:set>
+                                      <p:cBhvr>
+                                        <p:cTn id="17" dur="1" fill="hold">
+                                          <p:stCondLst>
+                                            <p:cond delay="0"/>
+                                          </p:stCondLst>
+                                        </p:cTn>
+                                        <p:tgtEl>
+                                          <p:spTgt spid="16"/>
                                         </p:tgtEl>
                                         <p:attrNameLst>
                                           <p:attrName>style.visibility</p:attrName>
@@ -8393,6 +8987,9 @@
         </p:cTn>
       </p:par>
     </p:tnLst>
+    <p:bldLst>
+      <p:bldP spid="16" grpId="0"/>
+    </p:bldLst>
   </p:timing>
 </p:sld>
 </file>
@@ -8419,7 +9016,7 @@
           <p:cNvPr id="2" name="Titre 1">
             <a:extLst>
               <a:ext uri="{FF2B5EF4-FFF2-40B4-BE49-F238E27FC236}">
-                <a16:creationId xmlns:a16="http://schemas.microsoft.com/office/drawing/2014/main" id="{33D48989-5D71-406C-AC15-390DA2F5F356}"/>
+                <a16:creationId xmlns:a16="http://schemas.microsoft.com/office/drawing/2014/main" xmlns="" id="{33D48989-5D71-406C-AC15-390DA2F5F356}"/>
               </a:ext>
             </a:extLst>
           </p:cNvPr>
@@ -8447,7 +9044,7 @@
           <p:cNvPr id="3" name="Espace réservé du contenu 2">
             <a:extLst>
               <a:ext uri="{FF2B5EF4-FFF2-40B4-BE49-F238E27FC236}">
-                <a16:creationId xmlns:a16="http://schemas.microsoft.com/office/drawing/2014/main" id="{11DCB18D-0E24-4E2D-A04E-C2DDFCD78A60}"/>
+                <a16:creationId xmlns:a16="http://schemas.microsoft.com/office/drawing/2014/main" xmlns="" id="{11DCB18D-0E24-4E2D-A04E-C2DDFCD78A60}"/>
               </a:ext>
             </a:extLst>
           </p:cNvPr>
@@ -8625,7 +9222,7 @@
         </p:txBody>
       </p:sp>
       <mc:AlternateContent xmlns:mc="http://schemas.openxmlformats.org/markup-compatibility/2006">
-        <mc:Choice xmlns:a14="http://schemas.microsoft.com/office/drawing/2010/main" Requires="a14">
+        <mc:Choice xmlns:a14="http://schemas.microsoft.com/office/drawing/2010/main" xmlns="" Requires="a14">
           <p:sp>
             <p:nvSpPr>
               <p:cNvPr id="6" name="ZoneTexte 5">
@@ -9057,7 +9654,7 @@
               <p:cNvPr id="6" name="ZoneTexte 5">
                 <a:extLst>
                   <a:ext uri="{FF2B5EF4-FFF2-40B4-BE49-F238E27FC236}">
-                    <a16:creationId xmlns:a16="http://schemas.microsoft.com/office/drawing/2014/main" id="{7D82F776-85DB-4C84-AED1-07693A0AD7BD}"/>
+                    <a16:creationId xmlns:a16="http://schemas.microsoft.com/office/drawing/2014/main" xmlns="" id="{7D82F776-85DB-4C84-AED1-07693A0AD7BD}"/>
                   </a:ext>
                 </a:extLst>
               </p:cNvPr>
@@ -9099,13 +9696,20 @@
     </p:spTree>
     <p:extLst>
       <p:ext uri="{BB962C8B-B14F-4D97-AF65-F5344CB8AC3E}">
-        <p14:creationId xmlns:p14="http://schemas.microsoft.com/office/powerpoint/2010/main" val="861286761"/>
+        <p14:creationId xmlns:p14="http://schemas.microsoft.com/office/powerpoint/2010/main" xmlns="" val="861286761"/>
       </p:ext>
     </p:extLst>
   </p:cSld>
   <p:clrMapOvr>
     <a:masterClrMapping/>
   </p:clrMapOvr>
+  <p:timing>
+    <p:tnLst>
+      <p:par>
+        <p:cTn id="1" dur="indefinite" restart="never" nodeType="tmRoot"/>
+      </p:par>
+    </p:tnLst>
+  </p:timing>
 </p:sld>
 </file>
 
@@ -9131,7 +9735,7 @@
           <p:cNvPr id="2" name="Titre 1">
             <a:extLst>
               <a:ext uri="{FF2B5EF4-FFF2-40B4-BE49-F238E27FC236}">
-                <a16:creationId xmlns:a16="http://schemas.microsoft.com/office/drawing/2014/main" id="{69D98500-3E71-4B6B-BECF-27066BD9682A}"/>
+                <a16:creationId xmlns:a16="http://schemas.microsoft.com/office/drawing/2014/main" xmlns="" id="{69D98500-3E71-4B6B-BECF-27066BD9682A}"/>
               </a:ext>
             </a:extLst>
           </p:cNvPr>
@@ -9160,7 +9764,7 @@
           <p:cNvPr id="3" name="Espace réservé du contenu 2">
             <a:extLst>
               <a:ext uri="{FF2B5EF4-FFF2-40B4-BE49-F238E27FC236}">
-                <a16:creationId xmlns:a16="http://schemas.microsoft.com/office/drawing/2014/main" id="{AC9AEF68-C286-46F0-A42E-2550BE479DEA}"/>
+                <a16:creationId xmlns:a16="http://schemas.microsoft.com/office/drawing/2014/main" xmlns="" id="{AC9AEF68-C286-46F0-A42E-2550BE479DEA}"/>
               </a:ext>
             </a:extLst>
           </p:cNvPr>
@@ -9248,7 +9852,7 @@
           <p:cNvPr id="5" name="Espace réservé du numéro de diapositive 4">
             <a:extLst>
               <a:ext uri="{FF2B5EF4-FFF2-40B4-BE49-F238E27FC236}">
-                <a16:creationId xmlns:a16="http://schemas.microsoft.com/office/drawing/2014/main" id="{2763C543-9DC2-458A-9059-B0871E5F6D5C}"/>
+                <a16:creationId xmlns:a16="http://schemas.microsoft.com/office/drawing/2014/main" xmlns="" id="{2763C543-9DC2-458A-9059-B0871E5F6D5C}"/>
               </a:ext>
             </a:extLst>
           </p:cNvPr>
@@ -9266,6 +9870,7 @@
           <a:p>
             <a:fld id="{000982F6-AAAD-4258-B115-44D8EC280712}" type="slidenum">
               <a:rPr lang="fr-FR" smtClean="0"/>
+              <a:pPr/>
               <a:t>2</a:t>
             </a:fld>
             <a:endParaRPr lang="fr-FR"/>
@@ -9275,7 +9880,7 @@
     </p:spTree>
     <p:extLst>
       <p:ext uri="{BB962C8B-B14F-4D97-AF65-F5344CB8AC3E}">
-        <p14:creationId xmlns:p14="http://schemas.microsoft.com/office/powerpoint/2010/main" val="1102305186"/>
+        <p14:creationId xmlns:p14="http://schemas.microsoft.com/office/powerpoint/2010/main" xmlns="" val="1102305186"/>
       </p:ext>
     </p:extLst>
   </p:cSld>
@@ -9304,10 +9909,585 @@
       </p:grpSpPr>
       <p:sp>
         <p:nvSpPr>
+          <p:cNvPr id="9" name="Titre 1">
+            <a:extLst>
+              <a:ext uri="{FF2B5EF4-FFF2-40B4-BE49-F238E27FC236}">
+                <a16:creationId xmlns="" xmlns:a16="http://schemas.microsoft.com/office/drawing/2014/main" id="{B3ACA20D-C8BA-48AC-8A1B-D5BF49DC040C}"/>
+              </a:ext>
+            </a:extLst>
+          </p:cNvPr>
+          <p:cNvSpPr>
+            <a:spLocks noGrp="1"/>
+          </p:cNvSpPr>
+          <p:nvPr>
+            <p:ph type="title"/>
+          </p:nvPr>
+        </p:nvSpPr>
+        <p:spPr>
+          <a:xfrm>
+            <a:off x="677334" y="609600"/>
+            <a:ext cx="8596668" cy="1320800"/>
+          </a:xfrm>
+        </p:spPr>
+        <p:txBody>
+          <a:bodyPr/>
+          <a:lstStyle/>
+          <a:p>
+            <a:r>
+              <a:rPr lang="fr-FR" dirty="0"/>
+              <a:t>IV – Méthodes numériques exponentielles</a:t>
+            </a:r>
+          </a:p>
+        </p:txBody>
+      </p:sp>
+      <p:sp>
+        <p:nvSpPr>
+          <p:cNvPr id="10" name="Espace réservé du contenu 2">
+            <a:extLst>
+              <a:ext uri="{FF2B5EF4-FFF2-40B4-BE49-F238E27FC236}">
+                <a16:creationId xmlns="" xmlns:a16="http://schemas.microsoft.com/office/drawing/2014/main" id="{572CBCEE-73BF-41CE-94D4-7F72DCE621AB}"/>
+              </a:ext>
+            </a:extLst>
+          </p:cNvPr>
+          <p:cNvSpPr>
+            <a:spLocks noGrp="1"/>
+          </p:cNvSpPr>
+          <p:nvPr>
+            <p:ph idx="1"/>
+          </p:nvPr>
+        </p:nvSpPr>
+        <p:spPr>
+          <a:xfrm>
+            <a:off x="677334" y="2134085"/>
+            <a:ext cx="8596668" cy="3880773"/>
+          </a:xfrm>
+        </p:spPr>
+        <p:txBody>
+          <a:bodyPr/>
+          <a:lstStyle/>
+          <a:p>
+            <a:r>
+              <a:rPr lang="fr-FR" dirty="0"/>
+              <a:t>Calcul d’exponentielle </a:t>
+            </a:r>
+            <a:r>
+              <a:rPr lang="fr-FR" dirty="0" smtClean="0"/>
+              <a:t>d’une matrice,   , de taille </a:t>
+            </a:r>
+            <a:endParaRPr lang="fr-FR" dirty="0"/>
+          </a:p>
+          <a:p>
+            <a:pPr lvl="1"/>
+            <a:r>
+              <a:rPr lang="fr-FR" dirty="0" smtClean="0"/>
+              <a:t>Module </a:t>
+            </a:r>
+            <a:r>
+              <a:rPr lang="fr-FR" dirty="0" err="1"/>
+              <a:t>Scipy</a:t>
+            </a:r>
+            <a:r>
+              <a:rPr lang="fr-FR" dirty="0"/>
+              <a:t> </a:t>
+            </a:r>
+            <a:r>
+              <a:rPr lang="fr-FR" dirty="0" smtClean="0"/>
+              <a:t>       </a:t>
+            </a:r>
+            <a:r>
+              <a:rPr lang="es-ES" dirty="0" err="1" smtClean="0"/>
+              <a:t>Scaling</a:t>
+            </a:r>
+            <a:r>
+              <a:rPr lang="es-ES" dirty="0" smtClean="0"/>
+              <a:t> and </a:t>
+            </a:r>
+            <a:r>
+              <a:rPr lang="es-ES" dirty="0" err="1" smtClean="0"/>
+              <a:t>Squaring</a:t>
+            </a:r>
+            <a:r>
+              <a:rPr lang="es-ES" dirty="0" smtClean="0"/>
+              <a:t> </a:t>
+            </a:r>
+            <a:r>
+              <a:rPr lang="es-ES" dirty="0" err="1" smtClean="0"/>
+              <a:t>Algorithm</a:t>
+            </a:r>
+            <a:r>
+              <a:rPr lang="es-ES" dirty="0" smtClean="0"/>
+              <a:t> (</a:t>
+            </a:r>
+            <a:r>
+              <a:rPr lang="en-US" dirty="0" smtClean="0"/>
+              <a:t>A.H. Al-</a:t>
+            </a:r>
+            <a:r>
+              <a:rPr lang="en-US" dirty="0" err="1" smtClean="0"/>
+              <a:t>Mohy</a:t>
+            </a:r>
+            <a:r>
+              <a:rPr lang="en-US" dirty="0" smtClean="0"/>
+              <a:t> &amp; N.J. </a:t>
+            </a:r>
+            <a:r>
+              <a:rPr lang="en-US" dirty="0" err="1" smtClean="0"/>
+              <a:t>Higham</a:t>
+            </a:r>
+            <a:r>
+              <a:rPr lang="es-ES" dirty="0" smtClean="0"/>
+              <a:t>)</a:t>
+            </a:r>
+          </a:p>
+          <a:p>
+            <a:pPr lvl="2">
+              <a:buFont typeface="Wingdings" pitchFamily="2" charset="2"/>
+              <a:buChar char="§"/>
+            </a:pPr>
+            <a:r>
+              <a:rPr lang="es-ES" dirty="0" err="1" smtClean="0"/>
+              <a:t>Précision</a:t>
+            </a:r>
+            <a:r>
+              <a:rPr lang="es-ES" dirty="0" smtClean="0"/>
+              <a:t> </a:t>
+            </a:r>
+            <a:r>
+              <a:rPr lang="es-ES" dirty="0" err="1" smtClean="0"/>
+              <a:t>très</a:t>
+            </a:r>
+            <a:r>
+              <a:rPr lang="es-ES" dirty="0" smtClean="0"/>
+              <a:t> </a:t>
+            </a:r>
+            <a:r>
+              <a:rPr lang="es-ES" dirty="0" err="1" smtClean="0"/>
+              <a:t>élevée</a:t>
+            </a:r>
+            <a:r>
+              <a:rPr lang="es-ES" dirty="0" smtClean="0"/>
+              <a:t> (</a:t>
+            </a:r>
+            <a:r>
+              <a:rPr lang="es-ES" dirty="0" err="1" smtClean="0"/>
+              <a:t>référence</a:t>
+            </a:r>
+            <a:r>
+              <a:rPr lang="es-ES" dirty="0" smtClean="0"/>
+              <a:t>)</a:t>
+            </a:r>
+            <a:endParaRPr lang="fr-FR" dirty="0" smtClean="0"/>
+          </a:p>
+          <a:p>
+            <a:pPr lvl="1"/>
+            <a:r>
+              <a:rPr lang="fr-FR" dirty="0" smtClean="0"/>
+              <a:t>Méthode </a:t>
+            </a:r>
+            <a:r>
+              <a:rPr lang="fr-FR" dirty="0"/>
+              <a:t>de Krylov </a:t>
+            </a:r>
+            <a:endParaRPr lang="fr-FR" dirty="0" smtClean="0"/>
+          </a:p>
+          <a:p>
+            <a:pPr lvl="2">
+              <a:buFont typeface="Wingdings" pitchFamily="2" charset="2"/>
+              <a:buChar char="§"/>
+            </a:pPr>
+            <a:r>
+              <a:rPr lang="fr-FR" dirty="0" smtClean="0"/>
+              <a:t>Gain de temps</a:t>
+            </a:r>
+            <a:endParaRPr lang="fr-FR" dirty="0"/>
+          </a:p>
+          <a:p>
+            <a:r>
+              <a:rPr lang="fr-FR" dirty="0" smtClean="0"/>
+              <a:t>Base de la méthode de Krylov</a:t>
+            </a:r>
+          </a:p>
+          <a:p>
+            <a:endParaRPr lang="fr-FR" dirty="0" smtClean="0"/>
+          </a:p>
+          <a:p>
+            <a:endParaRPr lang="fr-FR" dirty="0" smtClean="0"/>
+          </a:p>
+          <a:p>
+            <a:pPr lvl="1"/>
+            <a:r>
+              <a:rPr lang="fr-FR" dirty="0" smtClean="0"/>
+              <a:t>Décomposition d’</a:t>
+            </a:r>
+            <a:r>
+              <a:rPr lang="fr-FR" dirty="0" err="1" smtClean="0"/>
+              <a:t>Arnoldi</a:t>
+            </a:r>
+            <a:r>
+              <a:rPr lang="fr-FR" dirty="0" smtClean="0"/>
+              <a:t>         Base orthogonale et bien conditionnée</a:t>
+            </a:r>
+          </a:p>
+          <a:p>
+            <a:pPr lvl="1"/>
+            <a:r>
+              <a:rPr lang="fr-FR" dirty="0" smtClean="0"/>
+              <a:t>Exponentielle d’une matrice de </a:t>
+            </a:r>
+            <a:r>
+              <a:rPr lang="fr-FR" dirty="0" err="1" smtClean="0"/>
+              <a:t>Hessenberg</a:t>
+            </a:r>
+            <a:r>
+              <a:rPr lang="fr-FR" dirty="0" smtClean="0"/>
+              <a:t>,       , de taille </a:t>
+            </a:r>
+          </a:p>
+          <a:p>
+            <a:endParaRPr lang="fr-FR" dirty="0"/>
+          </a:p>
+        </p:txBody>
+      </p:sp>
+      <p:cxnSp>
+        <p:nvCxnSpPr>
+          <p:cNvPr id="11" name="10 Conector recto de flecha"/>
+          <p:cNvCxnSpPr/>
+          <p:nvPr/>
+        </p:nvCxnSpPr>
+        <p:spPr>
+          <a:xfrm>
+            <a:off x="2769703" y="2716696"/>
+            <a:ext cx="318052" cy="1588"/>
+          </a:xfrm>
+          <a:prstGeom prst="straightConnector1">
+            <a:avLst/>
+          </a:prstGeom>
+          <a:ln>
+            <a:tailEnd type="arrow"/>
+          </a:ln>
+        </p:spPr>
+        <p:style>
+          <a:lnRef idx="1">
+            <a:schemeClr val="accent1"/>
+          </a:lnRef>
+          <a:fillRef idx="0">
+            <a:schemeClr val="accent1"/>
+          </a:fillRef>
+          <a:effectRef idx="0">
+            <a:schemeClr val="accent1"/>
+          </a:effectRef>
+          <a:fontRef idx="minor">
+            <a:schemeClr val="tx1"/>
+          </a:fontRef>
+        </p:style>
+      </p:cxnSp>
+      <p:pic>
+        <p:nvPicPr>
+          <p:cNvPr id="12" name="Picture 2"/>
+          <p:cNvPicPr>
+            <a:picLocks noChangeAspect="1" noChangeArrowheads="1"/>
+          </p:cNvPicPr>
+          <p:nvPr/>
+        </p:nvPicPr>
+        <p:blipFill>
+          <a:blip r:embed="rId2"/>
+          <a:srcRect/>
+          <a:stretch>
+            <a:fillRect/>
+          </a:stretch>
+        </p:blipFill>
+        <p:spPr bwMode="auto">
+          <a:xfrm>
+            <a:off x="1174888" y="4333463"/>
+            <a:ext cx="1753842" cy="895579"/>
+          </a:xfrm>
+          <a:prstGeom prst="rect">
+            <a:avLst/>
+          </a:prstGeom>
+          <a:noFill/>
+          <a:ln w="9525">
+            <a:noFill/>
+            <a:miter lim="800000"/>
+            <a:headEnd/>
+            <a:tailEnd/>
+          </a:ln>
+          <a:effectLst/>
+        </p:spPr>
+      </p:pic>
+      <p:pic>
+        <p:nvPicPr>
+          <p:cNvPr id="13" name="Picture 3"/>
+          <p:cNvPicPr>
+            <a:picLocks noChangeAspect="1" noChangeArrowheads="1"/>
+          </p:cNvPicPr>
+          <p:nvPr/>
+        </p:nvPicPr>
+        <p:blipFill>
+          <a:blip r:embed="rId3"/>
+          <a:srcRect/>
+          <a:stretch>
+            <a:fillRect/>
+          </a:stretch>
+        </p:blipFill>
+        <p:spPr bwMode="auto">
+          <a:xfrm>
+            <a:off x="3384488" y="4473026"/>
+            <a:ext cx="4275275" cy="608094"/>
+          </a:xfrm>
+          <a:prstGeom prst="rect">
+            <a:avLst/>
+          </a:prstGeom>
+          <a:noFill/>
+          <a:ln w="9525">
+            <a:noFill/>
+            <a:miter lim="800000"/>
+            <a:headEnd/>
+            <a:tailEnd/>
+          </a:ln>
+          <a:effectLst/>
+        </p:spPr>
+      </p:pic>
+      <p:cxnSp>
+        <p:nvCxnSpPr>
+          <p:cNvPr id="14" name="13 Conector recto de flecha"/>
+          <p:cNvCxnSpPr/>
+          <p:nvPr/>
+        </p:nvCxnSpPr>
+        <p:spPr>
+          <a:xfrm>
+            <a:off x="3041371" y="4777384"/>
+            <a:ext cx="318052" cy="1588"/>
+          </a:xfrm>
+          <a:prstGeom prst="straightConnector1">
+            <a:avLst/>
+          </a:prstGeom>
+          <a:ln>
+            <a:tailEnd type="arrow"/>
+          </a:ln>
+        </p:spPr>
+        <p:style>
+          <a:lnRef idx="1">
+            <a:schemeClr val="accent1"/>
+          </a:lnRef>
+          <a:fillRef idx="0">
+            <a:schemeClr val="accent1"/>
+          </a:fillRef>
+          <a:effectRef idx="0">
+            <a:schemeClr val="accent1"/>
+          </a:effectRef>
+          <a:fontRef idx="minor">
+            <a:schemeClr val="tx1"/>
+          </a:fontRef>
+        </p:style>
+      </p:cxnSp>
+      <p:cxnSp>
+        <p:nvCxnSpPr>
+          <p:cNvPr id="15" name="14 Conector recto de flecha"/>
+          <p:cNvCxnSpPr/>
+          <p:nvPr/>
+        </p:nvCxnSpPr>
+        <p:spPr>
+          <a:xfrm>
+            <a:off x="3856371" y="5340596"/>
+            <a:ext cx="318052" cy="1588"/>
+          </a:xfrm>
+          <a:prstGeom prst="straightConnector1">
+            <a:avLst/>
+          </a:prstGeom>
+          <a:ln>
+            <a:tailEnd type="arrow"/>
+          </a:ln>
+        </p:spPr>
+        <p:style>
+          <a:lnRef idx="1">
+            <a:schemeClr val="accent1"/>
+          </a:lnRef>
+          <a:fillRef idx="0">
+            <a:schemeClr val="accent1"/>
+          </a:fillRef>
+          <a:effectRef idx="0">
+            <a:schemeClr val="accent1"/>
+          </a:effectRef>
+          <a:fontRef idx="minor">
+            <a:schemeClr val="tx1"/>
+          </a:fontRef>
+        </p:style>
+      </p:cxnSp>
+      <p:pic>
+        <p:nvPicPr>
+          <p:cNvPr id="16" name="Picture 4"/>
+          <p:cNvPicPr>
+            <a:picLocks noChangeAspect="1" noChangeArrowheads="1"/>
+          </p:cNvPicPr>
+          <p:nvPr/>
+        </p:nvPicPr>
+        <p:blipFill>
+          <a:blip r:embed="rId4"/>
+          <a:srcRect l="13228" t="4" r="6924"/>
+          <a:stretch>
+            <a:fillRect/>
+          </a:stretch>
+        </p:blipFill>
+        <p:spPr bwMode="auto">
+          <a:xfrm>
+            <a:off x="5582983" y="5526157"/>
+            <a:ext cx="397942" cy="357796"/>
+          </a:xfrm>
+          <a:prstGeom prst="rect">
+            <a:avLst/>
+          </a:prstGeom>
+          <a:noFill/>
+          <a:ln w="9525">
+            <a:noFill/>
+            <a:miter lim="800000"/>
+            <a:headEnd/>
+            <a:tailEnd/>
+          </a:ln>
+          <a:effectLst/>
+        </p:spPr>
+      </p:pic>
+      <p:pic>
+        <p:nvPicPr>
+          <p:cNvPr id="17" name="Picture 6"/>
+          <p:cNvPicPr>
+            <a:picLocks noChangeAspect="1" noChangeArrowheads="1"/>
+          </p:cNvPicPr>
+          <p:nvPr/>
+        </p:nvPicPr>
+        <p:blipFill>
+          <a:blip r:embed="rId5"/>
+          <a:srcRect/>
+          <a:stretch>
+            <a:fillRect/>
+          </a:stretch>
+        </p:blipFill>
+        <p:spPr bwMode="auto">
+          <a:xfrm>
+            <a:off x="6973352" y="5617754"/>
+            <a:ext cx="881314" cy="220329"/>
+          </a:xfrm>
+          <a:prstGeom prst="rect">
+            <a:avLst/>
+          </a:prstGeom>
+          <a:noFill/>
+          <a:ln w="9525">
+            <a:noFill/>
+            <a:miter lim="800000"/>
+            <a:headEnd/>
+            <a:tailEnd/>
+          </a:ln>
+          <a:effectLst/>
+        </p:spPr>
+      </p:pic>
+      <p:pic>
+        <p:nvPicPr>
+          <p:cNvPr id="18" name="Picture 3"/>
+          <p:cNvPicPr>
+            <a:picLocks noChangeAspect="1" noChangeArrowheads="1"/>
+          </p:cNvPicPr>
+          <p:nvPr/>
+        </p:nvPicPr>
+        <p:blipFill>
+          <a:blip r:embed="rId3"/>
+          <a:srcRect l="12952" t="25778" r="82686" b="33944"/>
+          <a:stretch>
+            <a:fillRect/>
+          </a:stretch>
+        </p:blipFill>
+        <p:spPr bwMode="auto">
+          <a:xfrm>
+            <a:off x="5050258" y="2182084"/>
+            <a:ext cx="186505" cy="244929"/>
+          </a:xfrm>
+          <a:prstGeom prst="rect">
+            <a:avLst/>
+          </a:prstGeom>
+          <a:noFill/>
+          <a:ln w="9525">
+            <a:noFill/>
+            <a:miter lim="800000"/>
+            <a:headEnd/>
+            <a:tailEnd/>
+          </a:ln>
+          <a:effectLst/>
+        </p:spPr>
+      </p:pic>
+      <p:pic>
+        <p:nvPicPr>
+          <p:cNvPr id="19" name="Picture 6"/>
+          <p:cNvPicPr>
+            <a:picLocks noChangeAspect="1" noChangeArrowheads="1"/>
+          </p:cNvPicPr>
+          <p:nvPr/>
+        </p:nvPicPr>
+        <p:blipFill>
+          <a:blip r:embed="rId5"/>
+          <a:srcRect l="78866" t="-1840"/>
+          <a:stretch>
+            <a:fillRect/>
+          </a:stretch>
+        </p:blipFill>
+        <p:spPr bwMode="auto">
+          <a:xfrm>
+            <a:off x="6263726" y="2234786"/>
+            <a:ext cx="186256" cy="224384"/>
+          </a:xfrm>
+          <a:prstGeom prst="rect">
+            <a:avLst/>
+          </a:prstGeom>
+          <a:noFill/>
+          <a:ln w="9525">
+            <a:noFill/>
+            <a:miter lim="800000"/>
+            <a:headEnd/>
+            <a:tailEnd/>
+          </a:ln>
+          <a:effectLst/>
+        </p:spPr>
+      </p:pic>
+    </p:spTree>
+    <p:extLst>
+      <p:ext uri="{BB962C8B-B14F-4D97-AF65-F5344CB8AC3E}">
+        <p14:creationId xmlns:p14="http://schemas.microsoft.com/office/powerpoint/2010/main" xmlns="" val="474638245"/>
+      </p:ext>
+    </p:extLst>
+  </p:cSld>
+  <p:clrMapOvr>
+    <a:masterClrMapping/>
+  </p:clrMapOvr>
+  <p:timing>
+    <p:tnLst>
+      <p:par>
+        <p:cTn id="1" dur="indefinite" restart="never" nodeType="tmRoot"/>
+      </p:par>
+    </p:tnLst>
+  </p:timing>
+</p:sld>
+</file>
+
+<file path=ppt/slides/slide21.xml><?xml version="1.0" encoding="utf-8"?>
+<p:sld xmlns:a="http://schemas.openxmlformats.org/drawingml/2006/main" xmlns:r="http://schemas.openxmlformats.org/officeDocument/2006/relationships" xmlns:p="http://schemas.openxmlformats.org/presentationml/2006/main">
+  <p:cSld>
+    <p:spTree>
+      <p:nvGrpSpPr>
+        <p:cNvPr id="1" name=""/>
+        <p:cNvGrpSpPr/>
+        <p:nvPr/>
+      </p:nvGrpSpPr>
+      <p:grpSpPr>
+        <a:xfrm>
+          <a:off x="0" y="0"/>
+          <a:ext cx="0" cy="0"/>
+          <a:chOff x="0" y="0"/>
+          <a:chExt cx="0" cy="0"/>
+        </a:xfrm>
+      </p:grpSpPr>
+      <p:sp>
+        <p:nvSpPr>
           <p:cNvPr id="2" name="Titre 1">
             <a:extLst>
               <a:ext uri="{FF2B5EF4-FFF2-40B4-BE49-F238E27FC236}">
-                <a16:creationId xmlns:a16="http://schemas.microsoft.com/office/drawing/2014/main" id="{B3ACA20D-C8BA-48AC-8A1B-D5BF49DC040C}"/>
+                <a16:creationId xmlns:a16="http://schemas.microsoft.com/office/drawing/2014/main" xmlns="" id="{B3ACA20D-C8BA-48AC-8A1B-D5BF49DC040C}"/>
               </a:ext>
             </a:extLst>
           </p:cNvPr>
@@ -9335,7 +10515,7 @@
           <p:cNvPr id="3" name="Espace réservé du contenu 2">
             <a:extLst>
               <a:ext uri="{FF2B5EF4-FFF2-40B4-BE49-F238E27FC236}">
-                <a16:creationId xmlns:a16="http://schemas.microsoft.com/office/drawing/2014/main" id="{572CBCEE-73BF-41CE-94D4-7F72DCE621AB}"/>
+                <a16:creationId xmlns:a16="http://schemas.microsoft.com/office/drawing/2014/main" xmlns="" id="{572CBCEE-73BF-41CE-94D4-7F72DCE621AB}"/>
               </a:ext>
             </a:extLst>
           </p:cNvPr>
@@ -9349,48 +10529,35 @@
         <p:spPr/>
         <p:txBody>
           <a:bodyPr>
-            <a:normAutofit fontScale="85000" lnSpcReduction="20000"/>
+            <a:normAutofit/>
           </a:bodyPr>
           <a:lstStyle/>
           <a:p>
             <a:r>
-              <a:rPr lang="fr-FR" dirty="0"/>
-              <a:t>Calcul d’exponentielle de matrice en python</a:t>
-            </a:r>
-          </a:p>
-          <a:p>
-            <a:endParaRPr lang="fr-FR" dirty="0"/>
-          </a:p>
-          <a:p>
-            <a:r>
-              <a:rPr lang="fr-FR" dirty="0"/>
-              <a:t>Utilisation du module </a:t>
-            </a:r>
-            <a:r>
-              <a:rPr lang="fr-FR" dirty="0" err="1"/>
-              <a:t>Scipy</a:t>
-            </a:r>
-            <a:r>
-              <a:rPr lang="fr-FR" dirty="0"/>
-              <a:t> </a:t>
-            </a:r>
-          </a:p>
-          <a:p>
-            <a:endParaRPr lang="fr-FR" dirty="0"/>
-          </a:p>
-          <a:p>
-            <a:r>
-              <a:rPr lang="fr-FR" dirty="0"/>
-              <a:t>Implémentation de la méthode de Krylov </a:t>
-            </a:r>
-          </a:p>
-          <a:p>
-            <a:endParaRPr lang="fr-FR" dirty="0"/>
-          </a:p>
-          <a:p>
-            <a:r>
-              <a:rPr lang="fr-FR" dirty="0"/>
-              <a:t>   Amélioration du temps de calcul de la méthode (</a:t>
+              <a:rPr lang="fr-FR" dirty="0" smtClean="0"/>
+              <a:t>A</a:t>
+            </a:r>
+            <a:r>
+              <a:rPr lang="fr-FR" dirty="0" smtClean="0"/>
+              <a:t>mélioration du temps de calcul de la méthode (</a:t>
+            </a:r>
+            <a:r>
+              <a:rPr lang="fr-FR" dirty="0" smtClean="0">
+                <a:solidFill>
+                  <a:srgbClr val="FF0000"/>
+                </a:solidFill>
+              </a:rPr>
+              <a:t>Virer erreur absolue si ça fait de la merde)</a:t>
+            </a:r>
+          </a:p>
+          <a:p>
+            <a:r>
+              <a:rPr lang="fr-FR" dirty="0" smtClean="0">
+                <a:solidFill>
+                  <a:srgbClr val="FF0000"/>
+                </a:solidFill>
+              </a:rPr>
+              <a:t>Voir </a:t>
             </a:r>
             <a:r>
               <a:rPr lang="fr-FR" dirty="0">
@@ -9398,17 +10565,7 @@
                   <a:srgbClr val="FF0000"/>
                 </a:solidFill>
               </a:rPr>
-              <a:t>Virer erreur absolue si ça fait de la merde)</a:t>
-            </a:r>
-          </a:p>
-          <a:p>
-            <a:r>
-              <a:rPr lang="fr-FR" dirty="0">
-                <a:solidFill>
-                  <a:srgbClr val="FF0000"/>
-                </a:solidFill>
-              </a:rPr>
-              <a:t>Voir le moment ou Krylov n’est plus rentable avec l’augmentation de la dimension ( dire que du coup on va rester sur des problèmes de </a:t>
+              <a:t>le moment ou Krylov n’est plus rentable avec l’augmentation de la dimension ( dire que du coup on va rester sur des problèmes de </a:t>
             </a:r>
             <a:r>
               <a:rPr lang="fr-FR" dirty="0" err="1">
@@ -9471,58 +10628,12 @@
           </a:p>
         </p:txBody>
       </p:sp>
-      <p:sp>
-        <p:nvSpPr>
-          <p:cNvPr id="4" name="Flèche : droite 3">
-            <a:extLst>
-              <a:ext uri="{FF2B5EF4-FFF2-40B4-BE49-F238E27FC236}">
-                <a16:creationId xmlns:a16="http://schemas.microsoft.com/office/drawing/2014/main" id="{2953CAF0-33E8-4AF1-8E58-14EA48335686}"/>
-              </a:ext>
-            </a:extLst>
-          </p:cNvPr>
-          <p:cNvSpPr/>
-          <p:nvPr/>
-        </p:nvSpPr>
-        <p:spPr>
-          <a:xfrm>
-            <a:off x="677334" y="4592320"/>
-            <a:ext cx="457200" cy="355601"/>
-          </a:xfrm>
-          <a:prstGeom prst="rightArrow">
-            <a:avLst/>
-          </a:prstGeom>
-        </p:spPr>
-        <p:style>
-          <a:lnRef idx="2">
-            <a:schemeClr val="accent1">
-              <a:shade val="50000"/>
-            </a:schemeClr>
-          </a:lnRef>
-          <a:fillRef idx="1">
-            <a:schemeClr val="accent1"/>
-          </a:fillRef>
-          <a:effectRef idx="0">
-            <a:schemeClr val="accent1"/>
-          </a:effectRef>
-          <a:fontRef idx="minor">
-            <a:schemeClr val="lt1"/>
-          </a:fontRef>
-        </p:style>
-        <p:txBody>
-          <a:bodyPr rtlCol="0" anchor="ctr"/>
-          <a:lstStyle/>
-          <a:p>
-            <a:pPr algn="ctr"/>
-            <a:endParaRPr lang="fr-FR"/>
-          </a:p>
-        </p:txBody>
-      </p:sp>
       <p:pic>
         <p:nvPicPr>
           <p:cNvPr id="1026" name="Picture 2" descr="https://lh3.googleusercontent.com/9uI-o7le6bMVd2swCsPRnGWjIVobJZS6AHCRcRk31hs1euU42v5lElfT4mgJpqSyqVOz1TRILKo8WXElp97gSdab7Lh3Vd1ToTZD6sceA2aRRvOEetXKh6rOFe_z5BHrMzbqHTG-3jZeIQ">
             <a:extLst>
               <a:ext uri="{FF2B5EF4-FFF2-40B4-BE49-F238E27FC236}">
-                <a16:creationId xmlns:a16="http://schemas.microsoft.com/office/drawing/2014/main" id="{E6606883-82CD-4DA3-94CE-3AEC53ED689B}"/>
+                <a16:creationId xmlns:a16="http://schemas.microsoft.com/office/drawing/2014/main" xmlns="" id="{E6606883-82CD-4DA3-94CE-3AEC53ED689B}"/>
               </a:ext>
             </a:extLst>
           </p:cNvPr>
@@ -9535,7 +10646,7 @@
           <a:blip r:embed="rId2">
             <a:extLst>
               <a:ext uri="{28A0092B-C50C-407E-A947-70E740481C1C}">
-                <a14:useLocalDpi xmlns:a14="http://schemas.microsoft.com/office/drawing/2010/main" val="0"/>
+                <a14:useLocalDpi xmlns:a14="http://schemas.microsoft.com/office/drawing/2010/main" xmlns="" val="0"/>
               </a:ext>
             </a:extLst>
           </a:blip>
@@ -9546,7 +10657,7 @@
         </p:blipFill>
         <p:spPr bwMode="auto">
           <a:xfrm>
-            <a:off x="5222241" y="2256934"/>
+            <a:off x="4394927" y="5392020"/>
             <a:ext cx="7101488" cy="1229361"/>
           </a:xfrm>
           <a:prstGeom prst="rect">
@@ -9555,7 +10666,7 @@
           <a:noFill/>
           <a:extLst>
             <a:ext uri="{909E8E84-426E-40DD-AFC4-6F175D3DCCD1}">
-              <a14:hiddenFill xmlns:a14="http://schemas.microsoft.com/office/drawing/2010/main">
+              <a14:hiddenFill xmlns:a14="http://schemas.microsoft.com/office/drawing/2010/main" xmlns="">
                 <a:solidFill>
                   <a:srgbClr val="FFFFFF"/>
                 </a:solidFill>
@@ -9569,7 +10680,7 @@
           <p:cNvPr id="6" name="Espace réservé du numéro de diapositive 5">
             <a:extLst>
               <a:ext uri="{FF2B5EF4-FFF2-40B4-BE49-F238E27FC236}">
-                <a16:creationId xmlns:a16="http://schemas.microsoft.com/office/drawing/2014/main" id="{585359D9-45F9-4A60-A2CF-ABEBE8F51B58}"/>
+                <a16:creationId xmlns:a16="http://schemas.microsoft.com/office/drawing/2014/main" xmlns="" id="{585359D9-45F9-4A60-A2CF-ABEBE8F51B58}"/>
               </a:ext>
             </a:extLst>
           </p:cNvPr>
@@ -9587,7 +10698,8 @@
           <a:p>
             <a:fld id="{000982F6-AAAD-4258-B115-44D8EC280712}" type="slidenum">
               <a:rPr lang="fr-FR" smtClean="0"/>
-              <a:t>20</a:t>
+              <a:pPr/>
+              <a:t>21</a:t>
             </a:fld>
             <a:endParaRPr lang="fr-FR"/>
           </a:p>
@@ -9596,7 +10708,7 @@
     </p:spTree>
     <p:extLst>
       <p:ext uri="{BB962C8B-B14F-4D97-AF65-F5344CB8AC3E}">
-        <p14:creationId xmlns:p14="http://schemas.microsoft.com/office/powerpoint/2010/main" val="474638245"/>
+        <p14:creationId xmlns:p14="http://schemas.microsoft.com/office/powerpoint/2010/main" xmlns="" val="474638245"/>
       </p:ext>
     </p:extLst>
   </p:cSld>
@@ -9681,7 +10793,7 @@
 </p:sld>
 </file>
 
-<file path=ppt/slides/slide21.xml><?xml version="1.0" encoding="utf-8"?>
+<file path=ppt/slides/slide22.xml><?xml version="1.0" encoding="utf-8"?>
 <p:sld xmlns:a="http://schemas.openxmlformats.org/drawingml/2006/main" xmlns:r="http://schemas.openxmlformats.org/officeDocument/2006/relationships" xmlns:p="http://schemas.openxmlformats.org/presentationml/2006/main">
   <p:cSld>
     <p:spTree>
@@ -9703,7 +10815,7 @@
           <p:cNvPr id="2" name="Titre 1">
             <a:extLst>
               <a:ext uri="{FF2B5EF4-FFF2-40B4-BE49-F238E27FC236}">
-                <a16:creationId xmlns:a16="http://schemas.microsoft.com/office/drawing/2014/main" id="{BEAD297D-408C-4DCC-A83F-3991F010784A}"/>
+                <a16:creationId xmlns:a16="http://schemas.microsoft.com/office/drawing/2014/main" xmlns="" id="{BEAD297D-408C-4DCC-A83F-3991F010784A}"/>
               </a:ext>
             </a:extLst>
           </p:cNvPr>
@@ -9731,7 +10843,7 @@
           <p:cNvPr id="4" name="Espace réservé du contenu 3">
             <a:extLst>
               <a:ext uri="{FF2B5EF4-FFF2-40B4-BE49-F238E27FC236}">
-                <a16:creationId xmlns:a16="http://schemas.microsoft.com/office/drawing/2014/main" id="{BECEC932-1CBA-496B-A497-0EEBE4276EC1}"/>
+                <a16:creationId xmlns:a16="http://schemas.microsoft.com/office/drawing/2014/main" xmlns="" id="{BECEC932-1CBA-496B-A497-0EEBE4276EC1}"/>
               </a:ext>
             </a:extLst>
           </p:cNvPr>
@@ -9746,7 +10858,7 @@
           <a:blip r:embed="rId2">
             <a:extLst>
               <a:ext uri="{28A0092B-C50C-407E-A947-70E740481C1C}">
-                <a14:useLocalDpi xmlns:a14="http://schemas.microsoft.com/office/drawing/2010/main" val="0"/>
+                <a14:useLocalDpi xmlns:a14="http://schemas.microsoft.com/office/drawing/2010/main" xmlns="" val="0"/>
               </a:ext>
             </a:extLst>
           </a:blip>
@@ -9769,7 +10881,7 @@
           <p:cNvPr id="6" name="Image 5">
             <a:extLst>
               <a:ext uri="{FF2B5EF4-FFF2-40B4-BE49-F238E27FC236}">
-                <a16:creationId xmlns:a16="http://schemas.microsoft.com/office/drawing/2014/main" id="{BA8C6809-1D91-4B3D-BECB-23D7EFEEC9DB}"/>
+                <a16:creationId xmlns:a16="http://schemas.microsoft.com/office/drawing/2014/main" xmlns="" id="{BA8C6809-1D91-4B3D-BECB-23D7EFEEC9DB}"/>
               </a:ext>
             </a:extLst>
           </p:cNvPr>
@@ -9782,7 +10894,7 @@
           <a:blip r:embed="rId3">
             <a:extLst>
               <a:ext uri="{28A0092B-C50C-407E-A947-70E740481C1C}">
-                <a14:useLocalDpi xmlns:a14="http://schemas.microsoft.com/office/drawing/2010/main" val="0"/>
+                <a14:useLocalDpi xmlns:a14="http://schemas.microsoft.com/office/drawing/2010/main" xmlns="" val="0"/>
               </a:ext>
             </a:extLst>
           </a:blip>
@@ -9805,7 +10917,7 @@
           <p:cNvPr id="3" name="ZoneTexte 2">
             <a:extLst>
               <a:ext uri="{FF2B5EF4-FFF2-40B4-BE49-F238E27FC236}">
-                <a16:creationId xmlns:a16="http://schemas.microsoft.com/office/drawing/2014/main" id="{A899714B-70B7-4356-B765-062BAD9A1EB4}"/>
+                <a16:creationId xmlns:a16="http://schemas.microsoft.com/office/drawing/2014/main" xmlns="" id="{A899714B-70B7-4356-B765-062BAD9A1EB4}"/>
               </a:ext>
             </a:extLst>
           </p:cNvPr>
@@ -9857,7 +10969,7 @@
           <p:cNvPr id="7" name="Espace réservé du numéro de diapositive 6">
             <a:extLst>
               <a:ext uri="{FF2B5EF4-FFF2-40B4-BE49-F238E27FC236}">
-                <a16:creationId xmlns:a16="http://schemas.microsoft.com/office/drawing/2014/main" id="{B5F3ACBF-5648-4DC3-BB5F-8CC74562734A}"/>
+                <a16:creationId xmlns:a16="http://schemas.microsoft.com/office/drawing/2014/main" xmlns="" id="{B5F3ACBF-5648-4DC3-BB5F-8CC74562734A}"/>
               </a:ext>
             </a:extLst>
           </p:cNvPr>
@@ -9875,7 +10987,8 @@
           <a:p>
             <a:fld id="{000982F6-AAAD-4258-B115-44D8EC280712}" type="slidenum">
               <a:rPr lang="fr-FR" smtClean="0"/>
-              <a:t>21</a:t>
+              <a:pPr/>
+              <a:t>22</a:t>
             </a:fld>
             <a:endParaRPr lang="fr-FR"/>
           </a:p>
@@ -9884,7 +10997,7 @@
     </p:spTree>
     <p:extLst>
       <p:ext uri="{BB962C8B-B14F-4D97-AF65-F5344CB8AC3E}">
-        <p14:creationId xmlns:p14="http://schemas.microsoft.com/office/powerpoint/2010/main" val="883981461"/>
+        <p14:creationId xmlns:p14="http://schemas.microsoft.com/office/powerpoint/2010/main" xmlns="" val="883981461"/>
       </p:ext>
     </p:extLst>
   </p:cSld>
@@ -9996,7 +11109,7 @@
 </p:sld>
 </file>
 
-<file path=ppt/slides/slide22.xml><?xml version="1.0" encoding="utf-8"?>
+<file path=ppt/slides/slide23.xml><?xml version="1.0" encoding="utf-8"?>
 <p:sld xmlns:a="http://schemas.openxmlformats.org/drawingml/2006/main" xmlns:r="http://schemas.openxmlformats.org/officeDocument/2006/relationships" xmlns:p="http://schemas.openxmlformats.org/presentationml/2006/main">
   <p:cSld>
     <p:spTree>
@@ -10018,7 +11131,7 @@
           <p:cNvPr id="2" name="Titre 1">
             <a:extLst>
               <a:ext uri="{FF2B5EF4-FFF2-40B4-BE49-F238E27FC236}">
-                <a16:creationId xmlns:a16="http://schemas.microsoft.com/office/drawing/2014/main" id="{A032E8A6-5CD7-447B-9FF9-CCAB7F9B3C57}"/>
+                <a16:creationId xmlns:a16="http://schemas.microsoft.com/office/drawing/2014/main" xmlns="" id="{A032E8A6-5CD7-447B-9FF9-CCAB7F9B3C57}"/>
               </a:ext>
             </a:extLst>
           </p:cNvPr>
@@ -10046,7 +11159,7 @@
           <p:cNvPr id="4" name="Espace réservé du contenu 3">
             <a:extLst>
               <a:ext uri="{FF2B5EF4-FFF2-40B4-BE49-F238E27FC236}">
-                <a16:creationId xmlns:a16="http://schemas.microsoft.com/office/drawing/2014/main" id="{F76D6BBB-CCA8-4B44-A5C8-A0620C1291A6}"/>
+                <a16:creationId xmlns:a16="http://schemas.microsoft.com/office/drawing/2014/main" xmlns="" id="{F76D6BBB-CCA8-4B44-A5C8-A0620C1291A6}"/>
               </a:ext>
             </a:extLst>
           </p:cNvPr>
@@ -10061,7 +11174,7 @@
           <a:blip r:embed="rId2">
             <a:extLst>
               <a:ext uri="{28A0092B-C50C-407E-A947-70E740481C1C}">
-                <a14:useLocalDpi xmlns:a14="http://schemas.microsoft.com/office/drawing/2010/main" val="0"/>
+                <a14:useLocalDpi xmlns:a14="http://schemas.microsoft.com/office/drawing/2010/main" xmlns="" val="0"/>
               </a:ext>
             </a:extLst>
           </a:blip>
@@ -10084,7 +11197,7 @@
           <p:cNvPr id="6" name="Image 5">
             <a:extLst>
               <a:ext uri="{FF2B5EF4-FFF2-40B4-BE49-F238E27FC236}">
-                <a16:creationId xmlns:a16="http://schemas.microsoft.com/office/drawing/2014/main" id="{E63D94C4-FA55-4EFF-BE37-693B6A250459}"/>
+                <a16:creationId xmlns:a16="http://schemas.microsoft.com/office/drawing/2014/main" xmlns="" id="{E63D94C4-FA55-4EFF-BE37-693B6A250459}"/>
               </a:ext>
             </a:extLst>
           </p:cNvPr>
@@ -10097,7 +11210,7 @@
           <a:blip r:embed="rId3">
             <a:extLst>
               <a:ext uri="{28A0092B-C50C-407E-A947-70E740481C1C}">
-                <a14:useLocalDpi xmlns:a14="http://schemas.microsoft.com/office/drawing/2010/main" val="0"/>
+                <a14:useLocalDpi xmlns:a14="http://schemas.microsoft.com/office/drawing/2010/main" xmlns="" val="0"/>
               </a:ext>
             </a:extLst>
           </a:blip>
@@ -10120,7 +11233,7 @@
           <p:cNvPr id="5" name="Espace réservé du numéro de diapositive 4">
             <a:extLst>
               <a:ext uri="{FF2B5EF4-FFF2-40B4-BE49-F238E27FC236}">
-                <a16:creationId xmlns:a16="http://schemas.microsoft.com/office/drawing/2014/main" id="{D8B1A001-3647-4E9B-A473-0E496DC82853}"/>
+                <a16:creationId xmlns:a16="http://schemas.microsoft.com/office/drawing/2014/main" xmlns="" id="{D8B1A001-3647-4E9B-A473-0E496DC82853}"/>
               </a:ext>
             </a:extLst>
           </p:cNvPr>
@@ -10138,7 +11251,8 @@
           <a:p>
             <a:fld id="{000982F6-AAAD-4258-B115-44D8EC280712}" type="slidenum">
               <a:rPr lang="fr-FR" smtClean="0"/>
-              <a:t>22</a:t>
+              <a:pPr/>
+              <a:t>23</a:t>
             </a:fld>
             <a:endParaRPr lang="fr-FR"/>
           </a:p>
@@ -10147,7 +11261,7 @@
     </p:spTree>
     <p:extLst>
       <p:ext uri="{BB962C8B-B14F-4D97-AF65-F5344CB8AC3E}">
-        <p14:creationId xmlns:p14="http://schemas.microsoft.com/office/powerpoint/2010/main" val="2574923907"/>
+        <p14:creationId xmlns:p14="http://schemas.microsoft.com/office/powerpoint/2010/main" xmlns="" val="2574923907"/>
       </p:ext>
     </p:extLst>
   </p:cSld>
@@ -10259,7 +11373,7 @@
 </p:sld>
 </file>
 
-<file path=ppt/slides/slide23.xml><?xml version="1.0" encoding="utf-8"?>
+<file path=ppt/slides/slide24.xml><?xml version="1.0" encoding="utf-8"?>
 <p:sld xmlns:a="http://schemas.openxmlformats.org/drawingml/2006/main" xmlns:r="http://schemas.openxmlformats.org/officeDocument/2006/relationships" xmlns:p="http://schemas.openxmlformats.org/presentationml/2006/main">
   <p:cSld>
     <p:spTree>
@@ -10281,7 +11395,7 @@
           <p:cNvPr id="2" name="Titre 1">
             <a:extLst>
               <a:ext uri="{FF2B5EF4-FFF2-40B4-BE49-F238E27FC236}">
-                <a16:creationId xmlns:a16="http://schemas.microsoft.com/office/drawing/2014/main" id="{1EC22873-F9F0-4BC1-BA9D-6F5016FB6CAD}"/>
+                <a16:creationId xmlns:a16="http://schemas.microsoft.com/office/drawing/2014/main" xmlns="" id="{1EC22873-F9F0-4BC1-BA9D-6F5016FB6CAD}"/>
               </a:ext>
             </a:extLst>
           </p:cNvPr>
@@ -10306,7 +11420,7 @@
           <p:cNvPr id="3" name="Espace réservé du contenu 2">
             <a:extLst>
               <a:ext uri="{FF2B5EF4-FFF2-40B4-BE49-F238E27FC236}">
-                <a16:creationId xmlns:a16="http://schemas.microsoft.com/office/drawing/2014/main" id="{4271870C-2422-492A-96DA-4E72932D23DA}"/>
+                <a16:creationId xmlns:a16="http://schemas.microsoft.com/office/drawing/2014/main" xmlns="" id="{4271870C-2422-492A-96DA-4E72932D23DA}"/>
               </a:ext>
             </a:extLst>
           </p:cNvPr>
@@ -10365,7 +11479,7 @@
           <p:cNvPr id="4" name="Espace réservé du numéro de diapositive 3">
             <a:extLst>
               <a:ext uri="{FF2B5EF4-FFF2-40B4-BE49-F238E27FC236}">
-                <a16:creationId xmlns:a16="http://schemas.microsoft.com/office/drawing/2014/main" id="{11A06B5D-2D1D-4F4E-80EC-DB45BBB2EE98}"/>
+                <a16:creationId xmlns:a16="http://schemas.microsoft.com/office/drawing/2014/main" xmlns="" id="{11A06B5D-2D1D-4F4E-80EC-DB45BBB2EE98}"/>
               </a:ext>
             </a:extLst>
           </p:cNvPr>
@@ -10383,7 +11497,8 @@
           <a:p>
             <a:fld id="{000982F6-AAAD-4258-B115-44D8EC280712}" type="slidenum">
               <a:rPr lang="fr-FR" smtClean="0"/>
-              <a:t>23</a:t>
+              <a:pPr/>
+              <a:t>24</a:t>
             </a:fld>
             <a:endParaRPr lang="fr-FR"/>
           </a:p>
@@ -10394,7 +11509,7 @@
           <p:cNvPr id="5" name="Espace réservé du contenu 3">
             <a:extLst>
               <a:ext uri="{FF2B5EF4-FFF2-40B4-BE49-F238E27FC236}">
-                <a16:creationId xmlns:a16="http://schemas.microsoft.com/office/drawing/2014/main" id="{4B4083B4-391E-4787-9BE0-3397253F84B4}"/>
+                <a16:creationId xmlns:a16="http://schemas.microsoft.com/office/drawing/2014/main" xmlns="" id="{4B4083B4-391E-4787-9BE0-3397253F84B4}"/>
               </a:ext>
             </a:extLst>
           </p:cNvPr>
@@ -10407,7 +11522,7 @@
           <a:blip r:embed="rId2">
             <a:extLst>
               <a:ext uri="{28A0092B-C50C-407E-A947-70E740481C1C}">
-                <a14:useLocalDpi xmlns:a14="http://schemas.microsoft.com/office/drawing/2010/main" val="0"/>
+                <a14:useLocalDpi xmlns:a14="http://schemas.microsoft.com/office/drawing/2010/main" xmlns="" val="0"/>
               </a:ext>
             </a:extLst>
           </a:blip>
@@ -10428,7 +11543,7 @@
     </p:spTree>
     <p:extLst>
       <p:ext uri="{BB962C8B-B14F-4D97-AF65-F5344CB8AC3E}">
-        <p14:creationId xmlns:p14="http://schemas.microsoft.com/office/powerpoint/2010/main" val="1665590819"/>
+        <p14:creationId xmlns:p14="http://schemas.microsoft.com/office/powerpoint/2010/main" xmlns="" val="1665590819"/>
       </p:ext>
     </p:extLst>
   </p:cSld>
@@ -10516,7 +11631,7 @@
 </p:sld>
 </file>
 
-<file path=ppt/slides/slide24.xml><?xml version="1.0" encoding="utf-8"?>
+<file path=ppt/slides/slide25.xml><?xml version="1.0" encoding="utf-8"?>
 <p:sld xmlns:a="http://schemas.openxmlformats.org/drawingml/2006/main" xmlns:r="http://schemas.openxmlformats.org/officeDocument/2006/relationships" xmlns:p="http://schemas.openxmlformats.org/presentationml/2006/main">
   <p:cSld>
     <p:spTree>
@@ -10538,7 +11653,7 @@
           <p:cNvPr id="2" name="Titre 1">
             <a:extLst>
               <a:ext uri="{FF2B5EF4-FFF2-40B4-BE49-F238E27FC236}">
-                <a16:creationId xmlns:a16="http://schemas.microsoft.com/office/drawing/2014/main" id="{BEAD297D-408C-4DCC-A83F-3991F010784A}"/>
+                <a16:creationId xmlns:a16="http://schemas.microsoft.com/office/drawing/2014/main" xmlns="" id="{BEAD297D-408C-4DCC-A83F-3991F010784A}"/>
               </a:ext>
             </a:extLst>
           </p:cNvPr>
@@ -10566,7 +11681,7 @@
           <p:cNvPr id="3" name="Espace réservé du contenu 2">
             <a:extLst>
               <a:ext uri="{FF2B5EF4-FFF2-40B4-BE49-F238E27FC236}">
-                <a16:creationId xmlns:a16="http://schemas.microsoft.com/office/drawing/2014/main" id="{8C01C720-3BA3-4CC0-9BD8-6DAFA23FEEAA}"/>
+                <a16:creationId xmlns:a16="http://schemas.microsoft.com/office/drawing/2014/main" xmlns="" id="{8C01C720-3BA3-4CC0-9BD8-6DAFA23FEEAA}"/>
               </a:ext>
             </a:extLst>
           </p:cNvPr>
@@ -10621,7 +11736,7 @@
           <p:cNvPr id="5" name="Image 4">
             <a:extLst>
               <a:ext uri="{FF2B5EF4-FFF2-40B4-BE49-F238E27FC236}">
-                <a16:creationId xmlns:a16="http://schemas.microsoft.com/office/drawing/2014/main" id="{832230D8-B3A3-41BD-925A-1E390CFE5E0F}"/>
+                <a16:creationId xmlns:a16="http://schemas.microsoft.com/office/drawing/2014/main" xmlns="" id="{832230D8-B3A3-41BD-925A-1E390CFE5E0F}"/>
               </a:ext>
             </a:extLst>
           </p:cNvPr>
@@ -10634,7 +11749,7 @@
           <a:blip r:embed="rId2">
             <a:extLst>
               <a:ext uri="{28A0092B-C50C-407E-A947-70E740481C1C}">
-                <a14:useLocalDpi xmlns:a14="http://schemas.microsoft.com/office/drawing/2010/main" val="0"/>
+                <a14:useLocalDpi xmlns:a14="http://schemas.microsoft.com/office/drawing/2010/main" xmlns="" val="0"/>
               </a:ext>
             </a:extLst>
           </a:blip>
@@ -10657,7 +11772,7 @@
           <p:cNvPr id="7" name="Image 6">
             <a:extLst>
               <a:ext uri="{FF2B5EF4-FFF2-40B4-BE49-F238E27FC236}">
-                <a16:creationId xmlns:a16="http://schemas.microsoft.com/office/drawing/2014/main" id="{3D6D0F9D-E201-4CEA-ADB4-91536E300412}"/>
+                <a16:creationId xmlns:a16="http://schemas.microsoft.com/office/drawing/2014/main" xmlns="" id="{3D6D0F9D-E201-4CEA-ADB4-91536E300412}"/>
               </a:ext>
             </a:extLst>
           </p:cNvPr>
@@ -10670,7 +11785,7 @@
           <a:blip r:embed="rId3">
             <a:extLst>
               <a:ext uri="{28A0092B-C50C-407E-A947-70E740481C1C}">
-                <a14:useLocalDpi xmlns:a14="http://schemas.microsoft.com/office/drawing/2010/main" val="0"/>
+                <a14:useLocalDpi xmlns:a14="http://schemas.microsoft.com/office/drawing/2010/main" xmlns="" val="0"/>
               </a:ext>
             </a:extLst>
           </a:blip>
@@ -10693,7 +11808,7 @@
           <p:cNvPr id="9" name="Image 8">
             <a:extLst>
               <a:ext uri="{FF2B5EF4-FFF2-40B4-BE49-F238E27FC236}">
-                <a16:creationId xmlns:a16="http://schemas.microsoft.com/office/drawing/2014/main" id="{4C1C44DA-FC67-4D0A-B6CF-2DA9A645F6BA}"/>
+                <a16:creationId xmlns:a16="http://schemas.microsoft.com/office/drawing/2014/main" xmlns="" id="{4C1C44DA-FC67-4D0A-B6CF-2DA9A645F6BA}"/>
               </a:ext>
             </a:extLst>
           </p:cNvPr>
@@ -10706,7 +11821,7 @@
           <a:blip r:embed="rId4">
             <a:extLst>
               <a:ext uri="{28A0092B-C50C-407E-A947-70E740481C1C}">
-                <a14:useLocalDpi xmlns:a14="http://schemas.microsoft.com/office/drawing/2010/main" val="0"/>
+                <a14:useLocalDpi xmlns:a14="http://schemas.microsoft.com/office/drawing/2010/main" xmlns="" val="0"/>
               </a:ext>
             </a:extLst>
           </a:blip>
@@ -10729,7 +11844,7 @@
           <p:cNvPr id="6" name="Espace réservé du numéro de diapositive 5">
             <a:extLst>
               <a:ext uri="{FF2B5EF4-FFF2-40B4-BE49-F238E27FC236}">
-                <a16:creationId xmlns:a16="http://schemas.microsoft.com/office/drawing/2014/main" id="{B86378C0-05E7-4CAF-ABA7-16D08897F03C}"/>
+                <a16:creationId xmlns:a16="http://schemas.microsoft.com/office/drawing/2014/main" xmlns="" id="{B86378C0-05E7-4CAF-ABA7-16D08897F03C}"/>
               </a:ext>
             </a:extLst>
           </p:cNvPr>
@@ -10747,7 +11862,8 @@
           <a:p>
             <a:fld id="{000982F6-AAAD-4258-B115-44D8EC280712}" type="slidenum">
               <a:rPr lang="fr-FR" smtClean="0"/>
-              <a:t>24</a:t>
+              <a:pPr/>
+              <a:t>25</a:t>
             </a:fld>
             <a:endParaRPr lang="fr-FR"/>
           </a:p>
@@ -10756,7 +11872,7 @@
     </p:spTree>
     <p:extLst>
       <p:ext uri="{BB962C8B-B14F-4D97-AF65-F5344CB8AC3E}">
-        <p14:creationId xmlns:p14="http://schemas.microsoft.com/office/powerpoint/2010/main" val="34546804"/>
+        <p14:creationId xmlns:p14="http://schemas.microsoft.com/office/powerpoint/2010/main" xmlns="" val="34546804"/>
       </p:ext>
     </p:extLst>
   </p:cSld>
@@ -10958,184 +12074,6 @@
 </p:sld>
 </file>
 
-<file path=ppt/slides/slide25.xml><?xml version="1.0" encoding="utf-8"?>
-<p:sld xmlns:a="http://schemas.openxmlformats.org/drawingml/2006/main" xmlns:r="http://schemas.openxmlformats.org/officeDocument/2006/relationships" xmlns:p="http://schemas.openxmlformats.org/presentationml/2006/main">
-  <p:cSld>
-    <p:spTree>
-      <p:nvGrpSpPr>
-        <p:cNvPr id="1" name=""/>
-        <p:cNvGrpSpPr/>
-        <p:nvPr/>
-      </p:nvGrpSpPr>
-      <p:grpSpPr>
-        <a:xfrm>
-          <a:off x="0" y="0"/>
-          <a:ext cx="0" cy="0"/>
-          <a:chOff x="0" y="0"/>
-          <a:chExt cx="0" cy="0"/>
-        </a:xfrm>
-      </p:grpSpPr>
-      <p:sp>
-        <p:nvSpPr>
-          <p:cNvPr id="2" name="Titre 1">
-            <a:extLst>
-              <a:ext uri="{FF2B5EF4-FFF2-40B4-BE49-F238E27FC236}">
-                <a16:creationId xmlns:a16="http://schemas.microsoft.com/office/drawing/2014/main" id="{85A0ACAC-985A-4B07-9143-EAD1C2C47DB2}"/>
-              </a:ext>
-            </a:extLst>
-          </p:cNvPr>
-          <p:cNvSpPr>
-            <a:spLocks noGrp="1"/>
-          </p:cNvSpPr>
-          <p:nvPr>
-            <p:ph type="title"/>
-          </p:nvPr>
-        </p:nvSpPr>
-        <p:spPr/>
-        <p:txBody>
-          <a:bodyPr/>
-          <a:lstStyle/>
-          <a:p>
-            <a:endParaRPr lang="fr-FR"/>
-          </a:p>
-        </p:txBody>
-      </p:sp>
-      <p:sp>
-        <p:nvSpPr>
-          <p:cNvPr id="3" name="Espace réservé du contenu 2">
-            <a:extLst>
-              <a:ext uri="{FF2B5EF4-FFF2-40B4-BE49-F238E27FC236}">
-                <a16:creationId xmlns:a16="http://schemas.microsoft.com/office/drawing/2014/main" id="{064E0AF9-9385-49B3-8D88-2F9C238B48DC}"/>
-              </a:ext>
-            </a:extLst>
-          </p:cNvPr>
-          <p:cNvSpPr>
-            <a:spLocks noGrp="1"/>
-          </p:cNvSpPr>
-          <p:nvPr>
-            <p:ph idx="1"/>
-          </p:nvPr>
-        </p:nvSpPr>
-        <p:spPr/>
-        <p:txBody>
-          <a:bodyPr/>
-          <a:lstStyle/>
-          <a:p>
-            <a:r>
-              <a:rPr lang="fr-FR" dirty="0">
-                <a:solidFill>
-                  <a:srgbClr val="FF0000"/>
-                </a:solidFill>
-              </a:rPr>
-              <a:t>Plutôt faire un film </a:t>
-            </a:r>
-          </a:p>
-          <a:p>
-            <a:r>
-              <a:rPr lang="fr-FR" dirty="0">
-                <a:solidFill>
-                  <a:srgbClr val="FF0000"/>
-                </a:solidFill>
-              </a:rPr>
-              <a:t>Sur toutes les méthodes </a:t>
-            </a:r>
-          </a:p>
-          <a:p>
-            <a:r>
-              <a:rPr lang="fr-FR" dirty="0">
-                <a:solidFill>
-                  <a:srgbClr val="FF0000"/>
-                </a:solidFill>
-              </a:rPr>
-              <a:t>Voir même l’explosion des schémas </a:t>
-            </a:r>
-          </a:p>
-          <a:p>
-            <a:endParaRPr lang="fr-FR" dirty="0">
-              <a:solidFill>
-                <a:srgbClr val="FF0000"/>
-              </a:solidFill>
-            </a:endParaRPr>
-          </a:p>
-          <a:p>
-            <a:r>
-              <a:rPr lang="fr-FR" dirty="0">
-                <a:solidFill>
-                  <a:srgbClr val="FF0000"/>
-                </a:solidFill>
-              </a:rPr>
-              <a:t>+Slides perspectives </a:t>
-            </a:r>
-          </a:p>
-          <a:p>
-            <a:r>
-              <a:rPr lang="fr-FR" dirty="0">
-                <a:solidFill>
-                  <a:srgbClr val="FF0000"/>
-                </a:solidFill>
-              </a:rPr>
-              <a:t>+Slide recommandation </a:t>
-            </a:r>
-          </a:p>
-          <a:p>
-            <a:r>
-              <a:rPr lang="fr-FR">
-                <a:solidFill>
-                  <a:srgbClr val="FF0000"/>
-                </a:solidFill>
-              </a:rPr>
-              <a:t>+Conclusion </a:t>
-            </a:r>
-            <a:endParaRPr lang="fr-FR" dirty="0">
-              <a:solidFill>
-                <a:srgbClr val="FF0000"/>
-              </a:solidFill>
-            </a:endParaRPr>
-          </a:p>
-        </p:txBody>
-      </p:sp>
-      <p:sp>
-        <p:nvSpPr>
-          <p:cNvPr id="4" name="Espace réservé du numéro de diapositive 3">
-            <a:extLst>
-              <a:ext uri="{FF2B5EF4-FFF2-40B4-BE49-F238E27FC236}">
-                <a16:creationId xmlns:a16="http://schemas.microsoft.com/office/drawing/2014/main" id="{63606221-F579-45A8-A843-87EDD1ACB61A}"/>
-              </a:ext>
-            </a:extLst>
-          </p:cNvPr>
-          <p:cNvSpPr>
-            <a:spLocks noGrp="1"/>
-          </p:cNvSpPr>
-          <p:nvPr>
-            <p:ph type="sldNum" sz="quarter" idx="12"/>
-          </p:nvPr>
-        </p:nvSpPr>
-        <p:spPr/>
-        <p:txBody>
-          <a:bodyPr/>
-          <a:lstStyle/>
-          <a:p>
-            <a:fld id="{000982F6-AAAD-4258-B115-44D8EC280712}" type="slidenum">
-              <a:rPr lang="fr-FR" smtClean="0"/>
-              <a:t>25</a:t>
-            </a:fld>
-            <a:endParaRPr lang="fr-FR"/>
-          </a:p>
-        </p:txBody>
-      </p:sp>
-    </p:spTree>
-    <p:extLst>
-      <p:ext uri="{BB962C8B-B14F-4D97-AF65-F5344CB8AC3E}">
-        <p14:creationId xmlns:p14="http://schemas.microsoft.com/office/powerpoint/2010/main" val="2833046163"/>
-      </p:ext>
-    </p:extLst>
-  </p:cSld>
-  <p:clrMapOvr>
-    <a:masterClrMapping/>
-  </p:clrMapOvr>
-</p:sld>
-</file>
-
 <file path=ppt/slides/slide26.xml><?xml version="1.0" encoding="utf-8"?>
 <p:sld xmlns:a="http://schemas.openxmlformats.org/drawingml/2006/main" xmlns:r="http://schemas.openxmlformats.org/officeDocument/2006/relationships" xmlns:p="http://schemas.openxmlformats.org/presentationml/2006/main">
   <p:cSld>
@@ -11158,7 +12096,7 @@
           <p:cNvPr id="2" name="Titre 1">
             <a:extLst>
               <a:ext uri="{FF2B5EF4-FFF2-40B4-BE49-F238E27FC236}">
-                <a16:creationId xmlns:a16="http://schemas.microsoft.com/office/drawing/2014/main" id="{8B8AA958-7EF5-4EB0-806C-74836A2B60F3}"/>
+                <a16:creationId xmlns:a16="http://schemas.microsoft.com/office/drawing/2014/main" xmlns="" id="{85A0ACAC-985A-4B07-9143-EAD1C2C47DB2}"/>
               </a:ext>
             </a:extLst>
           </p:cNvPr>
@@ -11174,6 +12112,185 @@
           <a:bodyPr/>
           <a:lstStyle/>
           <a:p>
+            <a:endParaRPr lang="fr-FR"/>
+          </a:p>
+        </p:txBody>
+      </p:sp>
+      <p:sp>
+        <p:nvSpPr>
+          <p:cNvPr id="3" name="Espace réservé du contenu 2">
+            <a:extLst>
+              <a:ext uri="{FF2B5EF4-FFF2-40B4-BE49-F238E27FC236}">
+                <a16:creationId xmlns:a16="http://schemas.microsoft.com/office/drawing/2014/main" xmlns="" id="{064E0AF9-9385-49B3-8D88-2F9C238B48DC}"/>
+              </a:ext>
+            </a:extLst>
+          </p:cNvPr>
+          <p:cNvSpPr>
+            <a:spLocks noGrp="1"/>
+          </p:cNvSpPr>
+          <p:nvPr>
+            <p:ph idx="1"/>
+          </p:nvPr>
+        </p:nvSpPr>
+        <p:spPr/>
+        <p:txBody>
+          <a:bodyPr/>
+          <a:lstStyle/>
+          <a:p>
+            <a:r>
+              <a:rPr lang="fr-FR" dirty="0">
+                <a:solidFill>
+                  <a:srgbClr val="FF0000"/>
+                </a:solidFill>
+              </a:rPr>
+              <a:t>Plutôt faire un film </a:t>
+            </a:r>
+          </a:p>
+          <a:p>
+            <a:r>
+              <a:rPr lang="fr-FR" dirty="0">
+                <a:solidFill>
+                  <a:srgbClr val="FF0000"/>
+                </a:solidFill>
+              </a:rPr>
+              <a:t>Sur toutes les méthodes </a:t>
+            </a:r>
+          </a:p>
+          <a:p>
+            <a:r>
+              <a:rPr lang="fr-FR" dirty="0">
+                <a:solidFill>
+                  <a:srgbClr val="FF0000"/>
+                </a:solidFill>
+              </a:rPr>
+              <a:t>Voir même l’explosion des schémas </a:t>
+            </a:r>
+          </a:p>
+          <a:p>
+            <a:endParaRPr lang="fr-FR" dirty="0">
+              <a:solidFill>
+                <a:srgbClr val="FF0000"/>
+              </a:solidFill>
+            </a:endParaRPr>
+          </a:p>
+          <a:p>
+            <a:r>
+              <a:rPr lang="fr-FR" dirty="0">
+                <a:solidFill>
+                  <a:srgbClr val="FF0000"/>
+                </a:solidFill>
+              </a:rPr>
+              <a:t>+Slides perspectives </a:t>
+            </a:r>
+          </a:p>
+          <a:p>
+            <a:r>
+              <a:rPr lang="fr-FR" dirty="0">
+                <a:solidFill>
+                  <a:srgbClr val="FF0000"/>
+                </a:solidFill>
+              </a:rPr>
+              <a:t>+Slide recommandation </a:t>
+            </a:r>
+          </a:p>
+          <a:p>
+            <a:r>
+              <a:rPr lang="fr-FR">
+                <a:solidFill>
+                  <a:srgbClr val="FF0000"/>
+                </a:solidFill>
+              </a:rPr>
+              <a:t>+Conclusion </a:t>
+            </a:r>
+            <a:endParaRPr lang="fr-FR" dirty="0">
+              <a:solidFill>
+                <a:srgbClr val="FF0000"/>
+              </a:solidFill>
+            </a:endParaRPr>
+          </a:p>
+        </p:txBody>
+      </p:sp>
+      <p:sp>
+        <p:nvSpPr>
+          <p:cNvPr id="4" name="Espace réservé du numéro de diapositive 3">
+            <a:extLst>
+              <a:ext uri="{FF2B5EF4-FFF2-40B4-BE49-F238E27FC236}">
+                <a16:creationId xmlns:a16="http://schemas.microsoft.com/office/drawing/2014/main" xmlns="" id="{63606221-F579-45A8-A843-87EDD1ACB61A}"/>
+              </a:ext>
+            </a:extLst>
+          </p:cNvPr>
+          <p:cNvSpPr>
+            <a:spLocks noGrp="1"/>
+          </p:cNvSpPr>
+          <p:nvPr>
+            <p:ph type="sldNum" sz="quarter" idx="12"/>
+          </p:nvPr>
+        </p:nvSpPr>
+        <p:spPr/>
+        <p:txBody>
+          <a:bodyPr/>
+          <a:lstStyle/>
+          <a:p>
+            <a:fld id="{000982F6-AAAD-4258-B115-44D8EC280712}" type="slidenum">
+              <a:rPr lang="fr-FR" smtClean="0"/>
+              <a:pPr/>
+              <a:t>26</a:t>
+            </a:fld>
+            <a:endParaRPr lang="fr-FR"/>
+          </a:p>
+        </p:txBody>
+      </p:sp>
+    </p:spTree>
+    <p:extLst>
+      <p:ext uri="{BB962C8B-B14F-4D97-AF65-F5344CB8AC3E}">
+        <p14:creationId xmlns:p14="http://schemas.microsoft.com/office/powerpoint/2010/main" xmlns="" val="2833046163"/>
+      </p:ext>
+    </p:extLst>
+  </p:cSld>
+  <p:clrMapOvr>
+    <a:masterClrMapping/>
+  </p:clrMapOvr>
+</p:sld>
+</file>
+
+<file path=ppt/slides/slide27.xml><?xml version="1.0" encoding="utf-8"?>
+<p:sld xmlns:a="http://schemas.openxmlformats.org/drawingml/2006/main" xmlns:r="http://schemas.openxmlformats.org/officeDocument/2006/relationships" xmlns:p="http://schemas.openxmlformats.org/presentationml/2006/main">
+  <p:cSld>
+    <p:spTree>
+      <p:nvGrpSpPr>
+        <p:cNvPr id="1" name=""/>
+        <p:cNvGrpSpPr/>
+        <p:nvPr/>
+      </p:nvGrpSpPr>
+      <p:grpSpPr>
+        <a:xfrm>
+          <a:off x="0" y="0"/>
+          <a:ext cx="0" cy="0"/>
+          <a:chOff x="0" y="0"/>
+          <a:chExt cx="0" cy="0"/>
+        </a:xfrm>
+      </p:grpSpPr>
+      <p:sp>
+        <p:nvSpPr>
+          <p:cNvPr id="2" name="Titre 1">
+            <a:extLst>
+              <a:ext uri="{FF2B5EF4-FFF2-40B4-BE49-F238E27FC236}">
+                <a16:creationId xmlns:a16="http://schemas.microsoft.com/office/drawing/2014/main" xmlns="" id="{8B8AA958-7EF5-4EB0-806C-74836A2B60F3}"/>
+              </a:ext>
+            </a:extLst>
+          </p:cNvPr>
+          <p:cNvSpPr>
+            <a:spLocks noGrp="1"/>
+          </p:cNvSpPr>
+          <p:nvPr>
+            <p:ph type="title"/>
+          </p:nvPr>
+        </p:nvSpPr>
+        <p:spPr/>
+        <p:txBody>
+          <a:bodyPr/>
+          <a:lstStyle/>
+          <a:p>
             <a:r>
               <a:rPr lang="fr-FR" dirty="0"/>
               <a:t>IV – Méthodes numériques exponentielles</a:t>
@@ -11186,7 +12303,7 @@
           <p:cNvPr id="3" name="Espace réservé du texte 2">
             <a:extLst>
               <a:ext uri="{FF2B5EF4-FFF2-40B4-BE49-F238E27FC236}">
-                <a16:creationId xmlns:a16="http://schemas.microsoft.com/office/drawing/2014/main" id="{7478EE0A-709D-4E6A-9A69-97A1C1F54D87}"/>
+                <a16:creationId xmlns:a16="http://schemas.microsoft.com/office/drawing/2014/main" xmlns="" id="{7478EE0A-709D-4E6A-9A69-97A1C1F54D87}"/>
               </a:ext>
             </a:extLst>
           </p:cNvPr>
@@ -11214,7 +12331,7 @@
           <p:cNvPr id="4" name="Espace réservé du contenu 3">
             <a:extLst>
               <a:ext uri="{FF2B5EF4-FFF2-40B4-BE49-F238E27FC236}">
-                <a16:creationId xmlns:a16="http://schemas.microsoft.com/office/drawing/2014/main" id="{E2AB1664-5A63-444A-BC52-5D2B293703CE}"/>
+                <a16:creationId xmlns:a16="http://schemas.microsoft.com/office/drawing/2014/main" xmlns="" id="{E2AB1664-5A63-444A-BC52-5D2B293703CE}"/>
               </a:ext>
             </a:extLst>
           </p:cNvPr>
@@ -11266,7 +12383,7 @@
           <p:cNvPr id="5" name="Espace réservé du texte 4">
             <a:extLst>
               <a:ext uri="{FF2B5EF4-FFF2-40B4-BE49-F238E27FC236}">
-                <a16:creationId xmlns:a16="http://schemas.microsoft.com/office/drawing/2014/main" id="{88B3B4E8-F4B8-474F-ADF7-691CCDBA65DC}"/>
+                <a16:creationId xmlns:a16="http://schemas.microsoft.com/office/drawing/2014/main" xmlns="" id="{88B3B4E8-F4B8-474F-ADF7-691CCDBA65DC}"/>
               </a:ext>
             </a:extLst>
           </p:cNvPr>
@@ -11294,7 +12411,7 @@
           <p:cNvPr id="6" name="Espace réservé du contenu 5">
             <a:extLst>
               <a:ext uri="{FF2B5EF4-FFF2-40B4-BE49-F238E27FC236}">
-                <a16:creationId xmlns:a16="http://schemas.microsoft.com/office/drawing/2014/main" id="{7C7F8C92-21F6-4243-BC10-2A53A7E53035}"/>
+                <a16:creationId xmlns:a16="http://schemas.microsoft.com/office/drawing/2014/main" xmlns="" id="{7C7F8C92-21F6-4243-BC10-2A53A7E53035}"/>
               </a:ext>
             </a:extLst>
           </p:cNvPr>
@@ -11346,7 +12463,7 @@
           <p:cNvPr id="8" name="Espace réservé du numéro de diapositive 7">
             <a:extLst>
               <a:ext uri="{FF2B5EF4-FFF2-40B4-BE49-F238E27FC236}">
-                <a16:creationId xmlns:a16="http://schemas.microsoft.com/office/drawing/2014/main" id="{D49305E3-2AE4-48AE-BADF-ECC7835468A0}"/>
+                <a16:creationId xmlns:a16="http://schemas.microsoft.com/office/drawing/2014/main" xmlns="" id="{D49305E3-2AE4-48AE-BADF-ECC7835468A0}"/>
               </a:ext>
             </a:extLst>
           </p:cNvPr>
@@ -11364,7 +12481,8 @@
           <a:p>
             <a:fld id="{000982F6-AAAD-4258-B115-44D8EC280712}" type="slidenum">
               <a:rPr lang="fr-FR" smtClean="0"/>
-              <a:t>26</a:t>
+              <a:pPr/>
+              <a:t>27</a:t>
             </a:fld>
             <a:endParaRPr lang="fr-FR"/>
           </a:p>
@@ -11373,7 +12491,7 @@
     </p:spTree>
     <p:extLst>
       <p:ext uri="{BB962C8B-B14F-4D97-AF65-F5344CB8AC3E}">
-        <p14:creationId xmlns:p14="http://schemas.microsoft.com/office/powerpoint/2010/main" val="860307842"/>
+        <p14:creationId xmlns:p14="http://schemas.microsoft.com/office/powerpoint/2010/main" xmlns="" val="860307842"/>
       </p:ext>
     </p:extLst>
   </p:cSld>
@@ -11405,7 +12523,7 @@
           <p:cNvPr id="2" name="Titre 1">
             <a:extLst>
               <a:ext uri="{FF2B5EF4-FFF2-40B4-BE49-F238E27FC236}">
-                <a16:creationId xmlns:a16="http://schemas.microsoft.com/office/drawing/2014/main" id="{925AD2DE-CFF0-475B-98D6-8249214AA0DD}"/>
+                <a16:creationId xmlns:a16="http://schemas.microsoft.com/office/drawing/2014/main" xmlns="" id="{925AD2DE-CFF0-475B-98D6-8249214AA0DD}"/>
               </a:ext>
             </a:extLst>
           </p:cNvPr>
@@ -11434,8 +12552,8 @@
           </a:p>
         </p:txBody>
       </p:sp>
-      <mc:AlternateContent xmlns:mc="http://schemas.openxmlformats.org/markup-compatibility/2006" xmlns:a14="http://schemas.microsoft.com/office/drawing/2010/main">
-        <mc:Choice Requires="a14">
+      <mc:AlternateContent xmlns:mc="http://schemas.openxmlformats.org/markup-compatibility/2006">
+        <mc:Choice xmlns:a14="http://schemas.microsoft.com/office/drawing/2010/main" xmlns="" Requires="a14">
           <p:sp>
             <p:nvSpPr>
               <p:cNvPr id="3" name="Espace réservé du contenu 2">
@@ -11589,13 +12707,13 @@
             </p:txBody>
           </p:sp>
         </mc:Choice>
-        <mc:Fallback xmlns="">
+        <mc:Fallback>
           <p:sp>
             <p:nvSpPr>
               <p:cNvPr id="3" name="Espace réservé du contenu 2">
                 <a:extLst>
                   <a:ext uri="{FF2B5EF4-FFF2-40B4-BE49-F238E27FC236}">
-                    <a16:creationId xmlns:a16="http://schemas.microsoft.com/office/drawing/2014/main" id="{8CBA7287-84B3-424D-9ABF-037BCE2D2D13}"/>
+                    <a16:creationId xmlns:a16="http://schemas.microsoft.com/office/drawing/2014/main" xmlns="" xmlns:a14="http://schemas.microsoft.com/office/drawing/2010/main" id="{8CBA7287-84B3-424D-9ABF-037BCE2D2D13}"/>
                   </a:ext>
                 </a:extLst>
               </p:cNvPr>
@@ -11634,7 +12752,7 @@
           <p:cNvPr id="5" name="Espace réservé du numéro de diapositive 4">
             <a:extLst>
               <a:ext uri="{FF2B5EF4-FFF2-40B4-BE49-F238E27FC236}">
-                <a16:creationId xmlns:a16="http://schemas.microsoft.com/office/drawing/2014/main" id="{E7499F10-CC09-4721-80D2-753B2B7F5381}"/>
+                <a16:creationId xmlns:a16="http://schemas.microsoft.com/office/drawing/2014/main" xmlns="" id="{E7499F10-CC09-4721-80D2-753B2B7F5381}"/>
               </a:ext>
             </a:extLst>
           </p:cNvPr>
@@ -11652,6 +12770,7 @@
           <a:p>
             <a:fld id="{000982F6-AAAD-4258-B115-44D8EC280712}" type="slidenum">
               <a:rPr lang="fr-FR" smtClean="0"/>
+              <a:pPr/>
               <a:t>3</a:t>
             </a:fld>
             <a:endParaRPr lang="fr-FR"/>
@@ -11661,7 +12780,7 @@
     </p:spTree>
     <p:extLst>
       <p:ext uri="{BB962C8B-B14F-4D97-AF65-F5344CB8AC3E}">
-        <p14:creationId xmlns:p14="http://schemas.microsoft.com/office/powerpoint/2010/main" val="3686136127"/>
+        <p14:creationId xmlns:p14="http://schemas.microsoft.com/office/powerpoint/2010/main" xmlns="" val="3686136127"/>
       </p:ext>
     </p:extLst>
   </p:cSld>
@@ -11693,7 +12812,7 @@
           <p:cNvPr id="2" name="Titre 1">
             <a:extLst>
               <a:ext uri="{FF2B5EF4-FFF2-40B4-BE49-F238E27FC236}">
-                <a16:creationId xmlns:a16="http://schemas.microsoft.com/office/drawing/2014/main" id="{EE47D80A-963A-4039-9510-0B6C60716D4D}"/>
+                <a16:creationId xmlns:a16="http://schemas.microsoft.com/office/drawing/2014/main" xmlns="" id="{EE47D80A-963A-4039-9510-0B6C60716D4D}"/>
               </a:ext>
             </a:extLst>
           </p:cNvPr>
@@ -11718,7 +12837,7 @@
           <p:cNvPr id="3" name="Espace réservé du contenu 2">
             <a:extLst>
               <a:ext uri="{FF2B5EF4-FFF2-40B4-BE49-F238E27FC236}">
-                <a16:creationId xmlns:a16="http://schemas.microsoft.com/office/drawing/2014/main" id="{B4B1B833-0C3E-4B64-82BD-D739D3ED2E1E}"/>
+                <a16:creationId xmlns:a16="http://schemas.microsoft.com/office/drawing/2014/main" xmlns="" id="{B4B1B833-0C3E-4B64-82BD-D739D3ED2E1E}"/>
               </a:ext>
             </a:extLst>
           </p:cNvPr>
@@ -11806,7 +12925,7 @@
           <p:cNvPr id="4" name="Espace réservé du contenu 4">
             <a:extLst>
               <a:ext uri="{FF2B5EF4-FFF2-40B4-BE49-F238E27FC236}">
-                <a16:creationId xmlns:a16="http://schemas.microsoft.com/office/drawing/2014/main" id="{60569D3D-C3BB-4780-B0B7-7AC724C3E7EF}"/>
+                <a16:creationId xmlns:a16="http://schemas.microsoft.com/office/drawing/2014/main" xmlns="" id="{60569D3D-C3BB-4780-B0B7-7AC724C3E7EF}"/>
               </a:ext>
             </a:extLst>
           </p:cNvPr>
@@ -11819,7 +12938,7 @@
           <a:blip r:embed="rId2">
             <a:extLst>
               <a:ext uri="{28A0092B-C50C-407E-A947-70E740481C1C}">
-                <a14:useLocalDpi xmlns:a14="http://schemas.microsoft.com/office/drawing/2010/main" val="0"/>
+                <a14:useLocalDpi xmlns:a14="http://schemas.microsoft.com/office/drawing/2010/main" xmlns="" val="0"/>
               </a:ext>
             </a:extLst>
           </a:blip>
@@ -11842,7 +12961,7 @@
           <p:cNvPr id="6" name="Espace réservé du numéro de diapositive 5">
             <a:extLst>
               <a:ext uri="{FF2B5EF4-FFF2-40B4-BE49-F238E27FC236}">
-                <a16:creationId xmlns:a16="http://schemas.microsoft.com/office/drawing/2014/main" id="{554BE81E-A13E-462D-BB3F-726E7C0BC58E}"/>
+                <a16:creationId xmlns:a16="http://schemas.microsoft.com/office/drawing/2014/main" xmlns="" id="{554BE81E-A13E-462D-BB3F-726E7C0BC58E}"/>
               </a:ext>
             </a:extLst>
           </p:cNvPr>
@@ -11860,6 +12979,7 @@
           <a:p>
             <a:fld id="{000982F6-AAAD-4258-B115-44D8EC280712}" type="slidenum">
               <a:rPr lang="fr-FR" smtClean="0"/>
+              <a:pPr/>
               <a:t>4</a:t>
             </a:fld>
             <a:endParaRPr lang="fr-FR"/>
@@ -11869,7 +12989,7 @@
     </p:spTree>
     <p:extLst>
       <p:ext uri="{BB962C8B-B14F-4D97-AF65-F5344CB8AC3E}">
-        <p14:creationId xmlns:p14="http://schemas.microsoft.com/office/powerpoint/2010/main" val="703959671"/>
+        <p14:creationId xmlns:p14="http://schemas.microsoft.com/office/powerpoint/2010/main" xmlns="" val="703959671"/>
       </p:ext>
     </p:extLst>
   </p:cSld>
@@ -11901,7 +13021,7 @@
           <p:cNvPr id="2" name="Titre 1">
             <a:extLst>
               <a:ext uri="{FF2B5EF4-FFF2-40B4-BE49-F238E27FC236}">
-                <a16:creationId xmlns:a16="http://schemas.microsoft.com/office/drawing/2014/main" id="{3B78E597-641E-4559-B633-702BBC9C31B5}"/>
+                <a16:creationId xmlns:a16="http://schemas.microsoft.com/office/drawing/2014/main" xmlns="" id="{3B78E597-641E-4559-B633-702BBC9C31B5}"/>
               </a:ext>
             </a:extLst>
           </p:cNvPr>
@@ -11929,7 +13049,7 @@
           <p:cNvPr id="3" name="Espace réservé du contenu 2">
             <a:extLst>
               <a:ext uri="{FF2B5EF4-FFF2-40B4-BE49-F238E27FC236}">
-                <a16:creationId xmlns:a16="http://schemas.microsoft.com/office/drawing/2014/main" id="{3FF7DE30-3AD2-4874-BED4-F10455D3CA2F}"/>
+                <a16:creationId xmlns:a16="http://schemas.microsoft.com/office/drawing/2014/main" xmlns="" id="{3FF7DE30-3AD2-4874-BED4-F10455D3CA2F}"/>
               </a:ext>
             </a:extLst>
           </p:cNvPr>
@@ -11999,7 +13119,7 @@
           <p:cNvPr id="5" name="Espace réservé du numéro de diapositive 4">
             <a:extLst>
               <a:ext uri="{FF2B5EF4-FFF2-40B4-BE49-F238E27FC236}">
-                <a16:creationId xmlns:a16="http://schemas.microsoft.com/office/drawing/2014/main" id="{7ED22D32-C001-47A4-B0C8-5D4C89041792}"/>
+                <a16:creationId xmlns:a16="http://schemas.microsoft.com/office/drawing/2014/main" xmlns="" id="{7ED22D32-C001-47A4-B0C8-5D4C89041792}"/>
               </a:ext>
             </a:extLst>
           </p:cNvPr>
@@ -12017,6 +13137,7 @@
           <a:p>
             <a:fld id="{000982F6-AAAD-4258-B115-44D8EC280712}" type="slidenum">
               <a:rPr lang="fr-FR" smtClean="0"/>
+              <a:pPr/>
               <a:t>5</a:t>
             </a:fld>
             <a:endParaRPr lang="fr-FR"/>
@@ -12026,7 +13147,7 @@
     </p:spTree>
     <p:extLst>
       <p:ext uri="{BB962C8B-B14F-4D97-AF65-F5344CB8AC3E}">
-        <p14:creationId xmlns:p14="http://schemas.microsoft.com/office/powerpoint/2010/main" val="503595150"/>
+        <p14:creationId xmlns:p14="http://schemas.microsoft.com/office/powerpoint/2010/main" xmlns="" val="503595150"/>
       </p:ext>
     </p:extLst>
   </p:cSld>
@@ -12058,7 +13179,7 @@
           <p:cNvPr id="2" name="Titre 1">
             <a:extLst>
               <a:ext uri="{FF2B5EF4-FFF2-40B4-BE49-F238E27FC236}">
-                <a16:creationId xmlns:a16="http://schemas.microsoft.com/office/drawing/2014/main" id="{87AA8248-2FC7-4DB4-B76F-CE3FEE666906}"/>
+                <a16:creationId xmlns:a16="http://schemas.microsoft.com/office/drawing/2014/main" xmlns="" id="{87AA8248-2FC7-4DB4-B76F-CE3FEE666906}"/>
               </a:ext>
             </a:extLst>
           </p:cNvPr>
@@ -12095,7 +13216,7 @@
           <p:cNvPr id="3" name="Espace réservé du contenu 2">
             <a:extLst>
               <a:ext uri="{FF2B5EF4-FFF2-40B4-BE49-F238E27FC236}">
-                <a16:creationId xmlns:a16="http://schemas.microsoft.com/office/drawing/2014/main" id="{180EDACD-AC7E-4944-A8DC-529FEE578D6F}"/>
+                <a16:creationId xmlns:a16="http://schemas.microsoft.com/office/drawing/2014/main" xmlns="" id="{180EDACD-AC7E-4944-A8DC-529FEE578D6F}"/>
               </a:ext>
             </a:extLst>
           </p:cNvPr>
@@ -12177,7 +13298,7 @@
           <p:cNvPr id="5" name="Espace réservé du numéro de diapositive 4">
             <a:extLst>
               <a:ext uri="{FF2B5EF4-FFF2-40B4-BE49-F238E27FC236}">
-                <a16:creationId xmlns:a16="http://schemas.microsoft.com/office/drawing/2014/main" id="{50BF3ACC-650B-47C0-B56A-D817F3D6FA18}"/>
+                <a16:creationId xmlns:a16="http://schemas.microsoft.com/office/drawing/2014/main" xmlns="" id="{50BF3ACC-650B-47C0-B56A-D817F3D6FA18}"/>
               </a:ext>
             </a:extLst>
           </p:cNvPr>
@@ -12195,6 +13316,7 @@
           <a:p>
             <a:fld id="{000982F6-AAAD-4258-B115-44D8EC280712}" type="slidenum">
               <a:rPr lang="fr-FR" smtClean="0"/>
+              <a:pPr/>
               <a:t>6</a:t>
             </a:fld>
             <a:endParaRPr lang="fr-FR"/>
@@ -12204,7 +13326,7 @@
     </p:spTree>
     <p:extLst>
       <p:ext uri="{BB962C8B-B14F-4D97-AF65-F5344CB8AC3E}">
-        <p14:creationId xmlns:p14="http://schemas.microsoft.com/office/powerpoint/2010/main" val="129017208"/>
+        <p14:creationId xmlns:p14="http://schemas.microsoft.com/office/powerpoint/2010/main" xmlns="" val="129017208"/>
       </p:ext>
     </p:extLst>
   </p:cSld>
@@ -12236,7 +13358,7 @@
           <p:cNvPr id="2" name="Titre 1">
             <a:extLst>
               <a:ext uri="{FF2B5EF4-FFF2-40B4-BE49-F238E27FC236}">
-                <a16:creationId xmlns:a16="http://schemas.microsoft.com/office/drawing/2014/main" id="{A3B24EC0-D904-421A-A85B-AB0678AF0FCE}"/>
+                <a16:creationId xmlns:a16="http://schemas.microsoft.com/office/drawing/2014/main" xmlns="" id="{A3B24EC0-D904-421A-A85B-AB0678AF0FCE}"/>
               </a:ext>
             </a:extLst>
           </p:cNvPr>
@@ -12261,7 +13383,7 @@
           <p:cNvPr id="3" name="Espace réservé du contenu 2">
             <a:extLst>
               <a:ext uri="{FF2B5EF4-FFF2-40B4-BE49-F238E27FC236}">
-                <a16:creationId xmlns:a16="http://schemas.microsoft.com/office/drawing/2014/main" id="{BCD2C893-42EC-4C2F-9BF0-7AF360B0F54D}"/>
+                <a16:creationId xmlns:a16="http://schemas.microsoft.com/office/drawing/2014/main" xmlns="" id="{BCD2C893-42EC-4C2F-9BF0-7AF360B0F54D}"/>
               </a:ext>
             </a:extLst>
           </p:cNvPr>
@@ -12392,7 +13514,7 @@
           <p:cNvPr id="5" name="Espace réservé du numéro de diapositive 4">
             <a:extLst>
               <a:ext uri="{FF2B5EF4-FFF2-40B4-BE49-F238E27FC236}">
-                <a16:creationId xmlns:a16="http://schemas.microsoft.com/office/drawing/2014/main" id="{288C3BA0-0EAA-456B-BEC4-324DD889EEEC}"/>
+                <a16:creationId xmlns:a16="http://schemas.microsoft.com/office/drawing/2014/main" xmlns="" id="{288C3BA0-0EAA-456B-BEC4-324DD889EEEC}"/>
               </a:ext>
             </a:extLst>
           </p:cNvPr>
@@ -12410,6 +13532,7 @@
           <a:p>
             <a:fld id="{000982F6-AAAD-4258-B115-44D8EC280712}" type="slidenum">
               <a:rPr lang="fr-FR" smtClean="0"/>
+              <a:pPr/>
               <a:t>7</a:t>
             </a:fld>
             <a:endParaRPr lang="fr-FR"/>
@@ -12419,7 +13542,7 @@
     </p:spTree>
     <p:extLst>
       <p:ext uri="{BB962C8B-B14F-4D97-AF65-F5344CB8AC3E}">
-        <p14:creationId xmlns:p14="http://schemas.microsoft.com/office/powerpoint/2010/main" val="2821182814"/>
+        <p14:creationId xmlns:p14="http://schemas.microsoft.com/office/powerpoint/2010/main" xmlns="" val="2821182814"/>
       </p:ext>
     </p:extLst>
   </p:cSld>
@@ -12451,7 +13574,7 @@
           <p:cNvPr id="2" name="Titre 1">
             <a:extLst>
               <a:ext uri="{FF2B5EF4-FFF2-40B4-BE49-F238E27FC236}">
-                <a16:creationId xmlns:a16="http://schemas.microsoft.com/office/drawing/2014/main" id="{8DB6E984-1000-41D0-9BAD-8224D1D5B727}"/>
+                <a16:creationId xmlns:a16="http://schemas.microsoft.com/office/drawing/2014/main" xmlns="" id="{8DB6E984-1000-41D0-9BAD-8224D1D5B727}"/>
               </a:ext>
             </a:extLst>
           </p:cNvPr>
@@ -12488,7 +13611,7 @@
           <p:cNvPr id="3" name="Espace réservé du contenu 2">
             <a:extLst>
               <a:ext uri="{FF2B5EF4-FFF2-40B4-BE49-F238E27FC236}">
-                <a16:creationId xmlns:a16="http://schemas.microsoft.com/office/drawing/2014/main" id="{D2C42D89-DA06-4B88-A1AF-550229405A0C}"/>
+                <a16:creationId xmlns:a16="http://schemas.microsoft.com/office/drawing/2014/main" xmlns="" id="{D2C42D89-DA06-4B88-A1AF-550229405A0C}"/>
               </a:ext>
             </a:extLst>
           </p:cNvPr>
@@ -12561,7 +13684,7 @@
           <p:cNvPr id="5" name="Espace réservé du numéro de diapositive 4">
             <a:extLst>
               <a:ext uri="{FF2B5EF4-FFF2-40B4-BE49-F238E27FC236}">
-                <a16:creationId xmlns:a16="http://schemas.microsoft.com/office/drawing/2014/main" id="{822D4A30-1663-492F-AD8A-461A6BC623A1}"/>
+                <a16:creationId xmlns:a16="http://schemas.microsoft.com/office/drawing/2014/main" xmlns="" id="{822D4A30-1663-492F-AD8A-461A6BC623A1}"/>
               </a:ext>
             </a:extLst>
           </p:cNvPr>
@@ -12579,6 +13702,7 @@
           <a:p>
             <a:fld id="{000982F6-AAAD-4258-B115-44D8EC280712}" type="slidenum">
               <a:rPr lang="fr-FR" smtClean="0"/>
+              <a:pPr/>
               <a:t>8</a:t>
             </a:fld>
             <a:endParaRPr lang="fr-FR"/>
@@ -12588,7 +13712,7 @@
     </p:spTree>
     <p:extLst>
       <p:ext uri="{BB962C8B-B14F-4D97-AF65-F5344CB8AC3E}">
-        <p14:creationId xmlns:p14="http://schemas.microsoft.com/office/powerpoint/2010/main" val="2572246735"/>
+        <p14:creationId xmlns:p14="http://schemas.microsoft.com/office/powerpoint/2010/main" xmlns="" val="2572246735"/>
       </p:ext>
     </p:extLst>
   </p:cSld>
@@ -12620,7 +13744,7 @@
           <p:cNvPr id="2" name="Titre 1">
             <a:extLst>
               <a:ext uri="{FF2B5EF4-FFF2-40B4-BE49-F238E27FC236}">
-                <a16:creationId xmlns:a16="http://schemas.microsoft.com/office/drawing/2014/main" id="{2F4E9914-A102-49E3-9B09-BB7A13F49DD0}"/>
+                <a16:creationId xmlns:a16="http://schemas.microsoft.com/office/drawing/2014/main" xmlns="" id="{2F4E9914-A102-49E3-9B09-BB7A13F49DD0}"/>
               </a:ext>
             </a:extLst>
           </p:cNvPr>
@@ -12657,7 +13781,7 @@
           <p:cNvPr id="4" name="Espace réservé du contenu 3">
             <a:extLst>
               <a:ext uri="{FF2B5EF4-FFF2-40B4-BE49-F238E27FC236}">
-                <a16:creationId xmlns:a16="http://schemas.microsoft.com/office/drawing/2014/main" id="{8C412395-3E7D-4827-B89D-D10AF7A53A97}"/>
+                <a16:creationId xmlns:a16="http://schemas.microsoft.com/office/drawing/2014/main" xmlns="" id="{8C412395-3E7D-4827-B89D-D10AF7A53A97}"/>
               </a:ext>
             </a:extLst>
           </p:cNvPr>
@@ -12730,7 +13854,7 @@
           <p:cNvPr id="7" name="image6.png">
             <a:extLst>
               <a:ext uri="{FF2B5EF4-FFF2-40B4-BE49-F238E27FC236}">
-                <a16:creationId xmlns:a16="http://schemas.microsoft.com/office/drawing/2014/main" id="{C0C77CD7-A252-41BA-924C-91383B1D9AA9}"/>
+                <a16:creationId xmlns:a16="http://schemas.microsoft.com/office/drawing/2014/main" xmlns="" id="{C0C77CD7-A252-41BA-924C-91383B1D9AA9}"/>
               </a:ext>
             </a:extLst>
           </p:cNvPr>
@@ -12764,7 +13888,7 @@
           <p:cNvPr id="8" name="Flèche : droite 7">
             <a:extLst>
               <a:ext uri="{FF2B5EF4-FFF2-40B4-BE49-F238E27FC236}">
-                <a16:creationId xmlns:a16="http://schemas.microsoft.com/office/drawing/2014/main" id="{4F1978B8-9DC2-4CC4-87B0-445F4B061D10}"/>
+                <a16:creationId xmlns:a16="http://schemas.microsoft.com/office/drawing/2014/main" xmlns="" id="{4F1978B8-9DC2-4CC4-87B0-445F4B061D10}"/>
               </a:ext>
             </a:extLst>
           </p:cNvPr>
@@ -12810,7 +13934,7 @@
           <p:cNvPr id="5" name="Espace réservé du numéro de diapositive 4">
             <a:extLst>
               <a:ext uri="{FF2B5EF4-FFF2-40B4-BE49-F238E27FC236}">
-                <a16:creationId xmlns:a16="http://schemas.microsoft.com/office/drawing/2014/main" id="{E74AD553-1959-43E0-B79D-B4616E5DEB89}"/>
+                <a16:creationId xmlns:a16="http://schemas.microsoft.com/office/drawing/2014/main" xmlns="" id="{E74AD553-1959-43E0-B79D-B4616E5DEB89}"/>
               </a:ext>
             </a:extLst>
           </p:cNvPr>
@@ -12828,6 +13952,7 @@
           <a:p>
             <a:fld id="{000982F6-AAAD-4258-B115-44D8EC280712}" type="slidenum">
               <a:rPr lang="fr-FR" smtClean="0"/>
+              <a:pPr/>
               <a:t>9</a:t>
             </a:fld>
             <a:endParaRPr lang="fr-FR"/>
@@ -12837,7 +13962,7 @@
     </p:spTree>
     <p:extLst>
       <p:ext uri="{BB962C8B-B14F-4D97-AF65-F5344CB8AC3E}">
-        <p14:creationId xmlns:p14="http://schemas.microsoft.com/office/powerpoint/2010/main" val="308474648"/>
+        <p14:creationId xmlns:p14="http://schemas.microsoft.com/office/powerpoint/2010/main" xmlns="" val="308474648"/>
       </p:ext>
     </p:extLst>
   </p:cSld>
@@ -12890,7 +14015,7 @@
     </a:clrScheme>
     <a:fontScheme name="Facette">
       <a:majorFont>
-        <a:latin typeface="Trebuchet MS" panose="020B0603020202020204"/>
+        <a:latin typeface="Trebuchet MS"/>
         <a:ea typeface=""/>
         <a:cs typeface=""/>
         <a:font script="Jpan" typeface="メイリオ"/>
@@ -12925,7 +14050,7 @@
         <a:font script="Geor" typeface="Sylfaen"/>
       </a:majorFont>
       <a:minorFont>
-        <a:latin typeface="Trebuchet MS" panose="020B0603020202020204"/>
+        <a:latin typeface="Trebuchet MS"/>
         <a:ea typeface=""/>
         <a:cs typeface=""/>
         <a:font script="Jpan" typeface="メイリオ"/>
@@ -13098,7 +14223,7 @@
   <a:extraClrSchemeLst/>
   <a:extLst>
     <a:ext uri="{05A4C25C-085E-4340-85A3-A5531E510DB2}">
-      <thm15:themeFamily xmlns:thm15="http://schemas.microsoft.com/office/thememl/2012/main" name="Facet" id="{C0C680CD-088A-49FC-A102-D699147F32B2}" vid="{0B5AB586-D108-4FC1-8368-649FE654B894}"/>
+      <thm15:themeFamily xmlns:thm15="http://schemas.microsoft.com/office/thememl/2012/main" xmlns="" name="Facet" id="{C0C680CD-088A-49FC-A102-D699147F32B2}" vid="{0B5AB586-D108-4FC1-8368-649FE654B894}"/>
     </a:ext>
   </a:extLst>
 </a:theme>
@@ -13147,7 +14272,7 @@
     </a:clrScheme>
     <a:fontScheme name="Office">
       <a:majorFont>
-        <a:latin typeface="Calibri Light" panose="020F0302020204030204"/>
+        <a:latin typeface="Calibri Light"/>
         <a:ea typeface=""/>
         <a:cs typeface=""/>
         <a:font script="Jpan" typeface="游ゴシック Light"/>
@@ -13199,7 +14324,7 @@
         <a:font script="Tfng" typeface="Ebrima"/>
       </a:majorFont>
       <a:minorFont>
-        <a:latin typeface="Calibri" panose="020F0502020204030204"/>
+        <a:latin typeface="Calibri"/>
         <a:ea typeface=""/>
         <a:cs typeface=""/>
         <a:font script="Jpan" typeface="游ゴシック"/>
@@ -13393,7 +14518,7 @@
   <a:extraClrSchemeLst/>
   <a:extLst>
     <a:ext uri="{05A4C25C-085E-4340-85A3-A5531E510DB2}">
-      <thm15:themeFamily xmlns:thm15="http://schemas.microsoft.com/office/thememl/2012/main" name="Office Theme" id="{62F939B6-93AF-4DB8-9C6B-D6C7DFDC589F}" vid="{4A3C46E8-61CC-4603-A589-7422A47A8E4A}"/>
+      <thm15:themeFamily xmlns:thm15="http://schemas.microsoft.com/office/thememl/2012/main" xmlns="" name="Office Theme" id="{62F939B6-93AF-4DB8-9C6B-D6C7DFDC589F}" vid="{4A3C46E8-61CC-4603-A589-7422A47A8E4A}"/>
     </a:ext>
   </a:extLst>
 </a:theme>

</xml_diff>

<commit_message>
Changes in oral presentation
</commit_message>
<xml_diff>
--- a/oral_presentation/Oral_presentation_12_02_2019.pptx
+++ b/oral_presentation/Oral_presentation_12_02_2019.pptx
@@ -135,7 +135,18 @@
   </p:defaultTextStyle>
   <p:extLst>
     <p:ext uri="{EFAFB233-063F-42B5-8137-9DF3F51BA10A}">
-      <p15:sldGuideLst xmlns:p15="http://schemas.microsoft.com/office/powerpoint/2012/main" xmlns=""/>
+      <p15:sldGuideLst xmlns:p15="http://schemas.microsoft.com/office/powerpoint/2012/main">
+        <p15:guide id="1" orient="horz" pos="2160">
+          <p15:clr>
+            <a:srgbClr val="A4A3A4"/>
+          </p15:clr>
+        </p15:guide>
+        <p15:guide id="2" pos="3840">
+          <p15:clr>
+            <a:srgbClr val="A4A3A4"/>
+          </p15:clr>
+        </p15:guide>
+      </p15:sldGuideLst>
     </p:ext>
   </p:extLst>
 </p:presentation>
@@ -224,7 +235,7 @@
             <a:fld id="{56ADCF75-9FA8-4B5E-89AC-8EA488A0C9C6}" type="datetimeFigureOut">
               <a:rPr lang="fr-FR" smtClean="0"/>
               <a:pPr/>
-              <a:t>20/02/2019</a:t>
+              <a:t>06/03/2019</a:t>
             </a:fld>
             <a:endParaRPr lang="fr-FR"/>
           </a:p>
@@ -383,7 +394,7 @@
             <a:fld id="{EE68C684-0D5A-433E-9D44-475EB8B197BE}" type="slidenum">
               <a:rPr lang="fr-FR" smtClean="0"/>
               <a:pPr/>
-              <a:t>‹Nº›</a:t>
+              <a:t>‹N°›</a:t>
             </a:fld>
             <a:endParaRPr lang="fr-FR"/>
           </a:p>
@@ -392,7 +403,7 @@
     </p:spTree>
     <p:extLst>
       <p:ext uri="{BB962C8B-B14F-4D97-AF65-F5344CB8AC3E}">
-        <p14:creationId xmlns:p14="http://schemas.microsoft.com/office/powerpoint/2010/main" xmlns="" val="2768550619"/>
+        <p14:creationId xmlns:p14="http://schemas.microsoft.com/office/powerpoint/2010/main" val="2768550619"/>
       </p:ext>
     </p:extLst>
   </p:cSld>
@@ -1235,10 +1246,9 @@
           <a:bodyPr/>
           <a:lstStyle/>
           <a:p>
-            <a:fld id="{89DE9712-09E9-407E-A1FD-F5C2C5E766F2}" type="datetime1">
+            <a:fld id="{5C61E59B-5C64-43F7-8C6E-B6D55727013B}" type="datetime1">
               <a:rPr lang="fr-FR" smtClean="0"/>
-              <a:pPr/>
-              <a:t>20/02/2019</a:t>
+              <a:t>06/03/2019</a:t>
             </a:fld>
             <a:endParaRPr lang="fr-FR"/>
           </a:p>
@@ -1281,7 +1291,7 @@
             <a:fld id="{000982F6-AAAD-4258-B115-44D8EC280712}" type="slidenum">
               <a:rPr lang="fr-FR" smtClean="0"/>
               <a:pPr/>
-              <a:t>‹Nº›</a:t>
+              <a:t>‹N°›</a:t>
             </a:fld>
             <a:endParaRPr lang="fr-FR"/>
           </a:p>
@@ -1290,7 +1300,7 @@
     </p:spTree>
     <p:extLst>
       <p:ext uri="{BB962C8B-B14F-4D97-AF65-F5344CB8AC3E}">
-        <p14:creationId xmlns:p14="http://schemas.microsoft.com/office/powerpoint/2010/main" xmlns="" val="3344104296"/>
+        <p14:creationId xmlns:p14="http://schemas.microsoft.com/office/powerpoint/2010/main" val="3344104296"/>
       </p:ext>
     </p:extLst>
   </p:cSld>
@@ -1488,10 +1498,9 @@
           <a:bodyPr/>
           <a:lstStyle/>
           <a:p>
-            <a:fld id="{1EA571E9-F197-408D-A002-C7CB11937ADF}" type="datetime1">
+            <a:fld id="{40567310-A2B9-453F-B8C9-E4AF9BAE9154}" type="datetime1">
               <a:rPr lang="fr-FR" smtClean="0"/>
-              <a:pPr/>
-              <a:t>20/02/2019</a:t>
+              <a:t>06/03/2019</a:t>
             </a:fld>
             <a:endParaRPr lang="fr-FR"/>
           </a:p>
@@ -1534,7 +1543,7 @@
             <a:fld id="{000982F6-AAAD-4258-B115-44D8EC280712}" type="slidenum">
               <a:rPr lang="fr-FR" smtClean="0"/>
               <a:pPr/>
-              <a:t>‹Nº›</a:t>
+              <a:t>‹N°›</a:t>
             </a:fld>
             <a:endParaRPr lang="fr-FR"/>
           </a:p>
@@ -1543,7 +1552,7 @@
     </p:spTree>
     <p:extLst>
       <p:ext uri="{BB962C8B-B14F-4D97-AF65-F5344CB8AC3E}">
-        <p14:creationId xmlns:p14="http://schemas.microsoft.com/office/powerpoint/2010/main" xmlns="" val="3118303151"/>
+        <p14:creationId xmlns:p14="http://schemas.microsoft.com/office/powerpoint/2010/main" val="3118303151"/>
       </p:ext>
     </p:extLst>
   </p:cSld>
@@ -1804,10 +1813,9 @@
           <a:bodyPr/>
           <a:lstStyle/>
           <a:p>
-            <a:fld id="{BD56AC79-BDEC-4E9A-8490-EFD625A2113C}" type="datetime1">
+            <a:fld id="{F8768A15-35D6-493E-9F10-B8B588A234CB}" type="datetime1">
               <a:rPr lang="fr-FR" smtClean="0"/>
-              <a:pPr/>
-              <a:t>20/02/2019</a:t>
+              <a:t>06/03/2019</a:t>
             </a:fld>
             <a:endParaRPr lang="fr-FR"/>
           </a:p>
@@ -1850,7 +1858,7 @@
             <a:fld id="{000982F6-AAAD-4258-B115-44D8EC280712}" type="slidenum">
               <a:rPr lang="fr-FR" smtClean="0"/>
               <a:pPr/>
-              <a:t>‹Nº›</a:t>
+              <a:t>‹N°›</a:t>
             </a:fld>
             <a:endParaRPr lang="fr-FR"/>
           </a:p>
@@ -1941,7 +1949,7 @@
     </p:spTree>
     <p:extLst>
       <p:ext uri="{BB962C8B-B14F-4D97-AF65-F5344CB8AC3E}">
-        <p14:creationId xmlns:p14="http://schemas.microsoft.com/office/powerpoint/2010/main" xmlns="" val="2191588136"/>
+        <p14:creationId xmlns:p14="http://schemas.microsoft.com/office/powerpoint/2010/main" val="2191588136"/>
       </p:ext>
     </p:extLst>
   </p:cSld>
@@ -2139,10 +2147,9 @@
           <a:bodyPr/>
           <a:lstStyle/>
           <a:p>
-            <a:fld id="{BDFDD02D-B74E-4E50-ACE1-7DC01A48810E}" type="datetime1">
+            <a:fld id="{C5F5C17A-5CFA-49C2-BB3B-5D9FF30025E3}" type="datetime1">
               <a:rPr lang="fr-FR" smtClean="0"/>
-              <a:pPr/>
-              <a:t>20/02/2019</a:t>
+              <a:t>06/03/2019</a:t>
             </a:fld>
             <a:endParaRPr lang="fr-FR"/>
           </a:p>
@@ -2185,7 +2192,7 @@
             <a:fld id="{000982F6-AAAD-4258-B115-44D8EC280712}" type="slidenum">
               <a:rPr lang="fr-FR" smtClean="0"/>
               <a:pPr/>
-              <a:t>‹Nº›</a:t>
+              <a:t>‹N°›</a:t>
             </a:fld>
             <a:endParaRPr lang="fr-FR"/>
           </a:p>
@@ -2194,7 +2201,7 @@
     </p:spTree>
     <p:extLst>
       <p:ext uri="{BB962C8B-B14F-4D97-AF65-F5344CB8AC3E}">
-        <p14:creationId xmlns:p14="http://schemas.microsoft.com/office/powerpoint/2010/main" xmlns="" val="1959268983"/>
+        <p14:creationId xmlns:p14="http://schemas.microsoft.com/office/powerpoint/2010/main" val="1959268983"/>
       </p:ext>
     </p:extLst>
   </p:cSld>
@@ -2455,10 +2462,9 @@
           <a:bodyPr/>
           <a:lstStyle/>
           <a:p>
-            <a:fld id="{816C6CB9-D7B5-4C0B-B0D6-2259E77C28C5}" type="datetime1">
+            <a:fld id="{EB8975D8-7325-4F59-BFBB-049E3EBEDE05}" type="datetime1">
               <a:rPr lang="fr-FR" smtClean="0"/>
-              <a:pPr/>
-              <a:t>20/02/2019</a:t>
+              <a:t>06/03/2019</a:t>
             </a:fld>
             <a:endParaRPr lang="fr-FR"/>
           </a:p>
@@ -2501,7 +2507,7 @@
             <a:fld id="{000982F6-AAAD-4258-B115-44D8EC280712}" type="slidenum">
               <a:rPr lang="fr-FR" smtClean="0"/>
               <a:pPr/>
-              <a:t>‹Nº›</a:t>
+              <a:t>‹N°›</a:t>
             </a:fld>
             <a:endParaRPr lang="fr-FR"/>
           </a:p>
@@ -2592,7 +2598,7 @@
     </p:spTree>
     <p:extLst>
       <p:ext uri="{BB962C8B-B14F-4D97-AF65-F5344CB8AC3E}">
-        <p14:creationId xmlns:p14="http://schemas.microsoft.com/office/powerpoint/2010/main" xmlns="" val="3454582472"/>
+        <p14:creationId xmlns:p14="http://schemas.microsoft.com/office/powerpoint/2010/main" val="3454582472"/>
       </p:ext>
     </p:extLst>
   </p:cSld>
@@ -2850,10 +2856,9 @@
           <a:bodyPr/>
           <a:lstStyle/>
           <a:p>
-            <a:fld id="{D7649D92-D288-4ABD-A423-47AFF391697D}" type="datetime1">
+            <a:fld id="{7E3C8D4F-82A2-420E-9539-E6B4344E7EB5}" type="datetime1">
               <a:rPr lang="fr-FR" smtClean="0"/>
-              <a:pPr/>
-              <a:t>20/02/2019</a:t>
+              <a:t>06/03/2019</a:t>
             </a:fld>
             <a:endParaRPr lang="fr-FR"/>
           </a:p>
@@ -2896,7 +2901,7 @@
             <a:fld id="{000982F6-AAAD-4258-B115-44D8EC280712}" type="slidenum">
               <a:rPr lang="fr-FR" smtClean="0"/>
               <a:pPr/>
-              <a:t>‹Nº›</a:t>
+              <a:t>‹N°›</a:t>
             </a:fld>
             <a:endParaRPr lang="fr-FR"/>
           </a:p>
@@ -2905,7 +2910,7 @@
     </p:spTree>
     <p:extLst>
       <p:ext uri="{BB962C8B-B14F-4D97-AF65-F5344CB8AC3E}">
-        <p14:creationId xmlns:p14="http://schemas.microsoft.com/office/powerpoint/2010/main" xmlns="" val="1087781599"/>
+        <p14:creationId xmlns:p14="http://schemas.microsoft.com/office/powerpoint/2010/main" val="1087781599"/>
       </p:ext>
     </p:extLst>
   </p:cSld>
@@ -3022,10 +3027,9 @@
           <a:bodyPr/>
           <a:lstStyle/>
           <a:p>
-            <a:fld id="{32C16C4E-CE6B-4126-99D6-47659C184675}" type="datetime1">
+            <a:fld id="{5EAA12AF-7665-4477-9DE9-8EBB376AFBCC}" type="datetime1">
               <a:rPr lang="fr-FR" smtClean="0"/>
-              <a:pPr/>
-              <a:t>20/02/2019</a:t>
+              <a:t>06/03/2019</a:t>
             </a:fld>
             <a:endParaRPr lang="fr-FR"/>
           </a:p>
@@ -3068,7 +3072,7 @@
             <a:fld id="{000982F6-AAAD-4258-B115-44D8EC280712}" type="slidenum">
               <a:rPr lang="fr-FR" smtClean="0"/>
               <a:pPr/>
-              <a:t>‹Nº›</a:t>
+              <a:t>‹N°›</a:t>
             </a:fld>
             <a:endParaRPr lang="fr-FR"/>
           </a:p>
@@ -3077,7 +3081,7 @@
     </p:spTree>
     <p:extLst>
       <p:ext uri="{BB962C8B-B14F-4D97-AF65-F5344CB8AC3E}">
-        <p14:creationId xmlns:p14="http://schemas.microsoft.com/office/powerpoint/2010/main" xmlns="" val="1938243915"/>
+        <p14:creationId xmlns:p14="http://schemas.microsoft.com/office/powerpoint/2010/main" val="1938243915"/>
       </p:ext>
     </p:extLst>
   </p:cSld>
@@ -3204,10 +3208,9 @@
           <a:bodyPr/>
           <a:lstStyle/>
           <a:p>
-            <a:fld id="{1F51B9D7-346C-4256-8C4C-EAA818213197}" type="datetime1">
+            <a:fld id="{CB7A798C-9309-4115-9B7F-44F81B239286}" type="datetime1">
               <a:rPr lang="fr-FR" smtClean="0"/>
-              <a:pPr/>
-              <a:t>20/02/2019</a:t>
+              <a:t>06/03/2019</a:t>
             </a:fld>
             <a:endParaRPr lang="fr-FR"/>
           </a:p>
@@ -3250,7 +3253,7 @@
             <a:fld id="{000982F6-AAAD-4258-B115-44D8EC280712}" type="slidenum">
               <a:rPr lang="fr-FR" smtClean="0"/>
               <a:pPr/>
-              <a:t>‹Nº›</a:t>
+              <a:t>‹N°›</a:t>
             </a:fld>
             <a:endParaRPr lang="fr-FR"/>
           </a:p>
@@ -3259,7 +3262,7 @@
     </p:spTree>
     <p:extLst>
       <p:ext uri="{BB962C8B-B14F-4D97-AF65-F5344CB8AC3E}">
-        <p14:creationId xmlns:p14="http://schemas.microsoft.com/office/powerpoint/2010/main" xmlns="" val="4185667816"/>
+        <p14:creationId xmlns:p14="http://schemas.microsoft.com/office/powerpoint/2010/main" val="4185667816"/>
       </p:ext>
     </p:extLst>
   </p:cSld>
@@ -3376,10 +3379,9 @@
           <a:bodyPr/>
           <a:lstStyle/>
           <a:p>
-            <a:fld id="{737F8263-D0D8-4843-B368-33B7ADDF127F}" type="datetime1">
+            <a:fld id="{37C4B3FA-EDAF-41B8-AF88-73A626AF5D94}" type="datetime1">
               <a:rPr lang="fr-FR" smtClean="0"/>
-              <a:pPr/>
-              <a:t>20/02/2019</a:t>
+              <a:t>06/03/2019</a:t>
             </a:fld>
             <a:endParaRPr lang="fr-FR"/>
           </a:p>
@@ -3422,7 +3424,7 @@
             <a:fld id="{000982F6-AAAD-4258-B115-44D8EC280712}" type="slidenum">
               <a:rPr lang="fr-FR" smtClean="0"/>
               <a:pPr/>
-              <a:t>‹Nº›</a:t>
+              <a:t>‹N°›</a:t>
             </a:fld>
             <a:endParaRPr lang="fr-FR"/>
           </a:p>
@@ -3431,7 +3433,7 @@
     </p:spTree>
     <p:extLst>
       <p:ext uri="{BB962C8B-B14F-4D97-AF65-F5344CB8AC3E}">
-        <p14:creationId xmlns:p14="http://schemas.microsoft.com/office/powerpoint/2010/main" xmlns="" val="473486958"/>
+        <p14:creationId xmlns:p14="http://schemas.microsoft.com/office/powerpoint/2010/main" val="473486958"/>
       </p:ext>
     </p:extLst>
   </p:cSld>
@@ -3625,10 +3627,9 @@
           <a:bodyPr/>
           <a:lstStyle/>
           <a:p>
-            <a:fld id="{D392D74D-FFEA-4245-8886-A6F8268ED21E}" type="datetime1">
+            <a:fld id="{7D6C92E9-568D-4E9D-8F58-E2EE5036913B}" type="datetime1">
               <a:rPr lang="fr-FR" smtClean="0"/>
-              <a:pPr/>
-              <a:t>20/02/2019</a:t>
+              <a:t>06/03/2019</a:t>
             </a:fld>
             <a:endParaRPr lang="fr-FR"/>
           </a:p>
@@ -3671,7 +3672,7 @@
             <a:fld id="{000982F6-AAAD-4258-B115-44D8EC280712}" type="slidenum">
               <a:rPr lang="fr-FR" smtClean="0"/>
               <a:pPr/>
-              <a:t>‹Nº›</a:t>
+              <a:t>‹N°›</a:t>
             </a:fld>
             <a:endParaRPr lang="fr-FR"/>
           </a:p>
@@ -3680,7 +3681,7 @@
     </p:spTree>
     <p:extLst>
       <p:ext uri="{BB962C8B-B14F-4D97-AF65-F5344CB8AC3E}">
-        <p14:creationId xmlns:p14="http://schemas.microsoft.com/office/powerpoint/2010/main" xmlns="" val="1852630678"/>
+        <p14:creationId xmlns:p14="http://schemas.microsoft.com/office/powerpoint/2010/main" val="1852630678"/>
       </p:ext>
     </p:extLst>
   </p:cSld>
@@ -3859,10 +3860,9 @@
           <a:bodyPr/>
           <a:lstStyle/>
           <a:p>
-            <a:fld id="{B7A49A4A-35AF-4856-B170-4C5751F1F7EF}" type="datetime1">
+            <a:fld id="{A770640B-5157-494A-AB4D-8F6B5DABA2C6}" type="datetime1">
               <a:rPr lang="fr-FR" smtClean="0"/>
-              <a:pPr/>
-              <a:t>20/02/2019</a:t>
+              <a:t>06/03/2019</a:t>
             </a:fld>
             <a:endParaRPr lang="fr-FR"/>
           </a:p>
@@ -3905,7 +3905,7 @@
             <a:fld id="{000982F6-AAAD-4258-B115-44D8EC280712}" type="slidenum">
               <a:rPr lang="fr-FR" smtClean="0"/>
               <a:pPr/>
-              <a:t>‹Nº›</a:t>
+              <a:t>‹N°›</a:t>
             </a:fld>
             <a:endParaRPr lang="fr-FR"/>
           </a:p>
@@ -3914,7 +3914,7 @@
     </p:spTree>
     <p:extLst>
       <p:ext uri="{BB962C8B-B14F-4D97-AF65-F5344CB8AC3E}">
-        <p14:creationId xmlns:p14="http://schemas.microsoft.com/office/powerpoint/2010/main" xmlns="" val="1584811670"/>
+        <p14:creationId xmlns:p14="http://schemas.microsoft.com/office/powerpoint/2010/main" val="1584811670"/>
       </p:ext>
     </p:extLst>
   </p:cSld>
@@ -4235,10 +4235,9 @@
           <a:bodyPr/>
           <a:lstStyle/>
           <a:p>
-            <a:fld id="{76F48825-794F-4804-8130-41EB5FB3BA95}" type="datetime1">
+            <a:fld id="{BFE01ABC-777F-47A8-9355-E9BE8F9EE6BB}" type="datetime1">
               <a:rPr lang="fr-FR" smtClean="0"/>
-              <a:pPr/>
-              <a:t>20/02/2019</a:t>
+              <a:t>06/03/2019</a:t>
             </a:fld>
             <a:endParaRPr lang="fr-FR"/>
           </a:p>
@@ -4281,7 +4280,7 @@
             <a:fld id="{000982F6-AAAD-4258-B115-44D8EC280712}" type="slidenum">
               <a:rPr lang="fr-FR" smtClean="0"/>
               <a:pPr/>
-              <a:t>‹Nº›</a:t>
+              <a:t>‹N°›</a:t>
             </a:fld>
             <a:endParaRPr lang="fr-FR"/>
           </a:p>
@@ -4290,7 +4289,7 @@
     </p:spTree>
     <p:extLst>
       <p:ext uri="{BB962C8B-B14F-4D97-AF65-F5344CB8AC3E}">
-        <p14:creationId xmlns:p14="http://schemas.microsoft.com/office/powerpoint/2010/main" xmlns="" val="2334506417"/>
+        <p14:creationId xmlns:p14="http://schemas.microsoft.com/office/powerpoint/2010/main" val="2334506417"/>
       </p:ext>
     </p:extLst>
   </p:cSld>
@@ -4360,10 +4359,9 @@
           <a:bodyPr/>
           <a:lstStyle/>
           <a:p>
-            <a:fld id="{345AFD62-CB2E-47E0-B9F3-AF4CD676DF0D}" type="datetime1">
+            <a:fld id="{4893CD18-36AC-487E-9AA3-5FD0527C7D62}" type="datetime1">
               <a:rPr lang="fr-FR" smtClean="0"/>
-              <a:pPr/>
-              <a:t>20/02/2019</a:t>
+              <a:t>06/03/2019</a:t>
             </a:fld>
             <a:endParaRPr lang="fr-FR"/>
           </a:p>
@@ -4406,7 +4404,7 @@
             <a:fld id="{000982F6-AAAD-4258-B115-44D8EC280712}" type="slidenum">
               <a:rPr lang="fr-FR" smtClean="0"/>
               <a:pPr/>
-              <a:t>‹Nº›</a:t>
+              <a:t>‹N°›</a:t>
             </a:fld>
             <a:endParaRPr lang="fr-FR"/>
           </a:p>
@@ -4415,7 +4413,7 @@
     </p:spTree>
     <p:extLst>
       <p:ext uri="{BB962C8B-B14F-4D97-AF65-F5344CB8AC3E}">
-        <p14:creationId xmlns:p14="http://schemas.microsoft.com/office/powerpoint/2010/main" xmlns="" val="2069309907"/>
+        <p14:creationId xmlns:p14="http://schemas.microsoft.com/office/powerpoint/2010/main" val="2069309907"/>
       </p:ext>
     </p:extLst>
   </p:cSld>
@@ -4457,10 +4455,9 @@
           <a:bodyPr/>
           <a:lstStyle/>
           <a:p>
-            <a:fld id="{C6C76E0C-EAC5-4FFC-9610-27148E22261B}" type="datetime1">
+            <a:fld id="{B66C84C0-D701-48EB-8B1F-F1827A6FA8A2}" type="datetime1">
               <a:rPr lang="fr-FR" smtClean="0"/>
-              <a:pPr/>
-              <a:t>20/02/2019</a:t>
+              <a:t>06/03/2019</a:t>
             </a:fld>
             <a:endParaRPr lang="fr-FR"/>
           </a:p>
@@ -4503,7 +4500,7 @@
             <a:fld id="{000982F6-AAAD-4258-B115-44D8EC280712}" type="slidenum">
               <a:rPr lang="fr-FR" smtClean="0"/>
               <a:pPr/>
-              <a:t>‹Nº›</a:t>
+              <a:t>‹N°›</a:t>
             </a:fld>
             <a:endParaRPr lang="fr-FR"/>
           </a:p>
@@ -4512,7 +4509,7 @@
     </p:spTree>
     <p:extLst>
       <p:ext uri="{BB962C8B-B14F-4D97-AF65-F5344CB8AC3E}">
-        <p14:creationId xmlns:p14="http://schemas.microsoft.com/office/powerpoint/2010/main" xmlns="" val="639196056"/>
+        <p14:creationId xmlns:p14="http://schemas.microsoft.com/office/powerpoint/2010/main" val="639196056"/>
       </p:ext>
     </p:extLst>
   </p:cSld>
@@ -4714,10 +4711,9 @@
           <a:bodyPr/>
           <a:lstStyle/>
           <a:p>
-            <a:fld id="{23591DC3-B044-4F76-A85E-C7113341B796}" type="datetime1">
+            <a:fld id="{0DBF0F5B-26BD-4A66-B55F-9595895F2A43}" type="datetime1">
               <a:rPr lang="fr-FR" smtClean="0"/>
-              <a:pPr/>
-              <a:t>20/02/2019</a:t>
+              <a:t>06/03/2019</a:t>
             </a:fld>
             <a:endParaRPr lang="fr-FR"/>
           </a:p>
@@ -4760,7 +4756,7 @@
             <a:fld id="{000982F6-AAAD-4258-B115-44D8EC280712}" type="slidenum">
               <a:rPr lang="fr-FR" smtClean="0"/>
               <a:pPr/>
-              <a:t>‹Nº›</a:t>
+              <a:t>‹N°›</a:t>
             </a:fld>
             <a:endParaRPr lang="fr-FR"/>
           </a:p>
@@ -4769,7 +4765,7 @@
     </p:spTree>
     <p:extLst>
       <p:ext uri="{BB962C8B-B14F-4D97-AF65-F5344CB8AC3E}">
-        <p14:creationId xmlns:p14="http://schemas.microsoft.com/office/powerpoint/2010/main" xmlns="" val="4248595626"/>
+        <p14:creationId xmlns:p14="http://schemas.microsoft.com/office/powerpoint/2010/main" val="4248595626"/>
       </p:ext>
     </p:extLst>
   </p:cSld>
@@ -5001,7 +4997,7 @@
             <a:fld id="{000982F6-AAAD-4258-B115-44D8EC280712}" type="slidenum">
               <a:rPr lang="fr-FR" smtClean="0"/>
               <a:pPr/>
-              <a:t>‹Nº›</a:t>
+              <a:t>‹N°›</a:t>
             </a:fld>
             <a:endParaRPr lang="fr-FR"/>
           </a:p>
@@ -5022,10 +5018,9 @@
           <a:bodyPr/>
           <a:lstStyle/>
           <a:p>
-            <a:fld id="{7BE10B72-BCB4-4E5C-A06A-C621F15D31CF}" type="datetime1">
+            <a:fld id="{151AB4D3-308F-4EF4-A4A6-E27857A75307}" type="datetime1">
               <a:rPr lang="fr-FR" smtClean="0"/>
-              <a:pPr/>
-              <a:t>20/02/2019</a:t>
+              <a:t>06/03/2019</a:t>
             </a:fld>
             <a:endParaRPr lang="fr-FR"/>
           </a:p>
@@ -5034,7 +5029,7 @@
     </p:spTree>
     <p:extLst>
       <p:ext uri="{BB962C8B-B14F-4D97-AF65-F5344CB8AC3E}">
-        <p14:creationId xmlns:p14="http://schemas.microsoft.com/office/powerpoint/2010/main" xmlns="" val="1569854607"/>
+        <p14:creationId xmlns:p14="http://schemas.microsoft.com/office/powerpoint/2010/main" val="1569854607"/>
       </p:ext>
     </p:extLst>
   </p:cSld>
@@ -5725,10 +5720,9 @@
             </a:lvl1pPr>
           </a:lstStyle>
           <a:p>
-            <a:fld id="{74B392F4-30E2-47AE-AE4F-34A92428D3A6}" type="datetime1">
+            <a:fld id="{18288F12-2BB5-4EB8-BFA2-693E909DD195}" type="datetime1">
               <a:rPr lang="fr-FR" smtClean="0"/>
-              <a:pPr/>
-              <a:t>20/02/2019</a:t>
+              <a:t>06/03/2019</a:t>
             </a:fld>
             <a:endParaRPr lang="fr-FR"/>
           </a:p>
@@ -5805,7 +5799,7 @@
             <a:fld id="{000982F6-AAAD-4258-B115-44D8EC280712}" type="slidenum">
               <a:rPr lang="fr-FR" smtClean="0"/>
               <a:pPr/>
-              <a:t>‹Nº›</a:t>
+              <a:t>‹N°›</a:t>
             </a:fld>
             <a:endParaRPr lang="fr-FR"/>
           </a:p>
@@ -5814,7 +5808,7 @@
     </p:spTree>
     <p:extLst>
       <p:ext uri="{BB962C8B-B14F-4D97-AF65-F5344CB8AC3E}">
-        <p14:creationId xmlns:p14="http://schemas.microsoft.com/office/powerpoint/2010/main" xmlns="" val="2122014391"/>
+        <p14:creationId xmlns:p14="http://schemas.microsoft.com/office/powerpoint/2010/main" val="2122014391"/>
       </p:ext>
     </p:extLst>
   </p:cSld>
@@ -6259,7 +6253,7 @@
           <p:cNvPr id="2" name="Titre 1">
             <a:extLst>
               <a:ext uri="{FF2B5EF4-FFF2-40B4-BE49-F238E27FC236}">
-                <a16:creationId xmlns:a16="http://schemas.microsoft.com/office/drawing/2014/main" xmlns="" id="{3D894223-47F8-483F-851A-7E3A556F81DB}"/>
+                <a16:creationId xmlns:a16="http://schemas.microsoft.com/office/drawing/2014/main" id="{3D894223-47F8-483F-851A-7E3A556F81DB}"/>
               </a:ext>
             </a:extLst>
           </p:cNvPr>
@@ -6270,14 +6264,19 @@
             <p:ph type="ctrTitle"/>
           </p:nvPr>
         </p:nvSpPr>
-        <p:spPr/>
+        <p:spPr>
+          <a:xfrm>
+            <a:off x="1507066" y="2049628"/>
+            <a:ext cx="7766936" cy="901894"/>
+          </a:xfrm>
+        </p:spPr>
         <p:txBody>
           <a:bodyPr/>
           <a:lstStyle/>
           <a:p>
             <a:r>
               <a:rPr lang="fr-FR" dirty="0"/>
-              <a:t>Soutenance Blanche de PIE</a:t>
+              <a:t>Soutenance de PIE</a:t>
             </a:r>
           </a:p>
         </p:txBody>
@@ -6287,7 +6286,7 @@
           <p:cNvPr id="3" name="Sous-titre 2">
             <a:extLst>
               <a:ext uri="{FF2B5EF4-FFF2-40B4-BE49-F238E27FC236}">
-                <a16:creationId xmlns:a16="http://schemas.microsoft.com/office/drawing/2014/main" xmlns="" id="{EBA00830-AA12-447D-AEB8-C4E3C5AE3647}"/>
+                <a16:creationId xmlns:a16="http://schemas.microsoft.com/office/drawing/2014/main" id="{EBA00830-AA12-447D-AEB8-C4E3C5AE3647}"/>
               </a:ext>
             </a:extLst>
           </p:cNvPr>
@@ -6298,15 +6297,25 @@
             <p:ph type="subTitle" idx="1"/>
           </p:nvPr>
         </p:nvSpPr>
-        <p:spPr/>
+        <p:spPr>
+          <a:xfrm>
+            <a:off x="1507066" y="3171826"/>
+            <a:ext cx="7766936" cy="1096899"/>
+          </a:xfrm>
+        </p:spPr>
         <p:txBody>
           <a:bodyPr/>
           <a:lstStyle/>
           <a:p>
             <a:r>
               <a:rPr lang="fr-FR" dirty="0"/>
-              <a:t>Implémentation de nouveaux schémas numériques</a:t>
-            </a:r>
+              <a:t>Intégration </a:t>
+            </a:r>
+            <a:r>
+              <a:rPr lang="fr-FR"/>
+              <a:t>numérique temporelle</a:t>
+            </a:r>
+            <a:endParaRPr lang="fr-FR" dirty="0"/>
           </a:p>
         </p:txBody>
       </p:sp>
@@ -6315,7 +6324,7 @@
           <p:cNvPr id="5" name="Espace réservé du numéro de diapositive 4">
             <a:extLst>
               <a:ext uri="{FF2B5EF4-FFF2-40B4-BE49-F238E27FC236}">
-                <a16:creationId xmlns:a16="http://schemas.microsoft.com/office/drawing/2014/main" xmlns="" id="{59EDFDBB-9CE5-4EB2-93E2-08AFF19C6FE0}"/>
+                <a16:creationId xmlns:a16="http://schemas.microsoft.com/office/drawing/2014/main" id="{59EDFDBB-9CE5-4EB2-93E2-08AFF19C6FE0}"/>
               </a:ext>
             </a:extLst>
           </p:cNvPr>
@@ -6340,10 +6349,193 @@
           </a:p>
         </p:txBody>
       </p:sp>
+      <p:sp>
+        <p:nvSpPr>
+          <p:cNvPr id="6" name="ZoneTexte 5">
+            <a:extLst>
+              <a:ext uri="{FF2B5EF4-FFF2-40B4-BE49-F238E27FC236}">
+                <a16:creationId xmlns:a16="http://schemas.microsoft.com/office/drawing/2014/main" id="{DADE4DEE-F829-471F-8977-4709C98EE80C}"/>
+              </a:ext>
+            </a:extLst>
+          </p:cNvPr>
+          <p:cNvSpPr txBox="1"/>
+          <p:nvPr/>
+        </p:nvSpPr>
+        <p:spPr>
+          <a:xfrm>
+            <a:off x="1091953" y="3923934"/>
+            <a:ext cx="2689934" cy="1477328"/>
+          </a:xfrm>
+          <a:prstGeom prst="rect">
+            <a:avLst/>
+          </a:prstGeom>
+          <a:noFill/>
+        </p:spPr>
+        <p:txBody>
+          <a:bodyPr wrap="square" rtlCol="0">
+            <a:spAutoFit/>
+          </a:bodyPr>
+          <a:lstStyle/>
+          <a:p>
+            <a:r>
+              <a:rPr lang="fr-FR" dirty="0" err="1"/>
+              <a:t>Fourtout</a:t>
+            </a:r>
+            <a:r>
+              <a:rPr lang="fr-FR" dirty="0"/>
+              <a:t> Jean-Baptiste</a:t>
+            </a:r>
+          </a:p>
+          <a:p>
+            <a:r>
+              <a:rPr lang="fr-FR" dirty="0"/>
+              <a:t>Reboul Louis</a:t>
+            </a:r>
+          </a:p>
+          <a:p>
+            <a:r>
+              <a:rPr lang="fr-FR" dirty="0"/>
+              <a:t>Seize Pierre</a:t>
+            </a:r>
+          </a:p>
+          <a:p>
+            <a:r>
+              <a:rPr lang="fr-FR" dirty="0" err="1"/>
+              <a:t>Barassa</a:t>
+            </a:r>
+            <a:r>
+              <a:rPr lang="fr-FR" dirty="0"/>
+              <a:t>-Ramos Sara</a:t>
+            </a:r>
+          </a:p>
+          <a:p>
+            <a:r>
+              <a:rPr lang="fr-FR" dirty="0"/>
+              <a:t>Maes Théo</a:t>
+            </a:r>
+          </a:p>
+        </p:txBody>
+      </p:sp>
+      <p:sp>
+        <p:nvSpPr>
+          <p:cNvPr id="7" name="ZoneTexte 6">
+            <a:extLst>
+              <a:ext uri="{FF2B5EF4-FFF2-40B4-BE49-F238E27FC236}">
+                <a16:creationId xmlns:a16="http://schemas.microsoft.com/office/drawing/2014/main" id="{A386FC23-1D75-4167-9115-93889C193D4A}"/>
+              </a:ext>
+            </a:extLst>
+          </p:cNvPr>
+          <p:cNvSpPr txBox="1"/>
+          <p:nvPr/>
+        </p:nvSpPr>
+        <p:spPr>
+          <a:xfrm>
+            <a:off x="6573914" y="4754931"/>
+            <a:ext cx="2117324" cy="646331"/>
+          </a:xfrm>
+          <a:prstGeom prst="rect">
+            <a:avLst/>
+          </a:prstGeom>
+          <a:noFill/>
+        </p:spPr>
+        <p:txBody>
+          <a:bodyPr wrap="square" rtlCol="0">
+            <a:spAutoFit/>
+          </a:bodyPr>
+          <a:lstStyle/>
+          <a:p>
+            <a:r>
+              <a:rPr lang="fr-FR" dirty="0"/>
+              <a:t>Vasseur Xavier</a:t>
+            </a:r>
+          </a:p>
+          <a:p>
+            <a:r>
+              <a:rPr lang="fr-FR" dirty="0" err="1"/>
+              <a:t>Puigt</a:t>
+            </a:r>
+            <a:r>
+              <a:rPr lang="fr-FR" dirty="0"/>
+              <a:t> Guillaume</a:t>
+            </a:r>
+          </a:p>
+        </p:txBody>
+      </p:sp>
+      <p:pic>
+        <p:nvPicPr>
+          <p:cNvPr id="9" name="Image 8">
+            <a:extLst>
+              <a:ext uri="{FF2B5EF4-FFF2-40B4-BE49-F238E27FC236}">
+                <a16:creationId xmlns:a16="http://schemas.microsoft.com/office/drawing/2014/main" id="{2933015A-A5B4-4C92-AC26-D1627C3C49A7}"/>
+              </a:ext>
+            </a:extLst>
+          </p:cNvPr>
+          <p:cNvPicPr>
+            <a:picLocks noChangeAspect="1"/>
+          </p:cNvPicPr>
+          <p:nvPr/>
+        </p:nvPicPr>
+        <p:blipFill>
+          <a:blip r:embed="rId2">
+            <a:extLst>
+              <a:ext uri="{28A0092B-C50C-407E-A947-70E740481C1C}">
+                <a14:useLocalDpi xmlns:a14="http://schemas.microsoft.com/office/drawing/2010/main" val="0"/>
+              </a:ext>
+            </a:extLst>
+          </a:blip>
+          <a:stretch>
+            <a:fillRect/>
+          </a:stretch>
+        </p:blipFill>
+        <p:spPr>
+          <a:xfrm>
+            <a:off x="6573914" y="161186"/>
+            <a:ext cx="2327945" cy="1413395"/>
+          </a:xfrm>
+          <a:prstGeom prst="rect">
+            <a:avLst/>
+          </a:prstGeom>
+        </p:spPr>
+      </p:pic>
+      <p:pic>
+        <p:nvPicPr>
+          <p:cNvPr id="11" name="Image 10">
+            <a:extLst>
+              <a:ext uri="{FF2B5EF4-FFF2-40B4-BE49-F238E27FC236}">
+                <a16:creationId xmlns:a16="http://schemas.microsoft.com/office/drawing/2014/main" id="{DE577CD2-55D3-40FE-8E6A-C4C8AB30CEF2}"/>
+              </a:ext>
+            </a:extLst>
+          </p:cNvPr>
+          <p:cNvPicPr>
+            <a:picLocks noChangeAspect="1"/>
+          </p:cNvPicPr>
+          <p:nvPr/>
+        </p:nvPicPr>
+        <p:blipFill rotWithShape="1">
+          <a:blip r:embed="rId3">
+            <a:extLst>
+              <a:ext uri="{28A0092B-C50C-407E-A947-70E740481C1C}">
+                <a14:useLocalDpi xmlns:a14="http://schemas.microsoft.com/office/drawing/2010/main" val="0"/>
+              </a:ext>
+            </a:extLst>
+          </a:blip>
+          <a:srcRect l="7375" t="34773" r="7437" b="36950"/>
+          <a:stretch/>
+        </p:blipFill>
+        <p:spPr>
+          <a:xfrm>
+            <a:off x="1606858" y="477681"/>
+            <a:ext cx="3524436" cy="1096900"/>
+          </a:xfrm>
+          <a:prstGeom prst="rect">
+            <a:avLst/>
+          </a:prstGeom>
+        </p:spPr>
+      </p:pic>
     </p:spTree>
     <p:extLst>
       <p:ext uri="{BB962C8B-B14F-4D97-AF65-F5344CB8AC3E}">
-        <p14:creationId xmlns:p14="http://schemas.microsoft.com/office/powerpoint/2010/main" xmlns="" val="453207635"/>
+        <p14:creationId xmlns:p14="http://schemas.microsoft.com/office/powerpoint/2010/main" val="453207635"/>
       </p:ext>
     </p:extLst>
   </p:cSld>
@@ -6375,7 +6567,7 @@
           <p:cNvPr id="2" name="Titre 1">
             <a:extLst>
               <a:ext uri="{FF2B5EF4-FFF2-40B4-BE49-F238E27FC236}">
-                <a16:creationId xmlns:a16="http://schemas.microsoft.com/office/drawing/2014/main" xmlns="" id="{8DB6E984-1000-41D0-9BAD-8224D1D5B727}"/>
+                <a16:creationId xmlns:a16="http://schemas.microsoft.com/office/drawing/2014/main" id="{8DB6E984-1000-41D0-9BAD-8224D1D5B727}"/>
               </a:ext>
             </a:extLst>
           </p:cNvPr>
@@ -6416,7 +6608,7 @@
           <p:cNvPr id="4" name="image3.png">
             <a:extLst>
               <a:ext uri="{FF2B5EF4-FFF2-40B4-BE49-F238E27FC236}">
-                <a16:creationId xmlns:a16="http://schemas.microsoft.com/office/drawing/2014/main" xmlns="" id="{AF5DA36B-4B61-44E0-B6CA-383B78BFE83A}"/>
+                <a16:creationId xmlns:a16="http://schemas.microsoft.com/office/drawing/2014/main" id="{AF5DA36B-4B61-44E0-B6CA-383B78BFE83A}"/>
               </a:ext>
             </a:extLst>
           </p:cNvPr>
@@ -6450,7 +6642,7 @@
           <p:cNvPr id="5" name="Espace réservé du numéro de diapositive 4">
             <a:extLst>
               <a:ext uri="{FF2B5EF4-FFF2-40B4-BE49-F238E27FC236}">
-                <a16:creationId xmlns:a16="http://schemas.microsoft.com/office/drawing/2014/main" xmlns="" id="{CC0AF4EB-5793-4C57-B071-C30C5F47A36F}"/>
+                <a16:creationId xmlns:a16="http://schemas.microsoft.com/office/drawing/2014/main" id="{CC0AF4EB-5793-4C57-B071-C30C5F47A36F}"/>
               </a:ext>
             </a:extLst>
           </p:cNvPr>
@@ -6478,7 +6670,7 @@
     </p:spTree>
     <p:extLst>
       <p:ext uri="{BB962C8B-B14F-4D97-AF65-F5344CB8AC3E}">
-        <p14:creationId xmlns:p14="http://schemas.microsoft.com/office/powerpoint/2010/main" xmlns="" val="1880120633"/>
+        <p14:creationId xmlns:p14="http://schemas.microsoft.com/office/powerpoint/2010/main" val="1880120633"/>
       </p:ext>
     </p:extLst>
   </p:cSld>
@@ -6510,7 +6702,7 @@
           <p:cNvPr id="2" name="Titre 1">
             <a:extLst>
               <a:ext uri="{FF2B5EF4-FFF2-40B4-BE49-F238E27FC236}">
-                <a16:creationId xmlns:a16="http://schemas.microsoft.com/office/drawing/2014/main" xmlns="" id="{DA2842C6-85BF-428F-BA64-3F1746AE7B06}"/>
+                <a16:creationId xmlns:a16="http://schemas.microsoft.com/office/drawing/2014/main" id="{DA2842C6-85BF-428F-BA64-3F1746AE7B06}"/>
               </a:ext>
             </a:extLst>
           </p:cNvPr>
@@ -6535,7 +6727,7 @@
           <p:cNvPr id="3" name="Espace réservé du contenu 2">
             <a:extLst>
               <a:ext uri="{FF2B5EF4-FFF2-40B4-BE49-F238E27FC236}">
-                <a16:creationId xmlns:a16="http://schemas.microsoft.com/office/drawing/2014/main" xmlns="" id="{D8F8BA25-1C85-430F-81BD-3862B01F3253}"/>
+                <a16:creationId xmlns:a16="http://schemas.microsoft.com/office/drawing/2014/main" id="{D8F8BA25-1C85-430F-81BD-3862B01F3253}"/>
               </a:ext>
             </a:extLst>
           </p:cNvPr>
@@ -6577,7 +6769,7 @@
           <p:cNvPr id="5" name="image3.png">
             <a:extLst>
               <a:ext uri="{FF2B5EF4-FFF2-40B4-BE49-F238E27FC236}">
-                <a16:creationId xmlns:a16="http://schemas.microsoft.com/office/drawing/2014/main" xmlns="" id="{E390200B-D712-4A8C-A169-7FE01C42F22E}"/>
+                <a16:creationId xmlns:a16="http://schemas.microsoft.com/office/drawing/2014/main" id="{E390200B-D712-4A8C-A169-7FE01C42F22E}"/>
               </a:ext>
             </a:extLst>
           </p:cNvPr>
@@ -6609,7 +6801,7 @@
           <p:cNvPr id="7" name="Espace réservé du numéro de diapositive 6">
             <a:extLst>
               <a:ext uri="{FF2B5EF4-FFF2-40B4-BE49-F238E27FC236}">
-                <a16:creationId xmlns:a16="http://schemas.microsoft.com/office/drawing/2014/main" xmlns="" id="{73B5E105-71E2-4565-8ADB-9C935C94BB7E}"/>
+                <a16:creationId xmlns:a16="http://schemas.microsoft.com/office/drawing/2014/main" id="{73B5E105-71E2-4565-8ADB-9C935C94BB7E}"/>
               </a:ext>
             </a:extLst>
           </p:cNvPr>
@@ -6637,7 +6829,7 @@
     </p:spTree>
     <p:extLst>
       <p:ext uri="{BB962C8B-B14F-4D97-AF65-F5344CB8AC3E}">
-        <p14:creationId xmlns:p14="http://schemas.microsoft.com/office/powerpoint/2010/main" xmlns="" val="1114326998"/>
+        <p14:creationId xmlns:p14="http://schemas.microsoft.com/office/powerpoint/2010/main" val="1114326998"/>
       </p:ext>
     </p:extLst>
   </p:cSld>
@@ -6669,7 +6861,7 @@
           <p:cNvPr id="2" name="Titre 1">
             <a:extLst>
               <a:ext uri="{FF2B5EF4-FFF2-40B4-BE49-F238E27FC236}">
-                <a16:creationId xmlns:a16="http://schemas.microsoft.com/office/drawing/2014/main" xmlns="" id="{8DB6E984-1000-41D0-9BAD-8224D1D5B727}"/>
+                <a16:creationId xmlns:a16="http://schemas.microsoft.com/office/drawing/2014/main" id="{8DB6E984-1000-41D0-9BAD-8224D1D5B727}"/>
               </a:ext>
             </a:extLst>
           </p:cNvPr>
@@ -6710,7 +6902,7 @@
           <p:cNvPr id="6" name="Espace réservé du contenu 7">
             <a:extLst>
               <a:ext uri="{FF2B5EF4-FFF2-40B4-BE49-F238E27FC236}">
-                <a16:creationId xmlns:a16="http://schemas.microsoft.com/office/drawing/2014/main" xmlns="" id="{30805947-EB13-4CE1-AA67-545007F33662}"/>
+                <a16:creationId xmlns:a16="http://schemas.microsoft.com/office/drawing/2014/main" id="{30805947-EB13-4CE1-AA67-545007F33662}"/>
               </a:ext>
             </a:extLst>
           </p:cNvPr>
@@ -6725,7 +6917,7 @@
           <a:blip r:embed="rId2">
             <a:extLst>
               <a:ext uri="{28A0092B-C50C-407E-A947-70E740481C1C}">
-                <a14:useLocalDpi xmlns:a14="http://schemas.microsoft.com/office/drawing/2010/main" xmlns="" val="0"/>
+                <a14:useLocalDpi xmlns:a14="http://schemas.microsoft.com/office/drawing/2010/main" val="0"/>
               </a:ext>
             </a:extLst>
           </a:blip>
@@ -6745,7 +6937,7 @@
           <p:cNvPr id="4" name="Espace réservé du numéro de diapositive 3">
             <a:extLst>
               <a:ext uri="{FF2B5EF4-FFF2-40B4-BE49-F238E27FC236}">
-                <a16:creationId xmlns:a16="http://schemas.microsoft.com/office/drawing/2014/main" xmlns="" id="{6FA83639-8372-4E05-9712-D39DF24D8EBF}"/>
+                <a16:creationId xmlns:a16="http://schemas.microsoft.com/office/drawing/2014/main" id="{6FA83639-8372-4E05-9712-D39DF24D8EBF}"/>
               </a:ext>
             </a:extLst>
           </p:cNvPr>
@@ -6773,7 +6965,7 @@
     </p:spTree>
     <p:extLst>
       <p:ext uri="{BB962C8B-B14F-4D97-AF65-F5344CB8AC3E}">
-        <p14:creationId xmlns:p14="http://schemas.microsoft.com/office/powerpoint/2010/main" xmlns="" val="849679488"/>
+        <p14:creationId xmlns:p14="http://schemas.microsoft.com/office/powerpoint/2010/main" val="849679488"/>
       </p:ext>
     </p:extLst>
   </p:cSld>
@@ -6805,7 +6997,7 @@
           <p:cNvPr id="2" name="Titre 1">
             <a:extLst>
               <a:ext uri="{FF2B5EF4-FFF2-40B4-BE49-F238E27FC236}">
-                <a16:creationId xmlns:a16="http://schemas.microsoft.com/office/drawing/2014/main" xmlns="" id="{BA08D9E1-CEC9-4B88-AE35-3ECF4E31C848}"/>
+                <a16:creationId xmlns:a16="http://schemas.microsoft.com/office/drawing/2014/main" id="{BA08D9E1-CEC9-4B88-AE35-3ECF4E31C848}"/>
               </a:ext>
             </a:extLst>
           </p:cNvPr>
@@ -6842,7 +7034,7 @@
           <p:cNvPr id="3" name="Espace réservé du contenu 2">
             <a:extLst>
               <a:ext uri="{FF2B5EF4-FFF2-40B4-BE49-F238E27FC236}">
-                <a16:creationId xmlns:a16="http://schemas.microsoft.com/office/drawing/2014/main" xmlns="" id="{A9A29769-64FE-41E1-8464-629C5513BB6F}"/>
+                <a16:creationId xmlns:a16="http://schemas.microsoft.com/office/drawing/2014/main" id="{A9A29769-64FE-41E1-8464-629C5513BB6F}"/>
               </a:ext>
             </a:extLst>
           </p:cNvPr>
@@ -6910,7 +7102,7 @@
           <p:cNvPr id="5" name="Espace réservé du numéro de diapositive 4">
             <a:extLst>
               <a:ext uri="{FF2B5EF4-FFF2-40B4-BE49-F238E27FC236}">
-                <a16:creationId xmlns:a16="http://schemas.microsoft.com/office/drawing/2014/main" xmlns="" id="{606E6FB1-EE2B-4829-8DA7-FB30143A7A12}"/>
+                <a16:creationId xmlns:a16="http://schemas.microsoft.com/office/drawing/2014/main" id="{606E6FB1-EE2B-4829-8DA7-FB30143A7A12}"/>
               </a:ext>
             </a:extLst>
           </p:cNvPr>
@@ -6938,7 +7130,7 @@
     </p:spTree>
     <p:extLst>
       <p:ext uri="{BB962C8B-B14F-4D97-AF65-F5344CB8AC3E}">
-        <p14:creationId xmlns:p14="http://schemas.microsoft.com/office/powerpoint/2010/main" xmlns="" val="3356429125"/>
+        <p14:creationId xmlns:p14="http://schemas.microsoft.com/office/powerpoint/2010/main" val="3356429125"/>
       </p:ext>
     </p:extLst>
   </p:cSld>
@@ -6970,7 +7162,7 @@
           <p:cNvPr id="2" name="Titre 1">
             <a:extLst>
               <a:ext uri="{FF2B5EF4-FFF2-40B4-BE49-F238E27FC236}">
-                <a16:creationId xmlns:a16="http://schemas.microsoft.com/office/drawing/2014/main" xmlns="" id="{EBA0D8F0-6DB9-4391-BE2E-594E0C99CB60}"/>
+                <a16:creationId xmlns:a16="http://schemas.microsoft.com/office/drawing/2014/main" id="{EBA0D8F0-6DB9-4391-BE2E-594E0C99CB60}"/>
               </a:ext>
             </a:extLst>
           </p:cNvPr>
@@ -6998,7 +7190,7 @@
           <p:cNvPr id="3" name="Espace réservé du contenu 2">
             <a:extLst>
               <a:ext uri="{FF2B5EF4-FFF2-40B4-BE49-F238E27FC236}">
-                <a16:creationId xmlns:a16="http://schemas.microsoft.com/office/drawing/2014/main" xmlns="" id="{0580CE79-11C7-4557-A919-4162E26770A3}"/>
+                <a16:creationId xmlns:a16="http://schemas.microsoft.com/office/drawing/2014/main" id="{0580CE79-11C7-4557-A919-4162E26770A3}"/>
               </a:ext>
             </a:extLst>
           </p:cNvPr>
@@ -7150,7 +7342,7 @@
           <p:cNvPr id="4" name="Flèche : droite 3">
             <a:extLst>
               <a:ext uri="{FF2B5EF4-FFF2-40B4-BE49-F238E27FC236}">
-                <a16:creationId xmlns:a16="http://schemas.microsoft.com/office/drawing/2014/main" xmlns="" id="{6B0B5884-6582-4CAD-AEFC-7E4E82508A8A}"/>
+                <a16:creationId xmlns:a16="http://schemas.microsoft.com/office/drawing/2014/main" id="{6B0B5884-6582-4CAD-AEFC-7E4E82508A8A}"/>
               </a:ext>
             </a:extLst>
           </p:cNvPr>
@@ -7196,7 +7388,7 @@
           <p:cNvPr id="6" name="Espace réservé du numéro de diapositive 5">
             <a:extLst>
               <a:ext uri="{FF2B5EF4-FFF2-40B4-BE49-F238E27FC236}">
-                <a16:creationId xmlns:a16="http://schemas.microsoft.com/office/drawing/2014/main" xmlns="" id="{ECC2BB3B-6CC6-4471-BB84-A24DAA84C3A4}"/>
+                <a16:creationId xmlns:a16="http://schemas.microsoft.com/office/drawing/2014/main" id="{ECC2BB3B-6CC6-4471-BB84-A24DAA84C3A4}"/>
               </a:ext>
             </a:extLst>
           </p:cNvPr>
@@ -7224,7 +7416,7 @@
     </p:spTree>
     <p:extLst>
       <p:ext uri="{BB962C8B-B14F-4D97-AF65-F5344CB8AC3E}">
-        <p14:creationId xmlns:p14="http://schemas.microsoft.com/office/powerpoint/2010/main" xmlns="" val="659610021"/>
+        <p14:creationId xmlns:p14="http://schemas.microsoft.com/office/powerpoint/2010/main" val="659610021"/>
       </p:ext>
     </p:extLst>
   </p:cSld>
@@ -7256,7 +7448,7 @@
           <p:cNvPr id="2" name="Titre 1">
             <a:extLst>
               <a:ext uri="{FF2B5EF4-FFF2-40B4-BE49-F238E27FC236}">
-                <a16:creationId xmlns:a16="http://schemas.microsoft.com/office/drawing/2014/main" xmlns="" id="{D37F7EC2-0586-4160-9928-A4EF8825E06A}"/>
+                <a16:creationId xmlns:a16="http://schemas.microsoft.com/office/drawing/2014/main" id="{D37F7EC2-0586-4160-9928-A4EF8825E06A}"/>
               </a:ext>
             </a:extLst>
           </p:cNvPr>
@@ -7284,7 +7476,7 @@
           <p:cNvPr id="3" name="Espace réservé du texte 2">
             <a:extLst>
               <a:ext uri="{FF2B5EF4-FFF2-40B4-BE49-F238E27FC236}">
-                <a16:creationId xmlns:a16="http://schemas.microsoft.com/office/drawing/2014/main" xmlns="" id="{292B8FA9-1870-407A-90FB-C7E257C081B9}"/>
+                <a16:creationId xmlns:a16="http://schemas.microsoft.com/office/drawing/2014/main" id="{292B8FA9-1870-407A-90FB-C7E257C081B9}"/>
               </a:ext>
             </a:extLst>
           </p:cNvPr>
@@ -7312,7 +7504,7 @@
           <p:cNvPr id="4" name="Espace réservé du contenu 3">
             <a:extLst>
               <a:ext uri="{FF2B5EF4-FFF2-40B4-BE49-F238E27FC236}">
-                <a16:creationId xmlns:a16="http://schemas.microsoft.com/office/drawing/2014/main" xmlns="" id="{B7EE3265-4692-4A3D-80F0-270100CDF995}"/>
+                <a16:creationId xmlns:a16="http://schemas.microsoft.com/office/drawing/2014/main" id="{B7EE3265-4692-4A3D-80F0-270100CDF995}"/>
               </a:ext>
             </a:extLst>
           </p:cNvPr>
@@ -7378,7 +7570,7 @@
           <p:cNvPr id="5" name="Espace réservé du texte 4">
             <a:extLst>
               <a:ext uri="{FF2B5EF4-FFF2-40B4-BE49-F238E27FC236}">
-                <a16:creationId xmlns:a16="http://schemas.microsoft.com/office/drawing/2014/main" xmlns="" id="{135FB07D-4021-4680-A6A5-0A6F94CB2C46}"/>
+                <a16:creationId xmlns:a16="http://schemas.microsoft.com/office/drawing/2014/main" id="{135FB07D-4021-4680-A6A5-0A6F94CB2C46}"/>
               </a:ext>
             </a:extLst>
           </p:cNvPr>
@@ -7411,7 +7603,7 @@
           <p:cNvPr id="6" name="Espace réservé du contenu 5">
             <a:extLst>
               <a:ext uri="{FF2B5EF4-FFF2-40B4-BE49-F238E27FC236}">
-                <a16:creationId xmlns:a16="http://schemas.microsoft.com/office/drawing/2014/main" xmlns="" id="{451E412D-6B17-4628-91FC-F8E869BA2B46}"/>
+                <a16:creationId xmlns:a16="http://schemas.microsoft.com/office/drawing/2014/main" id="{451E412D-6B17-4628-91FC-F8E869BA2B46}"/>
               </a:ext>
             </a:extLst>
           </p:cNvPr>
@@ -7474,7 +7666,7 @@
           <p:cNvPr id="8" name="Espace réservé du numéro de diapositive 7">
             <a:extLst>
               <a:ext uri="{FF2B5EF4-FFF2-40B4-BE49-F238E27FC236}">
-                <a16:creationId xmlns:a16="http://schemas.microsoft.com/office/drawing/2014/main" xmlns="" id="{F8ED3CB3-2C93-4EAE-8F9A-7629B5201528}"/>
+                <a16:creationId xmlns:a16="http://schemas.microsoft.com/office/drawing/2014/main" id="{F8ED3CB3-2C93-4EAE-8F9A-7629B5201528}"/>
               </a:ext>
             </a:extLst>
           </p:cNvPr>
@@ -7502,7 +7694,7 @@
     </p:spTree>
     <p:extLst>
       <p:ext uri="{BB962C8B-B14F-4D97-AF65-F5344CB8AC3E}">
-        <p14:creationId xmlns:p14="http://schemas.microsoft.com/office/powerpoint/2010/main" xmlns="" val="2763711249"/>
+        <p14:creationId xmlns:p14="http://schemas.microsoft.com/office/powerpoint/2010/main" val="2763711249"/>
       </p:ext>
     </p:extLst>
   </p:cSld>
@@ -7534,7 +7726,7 @@
           <p:cNvPr id="2" name="Titre 1">
             <a:extLst>
               <a:ext uri="{FF2B5EF4-FFF2-40B4-BE49-F238E27FC236}">
-                <a16:creationId xmlns:a16="http://schemas.microsoft.com/office/drawing/2014/main" xmlns="" id="{C58ED35E-B5E2-42FE-91D3-D2A5FA10D1C6}"/>
+                <a16:creationId xmlns:a16="http://schemas.microsoft.com/office/drawing/2014/main" id="{C58ED35E-B5E2-42FE-91D3-D2A5FA10D1C6}"/>
               </a:ext>
             </a:extLst>
           </p:cNvPr>
@@ -7562,7 +7754,7 @@
           <p:cNvPr id="7" name="Image 6">
             <a:extLst>
               <a:ext uri="{FF2B5EF4-FFF2-40B4-BE49-F238E27FC236}">
-                <a16:creationId xmlns:a16="http://schemas.microsoft.com/office/drawing/2014/main" xmlns="" id="{2660A3EF-5FB2-4CB1-9E42-3217F955C33C}"/>
+                <a16:creationId xmlns:a16="http://schemas.microsoft.com/office/drawing/2014/main" id="{2660A3EF-5FB2-4CB1-9E42-3217F955C33C}"/>
               </a:ext>
             </a:extLst>
           </p:cNvPr>
@@ -7575,7 +7767,7 @@
           <a:blip r:embed="rId2">
             <a:extLst>
               <a:ext uri="{28A0092B-C50C-407E-A947-70E740481C1C}">
-                <a14:useLocalDpi xmlns:a14="http://schemas.microsoft.com/office/drawing/2010/main" xmlns="" val="0"/>
+                <a14:useLocalDpi xmlns:a14="http://schemas.microsoft.com/office/drawing/2010/main" val="0"/>
               </a:ext>
             </a:extLst>
           </a:blip>
@@ -7598,7 +7790,7 @@
           <p:cNvPr id="8" name="Espace réservé du contenu 7">
             <a:extLst>
               <a:ext uri="{FF2B5EF4-FFF2-40B4-BE49-F238E27FC236}">
-                <a16:creationId xmlns:a16="http://schemas.microsoft.com/office/drawing/2014/main" xmlns="" id="{C81D1FA0-349C-4443-BC5E-69EDD607808C}"/>
+                <a16:creationId xmlns:a16="http://schemas.microsoft.com/office/drawing/2014/main" id="{C81D1FA0-349C-4443-BC5E-69EDD607808C}"/>
               </a:ext>
             </a:extLst>
           </p:cNvPr>
@@ -7613,7 +7805,7 @@
           <a:blip r:embed="rId3">
             <a:extLst>
               <a:ext uri="{28A0092B-C50C-407E-A947-70E740481C1C}">
-                <a14:useLocalDpi xmlns:a14="http://schemas.microsoft.com/office/drawing/2010/main" xmlns="" val="0"/>
+                <a14:useLocalDpi xmlns:a14="http://schemas.microsoft.com/office/drawing/2010/main" val="0"/>
               </a:ext>
             </a:extLst>
           </a:blip>
@@ -7633,7 +7825,7 @@
           <p:cNvPr id="4" name="Espace réservé du numéro de diapositive 3">
             <a:extLst>
               <a:ext uri="{FF2B5EF4-FFF2-40B4-BE49-F238E27FC236}">
-                <a16:creationId xmlns:a16="http://schemas.microsoft.com/office/drawing/2014/main" xmlns="" id="{CEF00673-4004-4E0E-87DB-D70CF191A438}"/>
+                <a16:creationId xmlns:a16="http://schemas.microsoft.com/office/drawing/2014/main" id="{CEF00673-4004-4E0E-87DB-D70CF191A438}"/>
               </a:ext>
             </a:extLst>
           </p:cNvPr>
@@ -7661,7 +7853,7 @@
     </p:spTree>
     <p:extLst>
       <p:ext uri="{BB962C8B-B14F-4D97-AF65-F5344CB8AC3E}">
-        <p14:creationId xmlns:p14="http://schemas.microsoft.com/office/powerpoint/2010/main" xmlns="" val="666622740"/>
+        <p14:creationId xmlns:p14="http://schemas.microsoft.com/office/powerpoint/2010/main" val="666622740"/>
       </p:ext>
     </p:extLst>
   </p:cSld>
@@ -7795,7 +7987,7 @@
           <p:cNvPr id="2" name="Titre 1">
             <a:extLst>
               <a:ext uri="{FF2B5EF4-FFF2-40B4-BE49-F238E27FC236}">
-                <a16:creationId xmlns:a16="http://schemas.microsoft.com/office/drawing/2014/main" xmlns="" id="{C29DDC9A-9353-42C8-BE38-B481E27D43E5}"/>
+                <a16:creationId xmlns:a16="http://schemas.microsoft.com/office/drawing/2014/main" id="{C29DDC9A-9353-42C8-BE38-B481E27D43E5}"/>
               </a:ext>
             </a:extLst>
           </p:cNvPr>
@@ -7823,7 +8015,7 @@
           <p:cNvPr id="3" name="Espace réservé du contenu 2">
             <a:extLst>
               <a:ext uri="{FF2B5EF4-FFF2-40B4-BE49-F238E27FC236}">
-                <a16:creationId xmlns:a16="http://schemas.microsoft.com/office/drawing/2014/main" xmlns="" id="{A0FDF85D-AA4E-422E-B886-386CF8D1C946}"/>
+                <a16:creationId xmlns:a16="http://schemas.microsoft.com/office/drawing/2014/main" id="{A0FDF85D-AA4E-422E-B886-386CF8D1C946}"/>
               </a:ext>
             </a:extLst>
           </p:cNvPr>
@@ -7891,7 +8083,7 @@
           <p:cNvPr id="5" name="Image 4">
             <a:extLst>
               <a:ext uri="{FF2B5EF4-FFF2-40B4-BE49-F238E27FC236}">
-                <a16:creationId xmlns:a16="http://schemas.microsoft.com/office/drawing/2014/main" xmlns="" id="{5C174396-3F5C-4728-AD53-601599108461}"/>
+                <a16:creationId xmlns:a16="http://schemas.microsoft.com/office/drawing/2014/main" id="{5C174396-3F5C-4728-AD53-601599108461}"/>
               </a:ext>
             </a:extLst>
           </p:cNvPr>
@@ -7904,7 +8096,7 @@
           <a:blip r:embed="rId2">
             <a:extLst>
               <a:ext uri="{28A0092B-C50C-407E-A947-70E740481C1C}">
-                <a14:useLocalDpi xmlns:a14="http://schemas.microsoft.com/office/drawing/2010/main" xmlns="" val="0"/>
+                <a14:useLocalDpi xmlns:a14="http://schemas.microsoft.com/office/drawing/2010/main" val="0"/>
               </a:ext>
             </a:extLst>
           </a:blip>
@@ -7927,7 +8119,7 @@
           <p:cNvPr id="6" name="Image 5">
             <a:extLst>
               <a:ext uri="{FF2B5EF4-FFF2-40B4-BE49-F238E27FC236}">
-                <a16:creationId xmlns:a16="http://schemas.microsoft.com/office/drawing/2014/main" xmlns="" id="{EEE9FCD8-B323-492D-910B-EA0F46695B71}"/>
+                <a16:creationId xmlns:a16="http://schemas.microsoft.com/office/drawing/2014/main" id="{EEE9FCD8-B323-492D-910B-EA0F46695B71}"/>
               </a:ext>
             </a:extLst>
           </p:cNvPr>
@@ -7940,7 +8132,7 @@
           <a:blip r:embed="rId3">
             <a:extLst>
               <a:ext uri="{28A0092B-C50C-407E-A947-70E740481C1C}">
-                <a14:useLocalDpi xmlns:a14="http://schemas.microsoft.com/office/drawing/2010/main" xmlns="" val="0"/>
+                <a14:useLocalDpi xmlns:a14="http://schemas.microsoft.com/office/drawing/2010/main" val="0"/>
               </a:ext>
             </a:extLst>
           </a:blip>
@@ -7963,7 +8155,7 @@
           <p:cNvPr id="7" name="Espace réservé du numéro de diapositive 6">
             <a:extLst>
               <a:ext uri="{FF2B5EF4-FFF2-40B4-BE49-F238E27FC236}">
-                <a16:creationId xmlns:a16="http://schemas.microsoft.com/office/drawing/2014/main" xmlns="" id="{65F4A2E6-E711-495C-9A18-2BA5B95E1666}"/>
+                <a16:creationId xmlns:a16="http://schemas.microsoft.com/office/drawing/2014/main" id="{65F4A2E6-E711-495C-9A18-2BA5B95E1666}"/>
               </a:ext>
             </a:extLst>
           </p:cNvPr>
@@ -7991,7 +8183,7 @@
     </p:spTree>
     <p:extLst>
       <p:ext uri="{BB962C8B-B14F-4D97-AF65-F5344CB8AC3E}">
-        <p14:creationId xmlns:p14="http://schemas.microsoft.com/office/powerpoint/2010/main" xmlns="" val="728501483"/>
+        <p14:creationId xmlns:p14="http://schemas.microsoft.com/office/powerpoint/2010/main" val="728501483"/>
       </p:ext>
     </p:extLst>
   </p:cSld>
@@ -8125,7 +8317,7 @@
           <p:cNvPr id="10" name="Titre 1">
             <a:extLst>
               <a:ext uri="{FF2B5EF4-FFF2-40B4-BE49-F238E27FC236}">
-                <a16:creationId xmlns="" xmlns:a16="http://schemas.microsoft.com/office/drawing/2014/main" id="{22E14FB8-2A04-4BF7-830E-E1F70CC4D1EE}"/>
+                <a16:creationId xmlns:a16="http://schemas.microsoft.com/office/drawing/2014/main" id="{22E14FB8-2A04-4BF7-830E-E1F70CC4D1EE}"/>
               </a:ext>
             </a:extLst>
           </p:cNvPr>
@@ -8158,7 +8350,7 @@
           <p:cNvPr id="11" name="Espace réservé du contenu 2">
             <a:extLst>
               <a:ext uri="{FF2B5EF4-FFF2-40B4-BE49-F238E27FC236}">
-                <a16:creationId xmlns="" xmlns:a16="http://schemas.microsoft.com/office/drawing/2014/main" id="{63DCC6C1-B4A5-4CF6-A55E-7F89B39E94EE}"/>
+                <a16:creationId xmlns:a16="http://schemas.microsoft.com/office/drawing/2014/main" id="{63DCC6C1-B4A5-4CF6-A55E-7F89B39E94EE}"/>
               </a:ext>
             </a:extLst>
           </p:cNvPr>
@@ -8181,17 +8373,13 @@
           <a:p>
             <a:r>
               <a:rPr lang="fr-FR" dirty="0"/>
-              <a:t>Domaine de stabilité méthodes RK et </a:t>
-            </a:r>
-            <a:r>
-              <a:rPr lang="fr-FR" dirty="0" smtClean="0"/>
-              <a:t>BDF</a:t>
+              <a:t>Domaine de stabilité méthodes RK et BDF</a:t>
             </a:r>
           </a:p>
           <a:p>
             <a:pPr lvl="1"/>
             <a:r>
-              <a:rPr lang="fr-FR" dirty="0" smtClean="0"/>
+              <a:rPr lang="fr-FR" dirty="0"/>
               <a:t>A-stabilité pour des EDO </a:t>
             </a:r>
           </a:p>
@@ -8200,7 +8388,7 @@
               <a:buNone/>
             </a:pPr>
             <a:r>
-              <a:rPr lang="fr-FR" dirty="0" smtClean="0"/>
+              <a:rPr lang="fr-FR" dirty="0"/>
               <a:t>	linéaires, par exemple :</a:t>
             </a:r>
           </a:p>
@@ -8208,25 +8396,25 @@
             <a:pPr lvl="1">
               <a:buNone/>
             </a:pPr>
-            <a:endParaRPr lang="fr-FR" dirty="0" smtClean="0"/>
+            <a:endParaRPr lang="fr-FR" dirty="0"/>
           </a:p>
           <a:p>
             <a:pPr lvl="1">
               <a:buNone/>
             </a:pPr>
-            <a:endParaRPr lang="fr-FR" dirty="0" smtClean="0"/>
+            <a:endParaRPr lang="fr-FR" dirty="0"/>
           </a:p>
           <a:p>
             <a:pPr lvl="1"/>
-            <a:endParaRPr lang="fr-FR" dirty="0" smtClean="0"/>
+            <a:endParaRPr lang="fr-FR" dirty="0"/>
           </a:p>
           <a:p>
             <a:pPr lvl="1"/>
-            <a:endParaRPr lang="fr-FR" dirty="0" smtClean="0"/>
+            <a:endParaRPr lang="fr-FR" dirty="0"/>
           </a:p>
           <a:p>
             <a:pPr lvl="1"/>
-            <a:endParaRPr lang="fr-FR" dirty="0" smtClean="0"/>
+            <a:endParaRPr lang="fr-FR" dirty="0"/>
           </a:p>
         </p:txBody>
       </p:sp>
@@ -8349,7 +8537,7 @@
           <p:cNvPr id="16" name="Espace réservé du contenu 2">
             <a:extLst>
               <a:ext uri="{FF2B5EF4-FFF2-40B4-BE49-F238E27FC236}">
-                <a16:creationId xmlns="" xmlns:a16="http://schemas.microsoft.com/office/drawing/2014/main" id="{63DCC6C1-B4A5-4CF6-A55E-7F89B39E94EE}"/>
+                <a16:creationId xmlns:a16="http://schemas.microsoft.com/office/drawing/2014/main" id="{63DCC6C1-B4A5-4CF6-A55E-7F89B39E94EE}"/>
               </a:ext>
             </a:extLst>
           </p:cNvPr>
@@ -8390,7 +8578,7 @@
               <a:tabLst/>
               <a:defRPr/>
             </a:pPr>
-            <a:endParaRPr kumimoji="0" lang="fr-FR" sz="1600" b="0" i="0" u="none" strike="noStrike" kern="1200" cap="none" spc="0" normalizeH="0" baseline="0" noProof="0" dirty="0" smtClean="0">
+            <a:endParaRPr kumimoji="0" lang="fr-FR" sz="1600" b="0" i="0" u="none" strike="noStrike" kern="1200" cap="none" spc="0" normalizeH="0" baseline="0" noProof="0" dirty="0">
               <a:ln>
                 <a:noFill/>
               </a:ln>
@@ -8429,7 +8617,7 @@
               <a:defRPr/>
             </a:pPr>
             <a:r>
-              <a:rPr kumimoji="0" lang="fr-FR" sz="1600" b="0" i="0" u="none" strike="noStrike" kern="1200" cap="none" spc="0" normalizeH="0" baseline="0" noProof="0" dirty="0" smtClean="0">
+              <a:rPr kumimoji="0" lang="fr-FR" sz="1600" b="0" i="0" u="none" strike="noStrike" kern="1200" cap="none" spc="0" normalizeH="0" baseline="0" noProof="0" dirty="0">
                 <a:ln>
                   <a:noFill/>
                 </a:ln>
@@ -8470,7 +8658,7 @@
               <a:defRPr/>
             </a:pPr>
             <a:r>
-              <a:rPr kumimoji="0" lang="fr-FR" sz="1600" b="0" i="0" u="none" strike="noStrike" kern="1200" cap="none" spc="0" normalizeH="0" baseline="0" noProof="0" dirty="0" smtClean="0">
+              <a:rPr kumimoji="0" lang="fr-FR" sz="1600" b="0" i="0" u="none" strike="noStrike" kern="1200" cap="none" spc="0" normalizeH="0" baseline="0" noProof="0" dirty="0">
                 <a:ln>
                   <a:noFill/>
                 </a:ln>
@@ -8549,7 +8737,7 @@
             <p:cNvPr id="18" name="Image 6">
               <a:extLst>
                 <a:ext uri="{FF2B5EF4-FFF2-40B4-BE49-F238E27FC236}">
-                  <a16:creationId xmlns="" xmlns:a16="http://schemas.microsoft.com/office/drawing/2014/main" id="{4AB8479D-1181-4F7E-8648-B639C85E4D0F}"/>
+                  <a16:creationId xmlns:a16="http://schemas.microsoft.com/office/drawing/2014/main" id="{4AB8479D-1181-4F7E-8648-B639C85E4D0F}"/>
                 </a:ext>
               </a:extLst>
             </p:cNvPr>
@@ -8562,7 +8750,7 @@
             <a:blip r:embed="rId5">
               <a:extLst>
                 <a:ext uri="{28A0092B-C50C-407E-A947-70E740481C1C}">
-                  <a14:useLocalDpi xmlns="" xmlns:a14="http://schemas.microsoft.com/office/drawing/2010/main" val="0"/>
+                  <a14:useLocalDpi xmlns:a14="http://schemas.microsoft.com/office/drawing/2010/main" val="0"/>
                 </a:ext>
               </a:extLst>
             </a:blip>
@@ -8604,50 +8792,49 @@
             <a:p>
               <a:pPr algn="ctr"/>
               <a:r>
-                <a:rPr lang="fr-FR" sz="3200" dirty="0" smtClean="0"/>
+                <a:rPr lang="fr-FR" sz="3200" dirty="0"/>
                 <a:t>RK</a:t>
               </a:r>
             </a:p>
             <a:p>
-              <a:endParaRPr lang="fr-FR" dirty="0" smtClean="0"/>
+              <a:endParaRPr lang="fr-FR" dirty="0"/>
             </a:p>
             <a:p>
-              <a:endParaRPr lang="fr-FR" dirty="0" smtClean="0"/>
+              <a:endParaRPr lang="fr-FR" dirty="0"/>
             </a:p>
             <a:p>
-              <a:endParaRPr lang="fr-FR" dirty="0" smtClean="0"/>
+              <a:endParaRPr lang="fr-FR" dirty="0"/>
             </a:p>
             <a:p>
-              <a:endParaRPr lang="fr-FR" dirty="0" smtClean="0"/>
+              <a:endParaRPr lang="fr-FR" dirty="0"/>
             </a:p>
             <a:p>
-              <a:endParaRPr lang="fr-FR" dirty="0" smtClean="0"/>
+              <a:endParaRPr lang="fr-FR" dirty="0"/>
             </a:p>
             <a:p>
-              <a:endParaRPr lang="fr-FR" dirty="0" smtClean="0"/>
+              <a:endParaRPr lang="fr-FR" dirty="0"/>
             </a:p>
             <a:p>
-              <a:endParaRPr lang="fr-FR" dirty="0" smtClean="0"/>
+              <a:endParaRPr lang="fr-FR" dirty="0"/>
             </a:p>
             <a:p>
-              <a:endParaRPr lang="fr-FR" i="1" dirty="0" smtClean="0"/>
+              <a:endParaRPr lang="fr-FR" i="1" dirty="0"/>
             </a:p>
             <a:p>
-              <a:endParaRPr lang="fr-FR" i="1" dirty="0" smtClean="0"/>
+              <a:endParaRPr lang="fr-FR" i="1" dirty="0"/>
             </a:p>
             <a:p>
-              <a:endParaRPr lang="fr-FR" i="1" dirty="0" smtClean="0"/>
+              <a:endParaRPr lang="fr-FR" i="1" dirty="0"/>
             </a:p>
             <a:p>
-              <a:endParaRPr lang="fr-FR" i="1" dirty="0" smtClean="0"/>
+              <a:endParaRPr lang="fr-FR" i="1" dirty="0"/>
             </a:p>
             <a:p>
               <a:pPr algn="ctr"/>
               <a:r>
-                <a:rPr lang="fr-FR" i="1" dirty="0" smtClean="0"/>
+                <a:rPr lang="fr-FR" i="1" dirty="0"/>
                 <a:t>Source : ???</a:t>
               </a:r>
-              <a:endParaRPr lang="fr-FR" i="1" dirty="0"/>
             </a:p>
           </p:txBody>
         </p:sp>
@@ -8671,7 +8858,7 @@
             <p:cNvPr id="21" name="Image 4">
               <a:extLst>
                 <a:ext uri="{FF2B5EF4-FFF2-40B4-BE49-F238E27FC236}">
-                  <a16:creationId xmlns="" xmlns:a16="http://schemas.microsoft.com/office/drawing/2014/main" id="{D4F82992-7DDF-4A24-8514-DB781371A122}"/>
+                  <a16:creationId xmlns:a16="http://schemas.microsoft.com/office/drawing/2014/main" id="{D4F82992-7DDF-4A24-8514-DB781371A122}"/>
                 </a:ext>
               </a:extLst>
             </p:cNvPr>
@@ -8684,7 +8871,7 @@
             <a:blip r:embed="rId6">
               <a:extLst>
                 <a:ext uri="{28A0092B-C50C-407E-A947-70E740481C1C}">
-                  <a14:useLocalDpi xmlns="" xmlns:a14="http://schemas.microsoft.com/office/drawing/2010/main" val="0"/>
+                  <a14:useLocalDpi xmlns:a14="http://schemas.microsoft.com/office/drawing/2010/main" val="0"/>
                 </a:ext>
               </a:extLst>
             </a:blip>
@@ -8726,62 +8913,91 @@
             <a:p>
               <a:pPr algn="ctr"/>
               <a:r>
-                <a:rPr lang="fr-FR" sz="3200" dirty="0" smtClean="0"/>
+                <a:rPr lang="fr-FR" sz="3200" dirty="0"/>
                 <a:t>BDF</a:t>
               </a:r>
             </a:p>
             <a:p>
               <a:pPr algn="ctr"/>
-              <a:endParaRPr lang="fr-FR" sz="3200" dirty="0" smtClean="0"/>
+              <a:endParaRPr lang="fr-FR" sz="3200" dirty="0"/>
             </a:p>
             <a:p>
-              <a:endParaRPr lang="fr-FR" dirty="0" smtClean="0"/>
+              <a:endParaRPr lang="fr-FR" dirty="0"/>
             </a:p>
             <a:p>
-              <a:endParaRPr lang="fr-FR" dirty="0" smtClean="0"/>
+              <a:endParaRPr lang="fr-FR" dirty="0"/>
             </a:p>
             <a:p>
-              <a:endParaRPr lang="fr-FR" dirty="0" smtClean="0"/>
+              <a:endParaRPr lang="fr-FR" dirty="0"/>
             </a:p>
             <a:p>
-              <a:endParaRPr lang="fr-FR" dirty="0" smtClean="0"/>
+              <a:endParaRPr lang="fr-FR" dirty="0"/>
             </a:p>
             <a:p>
-              <a:endParaRPr lang="fr-FR" dirty="0" smtClean="0"/>
+              <a:endParaRPr lang="fr-FR" dirty="0"/>
             </a:p>
             <a:p>
-              <a:endParaRPr lang="fr-FR" dirty="0" smtClean="0"/>
+              <a:endParaRPr lang="fr-FR" dirty="0"/>
             </a:p>
             <a:p>
-              <a:endParaRPr lang="fr-FR" dirty="0" smtClean="0"/>
+              <a:endParaRPr lang="fr-FR" dirty="0"/>
             </a:p>
             <a:p>
-              <a:endParaRPr lang="fr-FR" i="1" dirty="0" smtClean="0"/>
+              <a:endParaRPr lang="fr-FR" i="1" dirty="0"/>
             </a:p>
             <a:p>
-              <a:endParaRPr lang="fr-FR" i="1" dirty="0" smtClean="0"/>
+              <a:endParaRPr lang="fr-FR" i="1" dirty="0"/>
             </a:p>
             <a:p>
-              <a:endParaRPr lang="fr-FR" i="1" dirty="0" smtClean="0"/>
+              <a:endParaRPr lang="fr-FR" i="1" dirty="0"/>
             </a:p>
             <a:p>
-              <a:endParaRPr lang="fr-FR" i="1" dirty="0" smtClean="0"/>
+              <a:endParaRPr lang="fr-FR" i="1" dirty="0"/>
             </a:p>
             <a:p>
               <a:pPr algn="ctr"/>
               <a:r>
-                <a:rPr lang="fr-FR" i="1" dirty="0" smtClean="0"/>
+                <a:rPr lang="fr-FR" i="1" dirty="0"/>
                 <a:t>Source : ???</a:t>
               </a:r>
-              <a:endParaRPr lang="fr-FR" i="1" dirty="0"/>
             </a:p>
           </p:txBody>
         </p:sp>
       </p:grpSp>
+      <p:sp>
+        <p:nvSpPr>
+          <p:cNvPr id="2" name="Espace réservé du numéro de diapositive 1">
+            <a:extLst>
+              <a:ext uri="{FF2B5EF4-FFF2-40B4-BE49-F238E27FC236}">
+                <a16:creationId xmlns:a16="http://schemas.microsoft.com/office/drawing/2014/main" id="{DDC7370F-444E-49BC-834F-AC27F9DC1BF5}"/>
+              </a:ext>
+            </a:extLst>
+          </p:cNvPr>
+          <p:cNvSpPr>
+            <a:spLocks noGrp="1"/>
+          </p:cNvSpPr>
+          <p:nvPr>
+            <p:ph type="sldNum" sz="quarter" idx="12"/>
+          </p:nvPr>
+        </p:nvSpPr>
+        <p:spPr/>
+        <p:txBody>
+          <a:bodyPr/>
+          <a:lstStyle/>
+          <a:p>
+            <a:fld id="{000982F6-AAAD-4258-B115-44D8EC280712}" type="slidenum">
+              <a:rPr lang="fr-FR" smtClean="0"/>
+              <a:pPr/>
+              <a:t>18</a:t>
+            </a:fld>
+            <a:endParaRPr lang="fr-FR"/>
+          </a:p>
+        </p:txBody>
+      </p:sp>
     </p:spTree>
     <p:extLst>
       <p:ext uri="{BB962C8B-B14F-4D97-AF65-F5344CB8AC3E}">
-        <p14:creationId xmlns:p14="http://schemas.microsoft.com/office/powerpoint/2010/main" xmlns="" val="1711717958"/>
+        <p14:creationId xmlns:p14="http://schemas.microsoft.com/office/powerpoint/2010/main" val="1711717958"/>
       </p:ext>
     </p:extLst>
   </p:cSld>
@@ -9016,7 +9232,7 @@
           <p:cNvPr id="2" name="Titre 1">
             <a:extLst>
               <a:ext uri="{FF2B5EF4-FFF2-40B4-BE49-F238E27FC236}">
-                <a16:creationId xmlns:a16="http://schemas.microsoft.com/office/drawing/2014/main" xmlns="" id="{33D48989-5D71-406C-AC15-390DA2F5F356}"/>
+                <a16:creationId xmlns:a16="http://schemas.microsoft.com/office/drawing/2014/main" id="{33D48989-5D71-406C-AC15-390DA2F5F356}"/>
               </a:ext>
             </a:extLst>
           </p:cNvPr>
@@ -9044,7 +9260,7 @@
           <p:cNvPr id="3" name="Espace réservé du contenu 2">
             <a:extLst>
               <a:ext uri="{FF2B5EF4-FFF2-40B4-BE49-F238E27FC236}">
-                <a16:creationId xmlns:a16="http://schemas.microsoft.com/office/drawing/2014/main" xmlns="" id="{11DCB18D-0E24-4E2D-A04E-C2DDFCD78A60}"/>
+                <a16:creationId xmlns:a16="http://schemas.microsoft.com/office/drawing/2014/main" id="{11DCB18D-0E24-4E2D-A04E-C2DDFCD78A60}"/>
               </a:ext>
             </a:extLst>
           </p:cNvPr>
@@ -9221,8 +9437,8 @@
           </a:p>
         </p:txBody>
       </p:sp>
-      <mc:AlternateContent xmlns:mc="http://schemas.openxmlformats.org/markup-compatibility/2006">
-        <mc:Choice xmlns:a14="http://schemas.microsoft.com/office/drawing/2010/main" xmlns="" Requires="a14">
+      <mc:AlternateContent xmlns:mc="http://schemas.openxmlformats.org/markup-compatibility/2006" xmlns:a14="http://schemas.microsoft.com/office/drawing/2010/main">
+        <mc:Choice Requires="a14">
           <p:sp>
             <p:nvSpPr>
               <p:cNvPr id="6" name="ZoneTexte 5">
@@ -9251,6 +9467,7 @@
               </a:bodyPr>
               <a:lstStyle/>
               <a:p>
+                <a:pPr/>
                 <a14:m>
                   <m:oMathPara xmlns:m="http://schemas.openxmlformats.org/officeDocument/2006/math">
                     <m:oMathParaPr>
@@ -9648,7 +9865,7 @@
             </p:txBody>
           </p:sp>
         </mc:Choice>
-        <mc:Fallback>
+        <mc:Fallback xmlns="">
           <p:sp>
             <p:nvSpPr>
               <p:cNvPr id="6" name="ZoneTexte 5">
@@ -9693,23 +9910,46 @@
           </p:sp>
         </mc:Fallback>
       </mc:AlternateContent>
+      <p:sp>
+        <p:nvSpPr>
+          <p:cNvPr id="4" name="Espace réservé du numéro de diapositive 3">
+            <a:extLst>
+              <a:ext uri="{FF2B5EF4-FFF2-40B4-BE49-F238E27FC236}">
+                <a16:creationId xmlns:a16="http://schemas.microsoft.com/office/drawing/2014/main" id="{C00598DC-BD47-40F1-AA1A-6DAACCE371E7}"/>
+              </a:ext>
+            </a:extLst>
+          </p:cNvPr>
+          <p:cNvSpPr>
+            <a:spLocks noGrp="1"/>
+          </p:cNvSpPr>
+          <p:nvPr>
+            <p:ph type="sldNum" sz="quarter" idx="12"/>
+          </p:nvPr>
+        </p:nvSpPr>
+        <p:spPr/>
+        <p:txBody>
+          <a:bodyPr/>
+          <a:lstStyle/>
+          <a:p>
+            <a:fld id="{000982F6-AAAD-4258-B115-44D8EC280712}" type="slidenum">
+              <a:rPr lang="fr-FR" smtClean="0"/>
+              <a:pPr/>
+              <a:t>19</a:t>
+            </a:fld>
+            <a:endParaRPr lang="fr-FR"/>
+          </a:p>
+        </p:txBody>
+      </p:sp>
     </p:spTree>
     <p:extLst>
       <p:ext uri="{BB962C8B-B14F-4D97-AF65-F5344CB8AC3E}">
-        <p14:creationId xmlns:p14="http://schemas.microsoft.com/office/powerpoint/2010/main" xmlns="" val="861286761"/>
+        <p14:creationId xmlns:p14="http://schemas.microsoft.com/office/powerpoint/2010/main" val="861286761"/>
       </p:ext>
     </p:extLst>
   </p:cSld>
   <p:clrMapOvr>
     <a:masterClrMapping/>
   </p:clrMapOvr>
-  <p:timing>
-    <p:tnLst>
-      <p:par>
-        <p:cTn id="1" dur="indefinite" restart="never" nodeType="tmRoot"/>
-      </p:par>
-    </p:tnLst>
-  </p:timing>
 </p:sld>
 </file>
 
@@ -9735,7 +9975,7 @@
           <p:cNvPr id="2" name="Titre 1">
             <a:extLst>
               <a:ext uri="{FF2B5EF4-FFF2-40B4-BE49-F238E27FC236}">
-                <a16:creationId xmlns:a16="http://schemas.microsoft.com/office/drawing/2014/main" xmlns="" id="{69D98500-3E71-4B6B-BECF-27066BD9682A}"/>
+                <a16:creationId xmlns:a16="http://schemas.microsoft.com/office/drawing/2014/main" id="{69D98500-3E71-4B6B-BECF-27066BD9682A}"/>
               </a:ext>
             </a:extLst>
           </p:cNvPr>
@@ -9764,7 +10004,7 @@
           <p:cNvPr id="3" name="Espace réservé du contenu 2">
             <a:extLst>
               <a:ext uri="{FF2B5EF4-FFF2-40B4-BE49-F238E27FC236}">
-                <a16:creationId xmlns:a16="http://schemas.microsoft.com/office/drawing/2014/main" xmlns="" id="{AC9AEF68-C286-46F0-A42E-2550BE479DEA}"/>
+                <a16:creationId xmlns:a16="http://schemas.microsoft.com/office/drawing/2014/main" id="{AC9AEF68-C286-46F0-A42E-2550BE479DEA}"/>
               </a:ext>
             </a:extLst>
           </p:cNvPr>
@@ -9852,7 +10092,7 @@
           <p:cNvPr id="5" name="Espace réservé du numéro de diapositive 4">
             <a:extLst>
               <a:ext uri="{FF2B5EF4-FFF2-40B4-BE49-F238E27FC236}">
-                <a16:creationId xmlns:a16="http://schemas.microsoft.com/office/drawing/2014/main" xmlns="" id="{2763C543-9DC2-458A-9059-B0871E5F6D5C}"/>
+                <a16:creationId xmlns:a16="http://schemas.microsoft.com/office/drawing/2014/main" id="{2763C543-9DC2-458A-9059-B0871E5F6D5C}"/>
               </a:ext>
             </a:extLst>
           </p:cNvPr>
@@ -9880,7 +10120,7 @@
     </p:spTree>
     <p:extLst>
       <p:ext uri="{BB962C8B-B14F-4D97-AF65-F5344CB8AC3E}">
-        <p14:creationId xmlns:p14="http://schemas.microsoft.com/office/powerpoint/2010/main" xmlns="" val="1102305186"/>
+        <p14:creationId xmlns:p14="http://schemas.microsoft.com/office/powerpoint/2010/main" val="1102305186"/>
       </p:ext>
     </p:extLst>
   </p:cSld>
@@ -9912,7 +10152,7 @@
           <p:cNvPr id="9" name="Titre 1">
             <a:extLst>
               <a:ext uri="{FF2B5EF4-FFF2-40B4-BE49-F238E27FC236}">
-                <a16:creationId xmlns="" xmlns:a16="http://schemas.microsoft.com/office/drawing/2014/main" id="{B3ACA20D-C8BA-48AC-8A1B-D5BF49DC040C}"/>
+                <a16:creationId xmlns:a16="http://schemas.microsoft.com/office/drawing/2014/main" id="{B3ACA20D-C8BA-48AC-8A1B-D5BF49DC040C}"/>
               </a:ext>
             </a:extLst>
           </p:cNvPr>
@@ -9945,7 +10185,7 @@
           <p:cNvPr id="10" name="Espace réservé du contenu 2">
             <a:extLst>
               <a:ext uri="{FF2B5EF4-FFF2-40B4-BE49-F238E27FC236}">
-                <a16:creationId xmlns="" xmlns:a16="http://schemas.microsoft.com/office/drawing/2014/main" id="{572CBCEE-73BF-41CE-94D4-7F72DCE621AB}"/>
+                <a16:creationId xmlns:a16="http://schemas.microsoft.com/office/drawing/2014/main" id="{572CBCEE-73BF-41CE-94D4-7F72DCE621AB}"/>
               </a:ext>
             </a:extLst>
           </p:cNvPr>
@@ -9968,18 +10208,13 @@
           <a:p>
             <a:r>
               <a:rPr lang="fr-FR" dirty="0"/>
-              <a:t>Calcul d’exponentielle </a:t>
-            </a:r>
-            <a:r>
-              <a:rPr lang="fr-FR" dirty="0" smtClean="0"/>
-              <a:t>d’une matrice,   , de taille </a:t>
-            </a:r>
-            <a:endParaRPr lang="fr-FR" dirty="0"/>
+              <a:t>Calcul d’exponentielle d’une matrice,   , de taille </a:t>
+            </a:r>
           </a:p>
           <a:p>
             <a:pPr lvl="1"/>
             <a:r>
-              <a:rPr lang="fr-FR" dirty="0" smtClean="0"/>
+              <a:rPr lang="fr-FR" dirty="0"/>
               <a:t>Module </a:t>
             </a:r>
             <a:r>
@@ -9988,54 +10223,50 @@
             </a:r>
             <a:r>
               <a:rPr lang="fr-FR" dirty="0"/>
+              <a:t>        </a:t>
+            </a:r>
+            <a:r>
+              <a:rPr lang="es-ES" dirty="0" err="1"/>
+              <a:t>Scaling</a:t>
+            </a:r>
+            <a:r>
+              <a:rPr lang="es-ES" dirty="0"/>
+              <a:t> and </a:t>
+            </a:r>
+            <a:r>
+              <a:rPr lang="es-ES" dirty="0" err="1"/>
+              <a:t>Squaring</a:t>
+            </a:r>
+            <a:r>
+              <a:rPr lang="es-ES" dirty="0"/>
               <a:t> </a:t>
             </a:r>
             <a:r>
-              <a:rPr lang="fr-FR" dirty="0" smtClean="0"/>
-              <a:t>       </a:t>
-            </a:r>
-            <a:r>
-              <a:rPr lang="es-ES" dirty="0" err="1" smtClean="0"/>
-              <a:t>Scaling</a:t>
-            </a:r>
-            <a:r>
-              <a:rPr lang="es-ES" dirty="0" smtClean="0"/>
-              <a:t> and </a:t>
-            </a:r>
-            <a:r>
-              <a:rPr lang="es-ES" dirty="0" err="1" smtClean="0"/>
-              <a:t>Squaring</a:t>
-            </a:r>
-            <a:r>
-              <a:rPr lang="es-ES" dirty="0" smtClean="0"/>
-              <a:t> </a:t>
-            </a:r>
-            <a:r>
-              <a:rPr lang="es-ES" dirty="0" err="1" smtClean="0"/>
+              <a:rPr lang="es-ES" dirty="0" err="1"/>
               <a:t>Algorithm</a:t>
             </a:r>
             <a:r>
-              <a:rPr lang="es-ES" dirty="0" smtClean="0"/>
+              <a:rPr lang="es-ES" dirty="0"/>
               <a:t> (</a:t>
             </a:r>
             <a:r>
-              <a:rPr lang="en-US" dirty="0" smtClean="0"/>
+              <a:rPr lang="en-US" dirty="0"/>
               <a:t>A.H. Al-</a:t>
             </a:r>
             <a:r>
-              <a:rPr lang="en-US" dirty="0" err="1" smtClean="0"/>
+              <a:rPr lang="en-US" dirty="0" err="1"/>
               <a:t>Mohy</a:t>
             </a:r>
             <a:r>
-              <a:rPr lang="en-US" dirty="0" smtClean="0"/>
+              <a:rPr lang="en-US" dirty="0"/>
               <a:t> &amp; N.J. </a:t>
             </a:r>
             <a:r>
-              <a:rPr lang="en-US" dirty="0" err="1" smtClean="0"/>
+              <a:rPr lang="en-US" dirty="0" err="1"/>
               <a:t>Higham</a:t>
             </a:r>
             <a:r>
-              <a:rPr lang="es-ES" dirty="0" smtClean="0"/>
+              <a:rPr lang="es-ES" dirty="0"/>
               <a:t>)</a:t>
             </a:r>
           </a:p>
@@ -10045,50 +10276,45 @@
               <a:buChar char="§"/>
             </a:pPr>
             <a:r>
-              <a:rPr lang="es-ES" dirty="0" err="1" smtClean="0"/>
+              <a:rPr lang="es-ES" dirty="0" err="1"/>
               <a:t>Précision</a:t>
             </a:r>
             <a:r>
-              <a:rPr lang="es-ES" dirty="0" smtClean="0"/>
+              <a:rPr lang="es-ES" dirty="0"/>
               <a:t> </a:t>
             </a:r>
             <a:r>
-              <a:rPr lang="es-ES" dirty="0" err="1" smtClean="0"/>
+              <a:rPr lang="es-ES" dirty="0" err="1"/>
               <a:t>très</a:t>
             </a:r>
             <a:r>
-              <a:rPr lang="es-ES" dirty="0" smtClean="0"/>
+              <a:rPr lang="es-ES" dirty="0"/>
               <a:t> </a:t>
             </a:r>
             <a:r>
-              <a:rPr lang="es-ES" dirty="0" err="1" smtClean="0"/>
+              <a:rPr lang="es-ES" dirty="0" err="1"/>
               <a:t>élevée</a:t>
             </a:r>
             <a:r>
-              <a:rPr lang="es-ES" dirty="0" smtClean="0"/>
+              <a:rPr lang="es-ES" dirty="0"/>
               <a:t> (</a:t>
             </a:r>
             <a:r>
-              <a:rPr lang="es-ES" dirty="0" err="1" smtClean="0"/>
+              <a:rPr lang="es-ES" dirty="0" err="1"/>
               <a:t>référence</a:t>
             </a:r>
             <a:r>
-              <a:rPr lang="es-ES" dirty="0" smtClean="0"/>
+              <a:rPr lang="es-ES" dirty="0"/>
               <a:t>)</a:t>
             </a:r>
-            <a:endParaRPr lang="fr-FR" dirty="0" smtClean="0"/>
+            <a:endParaRPr lang="fr-FR" dirty="0"/>
           </a:p>
           <a:p>
             <a:pPr lvl="1"/>
             <a:r>
-              <a:rPr lang="fr-FR" dirty="0" smtClean="0"/>
-              <a:t>Méthode </a:t>
-            </a:r>
-            <a:r>
               <a:rPr lang="fr-FR" dirty="0"/>
-              <a:t>de Krylov </a:t>
-            </a:r>
-            <a:endParaRPr lang="fr-FR" dirty="0" smtClean="0"/>
+              <a:t>Méthode de Krylov </a:t>
+            </a:r>
           </a:p>
           <a:p>
             <a:pPr lvl="2">
@@ -10096,50 +10322,49 @@
               <a:buChar char="§"/>
             </a:pPr>
             <a:r>
-              <a:rPr lang="fr-FR" dirty="0" smtClean="0"/>
+              <a:rPr lang="fr-FR" dirty="0"/>
               <a:t>Gain de temps</a:t>
             </a:r>
+          </a:p>
+          <a:p>
+            <a:r>
+              <a:rPr lang="fr-FR" dirty="0"/>
+              <a:t>Base de la méthode de Krylov</a:t>
+            </a:r>
+          </a:p>
+          <a:p>
             <a:endParaRPr lang="fr-FR" dirty="0"/>
           </a:p>
           <a:p>
-            <a:r>
-              <a:rPr lang="fr-FR" dirty="0" smtClean="0"/>
-              <a:t>Base de la méthode de Krylov</a:t>
-            </a:r>
-          </a:p>
-          <a:p>
-            <a:endParaRPr lang="fr-FR" dirty="0" smtClean="0"/>
-          </a:p>
-          <a:p>
-            <a:endParaRPr lang="fr-FR" dirty="0" smtClean="0"/>
+            <a:endParaRPr lang="fr-FR" dirty="0"/>
           </a:p>
           <a:p>
             <a:pPr lvl="1"/>
             <a:r>
-              <a:rPr lang="fr-FR" dirty="0" smtClean="0"/>
+              <a:rPr lang="fr-FR" dirty="0"/>
               <a:t>Décomposition d’</a:t>
             </a:r>
             <a:r>
-              <a:rPr lang="fr-FR" dirty="0" err="1" smtClean="0"/>
+              <a:rPr lang="fr-FR" dirty="0" err="1"/>
               <a:t>Arnoldi</a:t>
             </a:r>
             <a:r>
-              <a:rPr lang="fr-FR" dirty="0" smtClean="0"/>
+              <a:rPr lang="fr-FR" dirty="0"/>
               <a:t>         Base orthogonale et bien conditionnée</a:t>
             </a:r>
           </a:p>
           <a:p>
             <a:pPr lvl="1"/>
             <a:r>
-              <a:rPr lang="fr-FR" dirty="0" smtClean="0"/>
+              <a:rPr lang="fr-FR" dirty="0"/>
               <a:t>Exponentielle d’une matrice de </a:t>
             </a:r>
             <a:r>
-              <a:rPr lang="fr-FR" dirty="0" err="1" smtClean="0"/>
+              <a:rPr lang="fr-FR" dirty="0" err="1"/>
               <a:t>Hessenberg</a:t>
             </a:r>
             <a:r>
-              <a:rPr lang="fr-FR" dirty="0" smtClean="0"/>
+              <a:rPr lang="fr-FR" dirty="0"/>
               <a:t>,       , de taille </a:t>
             </a:r>
           </a:p>
@@ -10445,23 +10670,46 @@
           <a:effectLst/>
         </p:spPr>
       </p:pic>
+      <p:sp>
+        <p:nvSpPr>
+          <p:cNvPr id="2" name="Espace réservé du numéro de diapositive 1">
+            <a:extLst>
+              <a:ext uri="{FF2B5EF4-FFF2-40B4-BE49-F238E27FC236}">
+                <a16:creationId xmlns:a16="http://schemas.microsoft.com/office/drawing/2014/main" id="{FAAC13A0-7F57-498D-996B-C0F1A3D703B3}"/>
+              </a:ext>
+            </a:extLst>
+          </p:cNvPr>
+          <p:cNvSpPr>
+            <a:spLocks noGrp="1"/>
+          </p:cNvSpPr>
+          <p:nvPr>
+            <p:ph type="sldNum" sz="quarter" idx="12"/>
+          </p:nvPr>
+        </p:nvSpPr>
+        <p:spPr/>
+        <p:txBody>
+          <a:bodyPr/>
+          <a:lstStyle/>
+          <a:p>
+            <a:fld id="{000982F6-AAAD-4258-B115-44D8EC280712}" type="slidenum">
+              <a:rPr lang="fr-FR" smtClean="0"/>
+              <a:pPr/>
+              <a:t>20</a:t>
+            </a:fld>
+            <a:endParaRPr lang="fr-FR"/>
+          </a:p>
+        </p:txBody>
+      </p:sp>
     </p:spTree>
     <p:extLst>
       <p:ext uri="{BB962C8B-B14F-4D97-AF65-F5344CB8AC3E}">
-        <p14:creationId xmlns:p14="http://schemas.microsoft.com/office/powerpoint/2010/main" xmlns="" val="474638245"/>
+        <p14:creationId xmlns:p14="http://schemas.microsoft.com/office/powerpoint/2010/main" val="474638245"/>
       </p:ext>
     </p:extLst>
   </p:cSld>
   <p:clrMapOvr>
     <a:masterClrMapping/>
   </p:clrMapOvr>
-  <p:timing>
-    <p:tnLst>
-      <p:par>
-        <p:cTn id="1" dur="indefinite" restart="never" nodeType="tmRoot"/>
-      </p:par>
-    </p:tnLst>
-  </p:timing>
 </p:sld>
 </file>
 
@@ -10487,7 +10735,7 @@
           <p:cNvPr id="2" name="Titre 1">
             <a:extLst>
               <a:ext uri="{FF2B5EF4-FFF2-40B4-BE49-F238E27FC236}">
-                <a16:creationId xmlns:a16="http://schemas.microsoft.com/office/drawing/2014/main" xmlns="" id="{B3ACA20D-C8BA-48AC-8A1B-D5BF49DC040C}"/>
+                <a16:creationId xmlns:a16="http://schemas.microsoft.com/office/drawing/2014/main" id="{B3ACA20D-C8BA-48AC-8A1B-D5BF49DC040C}"/>
               </a:ext>
             </a:extLst>
           </p:cNvPr>
@@ -10515,7 +10763,7 @@
           <p:cNvPr id="3" name="Espace réservé du contenu 2">
             <a:extLst>
               <a:ext uri="{FF2B5EF4-FFF2-40B4-BE49-F238E27FC236}">
-                <a16:creationId xmlns:a16="http://schemas.microsoft.com/office/drawing/2014/main" xmlns="" id="{572CBCEE-73BF-41CE-94D4-7F72DCE621AB}"/>
+                <a16:creationId xmlns:a16="http://schemas.microsoft.com/office/drawing/2014/main" id="{572CBCEE-73BF-41CE-94D4-7F72DCE621AB}"/>
               </a:ext>
             </a:extLst>
           </p:cNvPr>
@@ -10534,15 +10782,11 @@
           <a:lstStyle/>
           <a:p>
             <a:r>
-              <a:rPr lang="fr-FR" dirty="0" smtClean="0"/>
-              <a:t>A</a:t>
-            </a:r>
-            <a:r>
-              <a:rPr lang="fr-FR" dirty="0" smtClean="0"/>
-              <a:t>mélioration du temps de calcul de la méthode (</a:t>
-            </a:r>
-            <a:r>
-              <a:rPr lang="fr-FR" dirty="0" smtClean="0">
+              <a:rPr lang="fr-FR" dirty="0"/>
+              <a:t>Amélioration du temps de calcul de la méthode (</a:t>
+            </a:r>
+            <a:r>
+              <a:rPr lang="fr-FR" dirty="0">
                 <a:solidFill>
                   <a:srgbClr val="FF0000"/>
                 </a:solidFill>
@@ -10552,20 +10796,12 @@
           </a:p>
           <a:p>
             <a:r>
-              <a:rPr lang="fr-FR" dirty="0" smtClean="0">
-                <a:solidFill>
-                  <a:srgbClr val="FF0000"/>
-                </a:solidFill>
-              </a:rPr>
-              <a:t>Voir </a:t>
-            </a:r>
-            <a:r>
               <a:rPr lang="fr-FR" dirty="0">
                 <a:solidFill>
                   <a:srgbClr val="FF0000"/>
                 </a:solidFill>
               </a:rPr>
-              <a:t>le moment ou Krylov n’est plus rentable avec l’augmentation de la dimension ( dire que du coup on va rester sur des problèmes de </a:t>
+              <a:t>Voir le moment ou Krylov n’est plus rentable avec l’augmentation de la dimension ( dire que du coup on va rester sur des problèmes de </a:t>
             </a:r>
             <a:r>
               <a:rPr lang="fr-FR" dirty="0" err="1">
@@ -10633,7 +10869,7 @@
           <p:cNvPr id="1026" name="Picture 2" descr="https://lh3.googleusercontent.com/9uI-o7le6bMVd2swCsPRnGWjIVobJZS6AHCRcRk31hs1euU42v5lElfT4mgJpqSyqVOz1TRILKo8WXElp97gSdab7Lh3Vd1ToTZD6sceA2aRRvOEetXKh6rOFe_z5BHrMzbqHTG-3jZeIQ">
             <a:extLst>
               <a:ext uri="{FF2B5EF4-FFF2-40B4-BE49-F238E27FC236}">
-                <a16:creationId xmlns:a16="http://schemas.microsoft.com/office/drawing/2014/main" xmlns="" id="{E6606883-82CD-4DA3-94CE-3AEC53ED689B}"/>
+                <a16:creationId xmlns:a16="http://schemas.microsoft.com/office/drawing/2014/main" id="{E6606883-82CD-4DA3-94CE-3AEC53ED689B}"/>
               </a:ext>
             </a:extLst>
           </p:cNvPr>
@@ -10646,7 +10882,7 @@
           <a:blip r:embed="rId2">
             <a:extLst>
               <a:ext uri="{28A0092B-C50C-407E-A947-70E740481C1C}">
-                <a14:useLocalDpi xmlns:a14="http://schemas.microsoft.com/office/drawing/2010/main" xmlns="" val="0"/>
+                <a14:useLocalDpi xmlns:a14="http://schemas.microsoft.com/office/drawing/2010/main" val="0"/>
               </a:ext>
             </a:extLst>
           </a:blip>
@@ -10666,7 +10902,7 @@
           <a:noFill/>
           <a:extLst>
             <a:ext uri="{909E8E84-426E-40DD-AFC4-6F175D3DCCD1}">
-              <a14:hiddenFill xmlns:a14="http://schemas.microsoft.com/office/drawing/2010/main" xmlns="">
+              <a14:hiddenFill xmlns:a14="http://schemas.microsoft.com/office/drawing/2010/main">
                 <a:solidFill>
                   <a:srgbClr val="FFFFFF"/>
                 </a:solidFill>
@@ -10680,7 +10916,7 @@
           <p:cNvPr id="6" name="Espace réservé du numéro de diapositive 5">
             <a:extLst>
               <a:ext uri="{FF2B5EF4-FFF2-40B4-BE49-F238E27FC236}">
-                <a16:creationId xmlns:a16="http://schemas.microsoft.com/office/drawing/2014/main" xmlns="" id="{585359D9-45F9-4A60-A2CF-ABEBE8F51B58}"/>
+                <a16:creationId xmlns:a16="http://schemas.microsoft.com/office/drawing/2014/main" id="{585359D9-45F9-4A60-A2CF-ABEBE8F51B58}"/>
               </a:ext>
             </a:extLst>
           </p:cNvPr>
@@ -10708,7 +10944,7 @@
     </p:spTree>
     <p:extLst>
       <p:ext uri="{BB962C8B-B14F-4D97-AF65-F5344CB8AC3E}">
-        <p14:creationId xmlns:p14="http://schemas.microsoft.com/office/powerpoint/2010/main" xmlns="" val="474638245"/>
+        <p14:creationId xmlns:p14="http://schemas.microsoft.com/office/powerpoint/2010/main" val="474638245"/>
       </p:ext>
     </p:extLst>
   </p:cSld>
@@ -10815,7 +11051,7 @@
           <p:cNvPr id="2" name="Titre 1">
             <a:extLst>
               <a:ext uri="{FF2B5EF4-FFF2-40B4-BE49-F238E27FC236}">
-                <a16:creationId xmlns:a16="http://schemas.microsoft.com/office/drawing/2014/main" xmlns="" id="{BEAD297D-408C-4DCC-A83F-3991F010784A}"/>
+                <a16:creationId xmlns:a16="http://schemas.microsoft.com/office/drawing/2014/main" id="{BEAD297D-408C-4DCC-A83F-3991F010784A}"/>
               </a:ext>
             </a:extLst>
           </p:cNvPr>
@@ -10843,7 +11079,7 @@
           <p:cNvPr id="4" name="Espace réservé du contenu 3">
             <a:extLst>
               <a:ext uri="{FF2B5EF4-FFF2-40B4-BE49-F238E27FC236}">
-                <a16:creationId xmlns:a16="http://schemas.microsoft.com/office/drawing/2014/main" xmlns="" id="{BECEC932-1CBA-496B-A497-0EEBE4276EC1}"/>
+                <a16:creationId xmlns:a16="http://schemas.microsoft.com/office/drawing/2014/main" id="{BECEC932-1CBA-496B-A497-0EEBE4276EC1}"/>
               </a:ext>
             </a:extLst>
           </p:cNvPr>
@@ -10858,7 +11094,7 @@
           <a:blip r:embed="rId2">
             <a:extLst>
               <a:ext uri="{28A0092B-C50C-407E-A947-70E740481C1C}">
-                <a14:useLocalDpi xmlns:a14="http://schemas.microsoft.com/office/drawing/2010/main" xmlns="" val="0"/>
+                <a14:useLocalDpi xmlns:a14="http://schemas.microsoft.com/office/drawing/2010/main" val="0"/>
               </a:ext>
             </a:extLst>
           </a:blip>
@@ -10881,7 +11117,7 @@
           <p:cNvPr id="6" name="Image 5">
             <a:extLst>
               <a:ext uri="{FF2B5EF4-FFF2-40B4-BE49-F238E27FC236}">
-                <a16:creationId xmlns:a16="http://schemas.microsoft.com/office/drawing/2014/main" xmlns="" id="{BA8C6809-1D91-4B3D-BECB-23D7EFEEC9DB}"/>
+                <a16:creationId xmlns:a16="http://schemas.microsoft.com/office/drawing/2014/main" id="{BA8C6809-1D91-4B3D-BECB-23D7EFEEC9DB}"/>
               </a:ext>
             </a:extLst>
           </p:cNvPr>
@@ -10894,7 +11130,7 @@
           <a:blip r:embed="rId3">
             <a:extLst>
               <a:ext uri="{28A0092B-C50C-407E-A947-70E740481C1C}">
-                <a14:useLocalDpi xmlns:a14="http://schemas.microsoft.com/office/drawing/2010/main" xmlns="" val="0"/>
+                <a14:useLocalDpi xmlns:a14="http://schemas.microsoft.com/office/drawing/2010/main" val="0"/>
               </a:ext>
             </a:extLst>
           </a:blip>
@@ -10917,7 +11153,7 @@
           <p:cNvPr id="3" name="ZoneTexte 2">
             <a:extLst>
               <a:ext uri="{FF2B5EF4-FFF2-40B4-BE49-F238E27FC236}">
-                <a16:creationId xmlns:a16="http://schemas.microsoft.com/office/drawing/2014/main" xmlns="" id="{A899714B-70B7-4356-B765-062BAD9A1EB4}"/>
+                <a16:creationId xmlns:a16="http://schemas.microsoft.com/office/drawing/2014/main" id="{A899714B-70B7-4356-B765-062BAD9A1EB4}"/>
               </a:ext>
             </a:extLst>
           </p:cNvPr>
@@ -10969,7 +11205,7 @@
           <p:cNvPr id="7" name="Espace réservé du numéro de diapositive 6">
             <a:extLst>
               <a:ext uri="{FF2B5EF4-FFF2-40B4-BE49-F238E27FC236}">
-                <a16:creationId xmlns:a16="http://schemas.microsoft.com/office/drawing/2014/main" xmlns="" id="{B5F3ACBF-5648-4DC3-BB5F-8CC74562734A}"/>
+                <a16:creationId xmlns:a16="http://schemas.microsoft.com/office/drawing/2014/main" id="{B5F3ACBF-5648-4DC3-BB5F-8CC74562734A}"/>
               </a:ext>
             </a:extLst>
           </p:cNvPr>
@@ -10997,7 +11233,7 @@
     </p:spTree>
     <p:extLst>
       <p:ext uri="{BB962C8B-B14F-4D97-AF65-F5344CB8AC3E}">
-        <p14:creationId xmlns:p14="http://schemas.microsoft.com/office/powerpoint/2010/main" xmlns="" val="883981461"/>
+        <p14:creationId xmlns:p14="http://schemas.microsoft.com/office/powerpoint/2010/main" val="883981461"/>
       </p:ext>
     </p:extLst>
   </p:cSld>
@@ -11131,7 +11367,7 @@
           <p:cNvPr id="2" name="Titre 1">
             <a:extLst>
               <a:ext uri="{FF2B5EF4-FFF2-40B4-BE49-F238E27FC236}">
-                <a16:creationId xmlns:a16="http://schemas.microsoft.com/office/drawing/2014/main" xmlns="" id="{A032E8A6-5CD7-447B-9FF9-CCAB7F9B3C57}"/>
+                <a16:creationId xmlns:a16="http://schemas.microsoft.com/office/drawing/2014/main" id="{A032E8A6-5CD7-447B-9FF9-CCAB7F9B3C57}"/>
               </a:ext>
             </a:extLst>
           </p:cNvPr>
@@ -11159,7 +11395,7 @@
           <p:cNvPr id="4" name="Espace réservé du contenu 3">
             <a:extLst>
               <a:ext uri="{FF2B5EF4-FFF2-40B4-BE49-F238E27FC236}">
-                <a16:creationId xmlns:a16="http://schemas.microsoft.com/office/drawing/2014/main" xmlns="" id="{F76D6BBB-CCA8-4B44-A5C8-A0620C1291A6}"/>
+                <a16:creationId xmlns:a16="http://schemas.microsoft.com/office/drawing/2014/main" id="{F76D6BBB-CCA8-4B44-A5C8-A0620C1291A6}"/>
               </a:ext>
             </a:extLst>
           </p:cNvPr>
@@ -11174,7 +11410,7 @@
           <a:blip r:embed="rId2">
             <a:extLst>
               <a:ext uri="{28A0092B-C50C-407E-A947-70E740481C1C}">
-                <a14:useLocalDpi xmlns:a14="http://schemas.microsoft.com/office/drawing/2010/main" xmlns="" val="0"/>
+                <a14:useLocalDpi xmlns:a14="http://schemas.microsoft.com/office/drawing/2010/main" val="0"/>
               </a:ext>
             </a:extLst>
           </a:blip>
@@ -11197,7 +11433,7 @@
           <p:cNvPr id="6" name="Image 5">
             <a:extLst>
               <a:ext uri="{FF2B5EF4-FFF2-40B4-BE49-F238E27FC236}">
-                <a16:creationId xmlns:a16="http://schemas.microsoft.com/office/drawing/2014/main" xmlns="" id="{E63D94C4-FA55-4EFF-BE37-693B6A250459}"/>
+                <a16:creationId xmlns:a16="http://schemas.microsoft.com/office/drawing/2014/main" id="{E63D94C4-FA55-4EFF-BE37-693B6A250459}"/>
               </a:ext>
             </a:extLst>
           </p:cNvPr>
@@ -11210,7 +11446,7 @@
           <a:blip r:embed="rId3">
             <a:extLst>
               <a:ext uri="{28A0092B-C50C-407E-A947-70E740481C1C}">
-                <a14:useLocalDpi xmlns:a14="http://schemas.microsoft.com/office/drawing/2010/main" xmlns="" val="0"/>
+                <a14:useLocalDpi xmlns:a14="http://schemas.microsoft.com/office/drawing/2010/main" val="0"/>
               </a:ext>
             </a:extLst>
           </a:blip>
@@ -11233,7 +11469,7 @@
           <p:cNvPr id="5" name="Espace réservé du numéro de diapositive 4">
             <a:extLst>
               <a:ext uri="{FF2B5EF4-FFF2-40B4-BE49-F238E27FC236}">
-                <a16:creationId xmlns:a16="http://schemas.microsoft.com/office/drawing/2014/main" xmlns="" id="{D8B1A001-3647-4E9B-A473-0E496DC82853}"/>
+                <a16:creationId xmlns:a16="http://schemas.microsoft.com/office/drawing/2014/main" id="{D8B1A001-3647-4E9B-A473-0E496DC82853}"/>
               </a:ext>
             </a:extLst>
           </p:cNvPr>
@@ -11261,7 +11497,7 @@
     </p:spTree>
     <p:extLst>
       <p:ext uri="{BB962C8B-B14F-4D97-AF65-F5344CB8AC3E}">
-        <p14:creationId xmlns:p14="http://schemas.microsoft.com/office/powerpoint/2010/main" xmlns="" val="2574923907"/>
+        <p14:creationId xmlns:p14="http://schemas.microsoft.com/office/powerpoint/2010/main" val="2574923907"/>
       </p:ext>
     </p:extLst>
   </p:cSld>
@@ -11395,7 +11631,7 @@
           <p:cNvPr id="2" name="Titre 1">
             <a:extLst>
               <a:ext uri="{FF2B5EF4-FFF2-40B4-BE49-F238E27FC236}">
-                <a16:creationId xmlns:a16="http://schemas.microsoft.com/office/drawing/2014/main" xmlns="" id="{1EC22873-F9F0-4BC1-BA9D-6F5016FB6CAD}"/>
+                <a16:creationId xmlns:a16="http://schemas.microsoft.com/office/drawing/2014/main" id="{1EC22873-F9F0-4BC1-BA9D-6F5016FB6CAD}"/>
               </a:ext>
             </a:extLst>
           </p:cNvPr>
@@ -11420,7 +11656,7 @@
           <p:cNvPr id="3" name="Espace réservé du contenu 2">
             <a:extLst>
               <a:ext uri="{FF2B5EF4-FFF2-40B4-BE49-F238E27FC236}">
-                <a16:creationId xmlns:a16="http://schemas.microsoft.com/office/drawing/2014/main" xmlns="" id="{4271870C-2422-492A-96DA-4E72932D23DA}"/>
+                <a16:creationId xmlns:a16="http://schemas.microsoft.com/office/drawing/2014/main" id="{4271870C-2422-492A-96DA-4E72932D23DA}"/>
               </a:ext>
             </a:extLst>
           </p:cNvPr>
@@ -11479,7 +11715,7 @@
           <p:cNvPr id="4" name="Espace réservé du numéro de diapositive 3">
             <a:extLst>
               <a:ext uri="{FF2B5EF4-FFF2-40B4-BE49-F238E27FC236}">
-                <a16:creationId xmlns:a16="http://schemas.microsoft.com/office/drawing/2014/main" xmlns="" id="{11A06B5D-2D1D-4F4E-80EC-DB45BBB2EE98}"/>
+                <a16:creationId xmlns:a16="http://schemas.microsoft.com/office/drawing/2014/main" id="{11A06B5D-2D1D-4F4E-80EC-DB45BBB2EE98}"/>
               </a:ext>
             </a:extLst>
           </p:cNvPr>
@@ -11509,7 +11745,7 @@
           <p:cNvPr id="5" name="Espace réservé du contenu 3">
             <a:extLst>
               <a:ext uri="{FF2B5EF4-FFF2-40B4-BE49-F238E27FC236}">
-                <a16:creationId xmlns:a16="http://schemas.microsoft.com/office/drawing/2014/main" xmlns="" id="{4B4083B4-391E-4787-9BE0-3397253F84B4}"/>
+                <a16:creationId xmlns:a16="http://schemas.microsoft.com/office/drawing/2014/main" id="{4B4083B4-391E-4787-9BE0-3397253F84B4}"/>
               </a:ext>
             </a:extLst>
           </p:cNvPr>
@@ -11522,7 +11758,7 @@
           <a:blip r:embed="rId2">
             <a:extLst>
               <a:ext uri="{28A0092B-C50C-407E-A947-70E740481C1C}">
-                <a14:useLocalDpi xmlns:a14="http://schemas.microsoft.com/office/drawing/2010/main" xmlns="" val="0"/>
+                <a14:useLocalDpi xmlns:a14="http://schemas.microsoft.com/office/drawing/2010/main" val="0"/>
               </a:ext>
             </a:extLst>
           </a:blip>
@@ -11543,7 +11779,7 @@
     </p:spTree>
     <p:extLst>
       <p:ext uri="{BB962C8B-B14F-4D97-AF65-F5344CB8AC3E}">
-        <p14:creationId xmlns:p14="http://schemas.microsoft.com/office/powerpoint/2010/main" xmlns="" val="1665590819"/>
+        <p14:creationId xmlns:p14="http://schemas.microsoft.com/office/powerpoint/2010/main" val="1665590819"/>
       </p:ext>
     </p:extLst>
   </p:cSld>
@@ -11653,7 +11889,7 @@
           <p:cNvPr id="2" name="Titre 1">
             <a:extLst>
               <a:ext uri="{FF2B5EF4-FFF2-40B4-BE49-F238E27FC236}">
-                <a16:creationId xmlns:a16="http://schemas.microsoft.com/office/drawing/2014/main" xmlns="" id="{BEAD297D-408C-4DCC-A83F-3991F010784A}"/>
+                <a16:creationId xmlns:a16="http://schemas.microsoft.com/office/drawing/2014/main" id="{BEAD297D-408C-4DCC-A83F-3991F010784A}"/>
               </a:ext>
             </a:extLst>
           </p:cNvPr>
@@ -11681,7 +11917,7 @@
           <p:cNvPr id="3" name="Espace réservé du contenu 2">
             <a:extLst>
               <a:ext uri="{FF2B5EF4-FFF2-40B4-BE49-F238E27FC236}">
-                <a16:creationId xmlns:a16="http://schemas.microsoft.com/office/drawing/2014/main" xmlns="" id="{8C01C720-3BA3-4CC0-9BD8-6DAFA23FEEAA}"/>
+                <a16:creationId xmlns:a16="http://schemas.microsoft.com/office/drawing/2014/main" id="{8C01C720-3BA3-4CC0-9BD8-6DAFA23FEEAA}"/>
               </a:ext>
             </a:extLst>
           </p:cNvPr>
@@ -11736,7 +11972,7 @@
           <p:cNvPr id="5" name="Image 4">
             <a:extLst>
               <a:ext uri="{FF2B5EF4-FFF2-40B4-BE49-F238E27FC236}">
-                <a16:creationId xmlns:a16="http://schemas.microsoft.com/office/drawing/2014/main" xmlns="" id="{832230D8-B3A3-41BD-925A-1E390CFE5E0F}"/>
+                <a16:creationId xmlns:a16="http://schemas.microsoft.com/office/drawing/2014/main" id="{832230D8-B3A3-41BD-925A-1E390CFE5E0F}"/>
               </a:ext>
             </a:extLst>
           </p:cNvPr>
@@ -11749,7 +11985,7 @@
           <a:blip r:embed="rId2">
             <a:extLst>
               <a:ext uri="{28A0092B-C50C-407E-A947-70E740481C1C}">
-                <a14:useLocalDpi xmlns:a14="http://schemas.microsoft.com/office/drawing/2010/main" xmlns="" val="0"/>
+                <a14:useLocalDpi xmlns:a14="http://schemas.microsoft.com/office/drawing/2010/main" val="0"/>
               </a:ext>
             </a:extLst>
           </a:blip>
@@ -11772,7 +12008,7 @@
           <p:cNvPr id="7" name="Image 6">
             <a:extLst>
               <a:ext uri="{FF2B5EF4-FFF2-40B4-BE49-F238E27FC236}">
-                <a16:creationId xmlns:a16="http://schemas.microsoft.com/office/drawing/2014/main" xmlns="" id="{3D6D0F9D-E201-4CEA-ADB4-91536E300412}"/>
+                <a16:creationId xmlns:a16="http://schemas.microsoft.com/office/drawing/2014/main" id="{3D6D0F9D-E201-4CEA-ADB4-91536E300412}"/>
               </a:ext>
             </a:extLst>
           </p:cNvPr>
@@ -11785,7 +12021,7 @@
           <a:blip r:embed="rId3">
             <a:extLst>
               <a:ext uri="{28A0092B-C50C-407E-A947-70E740481C1C}">
-                <a14:useLocalDpi xmlns:a14="http://schemas.microsoft.com/office/drawing/2010/main" xmlns="" val="0"/>
+                <a14:useLocalDpi xmlns:a14="http://schemas.microsoft.com/office/drawing/2010/main" val="0"/>
               </a:ext>
             </a:extLst>
           </a:blip>
@@ -11808,7 +12044,7 @@
           <p:cNvPr id="9" name="Image 8">
             <a:extLst>
               <a:ext uri="{FF2B5EF4-FFF2-40B4-BE49-F238E27FC236}">
-                <a16:creationId xmlns:a16="http://schemas.microsoft.com/office/drawing/2014/main" xmlns="" id="{4C1C44DA-FC67-4D0A-B6CF-2DA9A645F6BA}"/>
+                <a16:creationId xmlns:a16="http://schemas.microsoft.com/office/drawing/2014/main" id="{4C1C44DA-FC67-4D0A-B6CF-2DA9A645F6BA}"/>
               </a:ext>
             </a:extLst>
           </p:cNvPr>
@@ -11821,7 +12057,7 @@
           <a:blip r:embed="rId4">
             <a:extLst>
               <a:ext uri="{28A0092B-C50C-407E-A947-70E740481C1C}">
-                <a14:useLocalDpi xmlns:a14="http://schemas.microsoft.com/office/drawing/2010/main" xmlns="" val="0"/>
+                <a14:useLocalDpi xmlns:a14="http://schemas.microsoft.com/office/drawing/2010/main" val="0"/>
               </a:ext>
             </a:extLst>
           </a:blip>
@@ -11844,7 +12080,7 @@
           <p:cNvPr id="6" name="Espace réservé du numéro de diapositive 5">
             <a:extLst>
               <a:ext uri="{FF2B5EF4-FFF2-40B4-BE49-F238E27FC236}">
-                <a16:creationId xmlns:a16="http://schemas.microsoft.com/office/drawing/2014/main" xmlns="" id="{B86378C0-05E7-4CAF-ABA7-16D08897F03C}"/>
+                <a16:creationId xmlns:a16="http://schemas.microsoft.com/office/drawing/2014/main" id="{B86378C0-05E7-4CAF-ABA7-16D08897F03C}"/>
               </a:ext>
             </a:extLst>
           </p:cNvPr>
@@ -11872,7 +12108,7 @@
     </p:spTree>
     <p:extLst>
       <p:ext uri="{BB962C8B-B14F-4D97-AF65-F5344CB8AC3E}">
-        <p14:creationId xmlns:p14="http://schemas.microsoft.com/office/powerpoint/2010/main" xmlns="" val="34546804"/>
+        <p14:creationId xmlns:p14="http://schemas.microsoft.com/office/powerpoint/2010/main" val="34546804"/>
       </p:ext>
     </p:extLst>
   </p:cSld>
@@ -12096,7 +12332,7 @@
           <p:cNvPr id="2" name="Titre 1">
             <a:extLst>
               <a:ext uri="{FF2B5EF4-FFF2-40B4-BE49-F238E27FC236}">
-                <a16:creationId xmlns:a16="http://schemas.microsoft.com/office/drawing/2014/main" xmlns="" id="{85A0ACAC-985A-4B07-9143-EAD1C2C47DB2}"/>
+                <a16:creationId xmlns:a16="http://schemas.microsoft.com/office/drawing/2014/main" id="{85A0ACAC-985A-4B07-9143-EAD1C2C47DB2}"/>
               </a:ext>
             </a:extLst>
           </p:cNvPr>
@@ -12121,7 +12357,7 @@
           <p:cNvPr id="3" name="Espace réservé du contenu 2">
             <a:extLst>
               <a:ext uri="{FF2B5EF4-FFF2-40B4-BE49-F238E27FC236}">
-                <a16:creationId xmlns:a16="http://schemas.microsoft.com/office/drawing/2014/main" xmlns="" id="{064E0AF9-9385-49B3-8D88-2F9C238B48DC}"/>
+                <a16:creationId xmlns:a16="http://schemas.microsoft.com/office/drawing/2014/main" id="{064E0AF9-9385-49B3-8D88-2F9C238B48DC}"/>
               </a:ext>
             </a:extLst>
           </p:cNvPr>
@@ -12215,7 +12451,7 @@
           <p:cNvPr id="4" name="Espace réservé du numéro de diapositive 3">
             <a:extLst>
               <a:ext uri="{FF2B5EF4-FFF2-40B4-BE49-F238E27FC236}">
-                <a16:creationId xmlns:a16="http://schemas.microsoft.com/office/drawing/2014/main" xmlns="" id="{63606221-F579-45A8-A843-87EDD1ACB61A}"/>
+                <a16:creationId xmlns:a16="http://schemas.microsoft.com/office/drawing/2014/main" id="{63606221-F579-45A8-A843-87EDD1ACB61A}"/>
               </a:ext>
             </a:extLst>
           </p:cNvPr>
@@ -12243,7 +12479,7 @@
     </p:spTree>
     <p:extLst>
       <p:ext uri="{BB962C8B-B14F-4D97-AF65-F5344CB8AC3E}">
-        <p14:creationId xmlns:p14="http://schemas.microsoft.com/office/powerpoint/2010/main" xmlns="" val="2833046163"/>
+        <p14:creationId xmlns:p14="http://schemas.microsoft.com/office/powerpoint/2010/main" val="2833046163"/>
       </p:ext>
     </p:extLst>
   </p:cSld>
@@ -12275,7 +12511,7 @@
           <p:cNvPr id="2" name="Titre 1">
             <a:extLst>
               <a:ext uri="{FF2B5EF4-FFF2-40B4-BE49-F238E27FC236}">
-                <a16:creationId xmlns:a16="http://schemas.microsoft.com/office/drawing/2014/main" xmlns="" id="{8B8AA958-7EF5-4EB0-806C-74836A2B60F3}"/>
+                <a16:creationId xmlns:a16="http://schemas.microsoft.com/office/drawing/2014/main" id="{8B8AA958-7EF5-4EB0-806C-74836A2B60F3}"/>
               </a:ext>
             </a:extLst>
           </p:cNvPr>
@@ -12303,7 +12539,7 @@
           <p:cNvPr id="3" name="Espace réservé du texte 2">
             <a:extLst>
               <a:ext uri="{FF2B5EF4-FFF2-40B4-BE49-F238E27FC236}">
-                <a16:creationId xmlns:a16="http://schemas.microsoft.com/office/drawing/2014/main" xmlns="" id="{7478EE0A-709D-4E6A-9A69-97A1C1F54D87}"/>
+                <a16:creationId xmlns:a16="http://schemas.microsoft.com/office/drawing/2014/main" id="{7478EE0A-709D-4E6A-9A69-97A1C1F54D87}"/>
               </a:ext>
             </a:extLst>
           </p:cNvPr>
@@ -12331,7 +12567,7 @@
           <p:cNvPr id="4" name="Espace réservé du contenu 3">
             <a:extLst>
               <a:ext uri="{FF2B5EF4-FFF2-40B4-BE49-F238E27FC236}">
-                <a16:creationId xmlns:a16="http://schemas.microsoft.com/office/drawing/2014/main" xmlns="" id="{E2AB1664-5A63-444A-BC52-5D2B293703CE}"/>
+                <a16:creationId xmlns:a16="http://schemas.microsoft.com/office/drawing/2014/main" id="{E2AB1664-5A63-444A-BC52-5D2B293703CE}"/>
               </a:ext>
             </a:extLst>
           </p:cNvPr>
@@ -12383,7 +12619,7 @@
           <p:cNvPr id="5" name="Espace réservé du texte 4">
             <a:extLst>
               <a:ext uri="{FF2B5EF4-FFF2-40B4-BE49-F238E27FC236}">
-                <a16:creationId xmlns:a16="http://schemas.microsoft.com/office/drawing/2014/main" xmlns="" id="{88B3B4E8-F4B8-474F-ADF7-691CCDBA65DC}"/>
+                <a16:creationId xmlns:a16="http://schemas.microsoft.com/office/drawing/2014/main" id="{88B3B4E8-F4B8-474F-ADF7-691CCDBA65DC}"/>
               </a:ext>
             </a:extLst>
           </p:cNvPr>
@@ -12411,7 +12647,7 @@
           <p:cNvPr id="6" name="Espace réservé du contenu 5">
             <a:extLst>
               <a:ext uri="{FF2B5EF4-FFF2-40B4-BE49-F238E27FC236}">
-                <a16:creationId xmlns:a16="http://schemas.microsoft.com/office/drawing/2014/main" xmlns="" id="{7C7F8C92-21F6-4243-BC10-2A53A7E53035}"/>
+                <a16:creationId xmlns:a16="http://schemas.microsoft.com/office/drawing/2014/main" id="{7C7F8C92-21F6-4243-BC10-2A53A7E53035}"/>
               </a:ext>
             </a:extLst>
           </p:cNvPr>
@@ -12463,7 +12699,7 @@
           <p:cNvPr id="8" name="Espace réservé du numéro de diapositive 7">
             <a:extLst>
               <a:ext uri="{FF2B5EF4-FFF2-40B4-BE49-F238E27FC236}">
-                <a16:creationId xmlns:a16="http://schemas.microsoft.com/office/drawing/2014/main" xmlns="" id="{D49305E3-2AE4-48AE-BADF-ECC7835468A0}"/>
+                <a16:creationId xmlns:a16="http://schemas.microsoft.com/office/drawing/2014/main" id="{D49305E3-2AE4-48AE-BADF-ECC7835468A0}"/>
               </a:ext>
             </a:extLst>
           </p:cNvPr>
@@ -12491,7 +12727,7 @@
     </p:spTree>
     <p:extLst>
       <p:ext uri="{BB962C8B-B14F-4D97-AF65-F5344CB8AC3E}">
-        <p14:creationId xmlns:p14="http://schemas.microsoft.com/office/powerpoint/2010/main" xmlns="" val="860307842"/>
+        <p14:creationId xmlns:p14="http://schemas.microsoft.com/office/powerpoint/2010/main" val="860307842"/>
       </p:ext>
     </p:extLst>
   </p:cSld>
@@ -12523,7 +12759,7 @@
           <p:cNvPr id="2" name="Titre 1">
             <a:extLst>
               <a:ext uri="{FF2B5EF4-FFF2-40B4-BE49-F238E27FC236}">
-                <a16:creationId xmlns:a16="http://schemas.microsoft.com/office/drawing/2014/main" xmlns="" id="{925AD2DE-CFF0-475B-98D6-8249214AA0DD}"/>
+                <a16:creationId xmlns:a16="http://schemas.microsoft.com/office/drawing/2014/main" id="{925AD2DE-CFF0-475B-98D6-8249214AA0DD}"/>
               </a:ext>
             </a:extLst>
           </p:cNvPr>
@@ -12552,8 +12788,8 @@
           </a:p>
         </p:txBody>
       </p:sp>
-      <mc:AlternateContent xmlns:mc="http://schemas.openxmlformats.org/markup-compatibility/2006">
-        <mc:Choice xmlns:a14="http://schemas.microsoft.com/office/drawing/2010/main" xmlns="" Requires="a14">
+      <mc:AlternateContent xmlns:mc="http://schemas.openxmlformats.org/markup-compatibility/2006" xmlns:a14="http://schemas.microsoft.com/office/drawing/2010/main">
+        <mc:Choice Requires="a14">
           <p:sp>
             <p:nvSpPr>
               <p:cNvPr id="3" name="Espace réservé du contenu 2">
@@ -12707,7 +12943,7 @@
             </p:txBody>
           </p:sp>
         </mc:Choice>
-        <mc:Fallback>
+        <mc:Fallback xmlns="">
           <p:sp>
             <p:nvSpPr>
               <p:cNvPr id="3" name="Espace réservé du contenu 2">
@@ -12752,7 +12988,7 @@
           <p:cNvPr id="5" name="Espace réservé du numéro de diapositive 4">
             <a:extLst>
               <a:ext uri="{FF2B5EF4-FFF2-40B4-BE49-F238E27FC236}">
-                <a16:creationId xmlns:a16="http://schemas.microsoft.com/office/drawing/2014/main" xmlns="" id="{E7499F10-CC09-4721-80D2-753B2B7F5381}"/>
+                <a16:creationId xmlns:a16="http://schemas.microsoft.com/office/drawing/2014/main" id="{E7499F10-CC09-4721-80D2-753B2B7F5381}"/>
               </a:ext>
             </a:extLst>
           </p:cNvPr>
@@ -12780,7 +13016,7 @@
     </p:spTree>
     <p:extLst>
       <p:ext uri="{BB962C8B-B14F-4D97-AF65-F5344CB8AC3E}">
-        <p14:creationId xmlns:p14="http://schemas.microsoft.com/office/powerpoint/2010/main" xmlns="" val="3686136127"/>
+        <p14:creationId xmlns:p14="http://schemas.microsoft.com/office/powerpoint/2010/main" val="3686136127"/>
       </p:ext>
     </p:extLst>
   </p:cSld>
@@ -12812,7 +13048,7 @@
           <p:cNvPr id="2" name="Titre 1">
             <a:extLst>
               <a:ext uri="{FF2B5EF4-FFF2-40B4-BE49-F238E27FC236}">
-                <a16:creationId xmlns:a16="http://schemas.microsoft.com/office/drawing/2014/main" xmlns="" id="{EE47D80A-963A-4039-9510-0B6C60716D4D}"/>
+                <a16:creationId xmlns:a16="http://schemas.microsoft.com/office/drawing/2014/main" id="{EE47D80A-963A-4039-9510-0B6C60716D4D}"/>
               </a:ext>
             </a:extLst>
           </p:cNvPr>
@@ -12837,7 +13073,7 @@
           <p:cNvPr id="3" name="Espace réservé du contenu 2">
             <a:extLst>
               <a:ext uri="{FF2B5EF4-FFF2-40B4-BE49-F238E27FC236}">
-                <a16:creationId xmlns:a16="http://schemas.microsoft.com/office/drawing/2014/main" xmlns="" id="{B4B1B833-0C3E-4B64-82BD-D739D3ED2E1E}"/>
+                <a16:creationId xmlns:a16="http://schemas.microsoft.com/office/drawing/2014/main" id="{B4B1B833-0C3E-4B64-82BD-D739D3ED2E1E}"/>
               </a:ext>
             </a:extLst>
           </p:cNvPr>
@@ -12925,7 +13161,7 @@
           <p:cNvPr id="4" name="Espace réservé du contenu 4">
             <a:extLst>
               <a:ext uri="{FF2B5EF4-FFF2-40B4-BE49-F238E27FC236}">
-                <a16:creationId xmlns:a16="http://schemas.microsoft.com/office/drawing/2014/main" xmlns="" id="{60569D3D-C3BB-4780-B0B7-7AC724C3E7EF}"/>
+                <a16:creationId xmlns:a16="http://schemas.microsoft.com/office/drawing/2014/main" id="{60569D3D-C3BB-4780-B0B7-7AC724C3E7EF}"/>
               </a:ext>
             </a:extLst>
           </p:cNvPr>
@@ -12938,7 +13174,7 @@
           <a:blip r:embed="rId2">
             <a:extLst>
               <a:ext uri="{28A0092B-C50C-407E-A947-70E740481C1C}">
-                <a14:useLocalDpi xmlns:a14="http://schemas.microsoft.com/office/drawing/2010/main" xmlns="" val="0"/>
+                <a14:useLocalDpi xmlns:a14="http://schemas.microsoft.com/office/drawing/2010/main" val="0"/>
               </a:ext>
             </a:extLst>
           </a:blip>
@@ -12961,7 +13197,7 @@
           <p:cNvPr id="6" name="Espace réservé du numéro de diapositive 5">
             <a:extLst>
               <a:ext uri="{FF2B5EF4-FFF2-40B4-BE49-F238E27FC236}">
-                <a16:creationId xmlns:a16="http://schemas.microsoft.com/office/drawing/2014/main" xmlns="" id="{554BE81E-A13E-462D-BB3F-726E7C0BC58E}"/>
+                <a16:creationId xmlns:a16="http://schemas.microsoft.com/office/drawing/2014/main" id="{554BE81E-A13E-462D-BB3F-726E7C0BC58E}"/>
               </a:ext>
             </a:extLst>
           </p:cNvPr>
@@ -12989,7 +13225,7 @@
     </p:spTree>
     <p:extLst>
       <p:ext uri="{BB962C8B-B14F-4D97-AF65-F5344CB8AC3E}">
-        <p14:creationId xmlns:p14="http://schemas.microsoft.com/office/powerpoint/2010/main" xmlns="" val="703959671"/>
+        <p14:creationId xmlns:p14="http://schemas.microsoft.com/office/powerpoint/2010/main" val="703959671"/>
       </p:ext>
     </p:extLst>
   </p:cSld>
@@ -13021,7 +13257,7 @@
           <p:cNvPr id="2" name="Titre 1">
             <a:extLst>
               <a:ext uri="{FF2B5EF4-FFF2-40B4-BE49-F238E27FC236}">
-                <a16:creationId xmlns:a16="http://schemas.microsoft.com/office/drawing/2014/main" xmlns="" id="{3B78E597-641E-4559-B633-702BBC9C31B5}"/>
+                <a16:creationId xmlns:a16="http://schemas.microsoft.com/office/drawing/2014/main" id="{3B78E597-641E-4559-B633-702BBC9C31B5}"/>
               </a:ext>
             </a:extLst>
           </p:cNvPr>
@@ -13049,7 +13285,7 @@
           <p:cNvPr id="3" name="Espace réservé du contenu 2">
             <a:extLst>
               <a:ext uri="{FF2B5EF4-FFF2-40B4-BE49-F238E27FC236}">
-                <a16:creationId xmlns:a16="http://schemas.microsoft.com/office/drawing/2014/main" xmlns="" id="{3FF7DE30-3AD2-4874-BED4-F10455D3CA2F}"/>
+                <a16:creationId xmlns:a16="http://schemas.microsoft.com/office/drawing/2014/main" id="{3FF7DE30-3AD2-4874-BED4-F10455D3CA2F}"/>
               </a:ext>
             </a:extLst>
           </p:cNvPr>
@@ -13119,7 +13355,7 @@
           <p:cNvPr id="5" name="Espace réservé du numéro de diapositive 4">
             <a:extLst>
               <a:ext uri="{FF2B5EF4-FFF2-40B4-BE49-F238E27FC236}">
-                <a16:creationId xmlns:a16="http://schemas.microsoft.com/office/drawing/2014/main" xmlns="" id="{7ED22D32-C001-47A4-B0C8-5D4C89041792}"/>
+                <a16:creationId xmlns:a16="http://schemas.microsoft.com/office/drawing/2014/main" id="{7ED22D32-C001-47A4-B0C8-5D4C89041792}"/>
               </a:ext>
             </a:extLst>
           </p:cNvPr>
@@ -13147,7 +13383,7 @@
     </p:spTree>
     <p:extLst>
       <p:ext uri="{BB962C8B-B14F-4D97-AF65-F5344CB8AC3E}">
-        <p14:creationId xmlns:p14="http://schemas.microsoft.com/office/powerpoint/2010/main" xmlns="" val="503595150"/>
+        <p14:creationId xmlns:p14="http://schemas.microsoft.com/office/powerpoint/2010/main" val="503595150"/>
       </p:ext>
     </p:extLst>
   </p:cSld>
@@ -13179,7 +13415,7 @@
           <p:cNvPr id="2" name="Titre 1">
             <a:extLst>
               <a:ext uri="{FF2B5EF4-FFF2-40B4-BE49-F238E27FC236}">
-                <a16:creationId xmlns:a16="http://schemas.microsoft.com/office/drawing/2014/main" xmlns="" id="{87AA8248-2FC7-4DB4-B76F-CE3FEE666906}"/>
+                <a16:creationId xmlns:a16="http://schemas.microsoft.com/office/drawing/2014/main" id="{87AA8248-2FC7-4DB4-B76F-CE3FEE666906}"/>
               </a:ext>
             </a:extLst>
           </p:cNvPr>
@@ -13216,7 +13452,7 @@
           <p:cNvPr id="3" name="Espace réservé du contenu 2">
             <a:extLst>
               <a:ext uri="{FF2B5EF4-FFF2-40B4-BE49-F238E27FC236}">
-                <a16:creationId xmlns:a16="http://schemas.microsoft.com/office/drawing/2014/main" xmlns="" id="{180EDACD-AC7E-4944-A8DC-529FEE578D6F}"/>
+                <a16:creationId xmlns:a16="http://schemas.microsoft.com/office/drawing/2014/main" id="{180EDACD-AC7E-4944-A8DC-529FEE578D6F}"/>
               </a:ext>
             </a:extLst>
           </p:cNvPr>
@@ -13298,7 +13534,7 @@
           <p:cNvPr id="5" name="Espace réservé du numéro de diapositive 4">
             <a:extLst>
               <a:ext uri="{FF2B5EF4-FFF2-40B4-BE49-F238E27FC236}">
-                <a16:creationId xmlns:a16="http://schemas.microsoft.com/office/drawing/2014/main" xmlns="" id="{50BF3ACC-650B-47C0-B56A-D817F3D6FA18}"/>
+                <a16:creationId xmlns:a16="http://schemas.microsoft.com/office/drawing/2014/main" id="{50BF3ACC-650B-47C0-B56A-D817F3D6FA18}"/>
               </a:ext>
             </a:extLst>
           </p:cNvPr>
@@ -13326,7 +13562,7 @@
     </p:spTree>
     <p:extLst>
       <p:ext uri="{BB962C8B-B14F-4D97-AF65-F5344CB8AC3E}">
-        <p14:creationId xmlns:p14="http://schemas.microsoft.com/office/powerpoint/2010/main" xmlns="" val="129017208"/>
+        <p14:creationId xmlns:p14="http://schemas.microsoft.com/office/powerpoint/2010/main" val="129017208"/>
       </p:ext>
     </p:extLst>
   </p:cSld>
@@ -13358,7 +13594,7 @@
           <p:cNvPr id="2" name="Titre 1">
             <a:extLst>
               <a:ext uri="{FF2B5EF4-FFF2-40B4-BE49-F238E27FC236}">
-                <a16:creationId xmlns:a16="http://schemas.microsoft.com/office/drawing/2014/main" xmlns="" id="{A3B24EC0-D904-421A-A85B-AB0678AF0FCE}"/>
+                <a16:creationId xmlns:a16="http://schemas.microsoft.com/office/drawing/2014/main" id="{A3B24EC0-D904-421A-A85B-AB0678AF0FCE}"/>
               </a:ext>
             </a:extLst>
           </p:cNvPr>
@@ -13383,7 +13619,7 @@
           <p:cNvPr id="3" name="Espace réservé du contenu 2">
             <a:extLst>
               <a:ext uri="{FF2B5EF4-FFF2-40B4-BE49-F238E27FC236}">
-                <a16:creationId xmlns:a16="http://schemas.microsoft.com/office/drawing/2014/main" xmlns="" id="{BCD2C893-42EC-4C2F-9BF0-7AF360B0F54D}"/>
+                <a16:creationId xmlns:a16="http://schemas.microsoft.com/office/drawing/2014/main" id="{BCD2C893-42EC-4C2F-9BF0-7AF360B0F54D}"/>
               </a:ext>
             </a:extLst>
           </p:cNvPr>
@@ -13514,7 +13750,7 @@
           <p:cNvPr id="5" name="Espace réservé du numéro de diapositive 4">
             <a:extLst>
               <a:ext uri="{FF2B5EF4-FFF2-40B4-BE49-F238E27FC236}">
-                <a16:creationId xmlns:a16="http://schemas.microsoft.com/office/drawing/2014/main" xmlns="" id="{288C3BA0-0EAA-456B-BEC4-324DD889EEEC}"/>
+                <a16:creationId xmlns:a16="http://schemas.microsoft.com/office/drawing/2014/main" id="{288C3BA0-0EAA-456B-BEC4-324DD889EEEC}"/>
               </a:ext>
             </a:extLst>
           </p:cNvPr>
@@ -13542,7 +13778,7 @@
     </p:spTree>
     <p:extLst>
       <p:ext uri="{BB962C8B-B14F-4D97-AF65-F5344CB8AC3E}">
-        <p14:creationId xmlns:p14="http://schemas.microsoft.com/office/powerpoint/2010/main" xmlns="" val="2821182814"/>
+        <p14:creationId xmlns:p14="http://schemas.microsoft.com/office/powerpoint/2010/main" val="2821182814"/>
       </p:ext>
     </p:extLst>
   </p:cSld>
@@ -13574,7 +13810,7 @@
           <p:cNvPr id="2" name="Titre 1">
             <a:extLst>
               <a:ext uri="{FF2B5EF4-FFF2-40B4-BE49-F238E27FC236}">
-                <a16:creationId xmlns:a16="http://schemas.microsoft.com/office/drawing/2014/main" xmlns="" id="{8DB6E984-1000-41D0-9BAD-8224D1D5B727}"/>
+                <a16:creationId xmlns:a16="http://schemas.microsoft.com/office/drawing/2014/main" id="{8DB6E984-1000-41D0-9BAD-8224D1D5B727}"/>
               </a:ext>
             </a:extLst>
           </p:cNvPr>
@@ -13611,7 +13847,7 @@
           <p:cNvPr id="3" name="Espace réservé du contenu 2">
             <a:extLst>
               <a:ext uri="{FF2B5EF4-FFF2-40B4-BE49-F238E27FC236}">
-                <a16:creationId xmlns:a16="http://schemas.microsoft.com/office/drawing/2014/main" xmlns="" id="{D2C42D89-DA06-4B88-A1AF-550229405A0C}"/>
+                <a16:creationId xmlns:a16="http://schemas.microsoft.com/office/drawing/2014/main" id="{D2C42D89-DA06-4B88-A1AF-550229405A0C}"/>
               </a:ext>
             </a:extLst>
           </p:cNvPr>
@@ -13684,7 +13920,7 @@
           <p:cNvPr id="5" name="Espace réservé du numéro de diapositive 4">
             <a:extLst>
               <a:ext uri="{FF2B5EF4-FFF2-40B4-BE49-F238E27FC236}">
-                <a16:creationId xmlns:a16="http://schemas.microsoft.com/office/drawing/2014/main" xmlns="" id="{822D4A30-1663-492F-AD8A-461A6BC623A1}"/>
+                <a16:creationId xmlns:a16="http://schemas.microsoft.com/office/drawing/2014/main" id="{822D4A30-1663-492F-AD8A-461A6BC623A1}"/>
               </a:ext>
             </a:extLst>
           </p:cNvPr>
@@ -13712,7 +13948,7 @@
     </p:spTree>
     <p:extLst>
       <p:ext uri="{BB962C8B-B14F-4D97-AF65-F5344CB8AC3E}">
-        <p14:creationId xmlns:p14="http://schemas.microsoft.com/office/powerpoint/2010/main" xmlns="" val="2572246735"/>
+        <p14:creationId xmlns:p14="http://schemas.microsoft.com/office/powerpoint/2010/main" val="2572246735"/>
       </p:ext>
     </p:extLst>
   </p:cSld>
@@ -13744,7 +13980,7 @@
           <p:cNvPr id="2" name="Titre 1">
             <a:extLst>
               <a:ext uri="{FF2B5EF4-FFF2-40B4-BE49-F238E27FC236}">
-                <a16:creationId xmlns:a16="http://schemas.microsoft.com/office/drawing/2014/main" xmlns="" id="{2F4E9914-A102-49E3-9B09-BB7A13F49DD0}"/>
+                <a16:creationId xmlns:a16="http://schemas.microsoft.com/office/drawing/2014/main" id="{2F4E9914-A102-49E3-9B09-BB7A13F49DD0}"/>
               </a:ext>
             </a:extLst>
           </p:cNvPr>
@@ -13781,7 +14017,7 @@
           <p:cNvPr id="4" name="Espace réservé du contenu 3">
             <a:extLst>
               <a:ext uri="{FF2B5EF4-FFF2-40B4-BE49-F238E27FC236}">
-                <a16:creationId xmlns:a16="http://schemas.microsoft.com/office/drawing/2014/main" xmlns="" id="{8C412395-3E7D-4827-B89D-D10AF7A53A97}"/>
+                <a16:creationId xmlns:a16="http://schemas.microsoft.com/office/drawing/2014/main" id="{8C412395-3E7D-4827-B89D-D10AF7A53A97}"/>
               </a:ext>
             </a:extLst>
           </p:cNvPr>
@@ -13854,7 +14090,7 @@
           <p:cNvPr id="7" name="image6.png">
             <a:extLst>
               <a:ext uri="{FF2B5EF4-FFF2-40B4-BE49-F238E27FC236}">
-                <a16:creationId xmlns:a16="http://schemas.microsoft.com/office/drawing/2014/main" xmlns="" id="{C0C77CD7-A252-41BA-924C-91383B1D9AA9}"/>
+                <a16:creationId xmlns:a16="http://schemas.microsoft.com/office/drawing/2014/main" id="{C0C77CD7-A252-41BA-924C-91383B1D9AA9}"/>
               </a:ext>
             </a:extLst>
           </p:cNvPr>
@@ -13888,7 +14124,7 @@
           <p:cNvPr id="8" name="Flèche : droite 7">
             <a:extLst>
               <a:ext uri="{FF2B5EF4-FFF2-40B4-BE49-F238E27FC236}">
-                <a16:creationId xmlns:a16="http://schemas.microsoft.com/office/drawing/2014/main" xmlns="" id="{4F1978B8-9DC2-4CC4-87B0-445F4B061D10}"/>
+                <a16:creationId xmlns:a16="http://schemas.microsoft.com/office/drawing/2014/main" id="{4F1978B8-9DC2-4CC4-87B0-445F4B061D10}"/>
               </a:ext>
             </a:extLst>
           </p:cNvPr>
@@ -13934,7 +14170,7 @@
           <p:cNvPr id="5" name="Espace réservé du numéro de diapositive 4">
             <a:extLst>
               <a:ext uri="{FF2B5EF4-FFF2-40B4-BE49-F238E27FC236}">
-                <a16:creationId xmlns:a16="http://schemas.microsoft.com/office/drawing/2014/main" xmlns="" id="{E74AD553-1959-43E0-B79D-B4616E5DEB89}"/>
+                <a16:creationId xmlns:a16="http://schemas.microsoft.com/office/drawing/2014/main" id="{E74AD553-1959-43E0-B79D-B4616E5DEB89}"/>
               </a:ext>
             </a:extLst>
           </p:cNvPr>
@@ -13962,7 +14198,7 @@
     </p:spTree>
     <p:extLst>
       <p:ext uri="{BB962C8B-B14F-4D97-AF65-F5344CB8AC3E}">
-        <p14:creationId xmlns:p14="http://schemas.microsoft.com/office/powerpoint/2010/main" xmlns="" val="308474648"/>
+        <p14:creationId xmlns:p14="http://schemas.microsoft.com/office/powerpoint/2010/main" val="308474648"/>
       </p:ext>
     </p:extLst>
   </p:cSld>
@@ -14223,7 +14459,7 @@
   <a:extraClrSchemeLst/>
   <a:extLst>
     <a:ext uri="{05A4C25C-085E-4340-85A3-A5531E510DB2}">
-      <thm15:themeFamily xmlns:thm15="http://schemas.microsoft.com/office/thememl/2012/main" xmlns="" name="Facet" id="{C0C680CD-088A-49FC-A102-D699147F32B2}" vid="{0B5AB586-D108-4FC1-8368-649FE654B894}"/>
+      <thm15:themeFamily xmlns:thm15="http://schemas.microsoft.com/office/thememl/2012/main" name="Facet" id="{C0C680CD-088A-49FC-A102-D699147F32B2}" vid="{0B5AB586-D108-4FC1-8368-649FE654B894}"/>
     </a:ext>
   </a:extLst>
 </a:theme>
@@ -14518,7 +14754,7 @@
   <a:extraClrSchemeLst/>
   <a:extLst>
     <a:ext uri="{05A4C25C-085E-4340-85A3-A5531E510DB2}">
-      <thm15:themeFamily xmlns:thm15="http://schemas.microsoft.com/office/thememl/2012/main" xmlns="" name="Office Theme" id="{62F939B6-93AF-4DB8-9C6B-D6C7DFDC589F}" vid="{4A3C46E8-61CC-4603-A589-7422A47A8E4A}"/>
+      <thm15:themeFamily xmlns:thm15="http://schemas.microsoft.com/office/thememl/2012/main" name="Office Theme" id="{62F939B6-93AF-4DB8-9C6B-D6C7DFDC589F}" vid="{4A3C46E8-61CC-4603-A589-7422A47A8E4A}"/>
     </a:ext>
   </a:extLst>
 </a:theme>

</xml_diff>

<commit_message>
Changes in oral representation
</commit_message>
<xml_diff>
--- a/oral_presentation/Oral_presentation_12_02_2019.pptx
+++ b/oral_presentation/Oral_presentation_12_02_2019.pptx
@@ -5,7 +5,7 @@
     <p:sldMasterId id="2147483677" r:id="rId1"/>
   </p:sldMasterIdLst>
   <p:notesMasterIdLst>
-    <p:notesMasterId r:id="rId35"/>
+    <p:notesMasterId r:id="rId37"/>
   </p:notesMasterIdLst>
   <p:sldIdLst>
     <p:sldId id="256" r:id="rId2"/>
@@ -39,8 +39,10 @@
     <p:sldId id="286" r:id="rId30"/>
     <p:sldId id="279" r:id="rId31"/>
     <p:sldId id="287" r:id="rId32"/>
-    <p:sldId id="280" r:id="rId33"/>
-    <p:sldId id="261" r:id="rId34"/>
+    <p:sldId id="299" r:id="rId33"/>
+    <p:sldId id="300" r:id="rId34"/>
+    <p:sldId id="280" r:id="rId35"/>
+    <p:sldId id="261" r:id="rId36"/>
   </p:sldIdLst>
   <p:sldSz cx="12192000" cy="6858000"/>
   <p:notesSz cx="6858000" cy="9144000"/>
@@ -6272,7 +6274,7 @@
         </p:nvSpPr>
         <p:spPr>
           <a:xfrm>
-            <a:off x="1507066" y="2049628"/>
+            <a:off x="531706" y="1813580"/>
             <a:ext cx="7766936" cy="901894"/>
           </a:xfrm>
         </p:spPr>
@@ -6305,7 +6307,7 @@
         </p:nvSpPr>
         <p:spPr>
           <a:xfrm>
-            <a:off x="1507066" y="3171826"/>
+            <a:off x="1247826" y="2771254"/>
             <a:ext cx="7766936" cy="1096899"/>
           </a:xfrm>
         </p:spPr>
@@ -6314,14 +6316,13 @@
           <a:lstStyle/>
           <a:p>
             <a:r>
-              <a:rPr lang="fr-FR" dirty="0"/>
-              <a:t>Intégration </a:t>
-            </a:r>
-            <a:r>
-              <a:rPr lang="fr-FR"/>
-              <a:t>numérique temporelle</a:t>
-            </a:r>
-            <a:endParaRPr lang="fr-FR" dirty="0"/>
+              <a:rPr lang="fr-FR" dirty="0">
+                <a:solidFill>
+                  <a:schemeClr val="tx1"/>
+                </a:solidFill>
+              </a:rPr>
+              <a:t>Analyse de schémas numériques d’intégration temporelle pour les simulations aux grandes échelles avec des méthodes spectrales discontinues d’ordre élevé </a:t>
+            </a:r>
           </a:p>
         </p:txBody>
       </p:sp>
@@ -6369,7 +6370,7 @@
         </p:nvSpPr>
         <p:spPr>
           <a:xfrm>
-            <a:off x="1091953" y="3923934"/>
+            <a:off x="6211925" y="4068600"/>
             <a:ext cx="2689934" cy="1477328"/>
           </a:xfrm>
           <a:prstGeom prst="rect">
@@ -6384,39 +6385,88 @@
           <a:lstStyle/>
           <a:p>
             <a:r>
-              <a:rPr lang="fr-FR" dirty="0" err="1"/>
+              <a:rPr lang="fr-FR" dirty="0" err="1">
+                <a:solidFill>
+                  <a:schemeClr val="tx1">
+                    <a:lumMod val="50000"/>
+                    <a:lumOff val="50000"/>
+                  </a:schemeClr>
+                </a:solidFill>
+              </a:rPr>
               <a:t>Fourtout</a:t>
             </a:r>
             <a:r>
-              <a:rPr lang="fr-FR" dirty="0"/>
+              <a:rPr lang="fr-FR" dirty="0">
+                <a:solidFill>
+                  <a:schemeClr val="tx1">
+                    <a:lumMod val="50000"/>
+                    <a:lumOff val="50000"/>
+                  </a:schemeClr>
+                </a:solidFill>
+              </a:rPr>
               <a:t> Jean-Baptiste</a:t>
             </a:r>
           </a:p>
           <a:p>
             <a:r>
-              <a:rPr lang="fr-FR" dirty="0"/>
+              <a:rPr lang="fr-FR" dirty="0">
+                <a:solidFill>
+                  <a:schemeClr val="tx1">
+                    <a:lumMod val="50000"/>
+                    <a:lumOff val="50000"/>
+                  </a:schemeClr>
+                </a:solidFill>
+              </a:rPr>
               <a:t>Reboul Louis</a:t>
             </a:r>
           </a:p>
           <a:p>
             <a:r>
-              <a:rPr lang="fr-FR" dirty="0"/>
+              <a:rPr lang="fr-FR" dirty="0">
+                <a:solidFill>
+                  <a:schemeClr val="tx1">
+                    <a:lumMod val="50000"/>
+                    <a:lumOff val="50000"/>
+                  </a:schemeClr>
+                </a:solidFill>
+              </a:rPr>
               <a:t>Seize Pierre</a:t>
             </a:r>
           </a:p>
           <a:p>
             <a:r>
-              <a:rPr lang="fr-FR" dirty="0" err="1"/>
+              <a:rPr lang="fr-FR" dirty="0" err="1">
+                <a:solidFill>
+                  <a:schemeClr val="tx1">
+                    <a:lumMod val="50000"/>
+                    <a:lumOff val="50000"/>
+                  </a:schemeClr>
+                </a:solidFill>
+              </a:rPr>
               <a:t>Barassa</a:t>
             </a:r>
             <a:r>
-              <a:rPr lang="fr-FR" dirty="0"/>
+              <a:rPr lang="fr-FR" dirty="0">
+                <a:solidFill>
+                  <a:schemeClr val="tx1">
+                    <a:lumMod val="50000"/>
+                    <a:lumOff val="50000"/>
+                  </a:schemeClr>
+                </a:solidFill>
+              </a:rPr>
               <a:t>-Ramos Sara</a:t>
             </a:r>
           </a:p>
           <a:p>
             <a:r>
-              <a:rPr lang="fr-FR" dirty="0"/>
+              <a:rPr lang="fr-FR" dirty="0">
+                <a:solidFill>
+                  <a:schemeClr val="tx1">
+                    <a:lumMod val="50000"/>
+                    <a:lumOff val="50000"/>
+                  </a:schemeClr>
+                </a:solidFill>
+              </a:rPr>
               <a:t>Maes Théo</a:t>
             </a:r>
           </a:p>
@@ -6436,7 +6486,7 @@
         </p:nvSpPr>
         <p:spPr>
           <a:xfrm>
-            <a:off x="6573914" y="4754931"/>
+            <a:off x="1871512" y="4055633"/>
             <a:ext cx="2117324" cy="646331"/>
           </a:xfrm>
           <a:prstGeom prst="rect">
@@ -6451,17 +6501,38 @@
           <a:lstStyle/>
           <a:p>
             <a:r>
-              <a:rPr lang="fr-FR" dirty="0"/>
+              <a:rPr lang="fr-FR" dirty="0">
+                <a:solidFill>
+                  <a:schemeClr val="tx1">
+                    <a:lumMod val="50000"/>
+                    <a:lumOff val="50000"/>
+                  </a:schemeClr>
+                </a:solidFill>
+              </a:rPr>
               <a:t>Vasseur Xavier</a:t>
             </a:r>
           </a:p>
           <a:p>
             <a:r>
-              <a:rPr lang="fr-FR" dirty="0" err="1"/>
+              <a:rPr lang="fr-FR" dirty="0" err="1">
+                <a:solidFill>
+                  <a:schemeClr val="tx1">
+                    <a:lumMod val="50000"/>
+                    <a:lumOff val="50000"/>
+                  </a:schemeClr>
+                </a:solidFill>
+              </a:rPr>
               <a:t>Puigt</a:t>
             </a:r>
             <a:r>
-              <a:rPr lang="fr-FR" dirty="0"/>
+              <a:rPr lang="fr-FR" dirty="0">
+                <a:solidFill>
+                  <a:schemeClr val="tx1">
+                    <a:lumMod val="50000"/>
+                    <a:lumOff val="50000"/>
+                  </a:schemeClr>
+                </a:solidFill>
+              </a:rPr>
               <a:t> Guillaume</a:t>
             </a:r>
           </a:p>
@@ -6834,8 +6905,44 @@
         </p:blipFill>
         <p:spPr>
           <a:xfrm>
-            <a:off x="5643238" y="1634311"/>
-            <a:ext cx="6078291" cy="4310061"/>
+            <a:off x="7030805" y="1347786"/>
+            <a:ext cx="4944535" cy="3506125"/>
+          </a:xfrm>
+          <a:prstGeom prst="rect">
+            <a:avLst/>
+          </a:prstGeom>
+        </p:spPr>
+      </p:pic>
+      <p:pic>
+        <p:nvPicPr>
+          <p:cNvPr id="7" name="Image 6">
+            <a:extLst>
+              <a:ext uri="{FF2B5EF4-FFF2-40B4-BE49-F238E27FC236}">
+                <a16:creationId xmlns:a16="http://schemas.microsoft.com/office/drawing/2014/main" id="{F03758EF-6D62-4DF0-8724-2F5B284AFFD9}"/>
+              </a:ext>
+            </a:extLst>
+          </p:cNvPr>
+          <p:cNvPicPr>
+            <a:picLocks noChangeAspect="1"/>
+          </p:cNvPicPr>
+          <p:nvPr/>
+        </p:nvPicPr>
+        <p:blipFill>
+          <a:blip r:embed="rId4">
+            <a:extLst>
+              <a:ext uri="{28A0092B-C50C-407E-A947-70E740481C1C}">
+                <a14:useLocalDpi xmlns:a14="http://schemas.microsoft.com/office/drawing/2010/main" val="0"/>
+              </a:ext>
+            </a:extLst>
+          </a:blip>
+          <a:stretch>
+            <a:fillRect/>
+          </a:stretch>
+        </p:blipFill>
+        <p:spPr>
+          <a:xfrm>
+            <a:off x="914075" y="5176024"/>
+            <a:ext cx="9458325" cy="1552575"/>
           </a:xfrm>
           <a:prstGeom prst="rect">
             <a:avLst/>
@@ -8436,7 +8543,7 @@
         </p:blipFill>
         <p:spPr>
           <a:xfrm>
-            <a:off x="1288782" y="702371"/>
+            <a:off x="383477" y="451513"/>
             <a:ext cx="11425046" cy="6045693"/>
           </a:xfrm>
         </p:spPr>
@@ -8499,8 +8606,8 @@
         </p:blipFill>
         <p:spPr>
           <a:xfrm>
-            <a:off x="1288782" y="2768600"/>
-            <a:ext cx="7373772" cy="1320800"/>
+            <a:off x="1381760" y="2931160"/>
+            <a:ext cx="7550572" cy="1320800"/>
           </a:xfrm>
           <a:prstGeom prst="rect">
             <a:avLst/>
@@ -8529,9 +8636,6 @@
                     <p:cTn id="3" fill="hold">
                       <p:stCondLst>
                         <p:cond delay="indefinite"/>
-                        <p:cond evt="onBegin" delay="0">
-                          <p:tn val="2"/>
-                        </p:cond>
                       </p:stCondLst>
                       <p:childTnLst>
                         <p:par>
@@ -8541,7 +8645,7 @@
                             </p:stCondLst>
                             <p:childTnLst>
                               <p:par>
-                                <p:cTn id="5" presetID="1" presetClass="entr" presetSubtype="0" fill="hold" nodeType="withEffect">
+                                <p:cTn id="5" presetID="1" presetClass="entr" presetSubtype="0" fill="hold" nodeType="clickEffect">
                                   <p:stCondLst>
                                     <p:cond delay="0"/>
                                   </p:stCondLst>
@@ -8562,6 +8666,33 @@
                                       </p:cBhvr>
                                       <p:to>
                                         <p:strVal val="visible"/>
+                                      </p:to>
+                                    </p:set>
+                                  </p:childTnLst>
+                                </p:cTn>
+                              </p:par>
+                              <p:par>
+                                <p:cTn id="7" presetID="1" presetClass="exit" presetSubtype="0" fill="hold" nodeType="withEffect">
+                                  <p:stCondLst>
+                                    <p:cond delay="0"/>
+                                  </p:stCondLst>
+                                  <p:childTnLst>
+                                    <p:set>
+                                      <p:cBhvr>
+                                        <p:cTn id="8" dur="1" fill="hold">
+                                          <p:stCondLst>
+                                            <p:cond delay="0"/>
+                                          </p:stCondLst>
+                                        </p:cTn>
+                                        <p:tgtEl>
+                                          <p:spTgt spid="5"/>
+                                        </p:tgtEl>
+                                        <p:attrNameLst>
+                                          <p:attrName>style.visibility</p:attrName>
+                                        </p:attrNameLst>
+                                      </p:cBhvr>
+                                      <p:to>
+                                        <p:strVal val="hidden"/>
                                       </p:to>
                                     </p:set>
                                   </p:childTnLst>
@@ -8669,49 +8800,6 @@
               <a:t>Problème non linéaire </a:t>
             </a:r>
           </a:p>
-          <a:p>
-            <a:r>
-              <a:rPr lang="fr-FR" dirty="0">
-                <a:solidFill>
-                  <a:srgbClr val="FF0000"/>
-                </a:solidFill>
-              </a:rPr>
-              <a:t>Attention abscisse en t pas en x </a:t>
-            </a:r>
-          </a:p>
-          <a:p>
-            <a:r>
-              <a:rPr lang="fr-FR" dirty="0">
-                <a:solidFill>
-                  <a:srgbClr val="FF0000"/>
-                </a:solidFill>
-              </a:rPr>
-              <a:t>Montrer les différence d’ordre de grandeur dans l’explication</a:t>
-            </a:r>
-          </a:p>
-          <a:p>
-            <a:pPr marL="0" indent="0">
-              <a:buNone/>
-            </a:pPr>
-            <a:endParaRPr lang="fr-FR" dirty="0">
-              <a:solidFill>
-                <a:srgbClr val="FF0000"/>
-              </a:solidFill>
-            </a:endParaRPr>
-          </a:p>
-          <a:p>
-            <a:endParaRPr lang="fr-FR" dirty="0">
-              <a:solidFill>
-                <a:srgbClr val="FF0000"/>
-              </a:solidFill>
-            </a:endParaRPr>
-          </a:p>
-          <a:p>
-            <a:pPr marL="0" indent="0">
-              <a:buNone/>
-            </a:pPr>
-            <a:endParaRPr lang="fr-FR" dirty="0"/>
-          </a:p>
         </p:txBody>
       </p:sp>
       <p:pic>
@@ -8742,8 +8830,8 @@
         </p:blipFill>
         <p:spPr>
           <a:xfrm>
-            <a:off x="7963270" y="609600"/>
-            <a:ext cx="5204090" cy="6178392"/>
+            <a:off x="754602" y="337707"/>
+            <a:ext cx="10164932" cy="6624864"/>
           </a:xfrm>
           <a:prstGeom prst="rect">
             <a:avLst/>
@@ -8808,7 +8896,7 @@
         </p:blipFill>
         <p:spPr>
           <a:xfrm>
-            <a:off x="2180566" y="4030462"/>
+            <a:off x="2765224" y="3166566"/>
             <a:ext cx="4661695" cy="1198486"/>
           </a:xfrm>
           <a:prstGeom prst="rect">
@@ -8838,9 +8926,6 @@
                     <p:cTn id="3" fill="hold">
                       <p:stCondLst>
                         <p:cond delay="indefinite"/>
-                        <p:cond evt="onBegin" delay="0">
-                          <p:tn val="2"/>
-                        </p:cond>
                       </p:stCondLst>
                       <p:childTnLst>
                         <p:par>
@@ -8850,7 +8935,7 @@
                             </p:stCondLst>
                             <p:childTnLst>
                               <p:par>
-                                <p:cTn id="5" presetID="1" presetClass="entr" presetSubtype="0" fill="hold" nodeType="withEffect">
+                                <p:cTn id="5" presetID="1" presetClass="entr" presetSubtype="0" fill="hold" nodeType="clickEffect">
                                   <p:stCondLst>
                                     <p:cond delay="0"/>
                                   </p:stCondLst>
@@ -8871,6 +8956,33 @@
                                       </p:cBhvr>
                                       <p:to>
                                         <p:strVal val="visible"/>
+                                      </p:to>
+                                    </p:set>
+                                  </p:childTnLst>
+                                </p:cTn>
+                              </p:par>
+                              <p:par>
+                                <p:cTn id="7" presetID="1" presetClass="exit" presetSubtype="0" fill="hold" nodeType="withEffect">
+                                  <p:stCondLst>
+                                    <p:cond delay="0"/>
+                                  </p:stCondLst>
+                                  <p:childTnLst>
+                                    <p:set>
+                                      <p:cBhvr>
+                                        <p:cTn id="8" dur="1" fill="hold">
+                                          <p:stCondLst>
+                                            <p:cond delay="0"/>
+                                          </p:stCondLst>
+                                        </p:cTn>
+                                        <p:tgtEl>
+                                          <p:spTgt spid="8"/>
+                                        </p:tgtEl>
+                                        <p:attrNameLst>
+                                          <p:attrName>style.visibility</p:attrName>
+                                        </p:attrNameLst>
+                                      </p:cBhvr>
+                                      <p:to>
+                                        <p:strVal val="hidden"/>
                                       </p:to>
                                     </p:set>
                                   </p:childTnLst>
@@ -9912,7 +10024,7 @@
             </a:r>
             <a:r>
               <a:rPr lang="fr-FR" dirty="0"/>
-              <a:t> Dynamics (CFD)  (Rajout image) </a:t>
+              <a:t> Dynamics (CFD)  </a:t>
             </a:r>
           </a:p>
           <a:p>
@@ -9970,6 +10082,42 @@
           </a:p>
         </p:txBody>
       </p:sp>
+      <p:pic>
+        <p:nvPicPr>
+          <p:cNvPr id="6" name="Image 5">
+            <a:extLst>
+              <a:ext uri="{FF2B5EF4-FFF2-40B4-BE49-F238E27FC236}">
+                <a16:creationId xmlns:a16="http://schemas.microsoft.com/office/drawing/2014/main" id="{CECD4CCB-CBE3-457F-8E78-FDA4CFD1A65D}"/>
+              </a:ext>
+            </a:extLst>
+          </p:cNvPr>
+          <p:cNvPicPr>
+            <a:picLocks noChangeAspect="1"/>
+          </p:cNvPicPr>
+          <p:nvPr/>
+        </p:nvPicPr>
+        <p:blipFill>
+          <a:blip r:embed="rId2">
+            <a:extLst>
+              <a:ext uri="{28A0092B-C50C-407E-A947-70E740481C1C}">
+                <a14:useLocalDpi xmlns:a14="http://schemas.microsoft.com/office/drawing/2010/main" val="0"/>
+              </a:ext>
+            </a:extLst>
+          </a:blip>
+          <a:stretch>
+            <a:fillRect/>
+          </a:stretch>
+        </p:blipFill>
+        <p:spPr>
+          <a:xfrm>
+            <a:off x="5242560" y="1412240"/>
+            <a:ext cx="6522720" cy="4033520"/>
+          </a:xfrm>
+          <a:prstGeom prst="rect">
+            <a:avLst/>
+          </a:prstGeom>
+        </p:spPr>
+      </p:pic>
     </p:spTree>
     <p:extLst>
       <p:ext uri="{BB962C8B-B14F-4D97-AF65-F5344CB8AC3E}">
@@ -10513,10 +10661,10 @@
       </p:sp>
       <p:pic>
         <p:nvPicPr>
-          <p:cNvPr id="6" name="Image 5">
+          <p:cNvPr id="16" name="Image 15">
             <a:extLst>
               <a:ext uri="{FF2B5EF4-FFF2-40B4-BE49-F238E27FC236}">
-                <a16:creationId xmlns:a16="http://schemas.microsoft.com/office/drawing/2014/main" id="{B5183C93-746A-4C46-9B02-58CFBEA3F686}"/>
+                <a16:creationId xmlns:a16="http://schemas.microsoft.com/office/drawing/2014/main" id="{C602637C-27FC-4BCE-A37C-BBABE29120E6}"/>
               </a:ext>
             </a:extLst>
           </p:cNvPr>
@@ -10527,114 +10675,6 @@
         </p:nvPicPr>
         <p:blipFill>
           <a:blip r:embed="rId2">
-            <a:extLst>
-              <a:ext uri="{28A0092B-C50C-407E-A947-70E740481C1C}">
-                <a14:useLocalDpi xmlns:a14="http://schemas.microsoft.com/office/drawing/2010/main" val="0"/>
-              </a:ext>
-            </a:extLst>
-          </a:blip>
-          <a:stretch>
-            <a:fillRect/>
-          </a:stretch>
-        </p:blipFill>
-        <p:spPr>
-          <a:xfrm>
-            <a:off x="3196056" y="2140547"/>
-            <a:ext cx="3824062" cy="1845334"/>
-          </a:xfrm>
-          <a:prstGeom prst="rect">
-            <a:avLst/>
-          </a:prstGeom>
-        </p:spPr>
-      </p:pic>
-      <p:pic>
-        <p:nvPicPr>
-          <p:cNvPr id="12" name="Image 11">
-            <a:extLst>
-              <a:ext uri="{FF2B5EF4-FFF2-40B4-BE49-F238E27FC236}">
-                <a16:creationId xmlns:a16="http://schemas.microsoft.com/office/drawing/2014/main" id="{672153E4-E387-4AF2-9837-63DC90CFC9CA}"/>
-              </a:ext>
-            </a:extLst>
-          </p:cNvPr>
-          <p:cNvPicPr>
-            <a:picLocks noChangeAspect="1"/>
-          </p:cNvPicPr>
-          <p:nvPr/>
-        </p:nvPicPr>
-        <p:blipFill>
-          <a:blip r:embed="rId3">
-            <a:extLst>
-              <a:ext uri="{28A0092B-C50C-407E-A947-70E740481C1C}">
-                <a14:useLocalDpi xmlns:a14="http://schemas.microsoft.com/office/drawing/2010/main" val="0"/>
-              </a:ext>
-            </a:extLst>
-          </a:blip>
-          <a:stretch>
-            <a:fillRect/>
-          </a:stretch>
-        </p:blipFill>
-        <p:spPr>
-          <a:xfrm>
-            <a:off x="1204820" y="5492891"/>
-            <a:ext cx="3147942" cy="664566"/>
-          </a:xfrm>
-          <a:prstGeom prst="rect">
-            <a:avLst/>
-          </a:prstGeom>
-        </p:spPr>
-      </p:pic>
-      <p:pic>
-        <p:nvPicPr>
-          <p:cNvPr id="14" name="Image 13">
-            <a:extLst>
-              <a:ext uri="{FF2B5EF4-FFF2-40B4-BE49-F238E27FC236}">
-                <a16:creationId xmlns:a16="http://schemas.microsoft.com/office/drawing/2014/main" id="{F996795C-B4FE-40C1-8F26-37FBEA9FB629}"/>
-              </a:ext>
-            </a:extLst>
-          </p:cNvPr>
-          <p:cNvPicPr>
-            <a:picLocks noChangeAspect="1"/>
-          </p:cNvPicPr>
-          <p:nvPr/>
-        </p:nvPicPr>
-        <p:blipFill>
-          <a:blip r:embed="rId4">
-            <a:extLst>
-              <a:ext uri="{28A0092B-C50C-407E-A947-70E740481C1C}">
-                <a14:useLocalDpi xmlns:a14="http://schemas.microsoft.com/office/drawing/2010/main" val="0"/>
-              </a:ext>
-            </a:extLst>
-          </a:blip>
-          <a:stretch>
-            <a:fillRect/>
-          </a:stretch>
-        </p:blipFill>
-        <p:spPr>
-          <a:xfrm>
-            <a:off x="901510" y="4658527"/>
-            <a:ext cx="3754562" cy="486082"/>
-          </a:xfrm>
-          <a:prstGeom prst="rect">
-            <a:avLst/>
-          </a:prstGeom>
-        </p:spPr>
-      </p:pic>
-      <p:pic>
-        <p:nvPicPr>
-          <p:cNvPr id="16" name="Image 15">
-            <a:extLst>
-              <a:ext uri="{FF2B5EF4-FFF2-40B4-BE49-F238E27FC236}">
-                <a16:creationId xmlns:a16="http://schemas.microsoft.com/office/drawing/2014/main" id="{C602637C-27FC-4BCE-A37C-BBABE29120E6}"/>
-              </a:ext>
-            </a:extLst>
-          </p:cNvPr>
-          <p:cNvPicPr>
-            <a:picLocks noChangeAspect="1"/>
-          </p:cNvPicPr>
-          <p:nvPr/>
-        </p:nvPicPr>
-        <p:blipFill>
-          <a:blip r:embed="rId5">
             <a:extLst>
               <a:ext uri="{28A0092B-C50C-407E-A947-70E740481C1C}">
                 <a14:useLocalDpi xmlns:a14="http://schemas.microsoft.com/office/drawing/2010/main" val="0"/>
@@ -10747,6 +10787,114 @@
           </a:p>
         </p:txBody>
       </p:sp>
+      <p:pic>
+        <p:nvPicPr>
+          <p:cNvPr id="7" name="Image 6">
+            <a:extLst>
+              <a:ext uri="{FF2B5EF4-FFF2-40B4-BE49-F238E27FC236}">
+                <a16:creationId xmlns:a16="http://schemas.microsoft.com/office/drawing/2014/main" id="{680F4DC7-64CD-46A1-8447-684823B8E0BD}"/>
+              </a:ext>
+            </a:extLst>
+          </p:cNvPr>
+          <p:cNvPicPr>
+            <a:picLocks noChangeAspect="1"/>
+          </p:cNvPicPr>
+          <p:nvPr/>
+        </p:nvPicPr>
+        <p:blipFill>
+          <a:blip r:embed="rId3">
+            <a:extLst>
+              <a:ext uri="{28A0092B-C50C-407E-A947-70E740481C1C}">
+                <a14:useLocalDpi xmlns:a14="http://schemas.microsoft.com/office/drawing/2010/main" val="0"/>
+              </a:ext>
+            </a:extLst>
+          </a:blip>
+          <a:stretch>
+            <a:fillRect/>
+          </a:stretch>
+        </p:blipFill>
+        <p:spPr>
+          <a:xfrm>
+            <a:off x="1115637" y="5497875"/>
+            <a:ext cx="3525128" cy="744195"/>
+          </a:xfrm>
+          <a:prstGeom prst="rect">
+            <a:avLst/>
+          </a:prstGeom>
+        </p:spPr>
+      </p:pic>
+      <p:pic>
+        <p:nvPicPr>
+          <p:cNvPr id="9" name="Image 8">
+            <a:extLst>
+              <a:ext uri="{FF2B5EF4-FFF2-40B4-BE49-F238E27FC236}">
+                <a16:creationId xmlns:a16="http://schemas.microsoft.com/office/drawing/2014/main" id="{17C21554-9642-4335-86DB-71A8EE02EA98}"/>
+              </a:ext>
+            </a:extLst>
+          </p:cNvPr>
+          <p:cNvPicPr>
+            <a:picLocks noChangeAspect="1"/>
+          </p:cNvPicPr>
+          <p:nvPr/>
+        </p:nvPicPr>
+        <p:blipFill>
+          <a:blip r:embed="rId4">
+            <a:extLst>
+              <a:ext uri="{28A0092B-C50C-407E-A947-70E740481C1C}">
+                <a14:useLocalDpi xmlns:a14="http://schemas.microsoft.com/office/drawing/2010/main" val="0"/>
+              </a:ext>
+            </a:extLst>
+          </a:blip>
+          <a:stretch>
+            <a:fillRect/>
+          </a:stretch>
+        </p:blipFill>
+        <p:spPr>
+          <a:xfrm>
+            <a:off x="700865" y="4533808"/>
+            <a:ext cx="4066096" cy="526414"/>
+          </a:xfrm>
+          <a:prstGeom prst="rect">
+            <a:avLst/>
+          </a:prstGeom>
+        </p:spPr>
+      </p:pic>
+      <p:pic>
+        <p:nvPicPr>
+          <p:cNvPr id="11" name="Image 10">
+            <a:extLst>
+              <a:ext uri="{FF2B5EF4-FFF2-40B4-BE49-F238E27FC236}">
+                <a16:creationId xmlns:a16="http://schemas.microsoft.com/office/drawing/2014/main" id="{DC4FFB81-90E3-4059-99B8-9B9B46C65075}"/>
+              </a:ext>
+            </a:extLst>
+          </p:cNvPr>
+          <p:cNvPicPr>
+            <a:picLocks noChangeAspect="1"/>
+          </p:cNvPicPr>
+          <p:nvPr/>
+        </p:nvPicPr>
+        <p:blipFill>
+          <a:blip r:embed="rId5">
+            <a:extLst>
+              <a:ext uri="{28A0092B-C50C-407E-A947-70E740481C1C}">
+                <a14:useLocalDpi xmlns:a14="http://schemas.microsoft.com/office/drawing/2010/main" val="0"/>
+              </a:ext>
+            </a:extLst>
+          </a:blip>
+          <a:stretch>
+            <a:fillRect/>
+          </a:stretch>
+        </p:blipFill>
+        <p:spPr>
+          <a:xfrm>
+            <a:off x="2878201" y="2152545"/>
+            <a:ext cx="3854690" cy="1860112"/>
+          </a:xfrm>
+          <a:prstGeom prst="rect">
+            <a:avLst/>
+          </a:prstGeom>
+        </p:spPr>
+      </p:pic>
     </p:spTree>
     <p:extLst>
       <p:ext uri="{BB962C8B-B14F-4D97-AF65-F5344CB8AC3E}">
@@ -10902,10 +11050,10 @@
       </p:pic>
       <p:pic>
         <p:nvPicPr>
-          <p:cNvPr id="8" name="Image 7">
+          <p:cNvPr id="12" name="Image 11">
             <a:extLst>
               <a:ext uri="{FF2B5EF4-FFF2-40B4-BE49-F238E27FC236}">
-                <a16:creationId xmlns:a16="http://schemas.microsoft.com/office/drawing/2014/main" id="{D482C64B-0BAC-4B66-AEF2-FE94CF7F0F1A}"/>
+                <a16:creationId xmlns:a16="http://schemas.microsoft.com/office/drawing/2014/main" id="{AEEC3F0B-4D31-4DD3-878A-C9656E616E62}"/>
               </a:ext>
             </a:extLst>
           </p:cNvPr>
@@ -10916,78 +11064,6 @@
         </p:nvPicPr>
         <p:blipFill>
           <a:blip r:embed="rId3">
-            <a:extLst>
-              <a:ext uri="{28A0092B-C50C-407E-A947-70E740481C1C}">
-                <a14:useLocalDpi xmlns:a14="http://schemas.microsoft.com/office/drawing/2010/main" val="0"/>
-              </a:ext>
-            </a:extLst>
-          </a:blip>
-          <a:stretch>
-            <a:fillRect/>
-          </a:stretch>
-        </p:blipFill>
-        <p:spPr>
-          <a:xfrm>
-            <a:off x="5572674" y="4556143"/>
-            <a:ext cx="3536134" cy="654415"/>
-          </a:xfrm>
-          <a:prstGeom prst="rect">
-            <a:avLst/>
-          </a:prstGeom>
-        </p:spPr>
-      </p:pic>
-      <p:pic>
-        <p:nvPicPr>
-          <p:cNvPr id="10" name="Image 9">
-            <a:extLst>
-              <a:ext uri="{FF2B5EF4-FFF2-40B4-BE49-F238E27FC236}">
-                <a16:creationId xmlns:a16="http://schemas.microsoft.com/office/drawing/2014/main" id="{611AC792-52CD-4A4A-AE96-944A17FCE87F}"/>
-              </a:ext>
-            </a:extLst>
-          </p:cNvPr>
-          <p:cNvPicPr>
-            <a:picLocks noChangeAspect="1"/>
-          </p:cNvPicPr>
-          <p:nvPr/>
-        </p:nvPicPr>
-        <p:blipFill>
-          <a:blip r:embed="rId4">
-            <a:extLst>
-              <a:ext uri="{28A0092B-C50C-407E-A947-70E740481C1C}">
-                <a14:useLocalDpi xmlns:a14="http://schemas.microsoft.com/office/drawing/2010/main" val="0"/>
-              </a:ext>
-            </a:extLst>
-          </a:blip>
-          <a:stretch>
-            <a:fillRect/>
-          </a:stretch>
-        </p:blipFill>
-        <p:spPr>
-          <a:xfrm>
-            <a:off x="5434904" y="2687954"/>
-            <a:ext cx="4291690" cy="1518230"/>
-          </a:xfrm>
-          <a:prstGeom prst="rect">
-            <a:avLst/>
-          </a:prstGeom>
-        </p:spPr>
-      </p:pic>
-      <p:pic>
-        <p:nvPicPr>
-          <p:cNvPr id="12" name="Image 11">
-            <a:extLst>
-              <a:ext uri="{FF2B5EF4-FFF2-40B4-BE49-F238E27FC236}">
-                <a16:creationId xmlns:a16="http://schemas.microsoft.com/office/drawing/2014/main" id="{AEEC3F0B-4D31-4DD3-878A-C9656E616E62}"/>
-              </a:ext>
-            </a:extLst>
-          </p:cNvPr>
-          <p:cNvPicPr>
-            <a:picLocks noChangeAspect="1"/>
-          </p:cNvPicPr>
-          <p:nvPr/>
-        </p:nvPicPr>
-        <p:blipFill>
-          <a:blip r:embed="rId5">
             <a:extLst>
               <a:ext uri="{28A0092B-C50C-407E-A947-70E740481C1C}">
                 <a14:useLocalDpi xmlns:a14="http://schemas.microsoft.com/office/drawing/2010/main" val="0"/>
@@ -11054,6 +11130,78 @@
           </a:p>
         </p:txBody>
       </p:sp>
+      <p:pic>
+        <p:nvPicPr>
+          <p:cNvPr id="7" name="Image 6">
+            <a:extLst>
+              <a:ext uri="{FF2B5EF4-FFF2-40B4-BE49-F238E27FC236}">
+                <a16:creationId xmlns:a16="http://schemas.microsoft.com/office/drawing/2014/main" id="{E2F2BBA7-F736-4CAE-B346-74877946AC39}"/>
+              </a:ext>
+            </a:extLst>
+          </p:cNvPr>
+          <p:cNvPicPr>
+            <a:picLocks noChangeAspect="1"/>
+          </p:cNvPicPr>
+          <p:nvPr/>
+        </p:nvPicPr>
+        <p:blipFill>
+          <a:blip r:embed="rId4">
+            <a:extLst>
+              <a:ext uri="{28A0092B-C50C-407E-A947-70E740481C1C}">
+                <a14:useLocalDpi xmlns:a14="http://schemas.microsoft.com/office/drawing/2010/main" val="0"/>
+              </a:ext>
+            </a:extLst>
+          </a:blip>
+          <a:stretch>
+            <a:fillRect/>
+          </a:stretch>
+        </p:blipFill>
+        <p:spPr>
+          <a:xfrm>
+            <a:off x="5572674" y="2605298"/>
+            <a:ext cx="4113858" cy="1434042"/>
+          </a:xfrm>
+          <a:prstGeom prst="rect">
+            <a:avLst/>
+          </a:prstGeom>
+        </p:spPr>
+      </p:pic>
+      <p:pic>
+        <p:nvPicPr>
+          <p:cNvPr id="11" name="Image 10">
+            <a:extLst>
+              <a:ext uri="{FF2B5EF4-FFF2-40B4-BE49-F238E27FC236}">
+                <a16:creationId xmlns:a16="http://schemas.microsoft.com/office/drawing/2014/main" id="{9D6CEC42-D9B0-42CE-B657-472A0DB23EEF}"/>
+              </a:ext>
+            </a:extLst>
+          </p:cNvPr>
+          <p:cNvPicPr>
+            <a:picLocks noChangeAspect="1"/>
+          </p:cNvPicPr>
+          <p:nvPr/>
+        </p:nvPicPr>
+        <p:blipFill>
+          <a:blip r:embed="rId5">
+            <a:extLst>
+              <a:ext uri="{28A0092B-C50C-407E-A947-70E740481C1C}">
+                <a14:useLocalDpi xmlns:a14="http://schemas.microsoft.com/office/drawing/2010/main" val="0"/>
+              </a:ext>
+            </a:extLst>
+          </a:blip>
+          <a:stretch>
+            <a:fillRect/>
+          </a:stretch>
+        </p:blipFill>
+        <p:spPr>
+          <a:xfrm>
+            <a:off x="5797204" y="4269529"/>
+            <a:ext cx="3664798" cy="678226"/>
+          </a:xfrm>
+          <a:prstGeom prst="rect">
+            <a:avLst/>
+          </a:prstGeom>
+        </p:spPr>
+      </p:pic>
     </p:spTree>
     <p:extLst>
       <p:ext uri="{BB962C8B-B14F-4D97-AF65-F5344CB8AC3E}">
@@ -14079,7 +14227,7 @@
           <p:cNvPr id="2" name="Titre 1">
             <a:extLst>
               <a:ext uri="{FF2B5EF4-FFF2-40B4-BE49-F238E27FC236}">
-                <a16:creationId xmlns:a16="http://schemas.microsoft.com/office/drawing/2014/main" id="{8B8AA958-7EF5-4EB0-806C-74836A2B60F3}"/>
+                <a16:creationId xmlns:a16="http://schemas.microsoft.com/office/drawing/2014/main" id="{BFF0AD97-191D-4FAA-9C4E-653C5ACDDAD8}"/>
               </a:ext>
             </a:extLst>
           </p:cNvPr>
@@ -14090,184 +14238,30 @@
             <p:ph type="title"/>
           </p:nvPr>
         </p:nvSpPr>
-        <p:spPr/>
+        <p:spPr>
+          <a:xfrm>
+            <a:off x="677334" y="609600"/>
+            <a:ext cx="8596668" cy="846338"/>
+          </a:xfrm>
+        </p:spPr>
         <p:txBody>
           <a:bodyPr/>
           <a:lstStyle/>
           <a:p>
+            <a:pPr algn="ctr"/>
             <a:r>
               <a:rPr lang="fr-FR" dirty="0"/>
-              <a:t>IV – Méthodes numériques exponentielles</a:t>
-            </a:r>
-          </a:p>
-        </p:txBody>
-      </p:sp>
-      <p:sp>
-        <p:nvSpPr>
-          <p:cNvPr id="3" name="Espace réservé du texte 2">
+              <a:t>Différences Finies et Spectrales</a:t>
+            </a:r>
+          </a:p>
+        </p:txBody>
+      </p:sp>
+      <p:sp>
+        <p:nvSpPr>
+          <p:cNvPr id="4" name="Espace réservé du numéro de diapositive 3">
             <a:extLst>
               <a:ext uri="{FF2B5EF4-FFF2-40B4-BE49-F238E27FC236}">
-                <a16:creationId xmlns:a16="http://schemas.microsoft.com/office/drawing/2014/main" id="{7478EE0A-709D-4E6A-9A69-97A1C1F54D87}"/>
-              </a:ext>
-            </a:extLst>
-          </p:cNvPr>
-          <p:cNvSpPr>
-            <a:spLocks noGrp="1"/>
-          </p:cNvSpPr>
-          <p:nvPr>
-            <p:ph type="body" idx="1"/>
-          </p:nvPr>
-        </p:nvSpPr>
-        <p:spPr/>
-        <p:txBody>
-          <a:bodyPr/>
-          <a:lstStyle/>
-          <a:p>
-            <a:r>
-              <a:rPr lang="fr-FR" dirty="0"/>
-              <a:t>Méthodes usuelles</a:t>
-            </a:r>
-          </a:p>
-        </p:txBody>
-      </p:sp>
-      <p:sp>
-        <p:nvSpPr>
-          <p:cNvPr id="4" name="Espace réservé du contenu 3">
-            <a:extLst>
-              <a:ext uri="{FF2B5EF4-FFF2-40B4-BE49-F238E27FC236}">
-                <a16:creationId xmlns:a16="http://schemas.microsoft.com/office/drawing/2014/main" id="{E2AB1664-5A63-444A-BC52-5D2B293703CE}"/>
-              </a:ext>
-            </a:extLst>
-          </p:cNvPr>
-          <p:cNvSpPr>
-            <a:spLocks noGrp="1"/>
-          </p:cNvSpPr>
-          <p:nvPr>
-            <p:ph sz="half" idx="2"/>
-          </p:nvPr>
-        </p:nvSpPr>
-        <p:spPr/>
-        <p:txBody>
-          <a:bodyPr/>
-          <a:lstStyle/>
-          <a:p>
-            <a:r>
-              <a:rPr lang="fr-FR" dirty="0"/>
-              <a:t>Conditionnellement stable </a:t>
-            </a:r>
-          </a:p>
-          <a:p>
-            <a:endParaRPr lang="fr-FR" dirty="0"/>
-          </a:p>
-          <a:p>
-            <a:r>
-              <a:rPr lang="fr-FR" dirty="0"/>
-              <a:t>Erreurs dues aux schémas numériques</a:t>
-            </a:r>
-          </a:p>
-          <a:p>
-            <a:endParaRPr lang="fr-FR" dirty="0"/>
-          </a:p>
-          <a:p>
-            <a:r>
-              <a:rPr lang="fr-FR" dirty="0"/>
-              <a:t>Condition CFL à respecter (pas de temps</a:t>
-            </a:r>
-          </a:p>
-          <a:p>
-            <a:endParaRPr lang="fr-FR" dirty="0"/>
-          </a:p>
-          <a:p>
-            <a:endParaRPr lang="fr-FR" dirty="0"/>
-          </a:p>
-        </p:txBody>
-      </p:sp>
-      <p:sp>
-        <p:nvSpPr>
-          <p:cNvPr id="5" name="Espace réservé du texte 4">
-            <a:extLst>
-              <a:ext uri="{FF2B5EF4-FFF2-40B4-BE49-F238E27FC236}">
-                <a16:creationId xmlns:a16="http://schemas.microsoft.com/office/drawing/2014/main" id="{88B3B4E8-F4B8-474F-ADF7-691CCDBA65DC}"/>
-              </a:ext>
-            </a:extLst>
-          </p:cNvPr>
-          <p:cNvSpPr>
-            <a:spLocks noGrp="1"/>
-          </p:cNvSpPr>
-          <p:nvPr>
-            <p:ph type="body" sz="quarter" idx="3"/>
-          </p:nvPr>
-        </p:nvSpPr>
-        <p:spPr/>
-        <p:txBody>
-          <a:bodyPr/>
-          <a:lstStyle/>
-          <a:p>
-            <a:r>
-              <a:rPr lang="fr-FR" dirty="0"/>
-              <a:t>Méthodes exponentielle</a:t>
-            </a:r>
-          </a:p>
-        </p:txBody>
-      </p:sp>
-      <p:sp>
-        <p:nvSpPr>
-          <p:cNvPr id="6" name="Espace réservé du contenu 5">
-            <a:extLst>
-              <a:ext uri="{FF2B5EF4-FFF2-40B4-BE49-F238E27FC236}">
-                <a16:creationId xmlns:a16="http://schemas.microsoft.com/office/drawing/2014/main" id="{7C7F8C92-21F6-4243-BC10-2A53A7E53035}"/>
-              </a:ext>
-            </a:extLst>
-          </p:cNvPr>
-          <p:cNvSpPr>
-            <a:spLocks noGrp="1"/>
-          </p:cNvSpPr>
-          <p:nvPr>
-            <p:ph sz="quarter" idx="4"/>
-          </p:nvPr>
-        </p:nvSpPr>
-        <p:spPr/>
-        <p:txBody>
-          <a:bodyPr/>
-          <a:lstStyle/>
-          <a:p>
-            <a:r>
-              <a:rPr lang="fr-FR" dirty="0"/>
-              <a:t>Grand pas de temps </a:t>
-            </a:r>
-          </a:p>
-          <a:p>
-            <a:endParaRPr lang="fr-FR" dirty="0"/>
-          </a:p>
-          <a:p>
-            <a:r>
-              <a:rPr lang="fr-FR" dirty="0"/>
-              <a:t>Aucune erreur sur des problèmes linéaire (précision machine)</a:t>
-            </a:r>
-          </a:p>
-          <a:p>
-            <a:endParaRPr lang="fr-FR" dirty="0"/>
-          </a:p>
-          <a:p>
-            <a:r>
-              <a:rPr lang="fr-FR" dirty="0"/>
-              <a:t>Inconditionnellement stable sur pb de CFD classique </a:t>
-            </a:r>
-          </a:p>
-          <a:p>
-            <a:endParaRPr lang="fr-FR" dirty="0"/>
-          </a:p>
-          <a:p>
-            <a:endParaRPr lang="fr-FR" dirty="0"/>
-          </a:p>
-        </p:txBody>
-      </p:sp>
-      <p:sp>
-        <p:nvSpPr>
-          <p:cNvPr id="8" name="Espace réservé du numéro de diapositive 7">
-            <a:extLst>
-              <a:ext uri="{FF2B5EF4-FFF2-40B4-BE49-F238E27FC236}">
-                <a16:creationId xmlns:a16="http://schemas.microsoft.com/office/drawing/2014/main" id="{D49305E3-2AE4-48AE-BADF-ECC7835468A0}"/>
+                <a16:creationId xmlns:a16="http://schemas.microsoft.com/office/drawing/2014/main" id="{C7C01062-9B67-495F-84D3-728A28393148}"/>
               </a:ext>
             </a:extLst>
           </p:cNvPr>
@@ -14292,16 +14286,187 @@
           </a:p>
         </p:txBody>
       </p:sp>
+      <p:pic>
+        <p:nvPicPr>
+          <p:cNvPr id="17" name="conv_diff_fd_vs_sd">
+            <a:hlinkClick r:id="" action="ppaction://media"/>
+            <a:extLst>
+              <a:ext uri="{FF2B5EF4-FFF2-40B4-BE49-F238E27FC236}">
+                <a16:creationId xmlns:a16="http://schemas.microsoft.com/office/drawing/2014/main" id="{C77BE691-9EB9-48C3-B5F9-0593C1D30D3A}"/>
+              </a:ext>
+            </a:extLst>
+          </p:cNvPr>
+          <p:cNvPicPr>
+            <a:picLocks noGrp="1" noChangeAspect="1"/>
+          </p:cNvPicPr>
+          <p:nvPr>
+            <p:ph idx="1"/>
+            <a:videoFile r:link="rId2"/>
+            <p:extLst>
+              <p:ext uri="{DAA4B4D4-6D71-4841-9C94-3DE7FCFB9230}">
+                <p14:media xmlns:p14="http://schemas.microsoft.com/office/powerpoint/2010/main" r:embed="rId1"/>
+              </p:ext>
+            </p:extLst>
+          </p:nvPr>
+        </p:nvPicPr>
+        <p:blipFill>
+          <a:blip r:embed="rId4"/>
+          <a:stretch>
+            <a:fillRect/>
+          </a:stretch>
+        </p:blipFill>
+        <p:spPr>
+          <a:xfrm>
+            <a:off x="1120989" y="1358284"/>
+            <a:ext cx="7811343" cy="4470677"/>
+          </a:xfrm>
+        </p:spPr>
+      </p:pic>
     </p:spTree>
     <p:extLst>
       <p:ext uri="{BB962C8B-B14F-4D97-AF65-F5344CB8AC3E}">
-        <p14:creationId xmlns:p14="http://schemas.microsoft.com/office/powerpoint/2010/main" val="860307842"/>
+        <p14:creationId xmlns:p14="http://schemas.microsoft.com/office/powerpoint/2010/main" val="2439367901"/>
       </p:ext>
     </p:extLst>
   </p:cSld>
   <p:clrMapOvr>
     <a:masterClrMapping/>
   </p:clrMapOvr>
+  <p:timing>
+    <p:tnLst>
+      <p:par>
+        <p:cTn id="1" dur="indefinite" restart="never" nodeType="tmRoot">
+          <p:childTnLst>
+            <p:seq concurrent="1" nextAc="seek">
+              <p:cTn id="2" dur="indefinite" nodeType="mainSeq">
+                <p:childTnLst>
+                  <p:par>
+                    <p:cTn id="3" fill="hold">
+                      <p:stCondLst>
+                        <p:cond delay="indefinite"/>
+                      </p:stCondLst>
+                      <p:childTnLst>
+                        <p:par>
+                          <p:cTn id="4" fill="hold">
+                            <p:stCondLst>
+                              <p:cond delay="0"/>
+                            </p:stCondLst>
+                            <p:childTnLst>
+                              <p:par>
+                                <p:cTn id="5" presetID="1" presetClass="mediacall" presetSubtype="0" fill="hold" nodeType="clickEffect">
+                                  <p:stCondLst>
+                                    <p:cond delay="0"/>
+                                  </p:stCondLst>
+                                  <p:childTnLst>
+                                    <p:cmd type="call" cmd="playFrom(0.0)">
+                                      <p:cBhvr>
+                                        <p:cTn id="6" dur="7191" fill="hold"/>
+                                        <p:tgtEl>
+                                          <p:spTgt spid="17"/>
+                                        </p:tgtEl>
+                                      </p:cBhvr>
+                                    </p:cmd>
+                                  </p:childTnLst>
+                                </p:cTn>
+                              </p:par>
+                            </p:childTnLst>
+                          </p:cTn>
+                        </p:par>
+                      </p:childTnLst>
+                    </p:cTn>
+                  </p:par>
+                </p:childTnLst>
+              </p:cTn>
+              <p:prevCondLst>
+                <p:cond evt="onPrev" delay="0">
+                  <p:tgtEl>
+                    <p:sldTgt/>
+                  </p:tgtEl>
+                </p:cond>
+              </p:prevCondLst>
+              <p:nextCondLst>
+                <p:cond evt="onNext" delay="0">
+                  <p:tgtEl>
+                    <p:sldTgt/>
+                  </p:tgtEl>
+                </p:cond>
+              </p:nextCondLst>
+            </p:seq>
+            <p:video fullScrn="1">
+              <p:cMediaNode vol="80000">
+                <p:cTn id="7" repeatCount="indefinite" fill="hold" display="0">
+                  <p:stCondLst>
+                    <p:cond delay="indefinite"/>
+                  </p:stCondLst>
+                </p:cTn>
+                <p:tgtEl>
+                  <p:spTgt spid="17"/>
+                </p:tgtEl>
+              </p:cMediaNode>
+            </p:video>
+            <p:seq concurrent="1" nextAc="seek">
+              <p:cTn id="8" restart="whenNotActive" fill="hold" evtFilter="cancelBubble" nodeType="interactiveSeq">
+                <p:stCondLst>
+                  <p:cond evt="onClick" delay="0">
+                    <p:tgtEl>
+                      <p:spTgt spid="17"/>
+                    </p:tgtEl>
+                  </p:cond>
+                </p:stCondLst>
+                <p:endSync evt="end" delay="0">
+                  <p:rtn val="all"/>
+                </p:endSync>
+                <p:childTnLst>
+                  <p:par>
+                    <p:cTn id="9" fill="hold">
+                      <p:stCondLst>
+                        <p:cond delay="0"/>
+                      </p:stCondLst>
+                      <p:childTnLst>
+                        <p:par>
+                          <p:cTn id="10" fill="hold">
+                            <p:stCondLst>
+                              <p:cond delay="0"/>
+                            </p:stCondLst>
+                            <p:childTnLst>
+                              <p:par>
+                                <p:cTn id="11" presetID="2" presetClass="mediacall" presetSubtype="0" fill="hold" nodeType="clickEffect">
+                                  <p:stCondLst>
+                                    <p:cond delay="0"/>
+                                  </p:stCondLst>
+                                  <p:childTnLst>
+                                    <p:cmd type="call" cmd="togglePause">
+                                      <p:cBhvr>
+                                        <p:cTn id="12" dur="1" fill="hold"/>
+                                        <p:tgtEl>
+                                          <p:spTgt spid="17"/>
+                                        </p:tgtEl>
+                                      </p:cBhvr>
+                                    </p:cmd>
+                                  </p:childTnLst>
+                                </p:cTn>
+                              </p:par>
+                            </p:childTnLst>
+                          </p:cTn>
+                        </p:par>
+                      </p:childTnLst>
+                    </p:cTn>
+                  </p:par>
+                </p:childTnLst>
+              </p:cTn>
+              <p:nextCondLst>
+                <p:cond evt="onClick" delay="0">
+                  <p:tgtEl>
+                    <p:spTgt spid="17"/>
+                  </p:tgtEl>
+                </p:cond>
+              </p:nextCondLst>
+            </p:seq>
+          </p:childTnLst>
+        </p:cTn>
+      </p:par>
+    </p:tnLst>
+  </p:timing>
 </p:sld>
 </file>
 
@@ -14327,6 +14492,514 @@
           <p:cNvPr id="2" name="Titre 1">
             <a:extLst>
               <a:ext uri="{FF2B5EF4-FFF2-40B4-BE49-F238E27FC236}">
+                <a16:creationId xmlns:a16="http://schemas.microsoft.com/office/drawing/2014/main" id="{30A77B80-F2B7-49E6-AD89-AA5B001EAAA3}"/>
+              </a:ext>
+            </a:extLst>
+          </p:cNvPr>
+          <p:cNvSpPr>
+            <a:spLocks noGrp="1"/>
+          </p:cNvSpPr>
+          <p:nvPr>
+            <p:ph type="title"/>
+          </p:nvPr>
+        </p:nvSpPr>
+        <p:spPr/>
+        <p:txBody>
+          <a:bodyPr/>
+          <a:lstStyle/>
+          <a:p>
+            <a:pPr algn="ctr"/>
+            <a:r>
+              <a:rPr lang="fr-FR" dirty="0"/>
+              <a:t>Convection/Diffusion</a:t>
+            </a:r>
+          </a:p>
+        </p:txBody>
+      </p:sp>
+      <p:pic>
+        <p:nvPicPr>
+          <p:cNvPr id="5" name="conv_diff_rk_vs_bdf_vs_exp">
+            <a:hlinkClick r:id="" action="ppaction://media"/>
+            <a:extLst>
+              <a:ext uri="{FF2B5EF4-FFF2-40B4-BE49-F238E27FC236}">
+                <a16:creationId xmlns:a16="http://schemas.microsoft.com/office/drawing/2014/main" id="{EB25B0AD-8AC2-4A0B-94B0-9A2D69135CF2}"/>
+              </a:ext>
+            </a:extLst>
+          </p:cNvPr>
+          <p:cNvPicPr>
+            <a:picLocks noGrp="1" noChangeAspect="1"/>
+          </p:cNvPicPr>
+          <p:nvPr>
+            <p:ph idx="1"/>
+            <a:videoFile r:link="rId2"/>
+            <p:extLst>
+              <p:ext uri="{DAA4B4D4-6D71-4841-9C94-3DE7FCFB9230}">
+                <p14:media xmlns:p14="http://schemas.microsoft.com/office/powerpoint/2010/main" r:embed="rId1"/>
+              </p:ext>
+            </p:extLst>
+          </p:nvPr>
+        </p:nvPicPr>
+        <p:blipFill>
+          <a:blip r:embed="rId4"/>
+          <a:stretch>
+            <a:fillRect/>
+          </a:stretch>
+        </p:blipFill>
+        <p:spPr>
+          <a:xfrm>
+            <a:off x="1084767" y="1745502"/>
+            <a:ext cx="7505896" cy="4295860"/>
+          </a:xfrm>
+        </p:spPr>
+      </p:pic>
+      <p:sp>
+        <p:nvSpPr>
+          <p:cNvPr id="4" name="Espace réservé du numéro de diapositive 3">
+            <a:extLst>
+              <a:ext uri="{FF2B5EF4-FFF2-40B4-BE49-F238E27FC236}">
+                <a16:creationId xmlns:a16="http://schemas.microsoft.com/office/drawing/2014/main" id="{EAA640B1-3083-41B7-AF54-EBA0BD42C2EF}"/>
+              </a:ext>
+            </a:extLst>
+          </p:cNvPr>
+          <p:cNvSpPr>
+            <a:spLocks noGrp="1"/>
+          </p:cNvSpPr>
+          <p:nvPr>
+            <p:ph type="sldNum" sz="quarter" idx="12"/>
+          </p:nvPr>
+        </p:nvSpPr>
+        <p:spPr/>
+        <p:txBody>
+          <a:bodyPr/>
+          <a:lstStyle/>
+          <a:p>
+            <a:fld id="{000982F6-AAAD-4258-B115-44D8EC280712}" type="slidenum">
+              <a:rPr lang="fr-FR" smtClean="0"/>
+              <a:pPr/>
+              <a:t>33</a:t>
+            </a:fld>
+            <a:endParaRPr lang="fr-FR"/>
+          </a:p>
+        </p:txBody>
+      </p:sp>
+    </p:spTree>
+    <p:extLst>
+      <p:ext uri="{BB962C8B-B14F-4D97-AF65-F5344CB8AC3E}">
+        <p14:creationId xmlns:p14="http://schemas.microsoft.com/office/powerpoint/2010/main" val="3722318638"/>
+      </p:ext>
+    </p:extLst>
+  </p:cSld>
+  <p:clrMapOvr>
+    <a:masterClrMapping/>
+  </p:clrMapOvr>
+  <p:timing>
+    <p:tnLst>
+      <p:par>
+        <p:cTn id="1" dur="indefinite" restart="never" nodeType="tmRoot">
+          <p:childTnLst>
+            <p:seq concurrent="1" nextAc="seek">
+              <p:cTn id="2" dur="indefinite" nodeType="mainSeq">
+                <p:childTnLst>
+                  <p:par>
+                    <p:cTn id="3" fill="hold">
+                      <p:stCondLst>
+                        <p:cond delay="indefinite"/>
+                      </p:stCondLst>
+                      <p:childTnLst>
+                        <p:par>
+                          <p:cTn id="4" fill="hold">
+                            <p:stCondLst>
+                              <p:cond delay="0"/>
+                            </p:stCondLst>
+                            <p:childTnLst>
+                              <p:par>
+                                <p:cTn id="5" presetID="1" presetClass="mediacall" presetSubtype="0" fill="hold" nodeType="clickEffect">
+                                  <p:stCondLst>
+                                    <p:cond delay="0"/>
+                                  </p:stCondLst>
+                                  <p:childTnLst>
+                                    <p:cmd type="call" cmd="playFrom(0.0)">
+                                      <p:cBhvr>
+                                        <p:cTn id="6" dur="8374" fill="hold"/>
+                                        <p:tgtEl>
+                                          <p:spTgt spid="5"/>
+                                        </p:tgtEl>
+                                      </p:cBhvr>
+                                    </p:cmd>
+                                  </p:childTnLst>
+                                </p:cTn>
+                              </p:par>
+                            </p:childTnLst>
+                          </p:cTn>
+                        </p:par>
+                      </p:childTnLst>
+                    </p:cTn>
+                  </p:par>
+                </p:childTnLst>
+              </p:cTn>
+              <p:prevCondLst>
+                <p:cond evt="onPrev" delay="0">
+                  <p:tgtEl>
+                    <p:sldTgt/>
+                  </p:tgtEl>
+                </p:cond>
+              </p:prevCondLst>
+              <p:nextCondLst>
+                <p:cond evt="onNext" delay="0">
+                  <p:tgtEl>
+                    <p:sldTgt/>
+                  </p:tgtEl>
+                </p:cond>
+              </p:nextCondLst>
+            </p:seq>
+            <p:video fullScrn="1">
+              <p:cMediaNode vol="80000">
+                <p:cTn id="7" repeatCount="indefinite" fill="hold" display="0">
+                  <p:stCondLst>
+                    <p:cond delay="indefinite"/>
+                  </p:stCondLst>
+                </p:cTn>
+                <p:tgtEl>
+                  <p:spTgt spid="5"/>
+                </p:tgtEl>
+              </p:cMediaNode>
+            </p:video>
+            <p:seq concurrent="1" nextAc="seek">
+              <p:cTn id="8" restart="whenNotActive" fill="hold" evtFilter="cancelBubble" nodeType="interactiveSeq">
+                <p:stCondLst>
+                  <p:cond evt="onClick" delay="0">
+                    <p:tgtEl>
+                      <p:spTgt spid="5"/>
+                    </p:tgtEl>
+                  </p:cond>
+                </p:stCondLst>
+                <p:endSync evt="end" delay="0">
+                  <p:rtn val="all"/>
+                </p:endSync>
+                <p:childTnLst>
+                  <p:par>
+                    <p:cTn id="9" fill="hold">
+                      <p:stCondLst>
+                        <p:cond delay="0"/>
+                      </p:stCondLst>
+                      <p:childTnLst>
+                        <p:par>
+                          <p:cTn id="10" fill="hold">
+                            <p:stCondLst>
+                              <p:cond delay="0"/>
+                            </p:stCondLst>
+                            <p:childTnLst>
+                              <p:par>
+                                <p:cTn id="11" presetID="2" presetClass="mediacall" presetSubtype="0" fill="hold" nodeType="clickEffect">
+                                  <p:stCondLst>
+                                    <p:cond delay="0"/>
+                                  </p:stCondLst>
+                                  <p:childTnLst>
+                                    <p:cmd type="call" cmd="togglePause">
+                                      <p:cBhvr>
+                                        <p:cTn id="12" dur="1" fill="hold"/>
+                                        <p:tgtEl>
+                                          <p:spTgt spid="5"/>
+                                        </p:tgtEl>
+                                      </p:cBhvr>
+                                    </p:cmd>
+                                  </p:childTnLst>
+                                </p:cTn>
+                              </p:par>
+                            </p:childTnLst>
+                          </p:cTn>
+                        </p:par>
+                      </p:childTnLst>
+                    </p:cTn>
+                  </p:par>
+                </p:childTnLst>
+              </p:cTn>
+              <p:nextCondLst>
+                <p:cond evt="onClick" delay="0">
+                  <p:tgtEl>
+                    <p:spTgt spid="5"/>
+                  </p:tgtEl>
+                </p:cond>
+              </p:nextCondLst>
+            </p:seq>
+          </p:childTnLst>
+        </p:cTn>
+      </p:par>
+    </p:tnLst>
+  </p:timing>
+</p:sld>
+</file>
+
+<file path=ppt/slides/slide34.xml><?xml version="1.0" encoding="utf-8"?>
+<p:sld xmlns:a="http://schemas.openxmlformats.org/drawingml/2006/main" xmlns:r="http://schemas.openxmlformats.org/officeDocument/2006/relationships" xmlns:p="http://schemas.openxmlformats.org/presentationml/2006/main">
+  <p:cSld>
+    <p:spTree>
+      <p:nvGrpSpPr>
+        <p:cNvPr id="1" name=""/>
+        <p:cNvGrpSpPr/>
+        <p:nvPr/>
+      </p:nvGrpSpPr>
+      <p:grpSpPr>
+        <a:xfrm>
+          <a:off x="0" y="0"/>
+          <a:ext cx="0" cy="0"/>
+          <a:chOff x="0" y="0"/>
+          <a:chExt cx="0" cy="0"/>
+        </a:xfrm>
+      </p:grpSpPr>
+      <p:sp>
+        <p:nvSpPr>
+          <p:cNvPr id="2" name="Titre 1">
+            <a:extLst>
+              <a:ext uri="{FF2B5EF4-FFF2-40B4-BE49-F238E27FC236}">
+                <a16:creationId xmlns:a16="http://schemas.microsoft.com/office/drawing/2014/main" id="{8B8AA958-7EF5-4EB0-806C-74836A2B60F3}"/>
+              </a:ext>
+            </a:extLst>
+          </p:cNvPr>
+          <p:cNvSpPr>
+            <a:spLocks noGrp="1"/>
+          </p:cNvSpPr>
+          <p:nvPr>
+            <p:ph type="title"/>
+          </p:nvPr>
+        </p:nvSpPr>
+        <p:spPr/>
+        <p:txBody>
+          <a:bodyPr/>
+          <a:lstStyle/>
+          <a:p>
+            <a:r>
+              <a:rPr lang="fr-FR" dirty="0"/>
+              <a:t>IV – Méthodes numériques exponentielles</a:t>
+            </a:r>
+          </a:p>
+        </p:txBody>
+      </p:sp>
+      <p:sp>
+        <p:nvSpPr>
+          <p:cNvPr id="3" name="Espace réservé du texte 2">
+            <a:extLst>
+              <a:ext uri="{FF2B5EF4-FFF2-40B4-BE49-F238E27FC236}">
+                <a16:creationId xmlns:a16="http://schemas.microsoft.com/office/drawing/2014/main" id="{7478EE0A-709D-4E6A-9A69-97A1C1F54D87}"/>
+              </a:ext>
+            </a:extLst>
+          </p:cNvPr>
+          <p:cNvSpPr>
+            <a:spLocks noGrp="1"/>
+          </p:cNvSpPr>
+          <p:nvPr>
+            <p:ph type="body" idx="1"/>
+          </p:nvPr>
+        </p:nvSpPr>
+        <p:spPr/>
+        <p:txBody>
+          <a:bodyPr/>
+          <a:lstStyle/>
+          <a:p>
+            <a:r>
+              <a:rPr lang="fr-FR" dirty="0"/>
+              <a:t>Méthodes usuelles</a:t>
+            </a:r>
+          </a:p>
+        </p:txBody>
+      </p:sp>
+      <p:sp>
+        <p:nvSpPr>
+          <p:cNvPr id="4" name="Espace réservé du contenu 3">
+            <a:extLst>
+              <a:ext uri="{FF2B5EF4-FFF2-40B4-BE49-F238E27FC236}">
+                <a16:creationId xmlns:a16="http://schemas.microsoft.com/office/drawing/2014/main" id="{E2AB1664-5A63-444A-BC52-5D2B293703CE}"/>
+              </a:ext>
+            </a:extLst>
+          </p:cNvPr>
+          <p:cNvSpPr>
+            <a:spLocks noGrp="1"/>
+          </p:cNvSpPr>
+          <p:nvPr>
+            <p:ph sz="half" idx="2"/>
+          </p:nvPr>
+        </p:nvSpPr>
+        <p:spPr/>
+        <p:txBody>
+          <a:bodyPr/>
+          <a:lstStyle/>
+          <a:p>
+            <a:r>
+              <a:rPr lang="fr-FR" dirty="0"/>
+              <a:t>Conditionnellement stable </a:t>
+            </a:r>
+          </a:p>
+          <a:p>
+            <a:endParaRPr lang="fr-FR" dirty="0"/>
+          </a:p>
+          <a:p>
+            <a:r>
+              <a:rPr lang="fr-FR" dirty="0"/>
+              <a:t>Erreurs dues aux schémas numériques</a:t>
+            </a:r>
+          </a:p>
+          <a:p>
+            <a:endParaRPr lang="fr-FR" dirty="0"/>
+          </a:p>
+          <a:p>
+            <a:r>
+              <a:rPr lang="fr-FR" dirty="0"/>
+              <a:t>Condition CFL à respecter (pas de temps</a:t>
+            </a:r>
+          </a:p>
+          <a:p>
+            <a:endParaRPr lang="fr-FR" dirty="0"/>
+          </a:p>
+          <a:p>
+            <a:endParaRPr lang="fr-FR" dirty="0"/>
+          </a:p>
+        </p:txBody>
+      </p:sp>
+      <p:sp>
+        <p:nvSpPr>
+          <p:cNvPr id="5" name="Espace réservé du texte 4">
+            <a:extLst>
+              <a:ext uri="{FF2B5EF4-FFF2-40B4-BE49-F238E27FC236}">
+                <a16:creationId xmlns:a16="http://schemas.microsoft.com/office/drawing/2014/main" id="{88B3B4E8-F4B8-474F-ADF7-691CCDBA65DC}"/>
+              </a:ext>
+            </a:extLst>
+          </p:cNvPr>
+          <p:cNvSpPr>
+            <a:spLocks noGrp="1"/>
+          </p:cNvSpPr>
+          <p:nvPr>
+            <p:ph type="body" sz="quarter" idx="3"/>
+          </p:nvPr>
+        </p:nvSpPr>
+        <p:spPr/>
+        <p:txBody>
+          <a:bodyPr/>
+          <a:lstStyle/>
+          <a:p>
+            <a:r>
+              <a:rPr lang="fr-FR" dirty="0"/>
+              <a:t>Méthodes exponentielle</a:t>
+            </a:r>
+          </a:p>
+        </p:txBody>
+      </p:sp>
+      <p:sp>
+        <p:nvSpPr>
+          <p:cNvPr id="6" name="Espace réservé du contenu 5">
+            <a:extLst>
+              <a:ext uri="{FF2B5EF4-FFF2-40B4-BE49-F238E27FC236}">
+                <a16:creationId xmlns:a16="http://schemas.microsoft.com/office/drawing/2014/main" id="{7C7F8C92-21F6-4243-BC10-2A53A7E53035}"/>
+              </a:ext>
+            </a:extLst>
+          </p:cNvPr>
+          <p:cNvSpPr>
+            <a:spLocks noGrp="1"/>
+          </p:cNvSpPr>
+          <p:nvPr>
+            <p:ph sz="quarter" idx="4"/>
+          </p:nvPr>
+        </p:nvSpPr>
+        <p:spPr/>
+        <p:txBody>
+          <a:bodyPr/>
+          <a:lstStyle/>
+          <a:p>
+            <a:r>
+              <a:rPr lang="fr-FR" dirty="0"/>
+              <a:t>Grand pas de temps </a:t>
+            </a:r>
+          </a:p>
+          <a:p>
+            <a:endParaRPr lang="fr-FR" dirty="0"/>
+          </a:p>
+          <a:p>
+            <a:r>
+              <a:rPr lang="fr-FR" dirty="0"/>
+              <a:t>Aucune erreur sur des problèmes linéaire (précision machine)</a:t>
+            </a:r>
+          </a:p>
+          <a:p>
+            <a:endParaRPr lang="fr-FR" dirty="0"/>
+          </a:p>
+          <a:p>
+            <a:r>
+              <a:rPr lang="fr-FR" dirty="0"/>
+              <a:t>Inconditionnellement stable sur pb de CFD classique </a:t>
+            </a:r>
+          </a:p>
+          <a:p>
+            <a:endParaRPr lang="fr-FR" dirty="0"/>
+          </a:p>
+          <a:p>
+            <a:endParaRPr lang="fr-FR" dirty="0"/>
+          </a:p>
+        </p:txBody>
+      </p:sp>
+      <p:sp>
+        <p:nvSpPr>
+          <p:cNvPr id="8" name="Espace réservé du numéro de diapositive 7">
+            <a:extLst>
+              <a:ext uri="{FF2B5EF4-FFF2-40B4-BE49-F238E27FC236}">
+                <a16:creationId xmlns:a16="http://schemas.microsoft.com/office/drawing/2014/main" id="{D49305E3-2AE4-48AE-BADF-ECC7835468A0}"/>
+              </a:ext>
+            </a:extLst>
+          </p:cNvPr>
+          <p:cNvSpPr>
+            <a:spLocks noGrp="1"/>
+          </p:cNvSpPr>
+          <p:nvPr>
+            <p:ph type="sldNum" sz="quarter" idx="12"/>
+          </p:nvPr>
+        </p:nvSpPr>
+        <p:spPr/>
+        <p:txBody>
+          <a:bodyPr/>
+          <a:lstStyle/>
+          <a:p>
+            <a:fld id="{000982F6-AAAD-4258-B115-44D8EC280712}" type="slidenum">
+              <a:rPr lang="fr-FR" smtClean="0"/>
+              <a:pPr/>
+              <a:t>34</a:t>
+            </a:fld>
+            <a:endParaRPr lang="fr-FR"/>
+          </a:p>
+        </p:txBody>
+      </p:sp>
+    </p:spTree>
+    <p:extLst>
+      <p:ext uri="{BB962C8B-B14F-4D97-AF65-F5344CB8AC3E}">
+        <p14:creationId xmlns:p14="http://schemas.microsoft.com/office/powerpoint/2010/main" val="860307842"/>
+      </p:ext>
+    </p:extLst>
+  </p:cSld>
+  <p:clrMapOvr>
+    <a:masterClrMapping/>
+  </p:clrMapOvr>
+</p:sld>
+</file>
+
+<file path=ppt/slides/slide35.xml><?xml version="1.0" encoding="utf-8"?>
+<p:sld xmlns:a="http://schemas.openxmlformats.org/drawingml/2006/main" xmlns:r="http://schemas.openxmlformats.org/officeDocument/2006/relationships" xmlns:p="http://schemas.openxmlformats.org/presentationml/2006/main">
+  <p:cSld>
+    <p:spTree>
+      <p:nvGrpSpPr>
+        <p:cNvPr id="1" name=""/>
+        <p:cNvGrpSpPr/>
+        <p:nvPr/>
+      </p:nvGrpSpPr>
+      <p:grpSpPr>
+        <a:xfrm>
+          <a:off x="0" y="0"/>
+          <a:ext cx="0" cy="0"/>
+          <a:chOff x="0" y="0"/>
+          <a:chExt cx="0" cy="0"/>
+        </a:xfrm>
+      </p:grpSpPr>
+      <p:sp>
+        <p:nvSpPr>
+          <p:cNvPr id="2" name="Titre 1">
+            <a:extLst>
+              <a:ext uri="{FF2B5EF4-FFF2-40B4-BE49-F238E27FC236}">
                 <a16:creationId xmlns:a16="http://schemas.microsoft.com/office/drawing/2014/main" id="{8DB6E984-1000-41D0-9BAD-8224D1D5B727}"/>
               </a:ext>
             </a:extLst>
@@ -14415,13 +15088,8 @@
             <a:pPr lvl="0"/>
             <a:r>
               <a:rPr lang="fr-FR" dirty="0"/>
-              <a:t>Ouverture sur le potentiel des espaces </a:t>
-            </a:r>
-            <a:r>
-              <a:rPr lang="fr-FR"/>
-              <a:t>de Krylov </a:t>
-            </a:r>
-            <a:endParaRPr lang="fr-FR" dirty="0"/>
+              <a:t>Ouverture sur le potentiel des espaces de Krylov </a:t>
+            </a:r>
           </a:p>
           <a:p>
             <a:pPr lvl="0"/>
@@ -14476,7 +15144,7 @@
             <a:fld id="{000982F6-AAAD-4258-B115-44D8EC280712}" type="slidenum">
               <a:rPr lang="fr-FR" smtClean="0"/>
               <a:pPr/>
-              <a:t>33</a:t>
+              <a:t>35</a:t>
             </a:fld>
             <a:endParaRPr lang="fr-FR"/>
           </a:p>

</xml_diff>

<commit_message>
Add changes in oral presentation
</commit_message>
<xml_diff>
--- a/oral_presentation/Oral_presentation_12_02_2019.pptx
+++ b/oral_presentation/Oral_presentation_12_02_2019.pptx
@@ -5,7 +5,7 @@
     <p:sldMasterId id="2147483677" r:id="rId1"/>
   </p:sldMasterIdLst>
   <p:notesMasterIdLst>
-    <p:notesMasterId r:id="rId38"/>
+    <p:notesMasterId r:id="rId37"/>
   </p:notesMasterIdLst>
   <p:sldIdLst>
     <p:sldId id="256" r:id="rId2"/>
@@ -38,12 +38,11 @@
     <p:sldId id="265" r:id="rId29"/>
     <p:sldId id="272" r:id="rId30"/>
     <p:sldId id="274" r:id="rId31"/>
-    <p:sldId id="277" r:id="rId32"/>
-    <p:sldId id="281" r:id="rId33"/>
-    <p:sldId id="300" r:id="rId34"/>
-    <p:sldId id="310" r:id="rId35"/>
-    <p:sldId id="280" r:id="rId36"/>
-    <p:sldId id="309" r:id="rId37"/>
+    <p:sldId id="281" r:id="rId32"/>
+    <p:sldId id="300" r:id="rId33"/>
+    <p:sldId id="310" r:id="rId34"/>
+    <p:sldId id="280" r:id="rId35"/>
+    <p:sldId id="309" r:id="rId36"/>
   </p:sldIdLst>
   <p:sldSz cx="12192000" cy="6858000"/>
   <p:notesSz cx="6858000" cy="9144000"/>
@@ -8764,8 +8763,8 @@
           <a:chExt cx="0" cy="0"/>
         </a:xfrm>
       </p:grpSpPr>
-      <mc:AlternateContent xmlns:mc="http://schemas.openxmlformats.org/markup-compatibility/2006">
-        <mc:Choice xmlns:a14="http://schemas.microsoft.com/office/drawing/2010/main" Requires="a14">
+      <mc:AlternateContent xmlns:mc="http://schemas.openxmlformats.org/markup-compatibility/2006" xmlns:a14="http://schemas.microsoft.com/office/drawing/2010/main">
+        <mc:Choice Requires="a14">
           <p:sp>
             <p:nvSpPr>
               <p:cNvPr id="3" name="Espace réservé du contenu 2">
@@ -9978,7 +9977,7 @@
             </p:txBody>
           </p:sp>
         </mc:Choice>
-        <mc:Fallback>
+        <mc:Fallback xmlns="">
           <p:sp>
             <p:nvSpPr>
               <p:cNvPr id="3" name="Espace réservé du contenu 2">
@@ -10460,8 +10459,8 @@
           </a:p>
         </p:txBody>
       </p:sp>
-      <mc:AlternateContent xmlns:mc="http://schemas.openxmlformats.org/markup-compatibility/2006">
-        <mc:Choice xmlns:a14="http://schemas.microsoft.com/office/drawing/2010/main" Requires="a14">
+      <mc:AlternateContent xmlns:mc="http://schemas.openxmlformats.org/markup-compatibility/2006" xmlns:a14="http://schemas.microsoft.com/office/drawing/2010/main">
+        <mc:Choice Requires="a14">
           <p:sp>
             <p:nvSpPr>
               <p:cNvPr id="3" name="Espace réservé du contenu 2">
@@ -10958,7 +10957,7 @@
             </p:txBody>
           </p:sp>
         </mc:Choice>
-        <mc:Fallback>
+        <mc:Fallback xmlns="">
           <p:sp>
             <p:nvSpPr>
               <p:cNvPr id="3" name="Espace réservé du contenu 2">
@@ -14862,24 +14861,60 @@
             <p:ph type="title"/>
           </p:nvPr>
         </p:nvSpPr>
-        <p:spPr/>
+        <p:spPr>
+          <a:xfrm>
+            <a:off x="677334" y="609600"/>
+            <a:ext cx="8596668" cy="917542"/>
+          </a:xfrm>
+        </p:spPr>
         <p:txBody>
           <a:bodyPr/>
           <a:lstStyle/>
           <a:p>
+            <a:pPr algn="ctr"/>
             <a:r>
               <a:rPr lang="fr-FR" dirty="0"/>
-              <a:t>III - Méthodes numériques temporelles usuelles </a:t>
-            </a:r>
+              <a:t>IV – Résultats  </a:t>
+            </a:r>
+          </a:p>
+        </p:txBody>
+      </p:sp>
+      <p:sp>
+        <p:nvSpPr>
+          <p:cNvPr id="4" name="Espace réservé du numéro de diapositive 3">
+            <a:extLst>
+              <a:ext uri="{FF2B5EF4-FFF2-40B4-BE49-F238E27FC236}">
+                <a16:creationId xmlns:a16="http://schemas.microsoft.com/office/drawing/2014/main" id="{CEF00673-4004-4E0E-87DB-D70CF191A438}"/>
+              </a:ext>
+            </a:extLst>
+          </p:cNvPr>
+          <p:cNvSpPr>
+            <a:spLocks noGrp="1"/>
+          </p:cNvSpPr>
+          <p:nvPr>
+            <p:ph type="sldNum" sz="quarter" idx="12"/>
+          </p:nvPr>
+        </p:nvSpPr>
+        <p:spPr/>
+        <p:txBody>
+          <a:bodyPr/>
+          <a:lstStyle/>
+          <a:p>
+            <a:fld id="{000982F6-AAAD-4258-B115-44D8EC280712}" type="slidenum">
+              <a:rPr lang="fr-FR" smtClean="0"/>
+              <a:pPr/>
+              <a:t>29</a:t>
+            </a:fld>
+            <a:endParaRPr lang="fr-FR"/>
           </a:p>
         </p:txBody>
       </p:sp>
       <p:pic>
         <p:nvPicPr>
-          <p:cNvPr id="8" name="Espace réservé du contenu 7">
+          <p:cNvPr id="9" name="Espace réservé du contenu 8">
             <a:extLst>
               <a:ext uri="{FF2B5EF4-FFF2-40B4-BE49-F238E27FC236}">
-                <a16:creationId xmlns:a16="http://schemas.microsoft.com/office/drawing/2014/main" id="{C81D1FA0-349C-4443-BC5E-69EDD607808C}"/>
+                <a16:creationId xmlns:a16="http://schemas.microsoft.com/office/drawing/2014/main" id="{C5E7BB98-048C-41ED-BE77-BE770D662E4E}"/>
               </a:ext>
             </a:extLst>
           </p:cNvPr>
@@ -14904,47 +14939,53 @@
         </p:blipFill>
         <p:spPr>
           <a:xfrm>
-            <a:off x="232557" y="609600"/>
-            <a:ext cx="11425046" cy="6045693"/>
+            <a:off x="2971640" y="2828042"/>
+            <a:ext cx="4159586" cy="1962068"/>
           </a:xfrm>
         </p:spPr>
       </p:pic>
       <p:sp>
         <p:nvSpPr>
-          <p:cNvPr id="4" name="Espace réservé du numéro de diapositive 3">
+          <p:cNvPr id="10" name="ZoneTexte 9">
             <a:extLst>
               <a:ext uri="{FF2B5EF4-FFF2-40B4-BE49-F238E27FC236}">
-                <a16:creationId xmlns:a16="http://schemas.microsoft.com/office/drawing/2014/main" id="{CEF00673-4004-4E0E-87DB-D70CF191A438}"/>
+                <a16:creationId xmlns:a16="http://schemas.microsoft.com/office/drawing/2014/main" id="{3ED12259-FDA2-476F-998B-18BCAE667999}"/>
               </a:ext>
             </a:extLst>
           </p:cNvPr>
-          <p:cNvSpPr>
-            <a:spLocks noGrp="1"/>
-          </p:cNvSpPr>
-          <p:nvPr>
-            <p:ph type="sldNum" sz="quarter" idx="12"/>
-          </p:nvPr>
-        </p:nvSpPr>
-        <p:spPr/>
-        <p:txBody>
-          <a:bodyPr/>
+          <p:cNvSpPr txBox="1"/>
+          <p:nvPr/>
+        </p:nvSpPr>
+        <p:spPr>
+          <a:xfrm>
+            <a:off x="2053358" y="5159401"/>
+            <a:ext cx="5844619" cy="369332"/>
+          </a:xfrm>
+          <a:prstGeom prst="rect">
+            <a:avLst/>
+          </a:prstGeom>
+          <a:noFill/>
+        </p:spPr>
+        <p:txBody>
+          <a:bodyPr wrap="square" rtlCol="0">
+            <a:spAutoFit/>
+          </a:bodyPr>
           <a:lstStyle/>
           <a:p>
-            <a:fld id="{000982F6-AAAD-4258-B115-44D8EC280712}" type="slidenum">
-              <a:rPr lang="fr-FR" smtClean="0"/>
-              <a:pPr/>
-              <a:t>29</a:t>
-            </a:fld>
-            <a:endParaRPr lang="fr-FR"/>
+            <a:pPr algn="ctr"/>
+            <a:r>
+              <a:rPr lang="fr-FR" dirty="0"/>
+              <a:t>La solution est la fonction cosinus</a:t>
+            </a:r>
           </a:p>
         </p:txBody>
       </p:sp>
       <p:pic>
         <p:nvPicPr>
-          <p:cNvPr id="5" name="Image 4">
+          <p:cNvPr id="12" name="Image 11">
             <a:extLst>
               <a:ext uri="{FF2B5EF4-FFF2-40B4-BE49-F238E27FC236}">
-                <a16:creationId xmlns:a16="http://schemas.microsoft.com/office/drawing/2014/main" id="{BE66CAD6-93A2-4CBA-9AF7-DDBB438942A4}"/>
+                <a16:creationId xmlns:a16="http://schemas.microsoft.com/office/drawing/2014/main" id="{0ADE1EB1-3B4C-448C-9EF2-7BA0F369B4D9}"/>
               </a:ext>
             </a:extLst>
           </p:cNvPr>
@@ -14967,8 +15008,44 @@
         </p:blipFill>
         <p:spPr>
           <a:xfrm>
-            <a:off x="1381760" y="2931160"/>
-            <a:ext cx="7550572" cy="1320800"/>
+            <a:off x="147816" y="182873"/>
+            <a:ext cx="11896368" cy="6492253"/>
+          </a:xfrm>
+          <a:prstGeom prst="rect">
+            <a:avLst/>
+          </a:prstGeom>
+        </p:spPr>
+      </p:pic>
+      <p:pic>
+        <p:nvPicPr>
+          <p:cNvPr id="14" name="Image 13">
+            <a:extLst>
+              <a:ext uri="{FF2B5EF4-FFF2-40B4-BE49-F238E27FC236}">
+                <a16:creationId xmlns:a16="http://schemas.microsoft.com/office/drawing/2014/main" id="{58885F32-C1EA-4AFA-8DA3-750A8D3D211D}"/>
+              </a:ext>
+            </a:extLst>
+          </p:cNvPr>
+          <p:cNvPicPr>
+            <a:picLocks noChangeAspect="1"/>
+          </p:cNvPicPr>
+          <p:nvPr/>
+        </p:nvPicPr>
+        <p:blipFill>
+          <a:blip r:embed="rId4">
+            <a:extLst>
+              <a:ext uri="{28A0092B-C50C-407E-A947-70E740481C1C}">
+                <a14:useLocalDpi xmlns:a14="http://schemas.microsoft.com/office/drawing/2010/main" val="0"/>
+              </a:ext>
+            </a:extLst>
+          </a:blip>
+          <a:stretch>
+            <a:fillRect/>
+          </a:stretch>
+        </p:blipFill>
+        <p:spPr>
+          <a:xfrm>
+            <a:off x="255875" y="182872"/>
+            <a:ext cx="11896368" cy="6492253"/>
           </a:xfrm>
           <a:prstGeom prst="rect">
             <a:avLst/>
@@ -15019,7 +15096,52 @@
                                           </p:stCondLst>
                                         </p:cTn>
                                         <p:tgtEl>
-                                          <p:spTgt spid="8"/>
+                                          <p:spTgt spid="12"/>
+                                        </p:tgtEl>
+                                        <p:attrNameLst>
+                                          <p:attrName>style.visibility</p:attrName>
+                                        </p:attrNameLst>
+                                      </p:cBhvr>
+                                      <p:to>
+                                        <p:strVal val="visible"/>
+                                      </p:to>
+                                    </p:set>
+                                  </p:childTnLst>
+                                </p:cTn>
+                              </p:par>
+                            </p:childTnLst>
+                          </p:cTn>
+                        </p:par>
+                      </p:childTnLst>
+                    </p:cTn>
+                  </p:par>
+                  <p:par>
+                    <p:cTn id="7" fill="hold">
+                      <p:stCondLst>
+                        <p:cond delay="indefinite"/>
+                      </p:stCondLst>
+                      <p:childTnLst>
+                        <p:par>
+                          <p:cTn id="8" fill="hold">
+                            <p:stCondLst>
+                              <p:cond delay="0"/>
+                            </p:stCondLst>
+                            <p:childTnLst>
+                              <p:par>
+                                <p:cTn id="9" presetID="1" presetClass="entr" presetSubtype="0" fill="hold" nodeType="clickEffect">
+                                  <p:stCondLst>
+                                    <p:cond delay="0"/>
+                                  </p:stCondLst>
+                                  <p:childTnLst>
+                                    <p:set>
+                                      <p:cBhvr>
+                                        <p:cTn id="10" dur="1" fill="hold">
+                                          <p:stCondLst>
+                                            <p:cond delay="0"/>
+                                          </p:stCondLst>
+                                        </p:cTn>
+                                        <p:tgtEl>
+                                          <p:spTgt spid="14"/>
                                         </p:tgtEl>
                                         <p:attrNameLst>
                                           <p:attrName>style.visibility</p:attrName>
@@ -15033,20 +15155,20 @@
                                 </p:cTn>
                               </p:par>
                               <p:par>
-                                <p:cTn id="7" presetID="1" presetClass="exit" presetSubtype="0" fill="hold" nodeType="withEffect">
+                                <p:cTn id="11" presetID="1" presetClass="exit" presetSubtype="0" fill="hold" nodeType="withEffect">
                                   <p:stCondLst>
                                     <p:cond delay="0"/>
                                   </p:stCondLst>
                                   <p:childTnLst>
                                     <p:set>
                                       <p:cBhvr>
-                                        <p:cTn id="8" dur="1" fill="hold">
+                                        <p:cTn id="12" dur="1" fill="hold">
                                           <p:stCondLst>
                                             <p:cond delay="0"/>
                                           </p:stCondLst>
                                         </p:cTn>
                                         <p:tgtEl>
-                                          <p:spTgt spid="5"/>
+                                          <p:spTgt spid="12"/>
                                         </p:tgtEl>
                                         <p:attrNameLst>
                                           <p:attrName>style.visibility</p:attrName>
@@ -15352,7 +15474,7 @@
           <a:p>
             <a:r>
               <a:rPr lang="fr-FR" dirty="0"/>
-              <a:t>III - Méthodes numériques temporelles usuelles </a:t>
+              <a:t>IV - Résultats</a:t>
             </a:r>
           </a:p>
         </p:txBody>
@@ -15375,22 +15497,54 @@
         </p:nvSpPr>
         <p:spPr/>
         <p:txBody>
+          <a:bodyPr>
+            <a:normAutofit/>
+          </a:bodyPr>
+          <a:lstStyle/>
+          <a:p>
+            <a:r>
+              <a:rPr lang="fr-FR" sz="2000" dirty="0"/>
+              <a:t>Problème raide</a:t>
+            </a:r>
+          </a:p>
+        </p:txBody>
+      </p:sp>
+      <p:sp>
+        <p:nvSpPr>
+          <p:cNvPr id="7" name="Espace réservé du numéro de diapositive 6">
+            <a:extLst>
+              <a:ext uri="{FF2B5EF4-FFF2-40B4-BE49-F238E27FC236}">
+                <a16:creationId xmlns:a16="http://schemas.microsoft.com/office/drawing/2014/main" id="{65F4A2E6-E711-495C-9A18-2BA5B95E1666}"/>
+              </a:ext>
+            </a:extLst>
+          </p:cNvPr>
+          <p:cNvSpPr>
+            <a:spLocks noGrp="1"/>
+          </p:cNvSpPr>
+          <p:nvPr>
+            <p:ph type="sldNum" sz="quarter" idx="12"/>
+          </p:nvPr>
+        </p:nvSpPr>
+        <p:spPr/>
+        <p:txBody>
           <a:bodyPr/>
           <a:lstStyle/>
           <a:p>
-            <a:r>
-              <a:rPr lang="fr-FR" dirty="0"/>
-              <a:t>Problème non linéaire </a:t>
-            </a:r>
+            <a:fld id="{000982F6-AAAD-4258-B115-44D8EC280712}" type="slidenum">
+              <a:rPr lang="fr-FR" smtClean="0"/>
+              <a:pPr/>
+              <a:t>30</a:t>
+            </a:fld>
+            <a:endParaRPr lang="fr-FR"/>
           </a:p>
         </p:txBody>
       </p:sp>
       <p:pic>
         <p:nvPicPr>
-          <p:cNvPr id="6" name="Image 5">
+          <p:cNvPr id="10" name="Image 9">
             <a:extLst>
               <a:ext uri="{FF2B5EF4-FFF2-40B4-BE49-F238E27FC236}">
-                <a16:creationId xmlns:a16="http://schemas.microsoft.com/office/drawing/2014/main" id="{EEE9FCD8-B323-492D-910B-EA0F46695B71}"/>
+                <a16:creationId xmlns:a16="http://schemas.microsoft.com/office/drawing/2014/main" id="{1261C673-7636-4A07-8206-02C82AC5BE6C}"/>
               </a:ext>
             </a:extLst>
           </p:cNvPr>
@@ -15413,50 +15567,20 @@
         </p:blipFill>
         <p:spPr>
           <a:xfrm>
-            <a:off x="754602" y="337707"/>
-            <a:ext cx="10164932" cy="6624864"/>
+            <a:off x="3171491" y="2897340"/>
+            <a:ext cx="5071360" cy="1744664"/>
           </a:xfrm>
           <a:prstGeom prst="rect">
             <a:avLst/>
           </a:prstGeom>
         </p:spPr>
       </p:pic>
-      <p:sp>
-        <p:nvSpPr>
-          <p:cNvPr id="7" name="Espace réservé du numéro de diapositive 6">
-            <a:extLst>
-              <a:ext uri="{FF2B5EF4-FFF2-40B4-BE49-F238E27FC236}">
-                <a16:creationId xmlns:a16="http://schemas.microsoft.com/office/drawing/2014/main" id="{65F4A2E6-E711-495C-9A18-2BA5B95E1666}"/>
-              </a:ext>
-            </a:extLst>
-          </p:cNvPr>
-          <p:cNvSpPr>
-            <a:spLocks noGrp="1"/>
-          </p:cNvSpPr>
-          <p:nvPr>
-            <p:ph type="sldNum" sz="quarter" idx="12"/>
-          </p:nvPr>
-        </p:nvSpPr>
-        <p:spPr/>
-        <p:txBody>
-          <a:bodyPr/>
-          <a:lstStyle/>
-          <a:p>
-            <a:fld id="{000982F6-AAAD-4258-B115-44D8EC280712}" type="slidenum">
-              <a:rPr lang="fr-FR" smtClean="0"/>
-              <a:pPr/>
-              <a:t>30</a:t>
-            </a:fld>
-            <a:endParaRPr lang="fr-FR"/>
-          </a:p>
-        </p:txBody>
-      </p:sp>
       <p:pic>
         <p:nvPicPr>
-          <p:cNvPr id="8" name="Image 7">
+          <p:cNvPr id="12" name="Image 11">
             <a:extLst>
               <a:ext uri="{FF2B5EF4-FFF2-40B4-BE49-F238E27FC236}">
-                <a16:creationId xmlns:a16="http://schemas.microsoft.com/office/drawing/2014/main" id="{1880AF47-050A-4D31-93D8-1A3676CE1AD2}"/>
+                <a16:creationId xmlns:a16="http://schemas.microsoft.com/office/drawing/2014/main" id="{B6C53598-43B0-4BA5-AAB0-387CC3EE9853}"/>
               </a:ext>
             </a:extLst>
           </p:cNvPr>
@@ -15479,8 +15603,79 @@
         </p:blipFill>
         <p:spPr>
           <a:xfrm>
-            <a:off x="2765224" y="3166566"/>
-            <a:ext cx="4661695" cy="1198486"/>
+            <a:off x="1811247" y="4991561"/>
+            <a:ext cx="7229990" cy="785652"/>
+          </a:xfrm>
+          <a:prstGeom prst="rect">
+            <a:avLst/>
+          </a:prstGeom>
+        </p:spPr>
+      </p:pic>
+      <p:sp>
+        <p:nvSpPr>
+          <p:cNvPr id="13" name="ZoneTexte 12">
+            <a:extLst>
+              <a:ext uri="{FF2B5EF4-FFF2-40B4-BE49-F238E27FC236}">
+                <a16:creationId xmlns:a16="http://schemas.microsoft.com/office/drawing/2014/main" id="{DA7625CB-4370-4B95-B209-6EF0FBB6A3BE}"/>
+              </a:ext>
+            </a:extLst>
+          </p:cNvPr>
+          <p:cNvSpPr txBox="1"/>
+          <p:nvPr/>
+        </p:nvSpPr>
+        <p:spPr>
+          <a:xfrm>
+            <a:off x="232537" y="5194089"/>
+            <a:ext cx="2720917" cy="400110"/>
+          </a:xfrm>
+          <a:prstGeom prst="rect">
+            <a:avLst/>
+          </a:prstGeom>
+          <a:noFill/>
+        </p:spPr>
+        <p:txBody>
+          <a:bodyPr wrap="square" rtlCol="0">
+            <a:spAutoFit/>
+          </a:bodyPr>
+          <a:lstStyle/>
+          <a:p>
+            <a:r>
+              <a:rPr lang="fr-FR" sz="2000" dirty="0"/>
+              <a:t>Solution : </a:t>
+            </a:r>
+          </a:p>
+        </p:txBody>
+      </p:sp>
+      <p:pic>
+        <p:nvPicPr>
+          <p:cNvPr id="15" name="Image 14">
+            <a:extLst>
+              <a:ext uri="{FF2B5EF4-FFF2-40B4-BE49-F238E27FC236}">
+                <a16:creationId xmlns:a16="http://schemas.microsoft.com/office/drawing/2014/main" id="{393BFAD6-F0A7-488D-BEE6-FAA5B309C6E0}"/>
+              </a:ext>
+            </a:extLst>
+          </p:cNvPr>
+          <p:cNvPicPr>
+            <a:picLocks noChangeAspect="1"/>
+          </p:cNvPicPr>
+          <p:nvPr/>
+        </p:nvPicPr>
+        <p:blipFill>
+          <a:blip r:embed="rId4">
+            <a:extLst>
+              <a:ext uri="{28A0092B-C50C-407E-A947-70E740481C1C}">
+                <a14:useLocalDpi xmlns:a14="http://schemas.microsoft.com/office/drawing/2010/main" val="0"/>
+              </a:ext>
+            </a:extLst>
+          </a:blip>
+          <a:stretch>
+            <a:fillRect/>
+          </a:stretch>
+        </p:blipFill>
+        <p:spPr>
+          <a:xfrm>
+            <a:off x="147816" y="182873"/>
+            <a:ext cx="11896368" cy="6492253"/>
           </a:xfrm>
           <a:prstGeom prst="rect">
             <a:avLst/>
@@ -15531,7 +15726,7 @@
                                           </p:stCondLst>
                                         </p:cTn>
                                         <p:tgtEl>
-                                          <p:spTgt spid="6"/>
+                                          <p:spTgt spid="15"/>
                                         </p:tgtEl>
                                         <p:attrNameLst>
                                           <p:attrName>style.visibility</p:attrName>
@@ -15539,33 +15734,6 @@
                                       </p:cBhvr>
                                       <p:to>
                                         <p:strVal val="visible"/>
-                                      </p:to>
-                                    </p:set>
-                                  </p:childTnLst>
-                                </p:cTn>
-                              </p:par>
-                              <p:par>
-                                <p:cTn id="7" presetID="1" presetClass="exit" presetSubtype="0" fill="hold" nodeType="withEffect">
-                                  <p:stCondLst>
-                                    <p:cond delay="0"/>
-                                  </p:stCondLst>
-                                  <p:childTnLst>
-                                    <p:set>
-                                      <p:cBhvr>
-                                        <p:cTn id="8" dur="1" fill="hold">
-                                          <p:stCondLst>
-                                            <p:cond delay="0"/>
-                                          </p:stCondLst>
-                                        </p:cTn>
-                                        <p:tgtEl>
-                                          <p:spTgt spid="8"/>
-                                        </p:tgtEl>
-                                        <p:attrNameLst>
-                                          <p:attrName>style.visibility</p:attrName>
-                                        </p:attrNameLst>
-                                      </p:cBhvr>
-                                      <p:to>
-                                        <p:strVal val="hidden"/>
                                       </p:to>
                                     </p:set>
                                   </p:childTnLst>
@@ -15624,7 +15792,7 @@
           <p:cNvPr id="2" name="Titre 1">
             <a:extLst>
               <a:ext uri="{FF2B5EF4-FFF2-40B4-BE49-F238E27FC236}">
-                <a16:creationId xmlns:a16="http://schemas.microsoft.com/office/drawing/2014/main" id="{BEAD297D-408C-4DCC-A83F-3991F010784A}"/>
+                <a16:creationId xmlns:a16="http://schemas.microsoft.com/office/drawing/2014/main" id="{A032E8A6-5CD7-447B-9FF9-CCAB7F9B3C57}"/>
               </a:ext>
             </a:extLst>
           </p:cNvPr>
@@ -15635,7 +15803,12 @@
             <p:ph type="title"/>
           </p:nvPr>
         </p:nvSpPr>
-        <p:spPr/>
+        <p:spPr>
+          <a:xfrm>
+            <a:off x="677334" y="609600"/>
+            <a:ext cx="8596668" cy="722050"/>
+          </a:xfrm>
+        </p:spPr>
         <p:txBody>
           <a:bodyPr/>
           <a:lstStyle/>
@@ -15643,17 +15816,17 @@
             <a:pPr algn="ctr"/>
             <a:r>
               <a:rPr lang="fr-FR" dirty="0"/>
-              <a:t>Résultats</a:t>
-            </a:r>
-          </a:p>
-        </p:txBody>
-      </p:sp>
-      <p:sp>
-        <p:nvSpPr>
-          <p:cNvPr id="7" name="Espace réservé du numéro de diapositive 6">
+              <a:t>IV - Résultats</a:t>
+            </a:r>
+          </a:p>
+        </p:txBody>
+      </p:sp>
+      <p:sp>
+        <p:nvSpPr>
+          <p:cNvPr id="5" name="Espace réservé du numéro de diapositive 4">
             <a:extLst>
               <a:ext uri="{FF2B5EF4-FFF2-40B4-BE49-F238E27FC236}">
-                <a16:creationId xmlns:a16="http://schemas.microsoft.com/office/drawing/2014/main" id="{B5F3ACBF-5648-4DC3-BB5F-8CC74562734A}"/>
+                <a16:creationId xmlns:a16="http://schemas.microsoft.com/office/drawing/2014/main" id="{D8B1A001-3647-4E9B-A473-0E496DC82853}"/>
               </a:ext>
             </a:extLst>
           </p:cNvPr>
@@ -15680,10 +15853,10 @@
       </p:sp>
       <p:pic>
         <p:nvPicPr>
-          <p:cNvPr id="10" name="Espace réservé du contenu 9">
+          <p:cNvPr id="9" name="Espace réservé du contenu 8">
             <a:extLst>
               <a:ext uri="{FF2B5EF4-FFF2-40B4-BE49-F238E27FC236}">
-                <a16:creationId xmlns:a16="http://schemas.microsoft.com/office/drawing/2014/main" id="{A8A60D4D-9971-4A43-9581-FFEF65A1557A}"/>
+                <a16:creationId xmlns:a16="http://schemas.microsoft.com/office/drawing/2014/main" id="{0151E7E7-719A-4588-91BD-9943A245EE71}"/>
               </a:ext>
             </a:extLst>
           </p:cNvPr>
@@ -15708,17 +15881,17 @@
         </p:blipFill>
         <p:spPr>
           <a:xfrm>
-            <a:off x="1246034" y="3384372"/>
-            <a:ext cx="7196630" cy="1203018"/>
+            <a:off x="1701160" y="2909118"/>
+            <a:ext cx="6137783" cy="1436939"/>
           </a:xfrm>
         </p:spPr>
       </p:pic>
       <p:pic>
         <p:nvPicPr>
-          <p:cNvPr id="14" name="Image 13">
+          <p:cNvPr id="4" name="Image 3">
             <a:extLst>
               <a:ext uri="{FF2B5EF4-FFF2-40B4-BE49-F238E27FC236}">
-                <a16:creationId xmlns:a16="http://schemas.microsoft.com/office/drawing/2014/main" id="{14E85D1B-2AEF-4BD8-8E60-5AEAACC0C43E}"/>
+                <a16:creationId xmlns:a16="http://schemas.microsoft.com/office/drawing/2014/main" id="{F7AD367A-132A-4FD5-B405-C369E6E00277}"/>
               </a:ext>
             </a:extLst>
           </p:cNvPr>
@@ -15741,275 +15914,8 @@
         </p:blipFill>
         <p:spPr>
           <a:xfrm>
-            <a:off x="281126" y="307767"/>
-            <a:ext cx="11789546" cy="6550233"/>
-          </a:xfrm>
-          <a:prstGeom prst="rect">
-            <a:avLst/>
-          </a:prstGeom>
-        </p:spPr>
-      </p:pic>
-    </p:spTree>
-    <p:extLst>
-      <p:ext uri="{BB962C8B-B14F-4D97-AF65-F5344CB8AC3E}">
-        <p14:creationId xmlns:p14="http://schemas.microsoft.com/office/powerpoint/2010/main" val="883981461"/>
-      </p:ext>
-    </p:extLst>
-  </p:cSld>
-  <p:clrMapOvr>
-    <a:masterClrMapping/>
-  </p:clrMapOvr>
-  <p:timing>
-    <p:tnLst>
-      <p:par>
-        <p:cTn id="1" dur="indefinite" restart="never" nodeType="tmRoot">
-          <p:childTnLst>
-            <p:seq concurrent="1" nextAc="seek">
-              <p:cTn id="2" dur="indefinite" nodeType="mainSeq">
-                <p:childTnLst>
-                  <p:par>
-                    <p:cTn id="3" fill="hold">
-                      <p:stCondLst>
-                        <p:cond delay="indefinite"/>
-                      </p:stCondLst>
-                      <p:childTnLst>
-                        <p:par>
-                          <p:cTn id="4" fill="hold">
-                            <p:stCondLst>
-                              <p:cond delay="0"/>
-                            </p:stCondLst>
-                            <p:childTnLst>
-                              <p:par>
-                                <p:cTn id="5" presetID="1" presetClass="entr" presetSubtype="0" fill="hold" nodeType="clickEffect">
-                                  <p:stCondLst>
-                                    <p:cond delay="0"/>
-                                  </p:stCondLst>
-                                  <p:childTnLst>
-                                    <p:set>
-                                      <p:cBhvr>
-                                        <p:cTn id="6" dur="1" fill="hold">
-                                          <p:stCondLst>
-                                            <p:cond delay="0"/>
-                                          </p:stCondLst>
-                                        </p:cTn>
-                                        <p:tgtEl>
-                                          <p:spTgt spid="14"/>
-                                        </p:tgtEl>
-                                        <p:attrNameLst>
-                                          <p:attrName>style.visibility</p:attrName>
-                                        </p:attrNameLst>
-                                      </p:cBhvr>
-                                      <p:to>
-                                        <p:strVal val="visible"/>
-                                      </p:to>
-                                    </p:set>
-                                  </p:childTnLst>
-                                </p:cTn>
-                              </p:par>
-                              <p:par>
-                                <p:cTn id="7" presetID="1" presetClass="exit" presetSubtype="0" fill="hold" nodeType="withEffect">
-                                  <p:stCondLst>
-                                    <p:cond delay="0"/>
-                                  </p:stCondLst>
-                                  <p:childTnLst>
-                                    <p:set>
-                                      <p:cBhvr>
-                                        <p:cTn id="8" dur="1" fill="hold">
-                                          <p:stCondLst>
-                                            <p:cond delay="0"/>
-                                          </p:stCondLst>
-                                        </p:cTn>
-                                        <p:tgtEl>
-                                          <p:spTgt spid="10"/>
-                                        </p:tgtEl>
-                                        <p:attrNameLst>
-                                          <p:attrName>style.visibility</p:attrName>
-                                        </p:attrNameLst>
-                                      </p:cBhvr>
-                                      <p:to>
-                                        <p:strVal val="hidden"/>
-                                      </p:to>
-                                    </p:set>
-                                  </p:childTnLst>
-                                </p:cTn>
-                              </p:par>
-                            </p:childTnLst>
-                          </p:cTn>
-                        </p:par>
-                      </p:childTnLst>
-                    </p:cTn>
-                  </p:par>
-                </p:childTnLst>
-              </p:cTn>
-              <p:prevCondLst>
-                <p:cond evt="onPrev" delay="0">
-                  <p:tgtEl>
-                    <p:sldTgt/>
-                  </p:tgtEl>
-                </p:cond>
-              </p:prevCondLst>
-              <p:nextCondLst>
-                <p:cond evt="onNext" delay="0">
-                  <p:tgtEl>
-                    <p:sldTgt/>
-                  </p:tgtEl>
-                </p:cond>
-              </p:nextCondLst>
-            </p:seq>
-          </p:childTnLst>
-        </p:cTn>
-      </p:par>
-    </p:tnLst>
-  </p:timing>
-</p:sld>
-</file>
-
-<file path=ppt/slides/slide32.xml><?xml version="1.0" encoding="utf-8"?>
-<p:sld xmlns:a="http://schemas.openxmlformats.org/drawingml/2006/main" xmlns:r="http://schemas.openxmlformats.org/officeDocument/2006/relationships" xmlns:p="http://schemas.openxmlformats.org/presentationml/2006/main">
-  <p:cSld>
-    <p:spTree>
-      <p:nvGrpSpPr>
-        <p:cNvPr id="1" name=""/>
-        <p:cNvGrpSpPr/>
-        <p:nvPr/>
-      </p:nvGrpSpPr>
-      <p:grpSpPr>
-        <a:xfrm>
-          <a:off x="0" y="0"/>
-          <a:ext cx="0" cy="0"/>
-          <a:chOff x="0" y="0"/>
-          <a:chExt cx="0" cy="0"/>
-        </a:xfrm>
-      </p:grpSpPr>
-      <p:sp>
-        <p:nvSpPr>
-          <p:cNvPr id="2" name="Titre 1">
-            <a:extLst>
-              <a:ext uri="{FF2B5EF4-FFF2-40B4-BE49-F238E27FC236}">
-                <a16:creationId xmlns:a16="http://schemas.microsoft.com/office/drawing/2014/main" id="{A032E8A6-5CD7-447B-9FF9-CCAB7F9B3C57}"/>
-              </a:ext>
-            </a:extLst>
-          </p:cNvPr>
-          <p:cNvSpPr>
-            <a:spLocks noGrp="1"/>
-          </p:cNvSpPr>
-          <p:nvPr>
-            <p:ph type="title"/>
-          </p:nvPr>
-        </p:nvSpPr>
-        <p:spPr>
-          <a:xfrm>
-            <a:off x="677334" y="609600"/>
-            <a:ext cx="8596668" cy="722050"/>
-          </a:xfrm>
-        </p:spPr>
-        <p:txBody>
-          <a:bodyPr/>
-          <a:lstStyle/>
-          <a:p>
-            <a:pPr algn="ctr"/>
-            <a:r>
-              <a:rPr lang="fr-FR" dirty="0"/>
-              <a:t>Résultats</a:t>
-            </a:r>
-          </a:p>
-        </p:txBody>
-      </p:sp>
-      <p:sp>
-        <p:nvSpPr>
-          <p:cNvPr id="5" name="Espace réservé du numéro de diapositive 4">
-            <a:extLst>
-              <a:ext uri="{FF2B5EF4-FFF2-40B4-BE49-F238E27FC236}">
-                <a16:creationId xmlns:a16="http://schemas.microsoft.com/office/drawing/2014/main" id="{D8B1A001-3647-4E9B-A473-0E496DC82853}"/>
-              </a:ext>
-            </a:extLst>
-          </p:cNvPr>
-          <p:cNvSpPr>
-            <a:spLocks noGrp="1"/>
-          </p:cNvSpPr>
-          <p:nvPr>
-            <p:ph type="sldNum" sz="quarter" idx="12"/>
-          </p:nvPr>
-        </p:nvSpPr>
-        <p:spPr/>
-        <p:txBody>
-          <a:bodyPr/>
-          <a:lstStyle/>
-          <a:p>
-            <a:fld id="{000982F6-AAAD-4258-B115-44D8EC280712}" type="slidenum">
-              <a:rPr lang="fr-FR" smtClean="0"/>
-              <a:pPr/>
-              <a:t>32</a:t>
-            </a:fld>
-            <a:endParaRPr lang="fr-FR"/>
-          </a:p>
-        </p:txBody>
-      </p:sp>
-      <p:pic>
-        <p:nvPicPr>
-          <p:cNvPr id="9" name="Espace réservé du contenu 8">
-            <a:extLst>
-              <a:ext uri="{FF2B5EF4-FFF2-40B4-BE49-F238E27FC236}">
-                <a16:creationId xmlns:a16="http://schemas.microsoft.com/office/drawing/2014/main" id="{0151E7E7-719A-4588-91BD-9943A245EE71}"/>
-              </a:ext>
-            </a:extLst>
-          </p:cNvPr>
-          <p:cNvPicPr>
-            <a:picLocks noGrp="1" noChangeAspect="1"/>
-          </p:cNvPicPr>
-          <p:nvPr>
-            <p:ph idx="1"/>
-          </p:nvPr>
-        </p:nvPicPr>
-        <p:blipFill>
-          <a:blip r:embed="rId2">
-            <a:extLst>
-              <a:ext uri="{28A0092B-C50C-407E-A947-70E740481C1C}">
-                <a14:useLocalDpi xmlns:a14="http://schemas.microsoft.com/office/drawing/2010/main" val="0"/>
-              </a:ext>
-            </a:extLst>
-          </a:blip>
-          <a:stretch>
-            <a:fillRect/>
-          </a:stretch>
-        </p:blipFill>
-        <p:spPr>
-          <a:xfrm>
-            <a:off x="1078991" y="2939601"/>
-            <a:ext cx="6137783" cy="1436939"/>
-          </a:xfrm>
-        </p:spPr>
-      </p:pic>
-      <p:pic>
-        <p:nvPicPr>
-          <p:cNvPr id="11" name="Image 10">
-            <a:extLst>
-              <a:ext uri="{FF2B5EF4-FFF2-40B4-BE49-F238E27FC236}">
-                <a16:creationId xmlns:a16="http://schemas.microsoft.com/office/drawing/2014/main" id="{C4E470FD-F7AF-47BF-86E1-68501B91C9D1}"/>
-              </a:ext>
-            </a:extLst>
-          </p:cNvPr>
-          <p:cNvPicPr>
-            <a:picLocks noChangeAspect="1"/>
-          </p:cNvPicPr>
-          <p:nvPr/>
-        </p:nvPicPr>
-        <p:blipFill>
-          <a:blip r:embed="rId3">
-            <a:extLst>
-              <a:ext uri="{28A0092B-C50C-407E-A947-70E740481C1C}">
-                <a14:useLocalDpi xmlns:a14="http://schemas.microsoft.com/office/drawing/2010/main" val="0"/>
-              </a:ext>
-            </a:extLst>
-          </a:blip>
-          <a:stretch>
-            <a:fillRect/>
-          </a:stretch>
-        </p:blipFill>
-        <p:spPr>
-          <a:xfrm>
-            <a:off x="285565" y="170840"/>
-            <a:ext cx="11620870" cy="6516319"/>
+            <a:off x="147816" y="182873"/>
+            <a:ext cx="11896368" cy="6492253"/>
           </a:xfrm>
           <a:prstGeom prst="rect">
             <a:avLst/>
@@ -16060,7 +15966,7 @@
                                           </p:stCondLst>
                                         </p:cTn>
                                         <p:tgtEl>
-                                          <p:spTgt spid="11"/>
+                                          <p:spTgt spid="4"/>
                                         </p:tgtEl>
                                         <p:attrNameLst>
                                           <p:attrName>style.visibility</p:attrName>
@@ -16131,7 +16037,7 @@
 </p:sld>
 </file>
 
-<file path=ppt/slides/slide33.xml><?xml version="1.0" encoding="utf-8"?>
+<file path=ppt/slides/slide32.xml><?xml version="1.0" encoding="utf-8"?>
 <p:sld xmlns:a="http://schemas.openxmlformats.org/drawingml/2006/main" xmlns:r="http://schemas.openxmlformats.org/officeDocument/2006/relationships" xmlns:p="http://schemas.openxmlformats.org/presentationml/2006/main">
   <p:cSld>
     <p:spTree>
@@ -16237,7 +16143,7 @@
             <a:fld id="{000982F6-AAAD-4258-B115-44D8EC280712}" type="slidenum">
               <a:rPr lang="fr-FR" smtClean="0"/>
               <a:pPr/>
-              <a:t>33</a:t>
+              <a:t>32</a:t>
             </a:fld>
             <a:endParaRPr lang="fr-FR"/>
           </a:p>
@@ -16391,6 +16297,129 @@
 </p:sld>
 </file>
 
+<file path=ppt/slides/slide33.xml><?xml version="1.0" encoding="utf-8"?>
+<p:sld xmlns:a="http://schemas.openxmlformats.org/drawingml/2006/main" xmlns:r="http://schemas.openxmlformats.org/officeDocument/2006/relationships" xmlns:p="http://schemas.openxmlformats.org/presentationml/2006/main">
+  <p:cSld>
+    <p:spTree>
+      <p:nvGrpSpPr>
+        <p:cNvPr id="1" name=""/>
+        <p:cNvGrpSpPr/>
+        <p:nvPr/>
+      </p:nvGrpSpPr>
+      <p:grpSpPr>
+        <a:xfrm>
+          <a:off x="0" y="0"/>
+          <a:ext cx="0" cy="0"/>
+          <a:chOff x="0" y="0"/>
+          <a:chExt cx="0" cy="0"/>
+        </a:xfrm>
+      </p:grpSpPr>
+      <p:sp>
+        <p:nvSpPr>
+          <p:cNvPr id="2" name="Titre 1">
+            <a:extLst>
+              <a:ext uri="{FF2B5EF4-FFF2-40B4-BE49-F238E27FC236}">
+                <a16:creationId xmlns:a16="http://schemas.microsoft.com/office/drawing/2014/main" id="{EE2B802E-DCE4-4D8F-96EE-A32AEC5D1371}"/>
+              </a:ext>
+            </a:extLst>
+          </p:cNvPr>
+          <p:cNvSpPr>
+            <a:spLocks noGrp="1"/>
+          </p:cNvSpPr>
+          <p:nvPr>
+            <p:ph type="title"/>
+          </p:nvPr>
+        </p:nvSpPr>
+        <p:spPr/>
+        <p:txBody>
+          <a:bodyPr/>
+          <a:lstStyle/>
+          <a:p>
+            <a:r>
+              <a:rPr lang="fr-FR" dirty="0"/>
+              <a:t>Espace de Krylov </a:t>
+            </a:r>
+          </a:p>
+        </p:txBody>
+      </p:sp>
+      <p:pic>
+        <p:nvPicPr>
+          <p:cNvPr id="6" name="Espace réservé du contenu 5">
+            <a:extLst>
+              <a:ext uri="{FF2B5EF4-FFF2-40B4-BE49-F238E27FC236}">
+                <a16:creationId xmlns:a16="http://schemas.microsoft.com/office/drawing/2014/main" id="{7A36B87C-19AE-4398-AD0E-3D7187F48FAB}"/>
+              </a:ext>
+            </a:extLst>
+          </p:cNvPr>
+          <p:cNvPicPr>
+            <a:picLocks noGrp="1" noChangeAspect="1"/>
+          </p:cNvPicPr>
+          <p:nvPr>
+            <p:ph idx="1"/>
+          </p:nvPr>
+        </p:nvPicPr>
+        <p:blipFill>
+          <a:blip r:embed="rId2">
+            <a:extLst>
+              <a:ext uri="{28A0092B-C50C-407E-A947-70E740481C1C}">
+                <a14:useLocalDpi xmlns:a14="http://schemas.microsoft.com/office/drawing/2010/main" val="0"/>
+              </a:ext>
+            </a:extLst>
+          </a:blip>
+          <a:stretch>
+            <a:fillRect/>
+          </a:stretch>
+        </p:blipFill>
+        <p:spPr>
+          <a:xfrm>
+            <a:off x="498714" y="1420412"/>
+            <a:ext cx="11194572" cy="5130938"/>
+          </a:xfrm>
+        </p:spPr>
+      </p:pic>
+      <p:sp>
+        <p:nvSpPr>
+          <p:cNvPr id="4" name="Espace réservé du numéro de diapositive 3">
+            <a:extLst>
+              <a:ext uri="{FF2B5EF4-FFF2-40B4-BE49-F238E27FC236}">
+                <a16:creationId xmlns:a16="http://schemas.microsoft.com/office/drawing/2014/main" id="{E9A37E3D-9377-40BE-AA7A-1A8ED4BC0381}"/>
+              </a:ext>
+            </a:extLst>
+          </p:cNvPr>
+          <p:cNvSpPr>
+            <a:spLocks noGrp="1"/>
+          </p:cNvSpPr>
+          <p:nvPr>
+            <p:ph type="sldNum" sz="quarter" idx="12"/>
+          </p:nvPr>
+        </p:nvSpPr>
+        <p:spPr/>
+        <p:txBody>
+          <a:bodyPr/>
+          <a:lstStyle/>
+          <a:p>
+            <a:fld id="{000982F6-AAAD-4258-B115-44D8EC280712}" type="slidenum">
+              <a:rPr lang="fr-FR" smtClean="0"/>
+              <a:pPr/>
+              <a:t>33</a:t>
+            </a:fld>
+            <a:endParaRPr lang="fr-FR"/>
+          </a:p>
+        </p:txBody>
+      </p:sp>
+    </p:spTree>
+    <p:extLst>
+      <p:ext uri="{BB962C8B-B14F-4D97-AF65-F5344CB8AC3E}">
+        <p14:creationId xmlns:p14="http://schemas.microsoft.com/office/powerpoint/2010/main" val="1180920578"/>
+      </p:ext>
+    </p:extLst>
+  </p:cSld>
+  <p:clrMapOvr>
+    <a:masterClrMapping/>
+  </p:clrMapOvr>
+</p:sld>
+</file>
+
 <file path=ppt/slides/slide34.xml><?xml version="1.0" encoding="utf-8"?>
 <p:sld xmlns:a="http://schemas.openxmlformats.org/drawingml/2006/main" xmlns:r="http://schemas.openxmlformats.org/officeDocument/2006/relationships" xmlns:p="http://schemas.openxmlformats.org/presentationml/2006/main">
   <p:cSld>
@@ -16413,7 +16442,7 @@
           <p:cNvPr id="2" name="Titre 1">
             <a:extLst>
               <a:ext uri="{FF2B5EF4-FFF2-40B4-BE49-F238E27FC236}">
-                <a16:creationId xmlns:a16="http://schemas.microsoft.com/office/drawing/2014/main" id="{EE2B802E-DCE4-4D8F-96EE-A32AEC5D1371}"/>
+                <a16:creationId xmlns:a16="http://schemas.microsoft.com/office/drawing/2014/main" id="{8B8AA958-7EF5-4EB0-806C-74836A2B60F3}"/>
               </a:ext>
             </a:extLst>
           </p:cNvPr>
@@ -16424,59 +16453,190 @@
             <p:ph type="title"/>
           </p:nvPr>
         </p:nvSpPr>
-        <p:spPr/>
+        <p:spPr>
+          <a:xfrm>
+            <a:off x="677334" y="609600"/>
+            <a:ext cx="8596668" cy="751840"/>
+          </a:xfrm>
+        </p:spPr>
         <p:txBody>
           <a:bodyPr/>
           <a:lstStyle/>
           <a:p>
+            <a:pPr algn="ctr"/>
             <a:r>
               <a:rPr lang="fr-FR" dirty="0"/>
-              <a:t>Krylov </a:t>
-            </a:r>
-          </a:p>
-        </p:txBody>
-      </p:sp>
-      <p:pic>
-        <p:nvPicPr>
+              <a:t>Conclusion</a:t>
+            </a:r>
+          </a:p>
+        </p:txBody>
+      </p:sp>
+      <p:sp>
+        <p:nvSpPr>
+          <p:cNvPr id="3" name="Espace réservé du texte 2">
+            <a:extLst>
+              <a:ext uri="{FF2B5EF4-FFF2-40B4-BE49-F238E27FC236}">
+                <a16:creationId xmlns:a16="http://schemas.microsoft.com/office/drawing/2014/main" id="{7478EE0A-709D-4E6A-9A69-97A1C1F54D87}"/>
+              </a:ext>
+            </a:extLst>
+          </p:cNvPr>
+          <p:cNvSpPr>
+            <a:spLocks noGrp="1"/>
+          </p:cNvSpPr>
+          <p:nvPr>
+            <p:ph type="body" idx="1"/>
+          </p:nvPr>
+        </p:nvSpPr>
+        <p:spPr/>
+        <p:txBody>
+          <a:bodyPr/>
+          <a:lstStyle/>
+          <a:p>
+            <a:r>
+              <a:rPr lang="fr-FR" dirty="0"/>
+              <a:t>Méthodes usuelles</a:t>
+            </a:r>
+          </a:p>
+        </p:txBody>
+      </p:sp>
+      <p:sp>
+        <p:nvSpPr>
+          <p:cNvPr id="4" name="Espace réservé du contenu 3">
+            <a:extLst>
+              <a:ext uri="{FF2B5EF4-FFF2-40B4-BE49-F238E27FC236}">
+                <a16:creationId xmlns:a16="http://schemas.microsoft.com/office/drawing/2014/main" id="{E2AB1664-5A63-444A-BC52-5D2B293703CE}"/>
+              </a:ext>
+            </a:extLst>
+          </p:cNvPr>
+          <p:cNvSpPr>
+            <a:spLocks noGrp="1"/>
+          </p:cNvSpPr>
+          <p:nvPr>
+            <p:ph sz="half" idx="2"/>
+          </p:nvPr>
+        </p:nvSpPr>
+        <p:spPr/>
+        <p:txBody>
+          <a:bodyPr/>
+          <a:lstStyle/>
+          <a:p>
+            <a:r>
+              <a:rPr lang="fr-FR" dirty="0"/>
+              <a:t>Conditionnellement stable </a:t>
+            </a:r>
+          </a:p>
+          <a:p>
+            <a:endParaRPr lang="fr-FR" dirty="0"/>
+          </a:p>
+          <a:p>
+            <a:r>
+              <a:rPr lang="fr-FR" dirty="0"/>
+              <a:t>Erreurs dues aux schémas numériques</a:t>
+            </a:r>
+          </a:p>
+          <a:p>
+            <a:endParaRPr lang="fr-FR" dirty="0"/>
+          </a:p>
+          <a:p>
+            <a:r>
+              <a:rPr lang="fr-FR" dirty="0"/>
+              <a:t>Condition CFL à respecter (pas de temps</a:t>
+            </a:r>
+          </a:p>
+          <a:p>
+            <a:endParaRPr lang="fr-FR" dirty="0"/>
+          </a:p>
+          <a:p>
+            <a:endParaRPr lang="fr-FR" dirty="0"/>
+          </a:p>
+        </p:txBody>
+      </p:sp>
+      <p:sp>
+        <p:nvSpPr>
+          <p:cNvPr id="5" name="Espace réservé du texte 4">
+            <a:extLst>
+              <a:ext uri="{FF2B5EF4-FFF2-40B4-BE49-F238E27FC236}">
+                <a16:creationId xmlns:a16="http://schemas.microsoft.com/office/drawing/2014/main" id="{88B3B4E8-F4B8-474F-ADF7-691CCDBA65DC}"/>
+              </a:ext>
+            </a:extLst>
+          </p:cNvPr>
+          <p:cNvSpPr>
+            <a:spLocks noGrp="1"/>
+          </p:cNvSpPr>
+          <p:nvPr>
+            <p:ph type="body" sz="quarter" idx="3"/>
+          </p:nvPr>
+        </p:nvSpPr>
+        <p:spPr/>
+        <p:txBody>
+          <a:bodyPr/>
+          <a:lstStyle/>
+          <a:p>
+            <a:r>
+              <a:rPr lang="fr-FR" dirty="0"/>
+              <a:t>Méthodes exponentielle</a:t>
+            </a:r>
+          </a:p>
+        </p:txBody>
+      </p:sp>
+      <p:sp>
+        <p:nvSpPr>
           <p:cNvPr id="6" name="Espace réservé du contenu 5">
             <a:extLst>
               <a:ext uri="{FF2B5EF4-FFF2-40B4-BE49-F238E27FC236}">
-                <a16:creationId xmlns:a16="http://schemas.microsoft.com/office/drawing/2014/main" id="{7A36B87C-19AE-4398-AD0E-3D7187F48FAB}"/>
+                <a16:creationId xmlns:a16="http://schemas.microsoft.com/office/drawing/2014/main" id="{7C7F8C92-21F6-4243-BC10-2A53A7E53035}"/>
               </a:ext>
             </a:extLst>
           </p:cNvPr>
-          <p:cNvPicPr>
-            <a:picLocks noGrp="1" noChangeAspect="1"/>
-          </p:cNvPicPr>
-          <p:nvPr>
-            <p:ph idx="1"/>
-          </p:nvPr>
-        </p:nvPicPr>
-        <p:blipFill>
-          <a:blip r:embed="rId2">
-            <a:extLst>
-              <a:ext uri="{28A0092B-C50C-407E-A947-70E740481C1C}">
-                <a14:useLocalDpi xmlns:a14="http://schemas.microsoft.com/office/drawing/2010/main" val="0"/>
-              </a:ext>
-            </a:extLst>
-          </a:blip>
-          <a:stretch>
-            <a:fillRect/>
-          </a:stretch>
-        </p:blipFill>
-        <p:spPr>
-          <a:xfrm>
-            <a:off x="498714" y="1420412"/>
-            <a:ext cx="11194572" cy="5130938"/>
-          </a:xfrm>
-        </p:spPr>
-      </p:pic>
-      <p:sp>
-        <p:nvSpPr>
-          <p:cNvPr id="4" name="Espace réservé du numéro de diapositive 3">
+          <p:cNvSpPr>
+            <a:spLocks noGrp="1"/>
+          </p:cNvSpPr>
+          <p:nvPr>
+            <p:ph sz="quarter" idx="4"/>
+          </p:nvPr>
+        </p:nvSpPr>
+        <p:spPr/>
+        <p:txBody>
+          <a:bodyPr/>
+          <a:lstStyle/>
+          <a:p>
+            <a:r>
+              <a:rPr lang="fr-FR" dirty="0"/>
+              <a:t>Grand pas de temps </a:t>
+            </a:r>
+          </a:p>
+          <a:p>
+            <a:endParaRPr lang="fr-FR" dirty="0"/>
+          </a:p>
+          <a:p>
+            <a:r>
+              <a:rPr lang="fr-FR" dirty="0"/>
+              <a:t>Aucune erreur sur des problèmes linéaire (précision machine)</a:t>
+            </a:r>
+          </a:p>
+          <a:p>
+            <a:endParaRPr lang="fr-FR" dirty="0"/>
+          </a:p>
+          <a:p>
+            <a:r>
+              <a:rPr lang="fr-FR" dirty="0"/>
+              <a:t>Inconditionnellement stable sur pb de CFD classique </a:t>
+            </a:r>
+          </a:p>
+          <a:p>
+            <a:endParaRPr lang="fr-FR" dirty="0"/>
+          </a:p>
+          <a:p>
+            <a:endParaRPr lang="fr-FR" dirty="0"/>
+          </a:p>
+        </p:txBody>
+      </p:sp>
+      <p:sp>
+        <p:nvSpPr>
+          <p:cNvPr id="8" name="Espace réservé du numéro de diapositive 7">
             <a:extLst>
               <a:ext uri="{FF2B5EF4-FFF2-40B4-BE49-F238E27FC236}">
-                <a16:creationId xmlns:a16="http://schemas.microsoft.com/office/drawing/2014/main" id="{E9A37E3D-9377-40BE-AA7A-1A8ED4BC0381}"/>
+                <a16:creationId xmlns:a16="http://schemas.microsoft.com/office/drawing/2014/main" id="{D49305E3-2AE4-48AE-BADF-ECC7835468A0}"/>
               </a:ext>
             </a:extLst>
           </p:cNvPr>
@@ -16504,7 +16664,7 @@
     </p:spTree>
     <p:extLst>
       <p:ext uri="{BB962C8B-B14F-4D97-AF65-F5344CB8AC3E}">
-        <p14:creationId xmlns:p14="http://schemas.microsoft.com/office/powerpoint/2010/main" val="1180920578"/>
+        <p14:creationId xmlns:p14="http://schemas.microsoft.com/office/powerpoint/2010/main" val="860307842"/>
       </p:ext>
     </p:extLst>
   </p:cSld>
@@ -16536,7 +16696,7 @@
           <p:cNvPr id="2" name="Titre 1">
             <a:extLst>
               <a:ext uri="{FF2B5EF4-FFF2-40B4-BE49-F238E27FC236}">
-                <a16:creationId xmlns:a16="http://schemas.microsoft.com/office/drawing/2014/main" id="{8B8AA958-7EF5-4EB0-806C-74836A2B60F3}"/>
+                <a16:creationId xmlns:a16="http://schemas.microsoft.com/office/drawing/2014/main" id="{9CFA50E0-9007-497C-9665-D1A03FB0E848}"/>
               </a:ext>
             </a:extLst>
           </p:cNvPr>
@@ -16547,30 +16707,24 @@
             <p:ph type="title"/>
           </p:nvPr>
         </p:nvSpPr>
-        <p:spPr>
-          <a:xfrm>
-            <a:off x="677334" y="609600"/>
-            <a:ext cx="8596668" cy="751840"/>
-          </a:xfrm>
-        </p:spPr>
+        <p:spPr/>
         <p:txBody>
           <a:bodyPr/>
           <a:lstStyle/>
           <a:p>
-            <a:pPr algn="ctr"/>
             <a:r>
               <a:rPr lang="fr-FR" dirty="0"/>
-              <a:t>Conclusion</a:t>
-            </a:r>
-          </a:p>
-        </p:txBody>
-      </p:sp>
-      <p:sp>
-        <p:nvSpPr>
-          <p:cNvPr id="3" name="Espace réservé du texte 2">
+              <a:t>Conclusion </a:t>
+            </a:r>
+          </a:p>
+        </p:txBody>
+      </p:sp>
+      <p:sp>
+        <p:nvSpPr>
+          <p:cNvPr id="3" name="Espace réservé du contenu 2">
             <a:extLst>
               <a:ext uri="{FF2B5EF4-FFF2-40B4-BE49-F238E27FC236}">
-                <a16:creationId xmlns:a16="http://schemas.microsoft.com/office/drawing/2014/main" id="{7478EE0A-709D-4E6A-9A69-97A1C1F54D87}"/>
+                <a16:creationId xmlns:a16="http://schemas.microsoft.com/office/drawing/2014/main" id="{5E8274BE-F605-4CE0-AD36-4BAB9F3BD123}"/>
               </a:ext>
             </a:extLst>
           </p:cNvPr>
@@ -16578,7 +16732,7 @@
             <a:spLocks noGrp="1"/>
           </p:cNvSpPr>
           <p:nvPr>
-            <p:ph type="body" idx="1"/>
+            <p:ph idx="1"/>
           </p:nvPr>
         </p:nvSpPr>
         <p:spPr/>
@@ -16588,149 +16742,61 @@
           <a:p>
             <a:r>
               <a:rPr lang="fr-FR" dirty="0"/>
-              <a:t>Méthodes usuelles</a:t>
-            </a:r>
-          </a:p>
-        </p:txBody>
-      </p:sp>
-      <p:sp>
-        <p:nvSpPr>
-          <p:cNvPr id="4" name="Espace réservé du contenu 3">
+              <a:t>Parfaite résolution des problèmes linéaires </a:t>
+            </a:r>
+          </a:p>
+          <a:p>
+            <a:endParaRPr lang="fr-FR" dirty="0"/>
+          </a:p>
+          <a:p>
+            <a:r>
+              <a:rPr lang="fr-FR" dirty="0"/>
+              <a:t>Donc problème d’advection/diffusion résolu exactement </a:t>
+            </a:r>
+          </a:p>
+          <a:p>
+            <a:endParaRPr lang="fr-FR" dirty="0"/>
+          </a:p>
+          <a:p>
+            <a:r>
+              <a:rPr lang="fr-FR" dirty="0"/>
+              <a:t>Equation non-linéaire du type Burgers </a:t>
+            </a:r>
+            <a:r>
+              <a:rPr lang="fr-FR" dirty="0">
+                <a:sym typeface="Wingdings" panose="05000000000000000000" pitchFamily="2" charset="2"/>
+              </a:rPr>
+              <a:t> Difficile de conclure car c’est en dehors des hypothèses d’applications de la théorie</a:t>
+            </a:r>
+          </a:p>
+          <a:p>
+            <a:endParaRPr lang="fr-FR" dirty="0">
+              <a:sym typeface="Wingdings" panose="05000000000000000000" pitchFamily="2" charset="2"/>
+            </a:endParaRPr>
+          </a:p>
+          <a:p>
+            <a:r>
+              <a:rPr lang="fr-FR" dirty="0">
+                <a:sym typeface="Wingdings" panose="05000000000000000000" pitchFamily="2" charset="2"/>
+              </a:rPr>
+              <a:t>Les espaces de Krylov semble </a:t>
+            </a:r>
+            <a:r>
+              <a:rPr lang="fr-FR" dirty="0" err="1">
+                <a:sym typeface="Wingdings" panose="05000000000000000000" pitchFamily="2" charset="2"/>
+              </a:rPr>
+              <a:t>necessair</a:t>
+            </a:r>
+            <a:endParaRPr lang="fr-FR" dirty="0"/>
+          </a:p>
+        </p:txBody>
+      </p:sp>
+      <p:sp>
+        <p:nvSpPr>
+          <p:cNvPr id="4" name="Espace réservé du numéro de diapositive 3">
             <a:extLst>
               <a:ext uri="{FF2B5EF4-FFF2-40B4-BE49-F238E27FC236}">
-                <a16:creationId xmlns:a16="http://schemas.microsoft.com/office/drawing/2014/main" id="{E2AB1664-5A63-444A-BC52-5D2B293703CE}"/>
-              </a:ext>
-            </a:extLst>
-          </p:cNvPr>
-          <p:cNvSpPr>
-            <a:spLocks noGrp="1"/>
-          </p:cNvSpPr>
-          <p:nvPr>
-            <p:ph sz="half" idx="2"/>
-          </p:nvPr>
-        </p:nvSpPr>
-        <p:spPr/>
-        <p:txBody>
-          <a:bodyPr/>
-          <a:lstStyle/>
-          <a:p>
-            <a:r>
-              <a:rPr lang="fr-FR" dirty="0"/>
-              <a:t>Conditionnellement stable </a:t>
-            </a:r>
-          </a:p>
-          <a:p>
-            <a:endParaRPr lang="fr-FR" dirty="0"/>
-          </a:p>
-          <a:p>
-            <a:r>
-              <a:rPr lang="fr-FR" dirty="0"/>
-              <a:t>Erreurs dues aux schémas numériques</a:t>
-            </a:r>
-          </a:p>
-          <a:p>
-            <a:endParaRPr lang="fr-FR" dirty="0"/>
-          </a:p>
-          <a:p>
-            <a:r>
-              <a:rPr lang="fr-FR" dirty="0"/>
-              <a:t>Condition CFL à respecter (pas de temps</a:t>
-            </a:r>
-          </a:p>
-          <a:p>
-            <a:endParaRPr lang="fr-FR" dirty="0"/>
-          </a:p>
-          <a:p>
-            <a:endParaRPr lang="fr-FR" dirty="0"/>
-          </a:p>
-        </p:txBody>
-      </p:sp>
-      <p:sp>
-        <p:nvSpPr>
-          <p:cNvPr id="5" name="Espace réservé du texte 4">
-            <a:extLst>
-              <a:ext uri="{FF2B5EF4-FFF2-40B4-BE49-F238E27FC236}">
-                <a16:creationId xmlns:a16="http://schemas.microsoft.com/office/drawing/2014/main" id="{88B3B4E8-F4B8-474F-ADF7-691CCDBA65DC}"/>
-              </a:ext>
-            </a:extLst>
-          </p:cNvPr>
-          <p:cNvSpPr>
-            <a:spLocks noGrp="1"/>
-          </p:cNvSpPr>
-          <p:nvPr>
-            <p:ph type="body" sz="quarter" idx="3"/>
-          </p:nvPr>
-        </p:nvSpPr>
-        <p:spPr/>
-        <p:txBody>
-          <a:bodyPr/>
-          <a:lstStyle/>
-          <a:p>
-            <a:r>
-              <a:rPr lang="fr-FR" dirty="0"/>
-              <a:t>Méthodes exponentielle</a:t>
-            </a:r>
-          </a:p>
-        </p:txBody>
-      </p:sp>
-      <p:sp>
-        <p:nvSpPr>
-          <p:cNvPr id="6" name="Espace réservé du contenu 5">
-            <a:extLst>
-              <a:ext uri="{FF2B5EF4-FFF2-40B4-BE49-F238E27FC236}">
-                <a16:creationId xmlns:a16="http://schemas.microsoft.com/office/drawing/2014/main" id="{7C7F8C92-21F6-4243-BC10-2A53A7E53035}"/>
-              </a:ext>
-            </a:extLst>
-          </p:cNvPr>
-          <p:cNvSpPr>
-            <a:spLocks noGrp="1"/>
-          </p:cNvSpPr>
-          <p:nvPr>
-            <p:ph sz="quarter" idx="4"/>
-          </p:nvPr>
-        </p:nvSpPr>
-        <p:spPr/>
-        <p:txBody>
-          <a:bodyPr/>
-          <a:lstStyle/>
-          <a:p>
-            <a:r>
-              <a:rPr lang="fr-FR" dirty="0"/>
-              <a:t>Grand pas de temps </a:t>
-            </a:r>
-          </a:p>
-          <a:p>
-            <a:endParaRPr lang="fr-FR" dirty="0"/>
-          </a:p>
-          <a:p>
-            <a:r>
-              <a:rPr lang="fr-FR" dirty="0"/>
-              <a:t>Aucune erreur sur des problèmes linéaire (précision machine)</a:t>
-            </a:r>
-          </a:p>
-          <a:p>
-            <a:endParaRPr lang="fr-FR" dirty="0"/>
-          </a:p>
-          <a:p>
-            <a:r>
-              <a:rPr lang="fr-FR" dirty="0"/>
-              <a:t>Inconditionnellement stable sur pb de CFD classique </a:t>
-            </a:r>
-          </a:p>
-          <a:p>
-            <a:endParaRPr lang="fr-FR" dirty="0"/>
-          </a:p>
-          <a:p>
-            <a:endParaRPr lang="fr-FR" dirty="0"/>
-          </a:p>
-        </p:txBody>
-      </p:sp>
-      <p:sp>
-        <p:nvSpPr>
-          <p:cNvPr id="8" name="Espace réservé du numéro de diapositive 7">
-            <a:extLst>
-              <a:ext uri="{FF2B5EF4-FFF2-40B4-BE49-F238E27FC236}">
-                <a16:creationId xmlns:a16="http://schemas.microsoft.com/office/drawing/2014/main" id="{D49305E3-2AE4-48AE-BADF-ECC7835468A0}"/>
+                <a16:creationId xmlns:a16="http://schemas.microsoft.com/office/drawing/2014/main" id="{546DDE9B-4449-4A1B-AAEC-1C359124B0C5}"/>
               </a:ext>
             </a:extLst>
           </p:cNvPr>
@@ -16750,166 +16816,6 @@
               <a:rPr lang="fr-FR" smtClean="0"/>
               <a:pPr/>
               <a:t>35</a:t>
-            </a:fld>
-            <a:endParaRPr lang="fr-FR"/>
-          </a:p>
-        </p:txBody>
-      </p:sp>
-    </p:spTree>
-    <p:extLst>
-      <p:ext uri="{BB962C8B-B14F-4D97-AF65-F5344CB8AC3E}">
-        <p14:creationId xmlns:p14="http://schemas.microsoft.com/office/powerpoint/2010/main" val="860307842"/>
-      </p:ext>
-    </p:extLst>
-  </p:cSld>
-  <p:clrMapOvr>
-    <a:masterClrMapping/>
-  </p:clrMapOvr>
-</p:sld>
-</file>
-
-<file path=ppt/slides/slide36.xml><?xml version="1.0" encoding="utf-8"?>
-<p:sld xmlns:a="http://schemas.openxmlformats.org/drawingml/2006/main" xmlns:r="http://schemas.openxmlformats.org/officeDocument/2006/relationships" xmlns:p="http://schemas.openxmlformats.org/presentationml/2006/main">
-  <p:cSld>
-    <p:spTree>
-      <p:nvGrpSpPr>
-        <p:cNvPr id="1" name=""/>
-        <p:cNvGrpSpPr/>
-        <p:nvPr/>
-      </p:nvGrpSpPr>
-      <p:grpSpPr>
-        <a:xfrm>
-          <a:off x="0" y="0"/>
-          <a:ext cx="0" cy="0"/>
-          <a:chOff x="0" y="0"/>
-          <a:chExt cx="0" cy="0"/>
-        </a:xfrm>
-      </p:grpSpPr>
-      <p:sp>
-        <p:nvSpPr>
-          <p:cNvPr id="2" name="Titre 1">
-            <a:extLst>
-              <a:ext uri="{FF2B5EF4-FFF2-40B4-BE49-F238E27FC236}">
-                <a16:creationId xmlns:a16="http://schemas.microsoft.com/office/drawing/2014/main" id="{9CFA50E0-9007-497C-9665-D1A03FB0E848}"/>
-              </a:ext>
-            </a:extLst>
-          </p:cNvPr>
-          <p:cNvSpPr>
-            <a:spLocks noGrp="1"/>
-          </p:cNvSpPr>
-          <p:nvPr>
-            <p:ph type="title"/>
-          </p:nvPr>
-        </p:nvSpPr>
-        <p:spPr/>
-        <p:txBody>
-          <a:bodyPr/>
-          <a:lstStyle/>
-          <a:p>
-            <a:r>
-              <a:rPr lang="fr-FR" dirty="0"/>
-              <a:t>Conclusion </a:t>
-            </a:r>
-          </a:p>
-        </p:txBody>
-      </p:sp>
-      <p:sp>
-        <p:nvSpPr>
-          <p:cNvPr id="3" name="Espace réservé du contenu 2">
-            <a:extLst>
-              <a:ext uri="{FF2B5EF4-FFF2-40B4-BE49-F238E27FC236}">
-                <a16:creationId xmlns:a16="http://schemas.microsoft.com/office/drawing/2014/main" id="{5E8274BE-F605-4CE0-AD36-4BAB9F3BD123}"/>
-              </a:ext>
-            </a:extLst>
-          </p:cNvPr>
-          <p:cNvSpPr>
-            <a:spLocks noGrp="1"/>
-          </p:cNvSpPr>
-          <p:nvPr>
-            <p:ph idx="1"/>
-          </p:nvPr>
-        </p:nvSpPr>
-        <p:spPr/>
-        <p:txBody>
-          <a:bodyPr/>
-          <a:lstStyle/>
-          <a:p>
-            <a:r>
-              <a:rPr lang="fr-FR" dirty="0"/>
-              <a:t>Parfaite résolution des problèmes linéaires </a:t>
-            </a:r>
-          </a:p>
-          <a:p>
-            <a:endParaRPr lang="fr-FR" dirty="0"/>
-          </a:p>
-          <a:p>
-            <a:r>
-              <a:rPr lang="fr-FR" dirty="0"/>
-              <a:t>Donc problème d’advection/diffusion résolu exactement </a:t>
-            </a:r>
-          </a:p>
-          <a:p>
-            <a:endParaRPr lang="fr-FR" dirty="0"/>
-          </a:p>
-          <a:p>
-            <a:r>
-              <a:rPr lang="fr-FR" dirty="0"/>
-              <a:t>Equation non-linéaire du type Burgers </a:t>
-            </a:r>
-            <a:r>
-              <a:rPr lang="fr-FR" dirty="0">
-                <a:sym typeface="Wingdings" panose="05000000000000000000" pitchFamily="2" charset="2"/>
-              </a:rPr>
-              <a:t> Difficile de conclure car c’est en dehors des hypothèses d’applications de la théorie</a:t>
-            </a:r>
-          </a:p>
-          <a:p>
-            <a:endParaRPr lang="fr-FR" dirty="0">
-              <a:sym typeface="Wingdings" panose="05000000000000000000" pitchFamily="2" charset="2"/>
-            </a:endParaRPr>
-          </a:p>
-          <a:p>
-            <a:r>
-              <a:rPr lang="fr-FR" dirty="0">
-                <a:sym typeface="Wingdings" panose="05000000000000000000" pitchFamily="2" charset="2"/>
-              </a:rPr>
-              <a:t>Les espaces de Krylov semble </a:t>
-            </a:r>
-            <a:r>
-              <a:rPr lang="fr-FR" dirty="0" err="1">
-                <a:sym typeface="Wingdings" panose="05000000000000000000" pitchFamily="2" charset="2"/>
-              </a:rPr>
-              <a:t>necessair</a:t>
-            </a:r>
-            <a:endParaRPr lang="fr-FR" dirty="0"/>
-          </a:p>
-        </p:txBody>
-      </p:sp>
-      <p:sp>
-        <p:nvSpPr>
-          <p:cNvPr id="4" name="Espace réservé du numéro de diapositive 3">
-            <a:extLst>
-              <a:ext uri="{FF2B5EF4-FFF2-40B4-BE49-F238E27FC236}">
-                <a16:creationId xmlns:a16="http://schemas.microsoft.com/office/drawing/2014/main" id="{546DDE9B-4449-4A1B-AAEC-1C359124B0C5}"/>
-              </a:ext>
-            </a:extLst>
-          </p:cNvPr>
-          <p:cNvSpPr>
-            <a:spLocks noGrp="1"/>
-          </p:cNvSpPr>
-          <p:nvPr>
-            <p:ph type="sldNum" sz="quarter" idx="12"/>
-          </p:nvPr>
-        </p:nvSpPr>
-        <p:spPr/>
-        <p:txBody>
-          <a:bodyPr/>
-          <a:lstStyle/>
-          <a:p>
-            <a:fld id="{000982F6-AAAD-4258-B115-44D8EC280712}" type="slidenum">
-              <a:rPr lang="fr-FR" smtClean="0"/>
-              <a:pPr/>
-              <a:t>36</a:t>
             </a:fld>
             <a:endParaRPr lang="fr-FR"/>
           </a:p>

</xml_diff>